<commit_message>
Backpu before adding FK and IK to last three joints
</commit_message>
<xml_diff>
--- a/Doc/Denavit-Hartenberg.pptx
+++ b/Doc/Denavit-Hartenberg.pptx
@@ -5,7 +5,9 @@
     <p:sldMasterId id="2147483648" r:id="rId1"/>
   </p:sldMasterIdLst>
   <p:sldIdLst>
-    <p:sldId id="256" r:id="rId2"/>
+    <p:sldId id="258" r:id="rId2"/>
+    <p:sldId id="257" r:id="rId3"/>
+    <p:sldId id="259" r:id="rId4"/>
   </p:sldIdLst>
   <p:sldSz cx="12192000" cy="6858000"/>
   <p:notesSz cx="6858000" cy="9144000"/>
@@ -104,6 +106,11 @@
       </a:defRPr>
     </a:lvl9pPr>
   </p:defaultTextStyle>
+  <p:extLst>
+    <p:ext uri="{EFAFB233-063F-42B5-8137-9DF3F51BA10A}">
+      <p15:sldGuideLst xmlns:p15="http://schemas.microsoft.com/office/powerpoint/2012/main"/>
+    </p:ext>
+  </p:extLst>
 </p:presentation>
 </file>
 
@@ -254,7 +261,7 @@
           <a:p>
             <a:fld id="{62A70C6D-A3C4-4C44-A745-7E174427F35D}" type="datetimeFigureOut">
               <a:rPr lang="en-US" smtClean="0"/>
-              <a:t>4/22/2024</a:t>
+              <a:t>5/3/2024</a:t>
             </a:fld>
             <a:endParaRPr lang="en-US"/>
           </a:p>
@@ -452,7 +459,7 @@
           <a:p>
             <a:fld id="{62A70C6D-A3C4-4C44-A745-7E174427F35D}" type="datetimeFigureOut">
               <a:rPr lang="en-US" smtClean="0"/>
-              <a:t>4/22/2024</a:t>
+              <a:t>5/3/2024</a:t>
             </a:fld>
             <a:endParaRPr lang="en-US"/>
           </a:p>
@@ -660,7 +667,7 @@
           <a:p>
             <a:fld id="{62A70C6D-A3C4-4C44-A745-7E174427F35D}" type="datetimeFigureOut">
               <a:rPr lang="en-US" smtClean="0"/>
-              <a:t>4/22/2024</a:t>
+              <a:t>5/3/2024</a:t>
             </a:fld>
             <a:endParaRPr lang="en-US"/>
           </a:p>
@@ -858,7 +865,7 @@
           <a:p>
             <a:fld id="{62A70C6D-A3C4-4C44-A745-7E174427F35D}" type="datetimeFigureOut">
               <a:rPr lang="en-US" smtClean="0"/>
-              <a:t>4/22/2024</a:t>
+              <a:t>5/3/2024</a:t>
             </a:fld>
             <a:endParaRPr lang="en-US"/>
           </a:p>
@@ -1133,7 +1140,7 @@
           <a:p>
             <a:fld id="{62A70C6D-A3C4-4C44-A745-7E174427F35D}" type="datetimeFigureOut">
               <a:rPr lang="en-US" smtClean="0"/>
-              <a:t>4/22/2024</a:t>
+              <a:t>5/3/2024</a:t>
             </a:fld>
             <a:endParaRPr lang="en-US"/>
           </a:p>
@@ -1398,7 +1405,7 @@
           <a:p>
             <a:fld id="{62A70C6D-A3C4-4C44-A745-7E174427F35D}" type="datetimeFigureOut">
               <a:rPr lang="en-US" smtClean="0"/>
-              <a:t>4/22/2024</a:t>
+              <a:t>5/3/2024</a:t>
             </a:fld>
             <a:endParaRPr lang="en-US"/>
           </a:p>
@@ -1810,7 +1817,7 @@
           <a:p>
             <a:fld id="{62A70C6D-A3C4-4C44-A745-7E174427F35D}" type="datetimeFigureOut">
               <a:rPr lang="en-US" smtClean="0"/>
-              <a:t>4/22/2024</a:t>
+              <a:t>5/3/2024</a:t>
             </a:fld>
             <a:endParaRPr lang="en-US"/>
           </a:p>
@@ -1951,7 +1958,7 @@
           <a:p>
             <a:fld id="{62A70C6D-A3C4-4C44-A745-7E174427F35D}" type="datetimeFigureOut">
               <a:rPr lang="en-US" smtClean="0"/>
-              <a:t>4/22/2024</a:t>
+              <a:t>5/3/2024</a:t>
             </a:fld>
             <a:endParaRPr lang="en-US"/>
           </a:p>
@@ -2064,7 +2071,7 @@
           <a:p>
             <a:fld id="{62A70C6D-A3C4-4C44-A745-7E174427F35D}" type="datetimeFigureOut">
               <a:rPr lang="en-US" smtClean="0"/>
-              <a:t>4/22/2024</a:t>
+              <a:t>5/3/2024</a:t>
             </a:fld>
             <a:endParaRPr lang="en-US"/>
           </a:p>
@@ -2375,7 +2382,7 @@
           <a:p>
             <a:fld id="{62A70C6D-A3C4-4C44-A745-7E174427F35D}" type="datetimeFigureOut">
               <a:rPr lang="en-US" smtClean="0"/>
-              <a:t>4/22/2024</a:t>
+              <a:t>5/3/2024</a:t>
             </a:fld>
             <a:endParaRPr lang="en-US"/>
           </a:p>
@@ -2663,7 +2670,7 @@
           <a:p>
             <a:fld id="{62A70C6D-A3C4-4C44-A745-7E174427F35D}" type="datetimeFigureOut">
               <a:rPr lang="en-US" smtClean="0"/>
-              <a:t>4/22/2024</a:t>
+              <a:t>5/3/2024</a:t>
             </a:fld>
             <a:endParaRPr lang="en-US"/>
           </a:p>
@@ -2904,7 +2911,7 @@
           <a:p>
             <a:fld id="{62A70C6D-A3C4-4C44-A745-7E174427F35D}" type="datetimeFigureOut">
               <a:rPr lang="en-US" smtClean="0"/>
-              <a:t>4/22/2024</a:t>
+              <a:t>5/3/2024</a:t>
             </a:fld>
             <a:endParaRPr lang="en-US"/>
           </a:p>
@@ -3323,10 +3330,10 @@
       </p:grpSpPr>
       <p:pic>
         <p:nvPicPr>
-          <p:cNvPr id="13" name="Picture 12">
-            <a:extLst>
-              <a:ext uri="{FF2B5EF4-FFF2-40B4-BE49-F238E27FC236}">
-                <a16:creationId xmlns:a16="http://schemas.microsoft.com/office/drawing/2014/main" id="{8947617E-CF31-3E07-A154-D8E845510BE0}"/>
+          <p:cNvPr id="3" name="Picture 2">
+            <a:extLst>
+              <a:ext uri="{FF2B5EF4-FFF2-40B4-BE49-F238E27FC236}">
+                <a16:creationId xmlns:a16="http://schemas.microsoft.com/office/drawing/2014/main" id="{BDBCF312-BD46-44D4-7F01-E836F33F6941}"/>
               </a:ext>
             </a:extLst>
           </p:cNvPr>
@@ -3343,38 +3350,8 @@
         </p:blipFill>
         <p:spPr>
           <a:xfrm>
-            <a:off x="242663" y="0"/>
-            <a:ext cx="4932648" cy="6858000"/>
-          </a:xfrm>
-          <a:prstGeom prst="rect">
-            <a:avLst/>
-          </a:prstGeom>
-        </p:spPr>
-      </p:pic>
-      <p:pic>
-        <p:nvPicPr>
-          <p:cNvPr id="16" name="Picture 15">
-            <a:extLst>
-              <a:ext uri="{FF2B5EF4-FFF2-40B4-BE49-F238E27FC236}">
-                <a16:creationId xmlns:a16="http://schemas.microsoft.com/office/drawing/2014/main" id="{FC12CAD7-2E16-CD67-587B-78F34426D2EB}"/>
-              </a:ext>
-            </a:extLst>
-          </p:cNvPr>
-          <p:cNvPicPr>
-            <a:picLocks noChangeAspect="1"/>
-          </p:cNvPicPr>
-          <p:nvPr/>
-        </p:nvPicPr>
-        <p:blipFill>
-          <a:blip r:embed="rId3"/>
-          <a:stretch>
-            <a:fillRect/>
-          </a:stretch>
-        </p:blipFill>
-        <p:spPr>
-          <a:xfrm>
-            <a:off x="5778467" y="1675039"/>
-            <a:ext cx="5972175" cy="4552950"/>
+            <a:off x="490537" y="404812"/>
+            <a:ext cx="11210925" cy="6048375"/>
           </a:xfrm>
           <a:prstGeom prst="rect">
             <a:avLst/>
@@ -3384,7 +3361,2618 @@
     </p:spTree>
     <p:extLst>
       <p:ext uri="{BB962C8B-B14F-4D97-AF65-F5344CB8AC3E}">
-        <p14:creationId xmlns:p14="http://schemas.microsoft.com/office/powerpoint/2010/main" val="1101059785"/>
+        <p14:creationId xmlns:p14="http://schemas.microsoft.com/office/powerpoint/2010/main" val="3592314825"/>
+      </p:ext>
+    </p:extLst>
+  </p:cSld>
+  <p:clrMapOvr>
+    <a:masterClrMapping/>
+  </p:clrMapOvr>
+</p:sld>
+</file>
+
+<file path=ppt/slides/slide2.xml><?xml version="1.0" encoding="utf-8"?>
+<p:sld xmlns:a="http://schemas.openxmlformats.org/drawingml/2006/main" xmlns:r="http://schemas.openxmlformats.org/officeDocument/2006/relationships" xmlns:p="http://schemas.openxmlformats.org/presentationml/2006/main">
+  <p:cSld>
+    <p:spTree>
+      <p:nvGrpSpPr>
+        <p:cNvPr id="1" name=""/>
+        <p:cNvGrpSpPr/>
+        <p:nvPr/>
+      </p:nvGrpSpPr>
+      <p:grpSpPr>
+        <a:xfrm>
+          <a:off x="0" y="0"/>
+          <a:ext cx="0" cy="0"/>
+          <a:chOff x="0" y="0"/>
+          <a:chExt cx="0" cy="0"/>
+        </a:xfrm>
+      </p:grpSpPr>
+      <p:grpSp>
+        <p:nvGrpSpPr>
+          <p:cNvPr id="4" name="Group 3">
+            <a:extLst>
+              <a:ext uri="{FF2B5EF4-FFF2-40B4-BE49-F238E27FC236}">
+                <a16:creationId xmlns:a16="http://schemas.microsoft.com/office/drawing/2014/main" id="{388A0AEC-6122-D731-A658-339644E16AF3}"/>
+              </a:ext>
+            </a:extLst>
+          </p:cNvPr>
+          <p:cNvGrpSpPr/>
+          <p:nvPr/>
+        </p:nvGrpSpPr>
+        <p:grpSpPr>
+          <a:xfrm>
+            <a:off x="2095128" y="4199051"/>
+            <a:ext cx="248575" cy="471998"/>
+            <a:chOff x="2246050" y="1305017"/>
+            <a:chExt cx="204187" cy="471998"/>
+          </a:xfrm>
+        </p:grpSpPr>
+        <p:sp>
+          <p:nvSpPr>
+            <p:cNvPr id="2" name="Isosceles Triangle 1">
+              <a:extLst>
+                <a:ext uri="{FF2B5EF4-FFF2-40B4-BE49-F238E27FC236}">
+                  <a16:creationId xmlns:a16="http://schemas.microsoft.com/office/drawing/2014/main" id="{E798782C-357A-4A4C-01FE-D86F1B2FE98F}"/>
+                </a:ext>
+              </a:extLst>
+            </p:cNvPr>
+            <p:cNvSpPr/>
+            <p:nvPr/>
+          </p:nvSpPr>
+          <p:spPr>
+            <a:xfrm>
+              <a:off x="2246050" y="1305017"/>
+              <a:ext cx="204187" cy="213065"/>
+            </a:xfrm>
+            <a:prstGeom prst="triangle">
+              <a:avLst/>
+            </a:prstGeom>
+          </p:spPr>
+          <p:style>
+            <a:lnRef idx="2">
+              <a:schemeClr val="dk1">
+                <a:shade val="15000"/>
+              </a:schemeClr>
+            </a:lnRef>
+            <a:fillRef idx="1">
+              <a:schemeClr val="dk1"/>
+            </a:fillRef>
+            <a:effectRef idx="0">
+              <a:schemeClr val="dk1"/>
+            </a:effectRef>
+            <a:fontRef idx="minor">
+              <a:schemeClr val="lt1"/>
+            </a:fontRef>
+          </p:style>
+          <p:txBody>
+            <a:bodyPr rtlCol="0" anchor="ctr"/>
+            <a:lstStyle/>
+            <a:p>
+              <a:pPr algn="ctr"/>
+              <a:endParaRPr lang="en-US"/>
+            </a:p>
+          </p:txBody>
+        </p:sp>
+        <p:sp>
+          <p:nvSpPr>
+            <p:cNvPr id="3" name="Isosceles Triangle 2">
+              <a:extLst>
+                <a:ext uri="{FF2B5EF4-FFF2-40B4-BE49-F238E27FC236}">
+                  <a16:creationId xmlns:a16="http://schemas.microsoft.com/office/drawing/2014/main" id="{D9BCC807-4E13-AF78-1C7B-AAB81D96CF68}"/>
+                </a:ext>
+              </a:extLst>
+            </p:cNvPr>
+            <p:cNvSpPr/>
+            <p:nvPr/>
+          </p:nvSpPr>
+          <p:spPr>
+            <a:xfrm rot="10800000">
+              <a:off x="2246050" y="1563950"/>
+              <a:ext cx="204187" cy="213065"/>
+            </a:xfrm>
+            <a:prstGeom prst="triangle">
+              <a:avLst/>
+            </a:prstGeom>
+          </p:spPr>
+          <p:style>
+            <a:lnRef idx="2">
+              <a:schemeClr val="dk1">
+                <a:shade val="15000"/>
+              </a:schemeClr>
+            </a:lnRef>
+            <a:fillRef idx="1">
+              <a:schemeClr val="dk1"/>
+            </a:fillRef>
+            <a:effectRef idx="0">
+              <a:schemeClr val="dk1"/>
+            </a:effectRef>
+            <a:fontRef idx="minor">
+              <a:schemeClr val="lt1"/>
+            </a:fontRef>
+          </p:style>
+          <p:txBody>
+            <a:bodyPr rtlCol="0" anchor="ctr"/>
+            <a:lstStyle/>
+            <a:p>
+              <a:pPr algn="ctr"/>
+              <a:endParaRPr lang="en-US"/>
+            </a:p>
+          </p:txBody>
+        </p:sp>
+      </p:grpSp>
+      <p:cxnSp>
+        <p:nvCxnSpPr>
+          <p:cNvPr id="6" name="Straight Arrow Connector 5">
+            <a:extLst>
+              <a:ext uri="{FF2B5EF4-FFF2-40B4-BE49-F238E27FC236}">
+                <a16:creationId xmlns:a16="http://schemas.microsoft.com/office/drawing/2014/main" id="{273034A2-02B5-073C-A6A2-5E28C61EB098}"/>
+              </a:ext>
+            </a:extLst>
+          </p:cNvPr>
+          <p:cNvCxnSpPr>
+            <a:cxnSpLocks/>
+          </p:cNvCxnSpPr>
+          <p:nvPr/>
+        </p:nvCxnSpPr>
+        <p:spPr>
+          <a:xfrm flipV="1">
+            <a:off x="5468643" y="4332303"/>
+            <a:ext cx="0" cy="526001"/>
+          </a:xfrm>
+          <a:prstGeom prst="straightConnector1">
+            <a:avLst/>
+          </a:prstGeom>
+          <a:ln w="38100">
+            <a:solidFill>
+              <a:schemeClr val="tx2">
+                <a:lumMod val="50000"/>
+                <a:lumOff val="50000"/>
+              </a:schemeClr>
+            </a:solidFill>
+            <a:tailEnd type="triangle"/>
+          </a:ln>
+        </p:spPr>
+        <p:style>
+          <a:lnRef idx="2">
+            <a:schemeClr val="dk1"/>
+          </a:lnRef>
+          <a:fillRef idx="0">
+            <a:schemeClr val="dk1"/>
+          </a:fillRef>
+          <a:effectRef idx="1">
+            <a:schemeClr val="dk1"/>
+          </a:effectRef>
+          <a:fontRef idx="minor">
+            <a:schemeClr val="tx1"/>
+          </a:fontRef>
+        </p:style>
+      </p:cxnSp>
+      <p:cxnSp>
+        <p:nvCxnSpPr>
+          <p:cNvPr id="7" name="Straight Arrow Connector 6">
+            <a:extLst>
+              <a:ext uri="{FF2B5EF4-FFF2-40B4-BE49-F238E27FC236}">
+                <a16:creationId xmlns:a16="http://schemas.microsoft.com/office/drawing/2014/main" id="{3D2634D5-8827-B972-E898-F3D25908F55A}"/>
+              </a:ext>
+            </a:extLst>
+          </p:cNvPr>
+          <p:cNvCxnSpPr>
+            <a:cxnSpLocks/>
+          </p:cNvCxnSpPr>
+          <p:nvPr/>
+        </p:nvCxnSpPr>
+        <p:spPr>
+          <a:xfrm>
+            <a:off x="5468643" y="4858304"/>
+            <a:ext cx="443885" cy="0"/>
+          </a:xfrm>
+          <a:prstGeom prst="straightConnector1">
+            <a:avLst/>
+          </a:prstGeom>
+          <a:ln w="38100">
+            <a:solidFill>
+              <a:schemeClr val="tx2">
+                <a:lumMod val="50000"/>
+                <a:lumOff val="50000"/>
+              </a:schemeClr>
+            </a:solidFill>
+            <a:tailEnd type="triangle"/>
+          </a:ln>
+        </p:spPr>
+        <p:style>
+          <a:lnRef idx="2">
+            <a:schemeClr val="dk1"/>
+          </a:lnRef>
+          <a:fillRef idx="0">
+            <a:schemeClr val="dk1"/>
+          </a:fillRef>
+          <a:effectRef idx="1">
+            <a:schemeClr val="dk1"/>
+          </a:effectRef>
+          <a:fontRef idx="minor">
+            <a:schemeClr val="tx1"/>
+          </a:fontRef>
+        </p:style>
+      </p:cxnSp>
+      <p:cxnSp>
+        <p:nvCxnSpPr>
+          <p:cNvPr id="9" name="Straight Arrow Connector 8">
+            <a:extLst>
+              <a:ext uri="{FF2B5EF4-FFF2-40B4-BE49-F238E27FC236}">
+                <a16:creationId xmlns:a16="http://schemas.microsoft.com/office/drawing/2014/main" id="{F406CE2F-5209-0CA7-2AE8-FDBAAF985256}"/>
+              </a:ext>
+            </a:extLst>
+          </p:cNvPr>
+          <p:cNvCxnSpPr>
+            <a:cxnSpLocks/>
+          </p:cNvCxnSpPr>
+          <p:nvPr/>
+        </p:nvCxnSpPr>
+        <p:spPr>
+          <a:xfrm flipV="1">
+            <a:off x="5468643" y="4435050"/>
+            <a:ext cx="381741" cy="423254"/>
+          </a:xfrm>
+          <a:prstGeom prst="straightConnector1">
+            <a:avLst/>
+          </a:prstGeom>
+          <a:ln w="38100">
+            <a:solidFill>
+              <a:schemeClr val="tx2">
+                <a:lumMod val="50000"/>
+                <a:lumOff val="50000"/>
+              </a:schemeClr>
+            </a:solidFill>
+            <a:tailEnd type="triangle"/>
+          </a:ln>
+        </p:spPr>
+        <p:style>
+          <a:lnRef idx="2">
+            <a:schemeClr val="dk1"/>
+          </a:lnRef>
+          <a:fillRef idx="0">
+            <a:schemeClr val="dk1"/>
+          </a:fillRef>
+          <a:effectRef idx="1">
+            <a:schemeClr val="dk1"/>
+          </a:effectRef>
+          <a:fontRef idx="minor">
+            <a:schemeClr val="tx1"/>
+          </a:fontRef>
+        </p:style>
+      </p:cxnSp>
+      <p:cxnSp>
+        <p:nvCxnSpPr>
+          <p:cNvPr id="20" name="Straight Connector 19">
+            <a:extLst>
+              <a:ext uri="{FF2B5EF4-FFF2-40B4-BE49-F238E27FC236}">
+                <a16:creationId xmlns:a16="http://schemas.microsoft.com/office/drawing/2014/main" id="{3C91ED00-EB92-F36B-4ADC-1625395AC9FE}"/>
+              </a:ext>
+            </a:extLst>
+          </p:cNvPr>
+          <p:cNvCxnSpPr>
+            <a:cxnSpLocks/>
+          </p:cNvCxnSpPr>
+          <p:nvPr/>
+        </p:nvCxnSpPr>
+        <p:spPr>
+          <a:xfrm>
+            <a:off x="2219416" y="3186260"/>
+            <a:ext cx="0" cy="1012791"/>
+          </a:xfrm>
+          <a:prstGeom prst="line">
+            <a:avLst/>
+          </a:prstGeom>
+        </p:spPr>
+        <p:style>
+          <a:lnRef idx="2">
+            <a:schemeClr val="dk1"/>
+          </a:lnRef>
+          <a:fillRef idx="0">
+            <a:schemeClr val="dk1"/>
+          </a:fillRef>
+          <a:effectRef idx="1">
+            <a:schemeClr val="dk1"/>
+          </a:effectRef>
+          <a:fontRef idx="minor">
+            <a:schemeClr val="tx1"/>
+          </a:fontRef>
+        </p:style>
+      </p:cxnSp>
+      <p:sp>
+        <p:nvSpPr>
+          <p:cNvPr id="21" name="TextBox 20">
+            <a:extLst>
+              <a:ext uri="{FF2B5EF4-FFF2-40B4-BE49-F238E27FC236}">
+                <a16:creationId xmlns:a16="http://schemas.microsoft.com/office/drawing/2014/main" id="{A05998FA-2C49-5FA4-9915-1E1591F09DB7}"/>
+              </a:ext>
+            </a:extLst>
+          </p:cNvPr>
+          <p:cNvSpPr txBox="1"/>
+          <p:nvPr/>
+        </p:nvSpPr>
+        <p:spPr>
+          <a:xfrm>
+            <a:off x="2378960" y="4147637"/>
+            <a:ext cx="476412" cy="461665"/>
+          </a:xfrm>
+          <a:prstGeom prst="rect">
+            <a:avLst/>
+          </a:prstGeom>
+          <a:noFill/>
+        </p:spPr>
+        <p:txBody>
+          <a:bodyPr wrap="square" rtlCol="0">
+            <a:spAutoFit/>
+          </a:bodyPr>
+          <a:lstStyle/>
+          <a:p>
+            <a:r>
+              <a:rPr lang="el-GR" sz="2400" dirty="0"/>
+              <a:t>θ</a:t>
+            </a:r>
+            <a:r>
+              <a:rPr lang="en-US" sz="2400" baseline="-25000" dirty="0"/>
+              <a:t>1</a:t>
+            </a:r>
+          </a:p>
+        </p:txBody>
+      </p:sp>
+      <p:sp>
+        <p:nvSpPr>
+          <p:cNvPr id="23" name="TextBox 22">
+            <a:extLst>
+              <a:ext uri="{FF2B5EF4-FFF2-40B4-BE49-F238E27FC236}">
+                <a16:creationId xmlns:a16="http://schemas.microsoft.com/office/drawing/2014/main" id="{E378DC2F-F0AB-C335-91F2-69C2FFC2F131}"/>
+              </a:ext>
+            </a:extLst>
+          </p:cNvPr>
+          <p:cNvSpPr txBox="1"/>
+          <p:nvPr/>
+        </p:nvSpPr>
+        <p:spPr>
+          <a:xfrm>
+            <a:off x="5299131" y="3976970"/>
+            <a:ext cx="413896" cy="400110"/>
+          </a:xfrm>
+          <a:prstGeom prst="rect">
+            <a:avLst/>
+          </a:prstGeom>
+          <a:noFill/>
+        </p:spPr>
+        <p:txBody>
+          <a:bodyPr wrap="none" rtlCol="0">
+            <a:spAutoFit/>
+          </a:bodyPr>
+          <a:lstStyle/>
+          <a:p>
+            <a:r>
+              <a:rPr lang="en-US" sz="2000" dirty="0"/>
+              <a:t>Y</a:t>
+            </a:r>
+            <a:r>
+              <a:rPr lang="en-US" sz="2000" baseline="-25000" dirty="0"/>
+              <a:t>0</a:t>
+            </a:r>
+          </a:p>
+        </p:txBody>
+      </p:sp>
+      <p:sp>
+        <p:nvSpPr>
+          <p:cNvPr id="27" name="TextBox 26">
+            <a:extLst>
+              <a:ext uri="{FF2B5EF4-FFF2-40B4-BE49-F238E27FC236}">
+                <a16:creationId xmlns:a16="http://schemas.microsoft.com/office/drawing/2014/main" id="{EAE7493E-44F6-A0DF-BB44-DE17BE036E42}"/>
+              </a:ext>
+            </a:extLst>
+          </p:cNvPr>
+          <p:cNvSpPr txBox="1"/>
+          <p:nvPr/>
+        </p:nvSpPr>
+        <p:spPr>
+          <a:xfrm>
+            <a:off x="5850384" y="4147637"/>
+            <a:ext cx="409086" cy="400110"/>
+          </a:xfrm>
+          <a:prstGeom prst="rect">
+            <a:avLst/>
+          </a:prstGeom>
+          <a:noFill/>
+        </p:spPr>
+        <p:txBody>
+          <a:bodyPr wrap="none" rtlCol="0">
+            <a:spAutoFit/>
+          </a:bodyPr>
+          <a:lstStyle/>
+          <a:p>
+            <a:r>
+              <a:rPr lang="en-US" sz="2000" dirty="0"/>
+              <a:t>Z</a:t>
+            </a:r>
+            <a:r>
+              <a:rPr lang="en-US" sz="2000" baseline="-25000" dirty="0"/>
+              <a:t>0</a:t>
+            </a:r>
+            <a:endParaRPr lang="en-US" sz="2000" dirty="0"/>
+          </a:p>
+        </p:txBody>
+      </p:sp>
+      <p:sp>
+        <p:nvSpPr>
+          <p:cNvPr id="28" name="TextBox 27">
+            <a:extLst>
+              <a:ext uri="{FF2B5EF4-FFF2-40B4-BE49-F238E27FC236}">
+                <a16:creationId xmlns:a16="http://schemas.microsoft.com/office/drawing/2014/main" id="{0881B96E-732B-63C2-258D-7EA73B66EA1E}"/>
+              </a:ext>
+            </a:extLst>
+          </p:cNvPr>
+          <p:cNvSpPr txBox="1"/>
+          <p:nvPr/>
+        </p:nvSpPr>
+        <p:spPr>
+          <a:xfrm>
+            <a:off x="5882640" y="4673638"/>
+            <a:ext cx="417102" cy="400110"/>
+          </a:xfrm>
+          <a:prstGeom prst="rect">
+            <a:avLst/>
+          </a:prstGeom>
+          <a:noFill/>
+        </p:spPr>
+        <p:txBody>
+          <a:bodyPr wrap="none" rtlCol="0">
+            <a:spAutoFit/>
+          </a:bodyPr>
+          <a:lstStyle/>
+          <a:p>
+            <a:r>
+              <a:rPr lang="en-US" sz="2000" dirty="0"/>
+              <a:t>X</a:t>
+            </a:r>
+            <a:r>
+              <a:rPr lang="en-US" sz="2000" baseline="-25000" dirty="0"/>
+              <a:t>0</a:t>
+            </a:r>
+          </a:p>
+        </p:txBody>
+      </p:sp>
+      <p:grpSp>
+        <p:nvGrpSpPr>
+          <p:cNvPr id="35" name="Group 34">
+            <a:extLst>
+              <a:ext uri="{FF2B5EF4-FFF2-40B4-BE49-F238E27FC236}">
+                <a16:creationId xmlns:a16="http://schemas.microsoft.com/office/drawing/2014/main" id="{25480107-13C2-9580-A022-3246C140F60E}"/>
+              </a:ext>
+            </a:extLst>
+          </p:cNvPr>
+          <p:cNvGrpSpPr/>
+          <p:nvPr/>
+        </p:nvGrpSpPr>
+        <p:grpSpPr>
+          <a:xfrm>
+            <a:off x="1827961" y="4811270"/>
+            <a:ext cx="1206278" cy="1096778"/>
+            <a:chOff x="5245864" y="4129370"/>
+            <a:chExt cx="1206278" cy="1096778"/>
+          </a:xfrm>
+        </p:grpSpPr>
+        <p:cxnSp>
+          <p:nvCxnSpPr>
+            <p:cNvPr id="29" name="Straight Arrow Connector 28">
+              <a:extLst>
+                <a:ext uri="{FF2B5EF4-FFF2-40B4-BE49-F238E27FC236}">
+                  <a16:creationId xmlns:a16="http://schemas.microsoft.com/office/drawing/2014/main" id="{BFFADD88-8C83-697D-63BD-55380A3C0707}"/>
+                </a:ext>
+              </a:extLst>
+            </p:cNvPr>
+            <p:cNvCxnSpPr>
+              <a:cxnSpLocks/>
+            </p:cNvCxnSpPr>
+            <p:nvPr/>
+          </p:nvCxnSpPr>
+          <p:spPr>
+            <a:xfrm flipV="1">
+              <a:off x="5621043" y="4484703"/>
+              <a:ext cx="0" cy="526001"/>
+            </a:xfrm>
+            <a:prstGeom prst="straightConnector1">
+              <a:avLst/>
+            </a:prstGeom>
+            <a:ln w="38100">
+              <a:solidFill>
+                <a:schemeClr val="tx2">
+                  <a:lumMod val="50000"/>
+                  <a:lumOff val="50000"/>
+                </a:schemeClr>
+              </a:solidFill>
+              <a:tailEnd type="triangle"/>
+            </a:ln>
+          </p:spPr>
+          <p:style>
+            <a:lnRef idx="2">
+              <a:schemeClr val="dk1"/>
+            </a:lnRef>
+            <a:fillRef idx="0">
+              <a:schemeClr val="dk1"/>
+            </a:fillRef>
+            <a:effectRef idx="1">
+              <a:schemeClr val="dk1"/>
+            </a:effectRef>
+            <a:fontRef idx="minor">
+              <a:schemeClr val="tx1"/>
+            </a:fontRef>
+          </p:style>
+        </p:cxnSp>
+        <p:cxnSp>
+          <p:nvCxnSpPr>
+            <p:cNvPr id="30" name="Straight Arrow Connector 29">
+              <a:extLst>
+                <a:ext uri="{FF2B5EF4-FFF2-40B4-BE49-F238E27FC236}">
+                  <a16:creationId xmlns:a16="http://schemas.microsoft.com/office/drawing/2014/main" id="{4B3F79CD-047D-D329-21FC-50910FF10F20}"/>
+                </a:ext>
+              </a:extLst>
+            </p:cNvPr>
+            <p:cNvCxnSpPr>
+              <a:cxnSpLocks/>
+            </p:cNvCxnSpPr>
+            <p:nvPr/>
+          </p:nvCxnSpPr>
+          <p:spPr>
+            <a:xfrm>
+              <a:off x="5621043" y="5010704"/>
+              <a:ext cx="443885" cy="0"/>
+            </a:xfrm>
+            <a:prstGeom prst="straightConnector1">
+              <a:avLst/>
+            </a:prstGeom>
+            <a:ln w="38100">
+              <a:solidFill>
+                <a:schemeClr val="tx2">
+                  <a:lumMod val="50000"/>
+                  <a:lumOff val="50000"/>
+                </a:schemeClr>
+              </a:solidFill>
+              <a:tailEnd type="triangle"/>
+            </a:ln>
+          </p:spPr>
+          <p:style>
+            <a:lnRef idx="2">
+              <a:schemeClr val="dk1"/>
+            </a:lnRef>
+            <a:fillRef idx="0">
+              <a:schemeClr val="dk1"/>
+            </a:fillRef>
+            <a:effectRef idx="1">
+              <a:schemeClr val="dk1"/>
+            </a:effectRef>
+            <a:fontRef idx="minor">
+              <a:schemeClr val="tx1"/>
+            </a:fontRef>
+          </p:style>
+        </p:cxnSp>
+        <p:cxnSp>
+          <p:nvCxnSpPr>
+            <p:cNvPr id="31" name="Straight Arrow Connector 30">
+              <a:extLst>
+                <a:ext uri="{FF2B5EF4-FFF2-40B4-BE49-F238E27FC236}">
+                  <a16:creationId xmlns:a16="http://schemas.microsoft.com/office/drawing/2014/main" id="{B75EFA4A-3342-2B58-5494-8B0B29A7BEE4}"/>
+                </a:ext>
+              </a:extLst>
+            </p:cNvPr>
+            <p:cNvCxnSpPr>
+              <a:cxnSpLocks/>
+            </p:cNvCxnSpPr>
+            <p:nvPr/>
+          </p:nvCxnSpPr>
+          <p:spPr>
+            <a:xfrm flipV="1">
+              <a:off x="5621043" y="4587450"/>
+              <a:ext cx="381741" cy="423254"/>
+            </a:xfrm>
+            <a:prstGeom prst="straightConnector1">
+              <a:avLst/>
+            </a:prstGeom>
+            <a:ln w="38100">
+              <a:solidFill>
+                <a:schemeClr val="tx2">
+                  <a:lumMod val="50000"/>
+                  <a:lumOff val="50000"/>
+                </a:schemeClr>
+              </a:solidFill>
+              <a:tailEnd type="triangle"/>
+            </a:ln>
+          </p:spPr>
+          <p:style>
+            <a:lnRef idx="2">
+              <a:schemeClr val="dk1"/>
+            </a:lnRef>
+            <a:fillRef idx="0">
+              <a:schemeClr val="dk1"/>
+            </a:fillRef>
+            <a:effectRef idx="1">
+              <a:schemeClr val="dk1"/>
+            </a:effectRef>
+            <a:fontRef idx="minor">
+              <a:schemeClr val="tx1"/>
+            </a:fontRef>
+          </p:style>
+        </p:cxnSp>
+        <p:sp>
+          <p:nvSpPr>
+            <p:cNvPr id="32" name="TextBox 31">
+              <a:extLst>
+                <a:ext uri="{FF2B5EF4-FFF2-40B4-BE49-F238E27FC236}">
+                  <a16:creationId xmlns:a16="http://schemas.microsoft.com/office/drawing/2014/main" id="{0BA8F0E9-902C-3D9B-95A2-9EF1FE0AB34C}"/>
+                </a:ext>
+              </a:extLst>
+            </p:cNvPr>
+            <p:cNvSpPr txBox="1"/>
+            <p:nvPr/>
+          </p:nvSpPr>
+          <p:spPr>
+            <a:xfrm>
+              <a:off x="5245864" y="4129370"/>
+              <a:ext cx="413896" cy="400110"/>
+            </a:xfrm>
+            <a:prstGeom prst="rect">
+              <a:avLst/>
+            </a:prstGeom>
+            <a:noFill/>
+          </p:spPr>
+          <p:txBody>
+            <a:bodyPr wrap="none" rtlCol="0">
+              <a:spAutoFit/>
+            </a:bodyPr>
+            <a:lstStyle/>
+            <a:p>
+              <a:r>
+                <a:rPr lang="en-US" sz="2000" dirty="0"/>
+                <a:t>Y</a:t>
+              </a:r>
+              <a:r>
+                <a:rPr lang="en-US" sz="2000" baseline="-25000" dirty="0"/>
+                <a:t>0</a:t>
+              </a:r>
+            </a:p>
+          </p:txBody>
+        </p:sp>
+        <p:sp>
+          <p:nvSpPr>
+            <p:cNvPr id="33" name="TextBox 32">
+              <a:extLst>
+                <a:ext uri="{FF2B5EF4-FFF2-40B4-BE49-F238E27FC236}">
+                  <a16:creationId xmlns:a16="http://schemas.microsoft.com/office/drawing/2014/main" id="{E9AF3BB9-A052-B26A-A7CE-8D31C2ABE20D}"/>
+                </a:ext>
+              </a:extLst>
+            </p:cNvPr>
+            <p:cNvSpPr txBox="1"/>
+            <p:nvPr/>
+          </p:nvSpPr>
+          <p:spPr>
+            <a:xfrm>
+              <a:off x="6002784" y="4300037"/>
+              <a:ext cx="409086" cy="400110"/>
+            </a:xfrm>
+            <a:prstGeom prst="rect">
+              <a:avLst/>
+            </a:prstGeom>
+            <a:noFill/>
+          </p:spPr>
+          <p:txBody>
+            <a:bodyPr wrap="none" rtlCol="0">
+              <a:spAutoFit/>
+            </a:bodyPr>
+            <a:lstStyle/>
+            <a:p>
+              <a:r>
+                <a:rPr lang="en-US" sz="2000" dirty="0"/>
+                <a:t>Z</a:t>
+              </a:r>
+              <a:r>
+                <a:rPr lang="en-US" sz="2000" baseline="-25000" dirty="0"/>
+                <a:t>0</a:t>
+              </a:r>
+              <a:endParaRPr lang="en-US" sz="2000" dirty="0"/>
+            </a:p>
+          </p:txBody>
+        </p:sp>
+        <p:sp>
+          <p:nvSpPr>
+            <p:cNvPr id="34" name="TextBox 33">
+              <a:extLst>
+                <a:ext uri="{FF2B5EF4-FFF2-40B4-BE49-F238E27FC236}">
+                  <a16:creationId xmlns:a16="http://schemas.microsoft.com/office/drawing/2014/main" id="{37B07609-8547-2D58-2CE2-2B46141E301D}"/>
+                </a:ext>
+              </a:extLst>
+            </p:cNvPr>
+            <p:cNvSpPr txBox="1"/>
+            <p:nvPr/>
+          </p:nvSpPr>
+          <p:spPr>
+            <a:xfrm>
+              <a:off x="6035040" y="4826038"/>
+              <a:ext cx="417102" cy="400110"/>
+            </a:xfrm>
+            <a:prstGeom prst="rect">
+              <a:avLst/>
+            </a:prstGeom>
+            <a:noFill/>
+          </p:spPr>
+          <p:txBody>
+            <a:bodyPr wrap="none" rtlCol="0">
+              <a:spAutoFit/>
+            </a:bodyPr>
+            <a:lstStyle/>
+            <a:p>
+              <a:r>
+                <a:rPr lang="en-US" sz="2000" dirty="0"/>
+                <a:t>X</a:t>
+              </a:r>
+              <a:r>
+                <a:rPr lang="en-US" sz="2000" baseline="-25000" dirty="0"/>
+                <a:t>0</a:t>
+              </a:r>
+            </a:p>
+          </p:txBody>
+        </p:sp>
+      </p:grpSp>
+      <p:cxnSp>
+        <p:nvCxnSpPr>
+          <p:cNvPr id="36" name="Straight Connector 35">
+            <a:extLst>
+              <a:ext uri="{FF2B5EF4-FFF2-40B4-BE49-F238E27FC236}">
+                <a16:creationId xmlns:a16="http://schemas.microsoft.com/office/drawing/2014/main" id="{AEBE4BD7-F713-2CE1-211D-A3839B353631}"/>
+              </a:ext>
+            </a:extLst>
+          </p:cNvPr>
+          <p:cNvCxnSpPr>
+            <a:cxnSpLocks/>
+          </p:cNvCxnSpPr>
+          <p:nvPr/>
+        </p:nvCxnSpPr>
+        <p:spPr>
+          <a:xfrm>
+            <a:off x="2219415" y="4688066"/>
+            <a:ext cx="0" cy="1012791"/>
+          </a:xfrm>
+          <a:prstGeom prst="line">
+            <a:avLst/>
+          </a:prstGeom>
+        </p:spPr>
+        <p:style>
+          <a:lnRef idx="2">
+            <a:schemeClr val="dk1"/>
+          </a:lnRef>
+          <a:fillRef idx="0">
+            <a:schemeClr val="dk1"/>
+          </a:fillRef>
+          <a:effectRef idx="1">
+            <a:schemeClr val="dk1"/>
+          </a:effectRef>
+          <a:fontRef idx="minor">
+            <a:schemeClr val="tx1"/>
+          </a:fontRef>
+        </p:style>
+      </p:cxnSp>
+      <p:cxnSp>
+        <p:nvCxnSpPr>
+          <p:cNvPr id="47" name="Straight Connector 46">
+            <a:extLst>
+              <a:ext uri="{FF2B5EF4-FFF2-40B4-BE49-F238E27FC236}">
+                <a16:creationId xmlns:a16="http://schemas.microsoft.com/office/drawing/2014/main" id="{3E7BEDEE-DDBC-2A8D-4979-0D561B5BB64B}"/>
+              </a:ext>
+            </a:extLst>
+          </p:cNvPr>
+          <p:cNvCxnSpPr>
+            <a:cxnSpLocks/>
+          </p:cNvCxnSpPr>
+          <p:nvPr/>
+        </p:nvCxnSpPr>
+        <p:spPr>
+          <a:xfrm flipH="1">
+            <a:off x="2229771" y="3098592"/>
+            <a:ext cx="1720792" cy="0"/>
+          </a:xfrm>
+          <a:prstGeom prst="line">
+            <a:avLst/>
+          </a:prstGeom>
+        </p:spPr>
+        <p:style>
+          <a:lnRef idx="2">
+            <a:schemeClr val="dk1"/>
+          </a:lnRef>
+          <a:fillRef idx="0">
+            <a:schemeClr val="dk1"/>
+          </a:fillRef>
+          <a:effectRef idx="1">
+            <a:schemeClr val="dk1"/>
+          </a:effectRef>
+          <a:fontRef idx="minor">
+            <a:schemeClr val="tx1"/>
+          </a:fontRef>
+        </p:style>
+      </p:cxnSp>
+      <p:cxnSp>
+        <p:nvCxnSpPr>
+          <p:cNvPr id="49" name="Straight Connector 48">
+            <a:extLst>
+              <a:ext uri="{FF2B5EF4-FFF2-40B4-BE49-F238E27FC236}">
+                <a16:creationId xmlns:a16="http://schemas.microsoft.com/office/drawing/2014/main" id="{042D2F7B-DE91-3A54-503E-1C200AB0156A}"/>
+              </a:ext>
+            </a:extLst>
+          </p:cNvPr>
+          <p:cNvCxnSpPr>
+            <a:cxnSpLocks/>
+            <a:stCxn id="66" idx="0"/>
+          </p:cNvCxnSpPr>
+          <p:nvPr/>
+        </p:nvCxnSpPr>
+        <p:spPr>
+          <a:xfrm flipH="1">
+            <a:off x="4150305" y="3098591"/>
+            <a:ext cx="1313644" cy="1"/>
+          </a:xfrm>
+          <a:prstGeom prst="line">
+            <a:avLst/>
+          </a:prstGeom>
+        </p:spPr>
+        <p:style>
+          <a:lnRef idx="2">
+            <a:schemeClr val="dk1"/>
+          </a:lnRef>
+          <a:fillRef idx="0">
+            <a:schemeClr val="dk1"/>
+          </a:fillRef>
+          <a:effectRef idx="1">
+            <a:schemeClr val="dk1"/>
+          </a:effectRef>
+          <a:fontRef idx="minor">
+            <a:schemeClr val="tx1"/>
+          </a:fontRef>
+        </p:style>
+      </p:cxnSp>
+      <p:sp>
+        <p:nvSpPr>
+          <p:cNvPr id="46" name="Oval 45">
+            <a:extLst>
+              <a:ext uri="{FF2B5EF4-FFF2-40B4-BE49-F238E27FC236}">
+                <a16:creationId xmlns:a16="http://schemas.microsoft.com/office/drawing/2014/main" id="{F852204D-1992-1641-C66A-C1FB6E34D6E9}"/>
+              </a:ext>
+            </a:extLst>
+          </p:cNvPr>
+          <p:cNvSpPr/>
+          <p:nvPr/>
+        </p:nvSpPr>
+        <p:spPr>
+          <a:xfrm>
+            <a:off x="2119544" y="3019148"/>
+            <a:ext cx="199742" cy="158888"/>
+          </a:xfrm>
+          <a:prstGeom prst="ellipse">
+            <a:avLst/>
+          </a:prstGeom>
+        </p:spPr>
+        <p:style>
+          <a:lnRef idx="2">
+            <a:schemeClr val="accent1">
+              <a:shade val="15000"/>
+            </a:schemeClr>
+          </a:lnRef>
+          <a:fillRef idx="1">
+            <a:schemeClr val="accent1"/>
+          </a:fillRef>
+          <a:effectRef idx="0">
+            <a:schemeClr val="accent1"/>
+          </a:effectRef>
+          <a:fontRef idx="minor">
+            <a:schemeClr val="lt1"/>
+          </a:fontRef>
+        </p:style>
+        <p:txBody>
+          <a:bodyPr rtlCol="0" anchor="ctr"/>
+          <a:lstStyle/>
+          <a:p>
+            <a:pPr algn="ctr"/>
+            <a:endParaRPr lang="en-US"/>
+          </a:p>
+        </p:txBody>
+      </p:sp>
+      <p:sp>
+        <p:nvSpPr>
+          <p:cNvPr id="50" name="Oval 49">
+            <a:extLst>
+              <a:ext uri="{FF2B5EF4-FFF2-40B4-BE49-F238E27FC236}">
+                <a16:creationId xmlns:a16="http://schemas.microsoft.com/office/drawing/2014/main" id="{F49A0742-42C7-7AB4-FB4E-A488BDCD042A}"/>
+              </a:ext>
+            </a:extLst>
+          </p:cNvPr>
+          <p:cNvSpPr/>
+          <p:nvPr/>
+        </p:nvSpPr>
+        <p:spPr>
+          <a:xfrm>
+            <a:off x="3950563" y="3029137"/>
+            <a:ext cx="199742" cy="158888"/>
+          </a:xfrm>
+          <a:prstGeom prst="ellipse">
+            <a:avLst/>
+          </a:prstGeom>
+        </p:spPr>
+        <p:style>
+          <a:lnRef idx="2">
+            <a:schemeClr val="accent1">
+              <a:shade val="15000"/>
+            </a:schemeClr>
+          </a:lnRef>
+          <a:fillRef idx="1">
+            <a:schemeClr val="accent1"/>
+          </a:fillRef>
+          <a:effectRef idx="0">
+            <a:schemeClr val="accent1"/>
+          </a:effectRef>
+          <a:fontRef idx="minor">
+            <a:schemeClr val="lt1"/>
+          </a:fontRef>
+        </p:style>
+        <p:txBody>
+          <a:bodyPr rtlCol="0" anchor="ctr"/>
+          <a:lstStyle/>
+          <a:p>
+            <a:pPr algn="ctr"/>
+            <a:endParaRPr lang="en-US"/>
+          </a:p>
+        </p:txBody>
+      </p:sp>
+      <p:grpSp>
+        <p:nvGrpSpPr>
+          <p:cNvPr id="57" name="Group 56">
+            <a:extLst>
+              <a:ext uri="{FF2B5EF4-FFF2-40B4-BE49-F238E27FC236}">
+                <a16:creationId xmlns:a16="http://schemas.microsoft.com/office/drawing/2014/main" id="{B5AF8952-6A8F-BA9F-9090-978EC904B6E3}"/>
+              </a:ext>
+            </a:extLst>
+          </p:cNvPr>
+          <p:cNvGrpSpPr/>
+          <p:nvPr/>
+        </p:nvGrpSpPr>
+        <p:grpSpPr>
+          <a:xfrm>
+            <a:off x="1614437" y="2235767"/>
+            <a:ext cx="1204458" cy="1406764"/>
+            <a:chOff x="8660025" y="3594876"/>
+            <a:chExt cx="1204458" cy="1406764"/>
+          </a:xfrm>
+        </p:grpSpPr>
+        <p:cxnSp>
+          <p:nvCxnSpPr>
+            <p:cNvPr id="51" name="Straight Arrow Connector 50">
+              <a:extLst>
+                <a:ext uri="{FF2B5EF4-FFF2-40B4-BE49-F238E27FC236}">
+                  <a16:creationId xmlns:a16="http://schemas.microsoft.com/office/drawing/2014/main" id="{C49066DA-FBBE-0722-F9F6-6BE497458D4C}"/>
+                </a:ext>
+              </a:extLst>
+            </p:cNvPr>
+            <p:cNvCxnSpPr>
+              <a:cxnSpLocks/>
+            </p:cNvCxnSpPr>
+            <p:nvPr/>
+          </p:nvCxnSpPr>
+          <p:spPr>
+            <a:xfrm flipV="1">
+              <a:off x="9238623" y="3950209"/>
+              <a:ext cx="0" cy="526001"/>
+            </a:xfrm>
+            <a:prstGeom prst="straightConnector1">
+              <a:avLst/>
+            </a:prstGeom>
+            <a:ln w="38100">
+              <a:solidFill>
+                <a:schemeClr val="tx2">
+                  <a:lumMod val="50000"/>
+                  <a:lumOff val="50000"/>
+                </a:schemeClr>
+              </a:solidFill>
+              <a:tailEnd type="triangle"/>
+            </a:ln>
+          </p:spPr>
+          <p:style>
+            <a:lnRef idx="2">
+              <a:schemeClr val="dk1"/>
+            </a:lnRef>
+            <a:fillRef idx="0">
+              <a:schemeClr val="dk1"/>
+            </a:fillRef>
+            <a:effectRef idx="1">
+              <a:schemeClr val="dk1"/>
+            </a:effectRef>
+            <a:fontRef idx="minor">
+              <a:schemeClr val="tx1"/>
+            </a:fontRef>
+          </p:style>
+        </p:cxnSp>
+        <p:cxnSp>
+          <p:nvCxnSpPr>
+            <p:cNvPr id="52" name="Straight Arrow Connector 51">
+              <a:extLst>
+                <a:ext uri="{FF2B5EF4-FFF2-40B4-BE49-F238E27FC236}">
+                  <a16:creationId xmlns:a16="http://schemas.microsoft.com/office/drawing/2014/main" id="{CA4EC0AF-E638-D705-D51B-EAB22D453F00}"/>
+                </a:ext>
+              </a:extLst>
+            </p:cNvPr>
+            <p:cNvCxnSpPr>
+              <a:cxnSpLocks/>
+            </p:cNvCxnSpPr>
+            <p:nvPr/>
+          </p:nvCxnSpPr>
+          <p:spPr>
+            <a:xfrm>
+              <a:off x="9238623" y="4476210"/>
+              <a:ext cx="443885" cy="0"/>
+            </a:xfrm>
+            <a:prstGeom prst="straightConnector1">
+              <a:avLst/>
+            </a:prstGeom>
+            <a:ln w="38100">
+              <a:solidFill>
+                <a:schemeClr val="tx2">
+                  <a:lumMod val="50000"/>
+                  <a:lumOff val="50000"/>
+                </a:schemeClr>
+              </a:solidFill>
+              <a:tailEnd type="triangle"/>
+            </a:ln>
+          </p:spPr>
+          <p:style>
+            <a:lnRef idx="2">
+              <a:schemeClr val="dk1"/>
+            </a:lnRef>
+            <a:fillRef idx="0">
+              <a:schemeClr val="dk1"/>
+            </a:fillRef>
+            <a:effectRef idx="1">
+              <a:schemeClr val="dk1"/>
+            </a:effectRef>
+            <a:fontRef idx="minor">
+              <a:schemeClr val="tx1"/>
+            </a:fontRef>
+          </p:style>
+        </p:cxnSp>
+        <p:cxnSp>
+          <p:nvCxnSpPr>
+            <p:cNvPr id="53" name="Straight Arrow Connector 52">
+              <a:extLst>
+                <a:ext uri="{FF2B5EF4-FFF2-40B4-BE49-F238E27FC236}">
+                  <a16:creationId xmlns:a16="http://schemas.microsoft.com/office/drawing/2014/main" id="{030CEA34-1FBA-4017-113F-1FB3C860D7B1}"/>
+                </a:ext>
+              </a:extLst>
+            </p:cNvPr>
+            <p:cNvCxnSpPr>
+              <a:cxnSpLocks/>
+            </p:cNvCxnSpPr>
+            <p:nvPr/>
+          </p:nvCxnSpPr>
+          <p:spPr>
+            <a:xfrm flipH="1">
+              <a:off x="8962997" y="4476210"/>
+              <a:ext cx="275626" cy="262587"/>
+            </a:xfrm>
+            <a:prstGeom prst="straightConnector1">
+              <a:avLst/>
+            </a:prstGeom>
+            <a:ln w="38100">
+              <a:solidFill>
+                <a:schemeClr val="tx2">
+                  <a:lumMod val="50000"/>
+                  <a:lumOff val="50000"/>
+                </a:schemeClr>
+              </a:solidFill>
+              <a:tailEnd type="triangle"/>
+            </a:ln>
+          </p:spPr>
+          <p:style>
+            <a:lnRef idx="2">
+              <a:schemeClr val="dk1"/>
+            </a:lnRef>
+            <a:fillRef idx="0">
+              <a:schemeClr val="dk1"/>
+            </a:fillRef>
+            <a:effectRef idx="1">
+              <a:schemeClr val="dk1"/>
+            </a:effectRef>
+            <a:fontRef idx="minor">
+              <a:schemeClr val="tx1"/>
+            </a:fontRef>
+          </p:style>
+        </p:cxnSp>
+        <p:sp>
+          <p:nvSpPr>
+            <p:cNvPr id="54" name="TextBox 53">
+              <a:extLst>
+                <a:ext uri="{FF2B5EF4-FFF2-40B4-BE49-F238E27FC236}">
+                  <a16:creationId xmlns:a16="http://schemas.microsoft.com/office/drawing/2014/main" id="{BEABAF22-C6D2-B54A-7B15-6438BB325C80}"/>
+                </a:ext>
+              </a:extLst>
+            </p:cNvPr>
+            <p:cNvSpPr txBox="1"/>
+            <p:nvPr/>
+          </p:nvSpPr>
+          <p:spPr>
+            <a:xfrm>
+              <a:off x="9069111" y="3594876"/>
+              <a:ext cx="413896" cy="400110"/>
+            </a:xfrm>
+            <a:prstGeom prst="rect">
+              <a:avLst/>
+            </a:prstGeom>
+            <a:noFill/>
+          </p:spPr>
+          <p:txBody>
+            <a:bodyPr wrap="none" rtlCol="0">
+              <a:spAutoFit/>
+            </a:bodyPr>
+            <a:lstStyle/>
+            <a:p>
+              <a:r>
+                <a:rPr lang="en-US" sz="2000" dirty="0"/>
+                <a:t>Y</a:t>
+              </a:r>
+              <a:r>
+                <a:rPr lang="en-US" sz="2000" baseline="-25000" dirty="0"/>
+                <a:t>1</a:t>
+              </a:r>
+            </a:p>
+          </p:txBody>
+        </p:sp>
+        <p:sp>
+          <p:nvSpPr>
+            <p:cNvPr id="55" name="TextBox 54">
+              <a:extLst>
+                <a:ext uri="{FF2B5EF4-FFF2-40B4-BE49-F238E27FC236}">
+                  <a16:creationId xmlns:a16="http://schemas.microsoft.com/office/drawing/2014/main" id="{CD2EC7B4-8EAB-483F-2600-C680E3100E23}"/>
+                </a:ext>
+              </a:extLst>
+            </p:cNvPr>
+            <p:cNvSpPr txBox="1"/>
+            <p:nvPr/>
+          </p:nvSpPr>
+          <p:spPr>
+            <a:xfrm>
+              <a:off x="8660025" y="4601530"/>
+              <a:ext cx="409086" cy="400110"/>
+            </a:xfrm>
+            <a:prstGeom prst="rect">
+              <a:avLst/>
+            </a:prstGeom>
+            <a:noFill/>
+          </p:spPr>
+          <p:txBody>
+            <a:bodyPr wrap="none" rtlCol="0">
+              <a:spAutoFit/>
+            </a:bodyPr>
+            <a:lstStyle/>
+            <a:p>
+              <a:r>
+                <a:rPr lang="en-US" sz="2000" dirty="0"/>
+                <a:t>Z</a:t>
+              </a:r>
+              <a:r>
+                <a:rPr lang="en-US" sz="2000" baseline="-25000" dirty="0"/>
+                <a:t>1</a:t>
+              </a:r>
+              <a:endParaRPr lang="en-US" sz="2000" dirty="0"/>
+            </a:p>
+          </p:txBody>
+        </p:sp>
+        <p:sp>
+          <p:nvSpPr>
+            <p:cNvPr id="56" name="TextBox 55">
+              <a:extLst>
+                <a:ext uri="{FF2B5EF4-FFF2-40B4-BE49-F238E27FC236}">
+                  <a16:creationId xmlns:a16="http://schemas.microsoft.com/office/drawing/2014/main" id="{84A6FAC3-46BD-7685-D860-31D2D33034D9}"/>
+                </a:ext>
+              </a:extLst>
+            </p:cNvPr>
+            <p:cNvSpPr txBox="1"/>
+            <p:nvPr/>
+          </p:nvSpPr>
+          <p:spPr>
+            <a:xfrm>
+              <a:off x="9447381" y="4067580"/>
+              <a:ext cx="417102" cy="400110"/>
+            </a:xfrm>
+            <a:prstGeom prst="rect">
+              <a:avLst/>
+            </a:prstGeom>
+            <a:noFill/>
+          </p:spPr>
+          <p:txBody>
+            <a:bodyPr wrap="none" rtlCol="0">
+              <a:spAutoFit/>
+            </a:bodyPr>
+            <a:lstStyle/>
+            <a:p>
+              <a:r>
+                <a:rPr lang="en-US" sz="2000" dirty="0"/>
+                <a:t>X</a:t>
+              </a:r>
+              <a:r>
+                <a:rPr lang="en-US" sz="2000" baseline="-25000" dirty="0"/>
+                <a:t>1</a:t>
+              </a:r>
+            </a:p>
+          </p:txBody>
+        </p:sp>
+      </p:grpSp>
+      <p:grpSp>
+        <p:nvGrpSpPr>
+          <p:cNvPr id="58" name="Group 57">
+            <a:extLst>
+              <a:ext uri="{FF2B5EF4-FFF2-40B4-BE49-F238E27FC236}">
+                <a16:creationId xmlns:a16="http://schemas.microsoft.com/office/drawing/2014/main" id="{4C2788E3-1232-8A58-1E18-9537AB54C36A}"/>
+              </a:ext>
+            </a:extLst>
+          </p:cNvPr>
+          <p:cNvGrpSpPr/>
+          <p:nvPr/>
+        </p:nvGrpSpPr>
+        <p:grpSpPr>
+          <a:xfrm>
+            <a:off x="3487505" y="2236325"/>
+            <a:ext cx="1204458" cy="1406764"/>
+            <a:chOff x="8660025" y="3594876"/>
+            <a:chExt cx="1204458" cy="1406764"/>
+          </a:xfrm>
+        </p:grpSpPr>
+        <p:cxnSp>
+          <p:nvCxnSpPr>
+            <p:cNvPr id="59" name="Straight Arrow Connector 58">
+              <a:extLst>
+                <a:ext uri="{FF2B5EF4-FFF2-40B4-BE49-F238E27FC236}">
+                  <a16:creationId xmlns:a16="http://schemas.microsoft.com/office/drawing/2014/main" id="{D272DE90-555F-5169-0A20-594F79565F4E}"/>
+                </a:ext>
+              </a:extLst>
+            </p:cNvPr>
+            <p:cNvCxnSpPr>
+              <a:cxnSpLocks/>
+            </p:cNvCxnSpPr>
+            <p:nvPr/>
+          </p:nvCxnSpPr>
+          <p:spPr>
+            <a:xfrm flipV="1">
+              <a:off x="9238623" y="3950209"/>
+              <a:ext cx="0" cy="526001"/>
+            </a:xfrm>
+            <a:prstGeom prst="straightConnector1">
+              <a:avLst/>
+            </a:prstGeom>
+            <a:ln w="38100">
+              <a:solidFill>
+                <a:schemeClr val="tx2">
+                  <a:lumMod val="50000"/>
+                  <a:lumOff val="50000"/>
+                </a:schemeClr>
+              </a:solidFill>
+              <a:tailEnd type="triangle"/>
+            </a:ln>
+          </p:spPr>
+          <p:style>
+            <a:lnRef idx="2">
+              <a:schemeClr val="dk1"/>
+            </a:lnRef>
+            <a:fillRef idx="0">
+              <a:schemeClr val="dk1"/>
+            </a:fillRef>
+            <a:effectRef idx="1">
+              <a:schemeClr val="dk1"/>
+            </a:effectRef>
+            <a:fontRef idx="minor">
+              <a:schemeClr val="tx1"/>
+            </a:fontRef>
+          </p:style>
+        </p:cxnSp>
+        <p:cxnSp>
+          <p:nvCxnSpPr>
+            <p:cNvPr id="60" name="Straight Arrow Connector 59">
+              <a:extLst>
+                <a:ext uri="{FF2B5EF4-FFF2-40B4-BE49-F238E27FC236}">
+                  <a16:creationId xmlns:a16="http://schemas.microsoft.com/office/drawing/2014/main" id="{9C5A2FE4-CC7F-AD3A-3D0C-BC22C004A51D}"/>
+                </a:ext>
+              </a:extLst>
+            </p:cNvPr>
+            <p:cNvCxnSpPr>
+              <a:cxnSpLocks/>
+            </p:cNvCxnSpPr>
+            <p:nvPr/>
+          </p:nvCxnSpPr>
+          <p:spPr>
+            <a:xfrm>
+              <a:off x="9238623" y="4476210"/>
+              <a:ext cx="443885" cy="0"/>
+            </a:xfrm>
+            <a:prstGeom prst="straightConnector1">
+              <a:avLst/>
+            </a:prstGeom>
+            <a:ln w="38100">
+              <a:solidFill>
+                <a:schemeClr val="tx2">
+                  <a:lumMod val="50000"/>
+                  <a:lumOff val="50000"/>
+                </a:schemeClr>
+              </a:solidFill>
+              <a:tailEnd type="triangle"/>
+            </a:ln>
+          </p:spPr>
+          <p:style>
+            <a:lnRef idx="2">
+              <a:schemeClr val="dk1"/>
+            </a:lnRef>
+            <a:fillRef idx="0">
+              <a:schemeClr val="dk1"/>
+            </a:fillRef>
+            <a:effectRef idx="1">
+              <a:schemeClr val="dk1"/>
+            </a:effectRef>
+            <a:fontRef idx="minor">
+              <a:schemeClr val="tx1"/>
+            </a:fontRef>
+          </p:style>
+        </p:cxnSp>
+        <p:cxnSp>
+          <p:nvCxnSpPr>
+            <p:cNvPr id="61" name="Straight Arrow Connector 60">
+              <a:extLst>
+                <a:ext uri="{FF2B5EF4-FFF2-40B4-BE49-F238E27FC236}">
+                  <a16:creationId xmlns:a16="http://schemas.microsoft.com/office/drawing/2014/main" id="{A80A486D-D071-E57E-E9B3-80B7DEEF36BA}"/>
+                </a:ext>
+              </a:extLst>
+            </p:cNvPr>
+            <p:cNvCxnSpPr>
+              <a:cxnSpLocks/>
+            </p:cNvCxnSpPr>
+            <p:nvPr/>
+          </p:nvCxnSpPr>
+          <p:spPr>
+            <a:xfrm flipH="1">
+              <a:off x="8962997" y="4476210"/>
+              <a:ext cx="275626" cy="262587"/>
+            </a:xfrm>
+            <a:prstGeom prst="straightConnector1">
+              <a:avLst/>
+            </a:prstGeom>
+            <a:ln w="38100">
+              <a:solidFill>
+                <a:schemeClr val="tx2">
+                  <a:lumMod val="50000"/>
+                  <a:lumOff val="50000"/>
+                </a:schemeClr>
+              </a:solidFill>
+              <a:tailEnd type="triangle"/>
+            </a:ln>
+          </p:spPr>
+          <p:style>
+            <a:lnRef idx="2">
+              <a:schemeClr val="dk1"/>
+            </a:lnRef>
+            <a:fillRef idx="0">
+              <a:schemeClr val="dk1"/>
+            </a:fillRef>
+            <a:effectRef idx="1">
+              <a:schemeClr val="dk1"/>
+            </a:effectRef>
+            <a:fontRef idx="minor">
+              <a:schemeClr val="tx1"/>
+            </a:fontRef>
+          </p:style>
+        </p:cxnSp>
+        <p:sp>
+          <p:nvSpPr>
+            <p:cNvPr id="62" name="TextBox 61">
+              <a:extLst>
+                <a:ext uri="{FF2B5EF4-FFF2-40B4-BE49-F238E27FC236}">
+                  <a16:creationId xmlns:a16="http://schemas.microsoft.com/office/drawing/2014/main" id="{62ED6053-4E5D-0280-692D-0B7D2414B9F0}"/>
+                </a:ext>
+              </a:extLst>
+            </p:cNvPr>
+            <p:cNvSpPr txBox="1"/>
+            <p:nvPr/>
+          </p:nvSpPr>
+          <p:spPr>
+            <a:xfrm>
+              <a:off x="9069111" y="3594876"/>
+              <a:ext cx="413896" cy="400110"/>
+            </a:xfrm>
+            <a:prstGeom prst="rect">
+              <a:avLst/>
+            </a:prstGeom>
+            <a:noFill/>
+          </p:spPr>
+          <p:txBody>
+            <a:bodyPr wrap="none" rtlCol="0">
+              <a:spAutoFit/>
+            </a:bodyPr>
+            <a:lstStyle/>
+            <a:p>
+              <a:r>
+                <a:rPr lang="en-US" sz="2000" dirty="0"/>
+                <a:t>Y</a:t>
+              </a:r>
+              <a:r>
+                <a:rPr lang="en-US" sz="2000" baseline="-25000" dirty="0"/>
+                <a:t>2</a:t>
+              </a:r>
+            </a:p>
+          </p:txBody>
+        </p:sp>
+        <p:sp>
+          <p:nvSpPr>
+            <p:cNvPr id="63" name="TextBox 62">
+              <a:extLst>
+                <a:ext uri="{FF2B5EF4-FFF2-40B4-BE49-F238E27FC236}">
+                  <a16:creationId xmlns:a16="http://schemas.microsoft.com/office/drawing/2014/main" id="{F8991860-1279-FCF6-4BD2-3083821F1DFD}"/>
+                </a:ext>
+              </a:extLst>
+            </p:cNvPr>
+            <p:cNvSpPr txBox="1"/>
+            <p:nvPr/>
+          </p:nvSpPr>
+          <p:spPr>
+            <a:xfrm>
+              <a:off x="8660025" y="4601530"/>
+              <a:ext cx="409086" cy="400110"/>
+            </a:xfrm>
+            <a:prstGeom prst="rect">
+              <a:avLst/>
+            </a:prstGeom>
+            <a:noFill/>
+          </p:spPr>
+          <p:txBody>
+            <a:bodyPr wrap="none" rtlCol="0">
+              <a:spAutoFit/>
+            </a:bodyPr>
+            <a:lstStyle/>
+            <a:p>
+              <a:r>
+                <a:rPr lang="en-US" sz="2000" dirty="0"/>
+                <a:t>Z</a:t>
+              </a:r>
+              <a:r>
+                <a:rPr lang="en-US" sz="2000" baseline="-25000" dirty="0"/>
+                <a:t>2</a:t>
+              </a:r>
+              <a:endParaRPr lang="en-US" sz="2000" dirty="0"/>
+            </a:p>
+          </p:txBody>
+        </p:sp>
+        <p:sp>
+          <p:nvSpPr>
+            <p:cNvPr id="64" name="TextBox 63">
+              <a:extLst>
+                <a:ext uri="{FF2B5EF4-FFF2-40B4-BE49-F238E27FC236}">
+                  <a16:creationId xmlns:a16="http://schemas.microsoft.com/office/drawing/2014/main" id="{87E171B8-FF4B-853C-0DED-0E2ACB71ECAD}"/>
+                </a:ext>
+              </a:extLst>
+            </p:cNvPr>
+            <p:cNvSpPr txBox="1"/>
+            <p:nvPr/>
+          </p:nvSpPr>
+          <p:spPr>
+            <a:xfrm>
+              <a:off x="9447381" y="4067580"/>
+              <a:ext cx="417102" cy="400110"/>
+            </a:xfrm>
+            <a:prstGeom prst="rect">
+              <a:avLst/>
+            </a:prstGeom>
+            <a:noFill/>
+          </p:spPr>
+          <p:txBody>
+            <a:bodyPr wrap="none" rtlCol="0">
+              <a:spAutoFit/>
+            </a:bodyPr>
+            <a:lstStyle/>
+            <a:p>
+              <a:r>
+                <a:rPr lang="en-US" sz="2000" dirty="0"/>
+                <a:t>X</a:t>
+              </a:r>
+              <a:r>
+                <a:rPr lang="en-US" sz="2000" baseline="-25000" dirty="0"/>
+                <a:t>2</a:t>
+              </a:r>
+            </a:p>
+          </p:txBody>
+        </p:sp>
+      </p:grpSp>
+      <p:grpSp>
+        <p:nvGrpSpPr>
+          <p:cNvPr id="65" name="Group 64">
+            <a:extLst>
+              <a:ext uri="{FF2B5EF4-FFF2-40B4-BE49-F238E27FC236}">
+                <a16:creationId xmlns:a16="http://schemas.microsoft.com/office/drawing/2014/main" id="{E63713F7-3F2B-AB58-1796-E7B988C783C2}"/>
+              </a:ext>
+            </a:extLst>
+          </p:cNvPr>
+          <p:cNvGrpSpPr/>
+          <p:nvPr/>
+        </p:nvGrpSpPr>
+        <p:grpSpPr>
+          <a:xfrm rot="16200000">
+            <a:off x="5575660" y="2862592"/>
+            <a:ext cx="248575" cy="471998"/>
+            <a:chOff x="2246050" y="1305017"/>
+            <a:chExt cx="204187" cy="471998"/>
+          </a:xfrm>
+        </p:grpSpPr>
+        <p:sp>
+          <p:nvSpPr>
+            <p:cNvPr id="66" name="Isosceles Triangle 65">
+              <a:extLst>
+                <a:ext uri="{FF2B5EF4-FFF2-40B4-BE49-F238E27FC236}">
+                  <a16:creationId xmlns:a16="http://schemas.microsoft.com/office/drawing/2014/main" id="{6BBC3EBC-DF97-BE83-752F-69D6DE9D879E}"/>
+                </a:ext>
+              </a:extLst>
+            </p:cNvPr>
+            <p:cNvSpPr/>
+            <p:nvPr/>
+          </p:nvSpPr>
+          <p:spPr>
+            <a:xfrm>
+              <a:off x="2246050" y="1305017"/>
+              <a:ext cx="204187" cy="213065"/>
+            </a:xfrm>
+            <a:prstGeom prst="triangle">
+              <a:avLst/>
+            </a:prstGeom>
+          </p:spPr>
+          <p:style>
+            <a:lnRef idx="2">
+              <a:schemeClr val="dk1">
+                <a:shade val="15000"/>
+              </a:schemeClr>
+            </a:lnRef>
+            <a:fillRef idx="1">
+              <a:schemeClr val="dk1"/>
+            </a:fillRef>
+            <a:effectRef idx="0">
+              <a:schemeClr val="dk1"/>
+            </a:effectRef>
+            <a:fontRef idx="minor">
+              <a:schemeClr val="lt1"/>
+            </a:fontRef>
+          </p:style>
+          <p:txBody>
+            <a:bodyPr rtlCol="0" anchor="ctr"/>
+            <a:lstStyle/>
+            <a:p>
+              <a:pPr algn="ctr"/>
+              <a:endParaRPr lang="en-US"/>
+            </a:p>
+          </p:txBody>
+        </p:sp>
+        <p:sp>
+          <p:nvSpPr>
+            <p:cNvPr id="67" name="Isosceles Triangle 66">
+              <a:extLst>
+                <a:ext uri="{FF2B5EF4-FFF2-40B4-BE49-F238E27FC236}">
+                  <a16:creationId xmlns:a16="http://schemas.microsoft.com/office/drawing/2014/main" id="{D1F8DC32-7EBA-02F0-E2D6-A24DD317F9C8}"/>
+                </a:ext>
+              </a:extLst>
+            </p:cNvPr>
+            <p:cNvSpPr/>
+            <p:nvPr/>
+          </p:nvSpPr>
+          <p:spPr>
+            <a:xfrm rot="10800000">
+              <a:off x="2246050" y="1563950"/>
+              <a:ext cx="204187" cy="213065"/>
+            </a:xfrm>
+            <a:prstGeom prst="triangle">
+              <a:avLst/>
+            </a:prstGeom>
+          </p:spPr>
+          <p:style>
+            <a:lnRef idx="2">
+              <a:schemeClr val="dk1">
+                <a:shade val="15000"/>
+              </a:schemeClr>
+            </a:lnRef>
+            <a:fillRef idx="1">
+              <a:schemeClr val="dk1"/>
+            </a:fillRef>
+            <a:effectRef idx="0">
+              <a:schemeClr val="dk1"/>
+            </a:effectRef>
+            <a:fontRef idx="minor">
+              <a:schemeClr val="lt1"/>
+            </a:fontRef>
+          </p:style>
+          <p:txBody>
+            <a:bodyPr rtlCol="0" anchor="ctr"/>
+            <a:lstStyle/>
+            <a:p>
+              <a:pPr algn="ctr"/>
+              <a:endParaRPr lang="en-US"/>
+            </a:p>
+          </p:txBody>
+        </p:sp>
+      </p:grpSp>
+      <p:sp>
+        <p:nvSpPr>
+          <p:cNvPr id="69" name="TextBox 68">
+            <a:extLst>
+              <a:ext uri="{FF2B5EF4-FFF2-40B4-BE49-F238E27FC236}">
+                <a16:creationId xmlns:a16="http://schemas.microsoft.com/office/drawing/2014/main" id="{B233B7C4-CD1D-8ADA-32C3-4231AFFA9D10}"/>
+              </a:ext>
+            </a:extLst>
+          </p:cNvPr>
+          <p:cNvSpPr txBox="1"/>
+          <p:nvPr/>
+        </p:nvSpPr>
+        <p:spPr>
+          <a:xfrm>
+            <a:off x="1643132" y="2623267"/>
+            <a:ext cx="476412" cy="461665"/>
+          </a:xfrm>
+          <a:prstGeom prst="rect">
+            <a:avLst/>
+          </a:prstGeom>
+          <a:noFill/>
+        </p:spPr>
+        <p:txBody>
+          <a:bodyPr wrap="square" rtlCol="0">
+            <a:spAutoFit/>
+          </a:bodyPr>
+          <a:lstStyle/>
+          <a:p>
+            <a:r>
+              <a:rPr lang="el-GR" sz="2400" dirty="0"/>
+              <a:t>θ</a:t>
+            </a:r>
+            <a:r>
+              <a:rPr lang="en-US" sz="2400" baseline="-25000" dirty="0"/>
+              <a:t>2</a:t>
+            </a:r>
+          </a:p>
+        </p:txBody>
+      </p:sp>
+      <p:sp>
+        <p:nvSpPr>
+          <p:cNvPr id="70" name="TextBox 69">
+            <a:extLst>
+              <a:ext uri="{FF2B5EF4-FFF2-40B4-BE49-F238E27FC236}">
+                <a16:creationId xmlns:a16="http://schemas.microsoft.com/office/drawing/2014/main" id="{DC6EBF60-D8F0-751D-14AA-9492A5CD8546}"/>
+              </a:ext>
+            </a:extLst>
+          </p:cNvPr>
+          <p:cNvSpPr txBox="1"/>
+          <p:nvPr/>
+        </p:nvSpPr>
+        <p:spPr>
+          <a:xfrm>
+            <a:off x="3487505" y="2545793"/>
+            <a:ext cx="476412" cy="461665"/>
+          </a:xfrm>
+          <a:prstGeom prst="rect">
+            <a:avLst/>
+          </a:prstGeom>
+          <a:noFill/>
+        </p:spPr>
+        <p:txBody>
+          <a:bodyPr wrap="square" rtlCol="0">
+            <a:spAutoFit/>
+          </a:bodyPr>
+          <a:lstStyle/>
+          <a:p>
+            <a:r>
+              <a:rPr lang="el-GR" sz="2400" dirty="0"/>
+              <a:t>θ</a:t>
+            </a:r>
+            <a:r>
+              <a:rPr lang="en-US" sz="2400" baseline="-25000" dirty="0"/>
+              <a:t>3</a:t>
+            </a:r>
+          </a:p>
+        </p:txBody>
+      </p:sp>
+      <p:grpSp>
+        <p:nvGrpSpPr>
+          <p:cNvPr id="77" name="Group 76">
+            <a:extLst>
+              <a:ext uri="{FF2B5EF4-FFF2-40B4-BE49-F238E27FC236}">
+                <a16:creationId xmlns:a16="http://schemas.microsoft.com/office/drawing/2014/main" id="{0DB5B83F-10F7-37E3-1876-6622DFB1A4B8}"/>
+              </a:ext>
+            </a:extLst>
+          </p:cNvPr>
+          <p:cNvGrpSpPr/>
+          <p:nvPr/>
+        </p:nvGrpSpPr>
+        <p:grpSpPr>
+          <a:xfrm>
+            <a:off x="7302471" y="1561545"/>
+            <a:ext cx="1409697" cy="1613573"/>
+            <a:chOff x="6684417" y="1573254"/>
+            <a:chExt cx="1409697" cy="1613573"/>
+          </a:xfrm>
+        </p:grpSpPr>
+        <p:cxnSp>
+          <p:nvCxnSpPr>
+            <p:cNvPr id="71" name="Straight Arrow Connector 70">
+              <a:extLst>
+                <a:ext uri="{FF2B5EF4-FFF2-40B4-BE49-F238E27FC236}">
+                  <a16:creationId xmlns:a16="http://schemas.microsoft.com/office/drawing/2014/main" id="{0815931D-7DE0-2BBC-3FF0-502886AA1186}"/>
+                </a:ext>
+              </a:extLst>
+            </p:cNvPr>
+            <p:cNvCxnSpPr>
+              <a:cxnSpLocks/>
+            </p:cNvCxnSpPr>
+            <p:nvPr/>
+          </p:nvCxnSpPr>
+          <p:spPr>
+            <a:xfrm flipV="1">
+              <a:off x="7263015" y="1928587"/>
+              <a:ext cx="0" cy="526001"/>
+            </a:xfrm>
+            <a:prstGeom prst="straightConnector1">
+              <a:avLst/>
+            </a:prstGeom>
+            <a:ln w="38100">
+              <a:solidFill>
+                <a:schemeClr val="tx2">
+                  <a:lumMod val="50000"/>
+                  <a:lumOff val="50000"/>
+                </a:schemeClr>
+              </a:solidFill>
+              <a:tailEnd type="triangle"/>
+            </a:ln>
+          </p:spPr>
+          <p:style>
+            <a:lnRef idx="2">
+              <a:schemeClr val="dk1"/>
+            </a:lnRef>
+            <a:fillRef idx="0">
+              <a:schemeClr val="dk1"/>
+            </a:fillRef>
+            <a:effectRef idx="1">
+              <a:schemeClr val="dk1"/>
+            </a:effectRef>
+            <a:fontRef idx="minor">
+              <a:schemeClr val="tx1"/>
+            </a:fontRef>
+          </p:style>
+        </p:cxnSp>
+        <p:cxnSp>
+          <p:nvCxnSpPr>
+            <p:cNvPr id="72" name="Straight Arrow Connector 71">
+              <a:extLst>
+                <a:ext uri="{FF2B5EF4-FFF2-40B4-BE49-F238E27FC236}">
+                  <a16:creationId xmlns:a16="http://schemas.microsoft.com/office/drawing/2014/main" id="{649DC51E-9793-0A84-6B08-D0D5538AA36B}"/>
+                </a:ext>
+              </a:extLst>
+            </p:cNvPr>
+            <p:cNvCxnSpPr>
+              <a:cxnSpLocks/>
+            </p:cNvCxnSpPr>
+            <p:nvPr/>
+          </p:nvCxnSpPr>
+          <p:spPr>
+            <a:xfrm>
+              <a:off x="7263015" y="2454588"/>
+              <a:ext cx="443885" cy="0"/>
+            </a:xfrm>
+            <a:prstGeom prst="straightConnector1">
+              <a:avLst/>
+            </a:prstGeom>
+            <a:ln w="38100">
+              <a:solidFill>
+                <a:schemeClr val="tx2">
+                  <a:lumMod val="50000"/>
+                  <a:lumOff val="50000"/>
+                </a:schemeClr>
+              </a:solidFill>
+              <a:tailEnd type="triangle"/>
+            </a:ln>
+          </p:spPr>
+          <p:style>
+            <a:lnRef idx="2">
+              <a:schemeClr val="dk1"/>
+            </a:lnRef>
+            <a:fillRef idx="0">
+              <a:schemeClr val="dk1"/>
+            </a:fillRef>
+            <a:effectRef idx="1">
+              <a:schemeClr val="dk1"/>
+            </a:effectRef>
+            <a:fontRef idx="minor">
+              <a:schemeClr val="tx1"/>
+            </a:fontRef>
+          </p:style>
+        </p:cxnSp>
+        <p:cxnSp>
+          <p:nvCxnSpPr>
+            <p:cNvPr id="73" name="Straight Arrow Connector 72">
+              <a:extLst>
+                <a:ext uri="{FF2B5EF4-FFF2-40B4-BE49-F238E27FC236}">
+                  <a16:creationId xmlns:a16="http://schemas.microsoft.com/office/drawing/2014/main" id="{64BE0B4C-797F-F543-1C9C-AB6E6882C01E}"/>
+                </a:ext>
+              </a:extLst>
+            </p:cNvPr>
+            <p:cNvCxnSpPr>
+              <a:cxnSpLocks/>
+            </p:cNvCxnSpPr>
+            <p:nvPr/>
+          </p:nvCxnSpPr>
+          <p:spPr>
+            <a:xfrm flipH="1">
+              <a:off x="6987389" y="2454588"/>
+              <a:ext cx="275626" cy="262587"/>
+            </a:xfrm>
+            <a:prstGeom prst="straightConnector1">
+              <a:avLst/>
+            </a:prstGeom>
+            <a:ln w="38100">
+              <a:solidFill>
+                <a:schemeClr val="tx2">
+                  <a:lumMod val="50000"/>
+                  <a:lumOff val="50000"/>
+                </a:schemeClr>
+              </a:solidFill>
+              <a:tailEnd type="triangle"/>
+            </a:ln>
+          </p:spPr>
+          <p:style>
+            <a:lnRef idx="2">
+              <a:schemeClr val="dk1"/>
+            </a:lnRef>
+            <a:fillRef idx="0">
+              <a:schemeClr val="dk1"/>
+            </a:fillRef>
+            <a:effectRef idx="1">
+              <a:schemeClr val="dk1"/>
+            </a:effectRef>
+            <a:fontRef idx="minor">
+              <a:schemeClr val="tx1"/>
+            </a:fontRef>
+          </p:style>
+        </p:cxnSp>
+        <p:sp>
+          <p:nvSpPr>
+            <p:cNvPr id="74" name="TextBox 73">
+              <a:extLst>
+                <a:ext uri="{FF2B5EF4-FFF2-40B4-BE49-F238E27FC236}">
+                  <a16:creationId xmlns:a16="http://schemas.microsoft.com/office/drawing/2014/main" id="{74087EC6-A3FE-6A96-4695-DEC2A456BE73}"/>
+                </a:ext>
+              </a:extLst>
+            </p:cNvPr>
+            <p:cNvSpPr txBox="1"/>
+            <p:nvPr/>
+          </p:nvSpPr>
+          <p:spPr>
+            <a:xfrm>
+              <a:off x="7093503" y="1573254"/>
+              <a:ext cx="413896" cy="400110"/>
+            </a:xfrm>
+            <a:prstGeom prst="rect">
+              <a:avLst/>
+            </a:prstGeom>
+            <a:noFill/>
+          </p:spPr>
+          <p:txBody>
+            <a:bodyPr wrap="none" rtlCol="0">
+              <a:spAutoFit/>
+            </a:bodyPr>
+            <a:lstStyle/>
+            <a:p>
+              <a:r>
+                <a:rPr lang="en-US" sz="2000" dirty="0"/>
+                <a:t>Y</a:t>
+              </a:r>
+              <a:r>
+                <a:rPr lang="en-US" sz="2000" baseline="-25000" dirty="0"/>
+                <a:t>1</a:t>
+              </a:r>
+            </a:p>
+          </p:txBody>
+        </p:sp>
+        <p:sp>
+          <p:nvSpPr>
+            <p:cNvPr id="75" name="TextBox 74">
+              <a:extLst>
+                <a:ext uri="{FF2B5EF4-FFF2-40B4-BE49-F238E27FC236}">
+                  <a16:creationId xmlns:a16="http://schemas.microsoft.com/office/drawing/2014/main" id="{BA7835DC-B40E-10A4-D4AE-BA4EA9A1740C}"/>
+                </a:ext>
+              </a:extLst>
+            </p:cNvPr>
+            <p:cNvSpPr txBox="1"/>
+            <p:nvPr/>
+          </p:nvSpPr>
+          <p:spPr>
+            <a:xfrm>
+              <a:off x="6684417" y="2786717"/>
+              <a:ext cx="409086" cy="400110"/>
+            </a:xfrm>
+            <a:prstGeom prst="rect">
+              <a:avLst/>
+            </a:prstGeom>
+            <a:noFill/>
+          </p:spPr>
+          <p:txBody>
+            <a:bodyPr wrap="none" rtlCol="0">
+              <a:spAutoFit/>
+            </a:bodyPr>
+            <a:lstStyle/>
+            <a:p>
+              <a:r>
+                <a:rPr lang="en-US" sz="2000" dirty="0"/>
+                <a:t>Z</a:t>
+              </a:r>
+              <a:r>
+                <a:rPr lang="en-US" sz="2000" baseline="-25000" dirty="0"/>
+                <a:t>1</a:t>
+              </a:r>
+              <a:endParaRPr lang="en-US" sz="2000" dirty="0"/>
+            </a:p>
+          </p:txBody>
+        </p:sp>
+        <p:sp>
+          <p:nvSpPr>
+            <p:cNvPr id="76" name="TextBox 75">
+              <a:extLst>
+                <a:ext uri="{FF2B5EF4-FFF2-40B4-BE49-F238E27FC236}">
+                  <a16:creationId xmlns:a16="http://schemas.microsoft.com/office/drawing/2014/main" id="{2650B500-C2F1-D869-B582-7182306919F3}"/>
+                </a:ext>
+              </a:extLst>
+            </p:cNvPr>
+            <p:cNvSpPr txBox="1"/>
+            <p:nvPr/>
+          </p:nvSpPr>
+          <p:spPr>
+            <a:xfrm>
+              <a:off x="7677012" y="2269922"/>
+              <a:ext cx="417102" cy="400110"/>
+            </a:xfrm>
+            <a:prstGeom prst="rect">
+              <a:avLst/>
+            </a:prstGeom>
+            <a:noFill/>
+          </p:spPr>
+          <p:txBody>
+            <a:bodyPr wrap="none" rtlCol="0">
+              <a:spAutoFit/>
+            </a:bodyPr>
+            <a:lstStyle/>
+            <a:p>
+              <a:r>
+                <a:rPr lang="en-US" sz="2000" dirty="0"/>
+                <a:t>X</a:t>
+              </a:r>
+              <a:r>
+                <a:rPr lang="en-US" sz="2000" baseline="-25000" dirty="0"/>
+                <a:t>1</a:t>
+              </a:r>
+            </a:p>
+          </p:txBody>
+        </p:sp>
+      </p:grpSp>
+      <p:cxnSp>
+        <p:nvCxnSpPr>
+          <p:cNvPr id="80" name="Straight Arrow Connector 79">
+            <a:extLst>
+              <a:ext uri="{FF2B5EF4-FFF2-40B4-BE49-F238E27FC236}">
+                <a16:creationId xmlns:a16="http://schemas.microsoft.com/office/drawing/2014/main" id="{24765B7B-682C-3251-F353-FC93C0B90DD8}"/>
+              </a:ext>
+            </a:extLst>
+          </p:cNvPr>
+          <p:cNvCxnSpPr>
+            <a:cxnSpLocks/>
+          </p:cNvCxnSpPr>
+          <p:nvPr/>
+        </p:nvCxnSpPr>
+        <p:spPr>
+          <a:xfrm>
+            <a:off x="1216240" y="3082544"/>
+            <a:ext cx="0" cy="2625449"/>
+          </a:xfrm>
+          <a:prstGeom prst="straightConnector1">
+            <a:avLst/>
+          </a:prstGeom>
+          <a:ln>
+            <a:headEnd type="triangle"/>
+            <a:tailEnd type="triangle"/>
+          </a:ln>
+        </p:spPr>
+        <p:style>
+          <a:lnRef idx="2">
+            <a:schemeClr val="accent1"/>
+          </a:lnRef>
+          <a:fillRef idx="0">
+            <a:schemeClr val="accent1"/>
+          </a:fillRef>
+          <a:effectRef idx="1">
+            <a:schemeClr val="accent1"/>
+          </a:effectRef>
+          <a:fontRef idx="minor">
+            <a:schemeClr val="tx1"/>
+          </a:fontRef>
+        </p:style>
+      </p:cxnSp>
+      <p:sp>
+        <p:nvSpPr>
+          <p:cNvPr id="82" name="TextBox 81">
+            <a:extLst>
+              <a:ext uri="{FF2B5EF4-FFF2-40B4-BE49-F238E27FC236}">
+                <a16:creationId xmlns:a16="http://schemas.microsoft.com/office/drawing/2014/main" id="{9A5AF5B4-443E-76C9-01E1-A30A0E9DE05E}"/>
+              </a:ext>
+            </a:extLst>
+          </p:cNvPr>
+          <p:cNvSpPr txBox="1"/>
+          <p:nvPr/>
+        </p:nvSpPr>
+        <p:spPr>
+          <a:xfrm>
+            <a:off x="301806" y="4024718"/>
+            <a:ext cx="487542" cy="369332"/>
+          </a:xfrm>
+          <a:prstGeom prst="rect">
+            <a:avLst/>
+          </a:prstGeom>
+          <a:noFill/>
+        </p:spPr>
+        <p:txBody>
+          <a:bodyPr wrap="square" rtlCol="0">
+            <a:spAutoFit/>
+          </a:bodyPr>
+          <a:lstStyle/>
+          <a:p>
+            <a:r>
+              <a:rPr lang="en-US" dirty="0"/>
+              <a:t>d1</a:t>
+            </a:r>
+          </a:p>
+        </p:txBody>
+      </p:sp>
+      <p:sp>
+        <p:nvSpPr>
+          <p:cNvPr id="83" name="TextBox 82">
+            <a:extLst>
+              <a:ext uri="{FF2B5EF4-FFF2-40B4-BE49-F238E27FC236}">
+                <a16:creationId xmlns:a16="http://schemas.microsoft.com/office/drawing/2014/main" id="{7E081EDC-DFC1-EA95-BA1A-4C7096995054}"/>
+              </a:ext>
+            </a:extLst>
+          </p:cNvPr>
+          <p:cNvSpPr txBox="1"/>
+          <p:nvPr/>
+        </p:nvSpPr>
+        <p:spPr>
+          <a:xfrm>
+            <a:off x="2904505" y="1509516"/>
+            <a:ext cx="487542" cy="369332"/>
+          </a:xfrm>
+          <a:prstGeom prst="rect">
+            <a:avLst/>
+          </a:prstGeom>
+          <a:noFill/>
+        </p:spPr>
+        <p:txBody>
+          <a:bodyPr wrap="square" rtlCol="0">
+            <a:spAutoFit/>
+          </a:bodyPr>
+          <a:lstStyle/>
+          <a:p>
+            <a:r>
+              <a:rPr lang="en-US" dirty="0"/>
+              <a:t>a1</a:t>
+            </a:r>
+          </a:p>
+        </p:txBody>
+      </p:sp>
+      <p:sp>
+        <p:nvSpPr>
+          <p:cNvPr id="84" name="TextBox 83">
+            <a:extLst>
+              <a:ext uri="{FF2B5EF4-FFF2-40B4-BE49-F238E27FC236}">
+                <a16:creationId xmlns:a16="http://schemas.microsoft.com/office/drawing/2014/main" id="{F57CD24A-2EE7-B048-9BC0-EBDC05C856C8}"/>
+              </a:ext>
+            </a:extLst>
+          </p:cNvPr>
+          <p:cNvSpPr txBox="1"/>
+          <p:nvPr/>
+        </p:nvSpPr>
+        <p:spPr>
+          <a:xfrm>
+            <a:off x="4566686" y="1541797"/>
+            <a:ext cx="487542" cy="369332"/>
+          </a:xfrm>
+          <a:prstGeom prst="rect">
+            <a:avLst/>
+          </a:prstGeom>
+          <a:noFill/>
+        </p:spPr>
+        <p:txBody>
+          <a:bodyPr wrap="square" rtlCol="0">
+            <a:spAutoFit/>
+          </a:bodyPr>
+          <a:lstStyle/>
+          <a:p>
+            <a:r>
+              <a:rPr lang="en-US" dirty="0"/>
+              <a:t>a2</a:t>
+            </a:r>
+          </a:p>
+        </p:txBody>
+      </p:sp>
+      <p:cxnSp>
+        <p:nvCxnSpPr>
+          <p:cNvPr id="90" name="Straight Arrow Connector 89">
+            <a:extLst>
+              <a:ext uri="{FF2B5EF4-FFF2-40B4-BE49-F238E27FC236}">
+                <a16:creationId xmlns:a16="http://schemas.microsoft.com/office/drawing/2014/main" id="{32C2A309-9248-41C9-CA11-72755ACDF3C7}"/>
+              </a:ext>
+            </a:extLst>
+          </p:cNvPr>
+          <p:cNvCxnSpPr>
+            <a:cxnSpLocks/>
+          </p:cNvCxnSpPr>
+          <p:nvPr/>
+        </p:nvCxnSpPr>
+        <p:spPr>
+          <a:xfrm flipH="1">
+            <a:off x="4050434" y="1872121"/>
+            <a:ext cx="1520047" cy="0"/>
+          </a:xfrm>
+          <a:prstGeom prst="straightConnector1">
+            <a:avLst/>
+          </a:prstGeom>
+          <a:ln>
+            <a:headEnd type="triangle"/>
+            <a:tailEnd type="triangle"/>
+          </a:ln>
+        </p:spPr>
+        <p:style>
+          <a:lnRef idx="2">
+            <a:schemeClr val="accent1"/>
+          </a:lnRef>
+          <a:fillRef idx="0">
+            <a:schemeClr val="accent1"/>
+          </a:fillRef>
+          <a:effectRef idx="1">
+            <a:schemeClr val="accent1"/>
+          </a:effectRef>
+          <a:fontRef idx="minor">
+            <a:schemeClr val="tx1"/>
+          </a:fontRef>
+        </p:style>
+      </p:cxnSp>
+      <p:cxnSp>
+        <p:nvCxnSpPr>
+          <p:cNvPr id="93" name="Straight Arrow Connector 92">
+            <a:extLst>
+              <a:ext uri="{FF2B5EF4-FFF2-40B4-BE49-F238E27FC236}">
+                <a16:creationId xmlns:a16="http://schemas.microsoft.com/office/drawing/2014/main" id="{1F00E8AD-E8C5-CF94-07D3-D1D357216DC5}"/>
+              </a:ext>
+            </a:extLst>
+          </p:cNvPr>
+          <p:cNvCxnSpPr>
+            <a:cxnSpLocks/>
+          </p:cNvCxnSpPr>
+          <p:nvPr/>
+        </p:nvCxnSpPr>
+        <p:spPr>
+          <a:xfrm flipH="1">
+            <a:off x="2193014" y="1872121"/>
+            <a:ext cx="1857420" cy="6727"/>
+          </a:xfrm>
+          <a:prstGeom prst="straightConnector1">
+            <a:avLst/>
+          </a:prstGeom>
+          <a:ln>
+            <a:headEnd type="triangle"/>
+            <a:tailEnd type="triangle"/>
+          </a:ln>
+        </p:spPr>
+        <p:style>
+          <a:lnRef idx="2">
+            <a:schemeClr val="accent1"/>
+          </a:lnRef>
+          <a:fillRef idx="0">
+            <a:schemeClr val="accent1"/>
+          </a:fillRef>
+          <a:effectRef idx="1">
+            <a:schemeClr val="accent1"/>
+          </a:effectRef>
+          <a:fontRef idx="minor">
+            <a:schemeClr val="tx1"/>
+          </a:fontRef>
+        </p:style>
+      </p:cxnSp>
+      <p:grpSp>
+        <p:nvGrpSpPr>
+          <p:cNvPr id="95" name="Group 94">
+            <a:extLst>
+              <a:ext uri="{FF2B5EF4-FFF2-40B4-BE49-F238E27FC236}">
+                <a16:creationId xmlns:a16="http://schemas.microsoft.com/office/drawing/2014/main" id="{2E074E4C-C0C1-AD17-EA30-C728F461D334}"/>
+              </a:ext>
+            </a:extLst>
+          </p:cNvPr>
+          <p:cNvGrpSpPr/>
+          <p:nvPr/>
+        </p:nvGrpSpPr>
+        <p:grpSpPr>
+          <a:xfrm>
+            <a:off x="5091723" y="2220698"/>
+            <a:ext cx="1318561" cy="1445645"/>
+            <a:chOff x="8494479" y="3442476"/>
+            <a:chExt cx="1318561" cy="1445645"/>
+          </a:xfrm>
+        </p:grpSpPr>
+        <p:cxnSp>
+          <p:nvCxnSpPr>
+            <p:cNvPr id="39" name="Straight Arrow Connector 38">
+              <a:extLst>
+                <a:ext uri="{FF2B5EF4-FFF2-40B4-BE49-F238E27FC236}">
+                  <a16:creationId xmlns:a16="http://schemas.microsoft.com/office/drawing/2014/main" id="{46DDC872-B033-4FC9-5D7E-E8B3CB5E8D73}"/>
+                </a:ext>
+              </a:extLst>
+            </p:cNvPr>
+            <p:cNvCxnSpPr>
+              <a:cxnSpLocks/>
+            </p:cNvCxnSpPr>
+            <p:nvPr/>
+          </p:nvCxnSpPr>
+          <p:spPr>
+            <a:xfrm flipV="1">
+              <a:off x="9086223" y="3797809"/>
+              <a:ext cx="0" cy="526001"/>
+            </a:xfrm>
+            <a:prstGeom prst="straightConnector1">
+              <a:avLst/>
+            </a:prstGeom>
+            <a:ln w="38100">
+              <a:solidFill>
+                <a:schemeClr val="tx2">
+                  <a:lumMod val="50000"/>
+                  <a:lumOff val="50000"/>
+                </a:schemeClr>
+              </a:solidFill>
+              <a:tailEnd type="triangle"/>
+            </a:ln>
+          </p:spPr>
+          <p:style>
+            <a:lnRef idx="2">
+              <a:schemeClr val="dk1"/>
+            </a:lnRef>
+            <a:fillRef idx="0">
+              <a:schemeClr val="dk1"/>
+            </a:fillRef>
+            <a:effectRef idx="1">
+              <a:schemeClr val="dk1"/>
+            </a:effectRef>
+            <a:fontRef idx="minor">
+              <a:schemeClr val="tx1"/>
+            </a:fontRef>
+          </p:style>
+        </p:cxnSp>
+        <p:cxnSp>
+          <p:nvCxnSpPr>
+            <p:cNvPr id="40" name="Straight Arrow Connector 39">
+              <a:extLst>
+                <a:ext uri="{FF2B5EF4-FFF2-40B4-BE49-F238E27FC236}">
+                  <a16:creationId xmlns:a16="http://schemas.microsoft.com/office/drawing/2014/main" id="{B6580AE8-FC98-F1EF-7429-C28E0946B84B}"/>
+                </a:ext>
+              </a:extLst>
+            </p:cNvPr>
+            <p:cNvCxnSpPr>
+              <a:cxnSpLocks/>
+            </p:cNvCxnSpPr>
+            <p:nvPr/>
+          </p:nvCxnSpPr>
+          <p:spPr>
+            <a:xfrm>
+              <a:off x="9086223" y="4323810"/>
+              <a:ext cx="443885" cy="0"/>
+            </a:xfrm>
+            <a:prstGeom prst="straightConnector1">
+              <a:avLst/>
+            </a:prstGeom>
+            <a:ln w="38100">
+              <a:solidFill>
+                <a:schemeClr val="tx2">
+                  <a:lumMod val="50000"/>
+                  <a:lumOff val="50000"/>
+                </a:schemeClr>
+              </a:solidFill>
+              <a:tailEnd type="triangle"/>
+            </a:ln>
+          </p:spPr>
+          <p:style>
+            <a:lnRef idx="2">
+              <a:schemeClr val="dk1"/>
+            </a:lnRef>
+            <a:fillRef idx="0">
+              <a:schemeClr val="dk1"/>
+            </a:fillRef>
+            <a:effectRef idx="1">
+              <a:schemeClr val="dk1"/>
+            </a:effectRef>
+            <a:fontRef idx="minor">
+              <a:schemeClr val="tx1"/>
+            </a:fontRef>
+          </p:style>
+        </p:cxnSp>
+        <p:cxnSp>
+          <p:nvCxnSpPr>
+            <p:cNvPr id="41" name="Straight Arrow Connector 40">
+              <a:extLst>
+                <a:ext uri="{FF2B5EF4-FFF2-40B4-BE49-F238E27FC236}">
+                  <a16:creationId xmlns:a16="http://schemas.microsoft.com/office/drawing/2014/main" id="{A516E6B8-4041-E25D-3609-CAD86C5BD83C}"/>
+                </a:ext>
+              </a:extLst>
+            </p:cNvPr>
+            <p:cNvCxnSpPr>
+              <a:cxnSpLocks/>
+            </p:cNvCxnSpPr>
+            <p:nvPr/>
+          </p:nvCxnSpPr>
+          <p:spPr>
+            <a:xfrm flipH="1">
+              <a:off x="8810597" y="4323810"/>
+              <a:ext cx="275626" cy="262587"/>
+            </a:xfrm>
+            <a:prstGeom prst="straightConnector1">
+              <a:avLst/>
+            </a:prstGeom>
+            <a:ln w="38100">
+              <a:solidFill>
+                <a:schemeClr val="tx2">
+                  <a:lumMod val="50000"/>
+                  <a:lumOff val="50000"/>
+                </a:schemeClr>
+              </a:solidFill>
+              <a:tailEnd type="triangle"/>
+            </a:ln>
+          </p:spPr>
+          <p:style>
+            <a:lnRef idx="2">
+              <a:schemeClr val="dk1"/>
+            </a:lnRef>
+            <a:fillRef idx="0">
+              <a:schemeClr val="dk1"/>
+            </a:fillRef>
+            <a:effectRef idx="1">
+              <a:schemeClr val="dk1"/>
+            </a:effectRef>
+            <a:fontRef idx="minor">
+              <a:schemeClr val="tx1"/>
+            </a:fontRef>
+          </p:style>
+        </p:cxnSp>
+        <p:sp>
+          <p:nvSpPr>
+            <p:cNvPr id="42" name="TextBox 41">
+              <a:extLst>
+                <a:ext uri="{FF2B5EF4-FFF2-40B4-BE49-F238E27FC236}">
+                  <a16:creationId xmlns:a16="http://schemas.microsoft.com/office/drawing/2014/main" id="{467A0B55-DE40-29B3-4DC8-4C2EC054400D}"/>
+                </a:ext>
+              </a:extLst>
+            </p:cNvPr>
+            <p:cNvSpPr txBox="1"/>
+            <p:nvPr/>
+          </p:nvSpPr>
+          <p:spPr>
+            <a:xfrm>
+              <a:off x="8916711" y="3442476"/>
+              <a:ext cx="417102" cy="400110"/>
+            </a:xfrm>
+            <a:prstGeom prst="rect">
+              <a:avLst/>
+            </a:prstGeom>
+            <a:noFill/>
+          </p:spPr>
+          <p:txBody>
+            <a:bodyPr wrap="none" rtlCol="0">
+              <a:spAutoFit/>
+            </a:bodyPr>
+            <a:lstStyle/>
+            <a:p>
+              <a:r>
+                <a:rPr lang="en-US" sz="2000" dirty="0"/>
+                <a:t>X</a:t>
+              </a:r>
+              <a:r>
+                <a:rPr lang="en-US" sz="2000" baseline="-25000" dirty="0"/>
+                <a:t>3</a:t>
+              </a:r>
+            </a:p>
+          </p:txBody>
+        </p:sp>
+        <p:sp>
+          <p:nvSpPr>
+            <p:cNvPr id="43" name="TextBox 42">
+              <a:extLst>
+                <a:ext uri="{FF2B5EF4-FFF2-40B4-BE49-F238E27FC236}">
+                  <a16:creationId xmlns:a16="http://schemas.microsoft.com/office/drawing/2014/main" id="{0BAD6E37-5747-2892-D475-D3B182795F29}"/>
+                </a:ext>
+              </a:extLst>
+            </p:cNvPr>
+            <p:cNvSpPr txBox="1"/>
+            <p:nvPr/>
+          </p:nvSpPr>
+          <p:spPr>
+            <a:xfrm>
+              <a:off x="9403954" y="3905473"/>
+              <a:ext cx="409086" cy="400110"/>
+            </a:xfrm>
+            <a:prstGeom prst="rect">
+              <a:avLst/>
+            </a:prstGeom>
+            <a:noFill/>
+          </p:spPr>
+          <p:txBody>
+            <a:bodyPr wrap="none" rtlCol="0">
+              <a:spAutoFit/>
+            </a:bodyPr>
+            <a:lstStyle/>
+            <a:p>
+              <a:r>
+                <a:rPr lang="en-US" sz="2000" dirty="0"/>
+                <a:t>Z</a:t>
+              </a:r>
+              <a:r>
+                <a:rPr lang="en-US" sz="2000" baseline="-25000" dirty="0"/>
+                <a:t>3</a:t>
+              </a:r>
+            </a:p>
+          </p:txBody>
+        </p:sp>
+        <p:sp>
+          <p:nvSpPr>
+            <p:cNvPr id="44" name="TextBox 43">
+              <a:extLst>
+                <a:ext uri="{FF2B5EF4-FFF2-40B4-BE49-F238E27FC236}">
+                  <a16:creationId xmlns:a16="http://schemas.microsoft.com/office/drawing/2014/main" id="{ECB2A78F-8EED-1FF2-6D7A-CFFDDFC00DB3}"/>
+                </a:ext>
+              </a:extLst>
+            </p:cNvPr>
+            <p:cNvSpPr txBox="1"/>
+            <p:nvPr/>
+          </p:nvSpPr>
+          <p:spPr>
+            <a:xfrm>
+              <a:off x="8494479" y="4488011"/>
+              <a:ext cx="413896" cy="400110"/>
+            </a:xfrm>
+            <a:prstGeom prst="rect">
+              <a:avLst/>
+            </a:prstGeom>
+            <a:noFill/>
+          </p:spPr>
+          <p:txBody>
+            <a:bodyPr wrap="none" rtlCol="0">
+              <a:spAutoFit/>
+            </a:bodyPr>
+            <a:lstStyle/>
+            <a:p>
+              <a:r>
+                <a:rPr lang="en-US" sz="2000" dirty="0"/>
+                <a:t>Y</a:t>
+              </a:r>
+              <a:r>
+                <a:rPr lang="en-US" sz="2000" baseline="-25000" dirty="0"/>
+                <a:t>3</a:t>
+              </a:r>
+            </a:p>
+          </p:txBody>
+        </p:sp>
+      </p:grpSp>
+      <p:sp>
+        <p:nvSpPr>
+          <p:cNvPr id="96" name="TextBox 95">
+            <a:extLst>
+              <a:ext uri="{FF2B5EF4-FFF2-40B4-BE49-F238E27FC236}">
+                <a16:creationId xmlns:a16="http://schemas.microsoft.com/office/drawing/2014/main" id="{2EBE830F-B90B-0312-4F32-22C57B9A205F}"/>
+              </a:ext>
+            </a:extLst>
+          </p:cNvPr>
+          <p:cNvSpPr txBox="1"/>
+          <p:nvPr/>
+        </p:nvSpPr>
+        <p:spPr>
+          <a:xfrm>
+            <a:off x="4927261" y="2545793"/>
+            <a:ext cx="476412" cy="461665"/>
+          </a:xfrm>
+          <a:prstGeom prst="rect">
+            <a:avLst/>
+          </a:prstGeom>
+          <a:noFill/>
+        </p:spPr>
+        <p:txBody>
+          <a:bodyPr wrap="square" rtlCol="0">
+            <a:spAutoFit/>
+          </a:bodyPr>
+          <a:lstStyle/>
+          <a:p>
+            <a:r>
+              <a:rPr lang="el-GR" sz="2400" dirty="0"/>
+              <a:t>θ</a:t>
+            </a:r>
+            <a:r>
+              <a:rPr lang="en-US" sz="2400" baseline="-25000" dirty="0"/>
+              <a:t>4</a:t>
+            </a:r>
+          </a:p>
+        </p:txBody>
+      </p:sp>
+    </p:spTree>
+    <p:extLst>
+      <p:ext uri="{BB962C8B-B14F-4D97-AF65-F5344CB8AC3E}">
+        <p14:creationId xmlns:p14="http://schemas.microsoft.com/office/powerpoint/2010/main" val="932086103"/>
+      </p:ext>
+    </p:extLst>
+  </p:cSld>
+  <p:clrMapOvr>
+    <a:masterClrMapping/>
+  </p:clrMapOvr>
+</p:sld>
+</file>
+
+<file path=ppt/slides/slide3.xml><?xml version="1.0" encoding="utf-8"?>
+<p:sld xmlns:a="http://schemas.openxmlformats.org/drawingml/2006/main" xmlns:r="http://schemas.openxmlformats.org/officeDocument/2006/relationships" xmlns:p="http://schemas.openxmlformats.org/presentationml/2006/main">
+  <p:cSld>
+    <p:spTree>
+      <p:nvGrpSpPr>
+        <p:cNvPr id="1" name=""/>
+        <p:cNvGrpSpPr/>
+        <p:nvPr/>
+      </p:nvGrpSpPr>
+      <p:grpSpPr>
+        <a:xfrm>
+          <a:off x="0" y="0"/>
+          <a:ext cx="0" cy="0"/>
+          <a:chOff x="0" y="0"/>
+          <a:chExt cx="0" cy="0"/>
+        </a:xfrm>
+      </p:grpSpPr>
+      <p:sp>
+        <p:nvSpPr>
+          <p:cNvPr id="5" name="TextBox 4">
+            <a:extLst>
+              <a:ext uri="{FF2B5EF4-FFF2-40B4-BE49-F238E27FC236}">
+                <a16:creationId xmlns:a16="http://schemas.microsoft.com/office/drawing/2014/main" id="{BFB0B5A4-5C1E-2E60-31EC-9BF16F91AD3C}"/>
+              </a:ext>
+            </a:extLst>
+          </p:cNvPr>
+          <p:cNvSpPr txBox="1"/>
+          <p:nvPr/>
+        </p:nvSpPr>
+        <p:spPr>
+          <a:xfrm>
+            <a:off x="1484789" y="879759"/>
+            <a:ext cx="8910961" cy="369332"/>
+          </a:xfrm>
+          <a:prstGeom prst="rect">
+            <a:avLst/>
+          </a:prstGeom>
+          <a:noFill/>
+        </p:spPr>
+        <p:txBody>
+          <a:bodyPr wrap="square">
+            <a:spAutoFit/>
+          </a:bodyPr>
+          <a:lstStyle/>
+          <a:p>
+            <a:r>
+              <a:rPr lang="en-US" dirty="0"/>
+              <a:t>https://www.mecademic.com/academic_articles/space-orientation-euler-angles/</a:t>
+            </a:r>
+          </a:p>
+        </p:txBody>
+      </p:sp>
+    </p:spTree>
+    <p:extLst>
+      <p:ext uri="{BB962C8B-B14F-4D97-AF65-F5344CB8AC3E}">
+        <p14:creationId xmlns:p14="http://schemas.microsoft.com/office/powerpoint/2010/main" val="3204216477"/>
       </p:ext>
     </p:extLst>
   </p:cSld>

</xml_diff>

<commit_message>
Backup before breaking it down to check each joint fomr 4 to 6
</commit_message>
<xml_diff>
--- a/Doc/Denavit-Hartenberg.pptx
+++ b/Doc/Denavit-Hartenberg.pptx
@@ -13662,9 +13662,9 @@
         <p:grpSpPr>
           <a:xfrm>
             <a:off x="6607719" y="3918779"/>
-            <a:ext cx="1316124" cy="983570"/>
+            <a:ext cx="1319330" cy="983570"/>
             <a:chOff x="8571972" y="4041481"/>
-            <a:chExt cx="1316124" cy="983570"/>
+            <a:chExt cx="1319330" cy="983570"/>
           </a:xfrm>
         </p:grpSpPr>
         <p:cxnSp>
@@ -13823,7 +13823,7 @@
           <p:spPr>
             <a:xfrm>
               <a:off x="8571972" y="4073208"/>
-              <a:ext cx="417102" cy="400110"/>
+              <a:ext cx="413896" cy="400110"/>
             </a:xfrm>
             <a:prstGeom prst="rect">
               <a:avLst/>
@@ -13838,7 +13838,7 @@
             <a:p>
               <a:r>
                 <a:rPr lang="en-US" sz="2000" dirty="0"/>
-                <a:t>X</a:t>
+                <a:t>Y</a:t>
               </a:r>
               <a:r>
                 <a:rPr lang="en-US" sz="2000" baseline="-25000" dirty="0"/>
@@ -13901,7 +13901,7 @@
           <p:spPr>
             <a:xfrm>
               <a:off x="9474200" y="4041481"/>
-              <a:ext cx="413896" cy="400110"/>
+              <a:ext cx="417102" cy="400110"/>
             </a:xfrm>
             <a:prstGeom prst="rect">
               <a:avLst/>
@@ -13916,7 +13916,7 @@
             <a:p>
               <a:r>
                 <a:rPr lang="en-US" sz="2000" dirty="0"/>
-                <a:t>Y</a:t>
+                <a:t>X</a:t>
               </a:r>
               <a:r>
                 <a:rPr lang="en-US" sz="2000" baseline="-25000" dirty="0"/>
@@ -14018,14 +14018,14 @@
           <p:nvPr>
             <p:extLst>
               <p:ext uri="{D42A27DB-BD31-4B8C-83A1-F6EECF244321}">
-                <p14:modId xmlns:p14="http://schemas.microsoft.com/office/powerpoint/2010/main" val="1175445171"/>
+                <p14:modId xmlns:p14="http://schemas.microsoft.com/office/powerpoint/2010/main" val="246584908"/>
               </p:ext>
             </p:extLst>
           </p:nvPr>
         </p:nvGraphicFramePr>
         <p:xfrm>
           <a:off x="8222888" y="925293"/>
-          <a:ext cx="3969110" cy="2926080"/>
+          <a:ext cx="3969110" cy="2560320"/>
         </p:xfrm>
         <a:graphic>
           <a:graphicData uri="http://schemas.openxmlformats.org/drawingml/2006/table">
@@ -14104,7 +14104,7 @@
                     <a:p>
                       <a:r>
                         <a:rPr lang="en-US" dirty="0"/>
-                        <a:t>b</a:t>
+                        <a:t>d</a:t>
                       </a:r>
                     </a:p>
                   </a:txBody>
@@ -14545,7 +14545,7 @@
                     <a:bodyPr/>
                     <a:lstStyle/>
                     <a:p>
-                      <a:endParaRPr lang="en-US"/>
+                      <a:endParaRPr lang="en-US" dirty="0"/>
                     </a:p>
                   </a:txBody>
                   <a:tcPr/>
@@ -14553,66 +14553,6 @@
                 <a:extLst>
                   <a:ext uri="{0D108BD9-81ED-4DB2-BD59-A6C34878D82A}">
                     <a16:rowId xmlns:a16="http://schemas.microsoft.com/office/drawing/2014/main" val="2116824428"/>
-                  </a:ext>
-                </a:extLst>
-              </a:tr>
-              <a:tr h="310059">
-                <a:tc>
-                  <a:txBody>
-                    <a:bodyPr/>
-                    <a:lstStyle/>
-                    <a:p>
-                      <a:r>
-                        <a:rPr lang="en-US" dirty="0"/>
-                        <a:t>7</a:t>
-                      </a:r>
-                    </a:p>
-                  </a:txBody>
-                  <a:tcPr/>
-                </a:tc>
-                <a:tc>
-                  <a:txBody>
-                    <a:bodyPr/>
-                    <a:lstStyle/>
-                    <a:p>
-                      <a:endParaRPr lang="en-US"/>
-                    </a:p>
-                  </a:txBody>
-                  <a:tcPr/>
-                </a:tc>
-                <a:tc>
-                  <a:txBody>
-                    <a:bodyPr/>
-                    <a:lstStyle/>
-                    <a:p>
-                      <a:endParaRPr lang="en-US"/>
-                    </a:p>
-                  </a:txBody>
-                  <a:tcPr/>
-                </a:tc>
-                <a:tc>
-                  <a:txBody>
-                    <a:bodyPr/>
-                    <a:lstStyle/>
-                    <a:p>
-                      <a:endParaRPr lang="en-US"/>
-                    </a:p>
-                  </a:txBody>
-                  <a:tcPr/>
-                </a:tc>
-                <a:tc>
-                  <a:txBody>
-                    <a:bodyPr/>
-                    <a:lstStyle/>
-                    <a:p>
-                      <a:endParaRPr lang="en-US" dirty="0"/>
-                    </a:p>
-                  </a:txBody>
-                  <a:tcPr/>
-                </a:tc>
-                <a:extLst>
-                  <a:ext uri="{0D108BD9-81ED-4DB2-BD59-A6C34878D82A}">
-                    <a16:rowId xmlns:a16="http://schemas.microsoft.com/office/drawing/2014/main" val="122815820"/>
                   </a:ext>
                 </a:extLst>
               </a:tr>

</xml_diff>

<commit_message>
Looks like j1-6 FK is wroking with orded DH parameters. Adding
</commit_message>
<xml_diff>
--- a/Doc/Denavit-Hartenberg.pptx
+++ b/Doc/Denavit-Hartenberg.pptx
@@ -14,6 +14,7 @@
     <p:sldId id="265" r:id="rId8"/>
     <p:sldId id="266" r:id="rId9"/>
     <p:sldId id="267" r:id="rId10"/>
+    <p:sldId id="268" r:id="rId11"/>
   </p:sldIdLst>
   <p:sldSz cx="12192000" cy="6858000"/>
   <p:notesSz cx="6858000" cy="9144000"/>
@@ -3368,6 +3369,4090 @@
     <p:extLst>
       <p:ext uri="{BB962C8B-B14F-4D97-AF65-F5344CB8AC3E}">
         <p14:creationId xmlns:p14="http://schemas.microsoft.com/office/powerpoint/2010/main" val="3592314825"/>
+      </p:ext>
+    </p:extLst>
+  </p:cSld>
+  <p:clrMapOvr>
+    <a:masterClrMapping/>
+  </p:clrMapOvr>
+</p:sld>
+</file>
+
+<file path=ppt/slides/slide10.xml><?xml version="1.0" encoding="utf-8"?>
+<p:sld xmlns:a="http://schemas.openxmlformats.org/drawingml/2006/main" xmlns:r="http://schemas.openxmlformats.org/officeDocument/2006/relationships" xmlns:p="http://schemas.openxmlformats.org/presentationml/2006/main">
+  <p:cSld>
+    <p:spTree>
+      <p:nvGrpSpPr>
+        <p:cNvPr id="1" name=""/>
+        <p:cNvGrpSpPr/>
+        <p:nvPr/>
+      </p:nvGrpSpPr>
+      <p:grpSpPr>
+        <a:xfrm>
+          <a:off x="0" y="0"/>
+          <a:ext cx="0" cy="0"/>
+          <a:chOff x="0" y="0"/>
+          <a:chExt cx="0" cy="0"/>
+        </a:xfrm>
+      </p:grpSpPr>
+      <p:grpSp>
+        <p:nvGrpSpPr>
+          <p:cNvPr id="4" name="Group 3">
+            <a:extLst>
+              <a:ext uri="{FF2B5EF4-FFF2-40B4-BE49-F238E27FC236}">
+                <a16:creationId xmlns:a16="http://schemas.microsoft.com/office/drawing/2014/main" id="{388A0AEC-6122-D731-A658-339644E16AF3}"/>
+              </a:ext>
+            </a:extLst>
+          </p:cNvPr>
+          <p:cNvGrpSpPr/>
+          <p:nvPr/>
+        </p:nvGrpSpPr>
+        <p:grpSpPr>
+          <a:xfrm>
+            <a:off x="1034729" y="3659846"/>
+            <a:ext cx="248575" cy="471998"/>
+            <a:chOff x="2246050" y="1305017"/>
+            <a:chExt cx="204187" cy="471998"/>
+          </a:xfrm>
+        </p:grpSpPr>
+        <p:sp>
+          <p:nvSpPr>
+            <p:cNvPr id="2" name="Isosceles Triangle 1">
+              <a:extLst>
+                <a:ext uri="{FF2B5EF4-FFF2-40B4-BE49-F238E27FC236}">
+                  <a16:creationId xmlns:a16="http://schemas.microsoft.com/office/drawing/2014/main" id="{E798782C-357A-4A4C-01FE-D86F1B2FE98F}"/>
+                </a:ext>
+              </a:extLst>
+            </p:cNvPr>
+            <p:cNvSpPr/>
+            <p:nvPr/>
+          </p:nvSpPr>
+          <p:spPr>
+            <a:xfrm>
+              <a:off x="2246050" y="1305017"/>
+              <a:ext cx="204187" cy="213065"/>
+            </a:xfrm>
+            <a:prstGeom prst="triangle">
+              <a:avLst/>
+            </a:prstGeom>
+          </p:spPr>
+          <p:style>
+            <a:lnRef idx="2">
+              <a:schemeClr val="dk1">
+                <a:shade val="15000"/>
+              </a:schemeClr>
+            </a:lnRef>
+            <a:fillRef idx="1">
+              <a:schemeClr val="dk1"/>
+            </a:fillRef>
+            <a:effectRef idx="0">
+              <a:schemeClr val="dk1"/>
+            </a:effectRef>
+            <a:fontRef idx="minor">
+              <a:schemeClr val="lt1"/>
+            </a:fontRef>
+          </p:style>
+          <p:txBody>
+            <a:bodyPr rtlCol="0" anchor="ctr"/>
+            <a:lstStyle/>
+            <a:p>
+              <a:pPr algn="ctr"/>
+              <a:endParaRPr lang="en-US"/>
+            </a:p>
+          </p:txBody>
+        </p:sp>
+        <p:sp>
+          <p:nvSpPr>
+            <p:cNvPr id="3" name="Isosceles Triangle 2">
+              <a:extLst>
+                <a:ext uri="{FF2B5EF4-FFF2-40B4-BE49-F238E27FC236}">
+                  <a16:creationId xmlns:a16="http://schemas.microsoft.com/office/drawing/2014/main" id="{D9BCC807-4E13-AF78-1C7B-AAB81D96CF68}"/>
+                </a:ext>
+              </a:extLst>
+            </p:cNvPr>
+            <p:cNvSpPr/>
+            <p:nvPr/>
+          </p:nvSpPr>
+          <p:spPr>
+            <a:xfrm rot="10800000">
+              <a:off x="2246050" y="1563950"/>
+              <a:ext cx="204187" cy="213065"/>
+            </a:xfrm>
+            <a:prstGeom prst="triangle">
+              <a:avLst/>
+            </a:prstGeom>
+          </p:spPr>
+          <p:style>
+            <a:lnRef idx="2">
+              <a:schemeClr val="dk1">
+                <a:shade val="15000"/>
+              </a:schemeClr>
+            </a:lnRef>
+            <a:fillRef idx="1">
+              <a:schemeClr val="dk1"/>
+            </a:fillRef>
+            <a:effectRef idx="0">
+              <a:schemeClr val="dk1"/>
+            </a:effectRef>
+            <a:fontRef idx="minor">
+              <a:schemeClr val="lt1"/>
+            </a:fontRef>
+          </p:style>
+          <p:txBody>
+            <a:bodyPr rtlCol="0" anchor="ctr"/>
+            <a:lstStyle/>
+            <a:p>
+              <a:pPr algn="ctr"/>
+              <a:endParaRPr lang="en-US"/>
+            </a:p>
+          </p:txBody>
+        </p:sp>
+      </p:grpSp>
+      <p:cxnSp>
+        <p:nvCxnSpPr>
+          <p:cNvPr id="20" name="Straight Connector 19">
+            <a:extLst>
+              <a:ext uri="{FF2B5EF4-FFF2-40B4-BE49-F238E27FC236}">
+                <a16:creationId xmlns:a16="http://schemas.microsoft.com/office/drawing/2014/main" id="{3C91ED00-EB92-F36B-4ADC-1625395AC9FE}"/>
+              </a:ext>
+            </a:extLst>
+          </p:cNvPr>
+          <p:cNvCxnSpPr>
+            <a:cxnSpLocks/>
+          </p:cNvCxnSpPr>
+          <p:nvPr/>
+        </p:nvCxnSpPr>
+        <p:spPr>
+          <a:xfrm>
+            <a:off x="1159017" y="2647055"/>
+            <a:ext cx="0" cy="1012791"/>
+          </a:xfrm>
+          <a:prstGeom prst="line">
+            <a:avLst/>
+          </a:prstGeom>
+        </p:spPr>
+        <p:style>
+          <a:lnRef idx="2">
+            <a:schemeClr val="dk1"/>
+          </a:lnRef>
+          <a:fillRef idx="0">
+            <a:schemeClr val="dk1"/>
+          </a:fillRef>
+          <a:effectRef idx="1">
+            <a:schemeClr val="dk1"/>
+          </a:effectRef>
+          <a:fontRef idx="minor">
+            <a:schemeClr val="tx1"/>
+          </a:fontRef>
+        </p:style>
+      </p:cxnSp>
+      <p:sp>
+        <p:nvSpPr>
+          <p:cNvPr id="21" name="TextBox 20">
+            <a:extLst>
+              <a:ext uri="{FF2B5EF4-FFF2-40B4-BE49-F238E27FC236}">
+                <a16:creationId xmlns:a16="http://schemas.microsoft.com/office/drawing/2014/main" id="{A05998FA-2C49-5FA4-9915-1E1591F09DB7}"/>
+              </a:ext>
+            </a:extLst>
+          </p:cNvPr>
+          <p:cNvSpPr txBox="1"/>
+          <p:nvPr/>
+        </p:nvSpPr>
+        <p:spPr>
+          <a:xfrm>
+            <a:off x="1318561" y="3608432"/>
+            <a:ext cx="476412" cy="461665"/>
+          </a:xfrm>
+          <a:prstGeom prst="rect">
+            <a:avLst/>
+          </a:prstGeom>
+          <a:noFill/>
+        </p:spPr>
+        <p:txBody>
+          <a:bodyPr wrap="square" rtlCol="0">
+            <a:spAutoFit/>
+          </a:bodyPr>
+          <a:lstStyle/>
+          <a:p>
+            <a:r>
+              <a:rPr lang="el-GR" sz="2400" dirty="0"/>
+              <a:t>θ</a:t>
+            </a:r>
+            <a:r>
+              <a:rPr lang="en-US" sz="2400" baseline="-25000" dirty="0"/>
+              <a:t>1</a:t>
+            </a:r>
+          </a:p>
+        </p:txBody>
+      </p:sp>
+      <p:grpSp>
+        <p:nvGrpSpPr>
+          <p:cNvPr id="35" name="Group 34">
+            <a:extLst>
+              <a:ext uri="{FF2B5EF4-FFF2-40B4-BE49-F238E27FC236}">
+                <a16:creationId xmlns:a16="http://schemas.microsoft.com/office/drawing/2014/main" id="{25480107-13C2-9580-A022-3246C140F60E}"/>
+              </a:ext>
+            </a:extLst>
+          </p:cNvPr>
+          <p:cNvGrpSpPr/>
+          <p:nvPr/>
+        </p:nvGrpSpPr>
+        <p:grpSpPr>
+          <a:xfrm>
+            <a:off x="767562" y="4272065"/>
+            <a:ext cx="1206278" cy="1096778"/>
+            <a:chOff x="5245864" y="4129370"/>
+            <a:chExt cx="1206278" cy="1096778"/>
+          </a:xfrm>
+        </p:grpSpPr>
+        <p:cxnSp>
+          <p:nvCxnSpPr>
+            <p:cNvPr id="29" name="Straight Arrow Connector 28">
+              <a:extLst>
+                <a:ext uri="{FF2B5EF4-FFF2-40B4-BE49-F238E27FC236}">
+                  <a16:creationId xmlns:a16="http://schemas.microsoft.com/office/drawing/2014/main" id="{BFFADD88-8C83-697D-63BD-55380A3C0707}"/>
+                </a:ext>
+              </a:extLst>
+            </p:cNvPr>
+            <p:cNvCxnSpPr>
+              <a:cxnSpLocks/>
+            </p:cNvCxnSpPr>
+            <p:nvPr/>
+          </p:nvCxnSpPr>
+          <p:spPr>
+            <a:xfrm flipV="1">
+              <a:off x="5621043" y="4484703"/>
+              <a:ext cx="0" cy="526001"/>
+            </a:xfrm>
+            <a:prstGeom prst="straightConnector1">
+              <a:avLst/>
+            </a:prstGeom>
+            <a:ln w="38100">
+              <a:solidFill>
+                <a:schemeClr val="tx2">
+                  <a:lumMod val="50000"/>
+                  <a:lumOff val="50000"/>
+                </a:schemeClr>
+              </a:solidFill>
+              <a:tailEnd type="triangle"/>
+            </a:ln>
+          </p:spPr>
+          <p:style>
+            <a:lnRef idx="2">
+              <a:schemeClr val="dk1"/>
+            </a:lnRef>
+            <a:fillRef idx="0">
+              <a:schemeClr val="dk1"/>
+            </a:fillRef>
+            <a:effectRef idx="1">
+              <a:schemeClr val="dk1"/>
+            </a:effectRef>
+            <a:fontRef idx="minor">
+              <a:schemeClr val="tx1"/>
+            </a:fontRef>
+          </p:style>
+        </p:cxnSp>
+        <p:cxnSp>
+          <p:nvCxnSpPr>
+            <p:cNvPr id="30" name="Straight Arrow Connector 29">
+              <a:extLst>
+                <a:ext uri="{FF2B5EF4-FFF2-40B4-BE49-F238E27FC236}">
+                  <a16:creationId xmlns:a16="http://schemas.microsoft.com/office/drawing/2014/main" id="{4B3F79CD-047D-D329-21FC-50910FF10F20}"/>
+                </a:ext>
+              </a:extLst>
+            </p:cNvPr>
+            <p:cNvCxnSpPr>
+              <a:cxnSpLocks/>
+            </p:cNvCxnSpPr>
+            <p:nvPr/>
+          </p:nvCxnSpPr>
+          <p:spPr>
+            <a:xfrm>
+              <a:off x="5621043" y="5010704"/>
+              <a:ext cx="443885" cy="0"/>
+            </a:xfrm>
+            <a:prstGeom prst="straightConnector1">
+              <a:avLst/>
+            </a:prstGeom>
+            <a:ln w="38100">
+              <a:solidFill>
+                <a:schemeClr val="tx2">
+                  <a:lumMod val="50000"/>
+                  <a:lumOff val="50000"/>
+                </a:schemeClr>
+              </a:solidFill>
+              <a:tailEnd type="triangle"/>
+            </a:ln>
+          </p:spPr>
+          <p:style>
+            <a:lnRef idx="2">
+              <a:schemeClr val="dk1"/>
+            </a:lnRef>
+            <a:fillRef idx="0">
+              <a:schemeClr val="dk1"/>
+            </a:fillRef>
+            <a:effectRef idx="1">
+              <a:schemeClr val="dk1"/>
+            </a:effectRef>
+            <a:fontRef idx="minor">
+              <a:schemeClr val="tx1"/>
+            </a:fontRef>
+          </p:style>
+        </p:cxnSp>
+        <p:cxnSp>
+          <p:nvCxnSpPr>
+            <p:cNvPr id="31" name="Straight Arrow Connector 30">
+              <a:extLst>
+                <a:ext uri="{FF2B5EF4-FFF2-40B4-BE49-F238E27FC236}">
+                  <a16:creationId xmlns:a16="http://schemas.microsoft.com/office/drawing/2014/main" id="{B75EFA4A-3342-2B58-5494-8B0B29A7BEE4}"/>
+                </a:ext>
+              </a:extLst>
+            </p:cNvPr>
+            <p:cNvCxnSpPr>
+              <a:cxnSpLocks/>
+            </p:cNvCxnSpPr>
+            <p:nvPr/>
+          </p:nvCxnSpPr>
+          <p:spPr>
+            <a:xfrm flipV="1">
+              <a:off x="5621043" y="4587450"/>
+              <a:ext cx="381741" cy="423254"/>
+            </a:xfrm>
+            <a:prstGeom prst="straightConnector1">
+              <a:avLst/>
+            </a:prstGeom>
+            <a:ln w="38100">
+              <a:solidFill>
+                <a:schemeClr val="tx2">
+                  <a:lumMod val="50000"/>
+                  <a:lumOff val="50000"/>
+                </a:schemeClr>
+              </a:solidFill>
+              <a:tailEnd type="triangle"/>
+            </a:ln>
+          </p:spPr>
+          <p:style>
+            <a:lnRef idx="2">
+              <a:schemeClr val="dk1"/>
+            </a:lnRef>
+            <a:fillRef idx="0">
+              <a:schemeClr val="dk1"/>
+            </a:fillRef>
+            <a:effectRef idx="1">
+              <a:schemeClr val="dk1"/>
+            </a:effectRef>
+            <a:fontRef idx="minor">
+              <a:schemeClr val="tx1"/>
+            </a:fontRef>
+          </p:style>
+        </p:cxnSp>
+        <p:sp>
+          <p:nvSpPr>
+            <p:cNvPr id="32" name="TextBox 31">
+              <a:extLst>
+                <a:ext uri="{FF2B5EF4-FFF2-40B4-BE49-F238E27FC236}">
+                  <a16:creationId xmlns:a16="http://schemas.microsoft.com/office/drawing/2014/main" id="{0BA8F0E9-902C-3D9B-95A2-9EF1FE0AB34C}"/>
+                </a:ext>
+              </a:extLst>
+            </p:cNvPr>
+            <p:cNvSpPr txBox="1"/>
+            <p:nvPr/>
+          </p:nvSpPr>
+          <p:spPr>
+            <a:xfrm>
+              <a:off x="5245864" y="4129370"/>
+              <a:ext cx="409086" cy="400110"/>
+            </a:xfrm>
+            <a:prstGeom prst="rect">
+              <a:avLst/>
+            </a:prstGeom>
+            <a:noFill/>
+          </p:spPr>
+          <p:txBody>
+            <a:bodyPr wrap="none" rtlCol="0">
+              <a:spAutoFit/>
+            </a:bodyPr>
+            <a:lstStyle/>
+            <a:p>
+              <a:r>
+                <a:rPr lang="en-US" sz="2000" dirty="0"/>
+                <a:t>Z</a:t>
+              </a:r>
+              <a:r>
+                <a:rPr lang="en-US" sz="2000" baseline="-25000" dirty="0"/>
+                <a:t>0</a:t>
+              </a:r>
+            </a:p>
+          </p:txBody>
+        </p:sp>
+        <p:sp>
+          <p:nvSpPr>
+            <p:cNvPr id="33" name="TextBox 32">
+              <a:extLst>
+                <a:ext uri="{FF2B5EF4-FFF2-40B4-BE49-F238E27FC236}">
+                  <a16:creationId xmlns:a16="http://schemas.microsoft.com/office/drawing/2014/main" id="{E9AF3BB9-A052-B26A-A7CE-8D31C2ABE20D}"/>
+                </a:ext>
+              </a:extLst>
+            </p:cNvPr>
+            <p:cNvSpPr txBox="1"/>
+            <p:nvPr/>
+          </p:nvSpPr>
+          <p:spPr>
+            <a:xfrm>
+              <a:off x="6002784" y="4300037"/>
+              <a:ext cx="413896" cy="400110"/>
+            </a:xfrm>
+            <a:prstGeom prst="rect">
+              <a:avLst/>
+            </a:prstGeom>
+            <a:noFill/>
+          </p:spPr>
+          <p:txBody>
+            <a:bodyPr wrap="none" rtlCol="0">
+              <a:spAutoFit/>
+            </a:bodyPr>
+            <a:lstStyle/>
+            <a:p>
+              <a:r>
+                <a:rPr lang="en-US" sz="2000" dirty="0"/>
+                <a:t>Y</a:t>
+              </a:r>
+              <a:r>
+                <a:rPr lang="en-US" sz="2000" baseline="-25000" dirty="0"/>
+                <a:t>0</a:t>
+              </a:r>
+              <a:endParaRPr lang="en-US" sz="2000" dirty="0"/>
+            </a:p>
+          </p:txBody>
+        </p:sp>
+        <p:sp>
+          <p:nvSpPr>
+            <p:cNvPr id="34" name="TextBox 33">
+              <a:extLst>
+                <a:ext uri="{FF2B5EF4-FFF2-40B4-BE49-F238E27FC236}">
+                  <a16:creationId xmlns:a16="http://schemas.microsoft.com/office/drawing/2014/main" id="{37B07609-8547-2D58-2CE2-2B46141E301D}"/>
+                </a:ext>
+              </a:extLst>
+            </p:cNvPr>
+            <p:cNvSpPr txBox="1"/>
+            <p:nvPr/>
+          </p:nvSpPr>
+          <p:spPr>
+            <a:xfrm>
+              <a:off x="6035040" y="4826038"/>
+              <a:ext cx="417102" cy="400110"/>
+            </a:xfrm>
+            <a:prstGeom prst="rect">
+              <a:avLst/>
+            </a:prstGeom>
+            <a:noFill/>
+          </p:spPr>
+          <p:txBody>
+            <a:bodyPr wrap="none" rtlCol="0">
+              <a:spAutoFit/>
+            </a:bodyPr>
+            <a:lstStyle/>
+            <a:p>
+              <a:r>
+                <a:rPr lang="en-US" sz="2000" dirty="0"/>
+                <a:t>X</a:t>
+              </a:r>
+              <a:r>
+                <a:rPr lang="en-US" sz="2000" baseline="-25000" dirty="0"/>
+                <a:t>0</a:t>
+              </a:r>
+            </a:p>
+          </p:txBody>
+        </p:sp>
+      </p:grpSp>
+      <p:cxnSp>
+        <p:nvCxnSpPr>
+          <p:cNvPr id="36" name="Straight Connector 35">
+            <a:extLst>
+              <a:ext uri="{FF2B5EF4-FFF2-40B4-BE49-F238E27FC236}">
+                <a16:creationId xmlns:a16="http://schemas.microsoft.com/office/drawing/2014/main" id="{AEBE4BD7-F713-2CE1-211D-A3839B353631}"/>
+              </a:ext>
+            </a:extLst>
+          </p:cNvPr>
+          <p:cNvCxnSpPr>
+            <a:cxnSpLocks/>
+          </p:cNvCxnSpPr>
+          <p:nvPr/>
+        </p:nvCxnSpPr>
+        <p:spPr>
+          <a:xfrm>
+            <a:off x="1159016" y="4148861"/>
+            <a:ext cx="0" cy="1012791"/>
+          </a:xfrm>
+          <a:prstGeom prst="line">
+            <a:avLst/>
+          </a:prstGeom>
+        </p:spPr>
+        <p:style>
+          <a:lnRef idx="2">
+            <a:schemeClr val="dk1"/>
+          </a:lnRef>
+          <a:fillRef idx="0">
+            <a:schemeClr val="dk1"/>
+          </a:fillRef>
+          <a:effectRef idx="1">
+            <a:schemeClr val="dk1"/>
+          </a:effectRef>
+          <a:fontRef idx="minor">
+            <a:schemeClr val="tx1"/>
+          </a:fontRef>
+        </p:style>
+      </p:cxnSp>
+      <p:cxnSp>
+        <p:nvCxnSpPr>
+          <p:cNvPr id="47" name="Straight Connector 46">
+            <a:extLst>
+              <a:ext uri="{FF2B5EF4-FFF2-40B4-BE49-F238E27FC236}">
+                <a16:creationId xmlns:a16="http://schemas.microsoft.com/office/drawing/2014/main" id="{3E7BEDEE-DDBC-2A8D-4979-0D561B5BB64B}"/>
+              </a:ext>
+            </a:extLst>
+          </p:cNvPr>
+          <p:cNvCxnSpPr>
+            <a:cxnSpLocks/>
+          </p:cNvCxnSpPr>
+          <p:nvPr/>
+        </p:nvCxnSpPr>
+        <p:spPr>
+          <a:xfrm flipH="1">
+            <a:off x="1169372" y="2559387"/>
+            <a:ext cx="1720792" cy="0"/>
+          </a:xfrm>
+          <a:prstGeom prst="line">
+            <a:avLst/>
+          </a:prstGeom>
+        </p:spPr>
+        <p:style>
+          <a:lnRef idx="2">
+            <a:schemeClr val="dk1"/>
+          </a:lnRef>
+          <a:fillRef idx="0">
+            <a:schemeClr val="dk1"/>
+          </a:fillRef>
+          <a:effectRef idx="1">
+            <a:schemeClr val="dk1"/>
+          </a:effectRef>
+          <a:fontRef idx="minor">
+            <a:schemeClr val="tx1"/>
+          </a:fontRef>
+        </p:style>
+      </p:cxnSp>
+      <p:cxnSp>
+        <p:nvCxnSpPr>
+          <p:cNvPr id="49" name="Straight Connector 48">
+            <a:extLst>
+              <a:ext uri="{FF2B5EF4-FFF2-40B4-BE49-F238E27FC236}">
+                <a16:creationId xmlns:a16="http://schemas.microsoft.com/office/drawing/2014/main" id="{042D2F7B-DE91-3A54-503E-1C200AB0156A}"/>
+              </a:ext>
+            </a:extLst>
+          </p:cNvPr>
+          <p:cNvCxnSpPr>
+            <a:cxnSpLocks/>
+            <a:stCxn id="66" idx="0"/>
+          </p:cNvCxnSpPr>
+          <p:nvPr/>
+        </p:nvCxnSpPr>
+        <p:spPr>
+          <a:xfrm flipH="1">
+            <a:off x="3089906" y="2559386"/>
+            <a:ext cx="1313644" cy="1"/>
+          </a:xfrm>
+          <a:prstGeom prst="line">
+            <a:avLst/>
+          </a:prstGeom>
+        </p:spPr>
+        <p:style>
+          <a:lnRef idx="2">
+            <a:schemeClr val="dk1"/>
+          </a:lnRef>
+          <a:fillRef idx="0">
+            <a:schemeClr val="dk1"/>
+          </a:fillRef>
+          <a:effectRef idx="1">
+            <a:schemeClr val="dk1"/>
+          </a:effectRef>
+          <a:fontRef idx="minor">
+            <a:schemeClr val="tx1"/>
+          </a:fontRef>
+        </p:style>
+      </p:cxnSp>
+      <p:sp>
+        <p:nvSpPr>
+          <p:cNvPr id="46" name="Oval 45">
+            <a:extLst>
+              <a:ext uri="{FF2B5EF4-FFF2-40B4-BE49-F238E27FC236}">
+                <a16:creationId xmlns:a16="http://schemas.microsoft.com/office/drawing/2014/main" id="{F852204D-1992-1641-C66A-C1FB6E34D6E9}"/>
+              </a:ext>
+            </a:extLst>
+          </p:cNvPr>
+          <p:cNvSpPr/>
+          <p:nvPr/>
+        </p:nvSpPr>
+        <p:spPr>
+          <a:xfrm>
+            <a:off x="1059145" y="2479943"/>
+            <a:ext cx="199742" cy="158888"/>
+          </a:xfrm>
+          <a:prstGeom prst="ellipse">
+            <a:avLst/>
+          </a:prstGeom>
+        </p:spPr>
+        <p:style>
+          <a:lnRef idx="2">
+            <a:schemeClr val="accent1">
+              <a:shade val="15000"/>
+            </a:schemeClr>
+          </a:lnRef>
+          <a:fillRef idx="1">
+            <a:schemeClr val="accent1"/>
+          </a:fillRef>
+          <a:effectRef idx="0">
+            <a:schemeClr val="accent1"/>
+          </a:effectRef>
+          <a:fontRef idx="minor">
+            <a:schemeClr val="lt1"/>
+          </a:fontRef>
+        </p:style>
+        <p:txBody>
+          <a:bodyPr rtlCol="0" anchor="ctr"/>
+          <a:lstStyle/>
+          <a:p>
+            <a:pPr algn="ctr"/>
+            <a:endParaRPr lang="en-US"/>
+          </a:p>
+        </p:txBody>
+      </p:sp>
+      <p:sp>
+        <p:nvSpPr>
+          <p:cNvPr id="50" name="Oval 49">
+            <a:extLst>
+              <a:ext uri="{FF2B5EF4-FFF2-40B4-BE49-F238E27FC236}">
+                <a16:creationId xmlns:a16="http://schemas.microsoft.com/office/drawing/2014/main" id="{F49A0742-42C7-7AB4-FB4E-A488BDCD042A}"/>
+              </a:ext>
+            </a:extLst>
+          </p:cNvPr>
+          <p:cNvSpPr/>
+          <p:nvPr/>
+        </p:nvSpPr>
+        <p:spPr>
+          <a:xfrm>
+            <a:off x="2890164" y="2489932"/>
+            <a:ext cx="199742" cy="158888"/>
+          </a:xfrm>
+          <a:prstGeom prst="ellipse">
+            <a:avLst/>
+          </a:prstGeom>
+        </p:spPr>
+        <p:style>
+          <a:lnRef idx="2">
+            <a:schemeClr val="accent1">
+              <a:shade val="15000"/>
+            </a:schemeClr>
+          </a:lnRef>
+          <a:fillRef idx="1">
+            <a:schemeClr val="accent1"/>
+          </a:fillRef>
+          <a:effectRef idx="0">
+            <a:schemeClr val="accent1"/>
+          </a:effectRef>
+          <a:fontRef idx="minor">
+            <a:schemeClr val="lt1"/>
+          </a:fontRef>
+        </p:style>
+        <p:txBody>
+          <a:bodyPr rtlCol="0" anchor="ctr"/>
+          <a:lstStyle/>
+          <a:p>
+            <a:pPr algn="ctr"/>
+            <a:endParaRPr lang="en-US"/>
+          </a:p>
+        </p:txBody>
+      </p:sp>
+      <p:grpSp>
+        <p:nvGrpSpPr>
+          <p:cNvPr id="57" name="Group 56">
+            <a:extLst>
+              <a:ext uri="{FF2B5EF4-FFF2-40B4-BE49-F238E27FC236}">
+                <a16:creationId xmlns:a16="http://schemas.microsoft.com/office/drawing/2014/main" id="{B5AF8952-6A8F-BA9F-9090-978EC904B6E3}"/>
+              </a:ext>
+            </a:extLst>
+          </p:cNvPr>
+          <p:cNvGrpSpPr/>
+          <p:nvPr/>
+        </p:nvGrpSpPr>
+        <p:grpSpPr>
+          <a:xfrm>
+            <a:off x="554038" y="1696562"/>
+            <a:ext cx="1204458" cy="1406764"/>
+            <a:chOff x="8660025" y="3594876"/>
+            <a:chExt cx="1204458" cy="1406764"/>
+          </a:xfrm>
+        </p:grpSpPr>
+        <p:cxnSp>
+          <p:nvCxnSpPr>
+            <p:cNvPr id="51" name="Straight Arrow Connector 50">
+              <a:extLst>
+                <a:ext uri="{FF2B5EF4-FFF2-40B4-BE49-F238E27FC236}">
+                  <a16:creationId xmlns:a16="http://schemas.microsoft.com/office/drawing/2014/main" id="{C49066DA-FBBE-0722-F9F6-6BE497458D4C}"/>
+                </a:ext>
+              </a:extLst>
+            </p:cNvPr>
+            <p:cNvCxnSpPr>
+              <a:cxnSpLocks/>
+            </p:cNvCxnSpPr>
+            <p:nvPr/>
+          </p:nvCxnSpPr>
+          <p:spPr>
+            <a:xfrm flipV="1">
+              <a:off x="9238623" y="3950209"/>
+              <a:ext cx="0" cy="526001"/>
+            </a:xfrm>
+            <a:prstGeom prst="straightConnector1">
+              <a:avLst/>
+            </a:prstGeom>
+            <a:ln w="38100">
+              <a:solidFill>
+                <a:schemeClr val="tx2">
+                  <a:lumMod val="50000"/>
+                  <a:lumOff val="50000"/>
+                </a:schemeClr>
+              </a:solidFill>
+              <a:tailEnd type="triangle"/>
+            </a:ln>
+          </p:spPr>
+          <p:style>
+            <a:lnRef idx="2">
+              <a:schemeClr val="dk1"/>
+            </a:lnRef>
+            <a:fillRef idx="0">
+              <a:schemeClr val="dk1"/>
+            </a:fillRef>
+            <a:effectRef idx="1">
+              <a:schemeClr val="dk1"/>
+            </a:effectRef>
+            <a:fontRef idx="minor">
+              <a:schemeClr val="tx1"/>
+            </a:fontRef>
+          </p:style>
+        </p:cxnSp>
+        <p:cxnSp>
+          <p:nvCxnSpPr>
+            <p:cNvPr id="52" name="Straight Arrow Connector 51">
+              <a:extLst>
+                <a:ext uri="{FF2B5EF4-FFF2-40B4-BE49-F238E27FC236}">
+                  <a16:creationId xmlns:a16="http://schemas.microsoft.com/office/drawing/2014/main" id="{CA4EC0AF-E638-D705-D51B-EAB22D453F00}"/>
+                </a:ext>
+              </a:extLst>
+            </p:cNvPr>
+            <p:cNvCxnSpPr>
+              <a:cxnSpLocks/>
+            </p:cNvCxnSpPr>
+            <p:nvPr/>
+          </p:nvCxnSpPr>
+          <p:spPr>
+            <a:xfrm>
+              <a:off x="9238623" y="4476210"/>
+              <a:ext cx="443885" cy="0"/>
+            </a:xfrm>
+            <a:prstGeom prst="straightConnector1">
+              <a:avLst/>
+            </a:prstGeom>
+            <a:ln w="38100">
+              <a:solidFill>
+                <a:schemeClr val="tx2">
+                  <a:lumMod val="50000"/>
+                  <a:lumOff val="50000"/>
+                </a:schemeClr>
+              </a:solidFill>
+              <a:tailEnd type="triangle"/>
+            </a:ln>
+          </p:spPr>
+          <p:style>
+            <a:lnRef idx="2">
+              <a:schemeClr val="dk1"/>
+            </a:lnRef>
+            <a:fillRef idx="0">
+              <a:schemeClr val="dk1"/>
+            </a:fillRef>
+            <a:effectRef idx="1">
+              <a:schemeClr val="dk1"/>
+            </a:effectRef>
+            <a:fontRef idx="minor">
+              <a:schemeClr val="tx1"/>
+            </a:fontRef>
+          </p:style>
+        </p:cxnSp>
+        <p:cxnSp>
+          <p:nvCxnSpPr>
+            <p:cNvPr id="53" name="Straight Arrow Connector 52">
+              <a:extLst>
+                <a:ext uri="{FF2B5EF4-FFF2-40B4-BE49-F238E27FC236}">
+                  <a16:creationId xmlns:a16="http://schemas.microsoft.com/office/drawing/2014/main" id="{030CEA34-1FBA-4017-113F-1FB3C860D7B1}"/>
+                </a:ext>
+              </a:extLst>
+            </p:cNvPr>
+            <p:cNvCxnSpPr>
+              <a:cxnSpLocks/>
+            </p:cNvCxnSpPr>
+            <p:nvPr/>
+          </p:nvCxnSpPr>
+          <p:spPr>
+            <a:xfrm flipH="1">
+              <a:off x="8962997" y="4476210"/>
+              <a:ext cx="275626" cy="262587"/>
+            </a:xfrm>
+            <a:prstGeom prst="straightConnector1">
+              <a:avLst/>
+            </a:prstGeom>
+            <a:ln w="38100">
+              <a:solidFill>
+                <a:schemeClr val="tx2">
+                  <a:lumMod val="50000"/>
+                  <a:lumOff val="50000"/>
+                </a:schemeClr>
+              </a:solidFill>
+              <a:tailEnd type="triangle"/>
+            </a:ln>
+          </p:spPr>
+          <p:style>
+            <a:lnRef idx="2">
+              <a:schemeClr val="dk1"/>
+            </a:lnRef>
+            <a:fillRef idx="0">
+              <a:schemeClr val="dk1"/>
+            </a:fillRef>
+            <a:effectRef idx="1">
+              <a:schemeClr val="dk1"/>
+            </a:effectRef>
+            <a:fontRef idx="minor">
+              <a:schemeClr val="tx1"/>
+            </a:fontRef>
+          </p:style>
+        </p:cxnSp>
+        <p:sp>
+          <p:nvSpPr>
+            <p:cNvPr id="54" name="TextBox 53">
+              <a:extLst>
+                <a:ext uri="{FF2B5EF4-FFF2-40B4-BE49-F238E27FC236}">
+                  <a16:creationId xmlns:a16="http://schemas.microsoft.com/office/drawing/2014/main" id="{BEABAF22-C6D2-B54A-7B15-6438BB325C80}"/>
+                </a:ext>
+              </a:extLst>
+            </p:cNvPr>
+            <p:cNvSpPr txBox="1"/>
+            <p:nvPr/>
+          </p:nvSpPr>
+          <p:spPr>
+            <a:xfrm>
+              <a:off x="9069111" y="3594876"/>
+              <a:ext cx="413896" cy="400110"/>
+            </a:xfrm>
+            <a:prstGeom prst="rect">
+              <a:avLst/>
+            </a:prstGeom>
+            <a:noFill/>
+          </p:spPr>
+          <p:txBody>
+            <a:bodyPr wrap="none" rtlCol="0">
+              <a:spAutoFit/>
+            </a:bodyPr>
+            <a:lstStyle/>
+            <a:p>
+              <a:r>
+                <a:rPr lang="en-US" sz="2000" dirty="0"/>
+                <a:t>Y</a:t>
+              </a:r>
+              <a:r>
+                <a:rPr lang="en-US" sz="2000" baseline="-25000" dirty="0"/>
+                <a:t>1</a:t>
+              </a:r>
+            </a:p>
+          </p:txBody>
+        </p:sp>
+        <p:sp>
+          <p:nvSpPr>
+            <p:cNvPr id="55" name="TextBox 54">
+              <a:extLst>
+                <a:ext uri="{FF2B5EF4-FFF2-40B4-BE49-F238E27FC236}">
+                  <a16:creationId xmlns:a16="http://schemas.microsoft.com/office/drawing/2014/main" id="{CD2EC7B4-8EAB-483F-2600-C680E3100E23}"/>
+                </a:ext>
+              </a:extLst>
+            </p:cNvPr>
+            <p:cNvSpPr txBox="1"/>
+            <p:nvPr/>
+          </p:nvSpPr>
+          <p:spPr>
+            <a:xfrm>
+              <a:off x="8660025" y="4601530"/>
+              <a:ext cx="409086" cy="400110"/>
+            </a:xfrm>
+            <a:prstGeom prst="rect">
+              <a:avLst/>
+            </a:prstGeom>
+            <a:noFill/>
+          </p:spPr>
+          <p:txBody>
+            <a:bodyPr wrap="none" rtlCol="0">
+              <a:spAutoFit/>
+            </a:bodyPr>
+            <a:lstStyle/>
+            <a:p>
+              <a:r>
+                <a:rPr lang="en-US" sz="2000" dirty="0"/>
+                <a:t>Z</a:t>
+              </a:r>
+              <a:r>
+                <a:rPr lang="en-US" sz="2000" baseline="-25000" dirty="0"/>
+                <a:t>1</a:t>
+              </a:r>
+              <a:endParaRPr lang="en-US" sz="2000" dirty="0"/>
+            </a:p>
+          </p:txBody>
+        </p:sp>
+        <p:sp>
+          <p:nvSpPr>
+            <p:cNvPr id="56" name="TextBox 55">
+              <a:extLst>
+                <a:ext uri="{FF2B5EF4-FFF2-40B4-BE49-F238E27FC236}">
+                  <a16:creationId xmlns:a16="http://schemas.microsoft.com/office/drawing/2014/main" id="{84A6FAC3-46BD-7685-D860-31D2D33034D9}"/>
+                </a:ext>
+              </a:extLst>
+            </p:cNvPr>
+            <p:cNvSpPr txBox="1"/>
+            <p:nvPr/>
+          </p:nvSpPr>
+          <p:spPr>
+            <a:xfrm>
+              <a:off x="9447381" y="4067580"/>
+              <a:ext cx="417102" cy="400110"/>
+            </a:xfrm>
+            <a:prstGeom prst="rect">
+              <a:avLst/>
+            </a:prstGeom>
+            <a:noFill/>
+          </p:spPr>
+          <p:txBody>
+            <a:bodyPr wrap="none" rtlCol="0">
+              <a:spAutoFit/>
+            </a:bodyPr>
+            <a:lstStyle/>
+            <a:p>
+              <a:r>
+                <a:rPr lang="en-US" sz="2000" dirty="0"/>
+                <a:t>X</a:t>
+              </a:r>
+              <a:r>
+                <a:rPr lang="en-US" sz="2000" baseline="-25000" dirty="0"/>
+                <a:t>1</a:t>
+              </a:r>
+            </a:p>
+          </p:txBody>
+        </p:sp>
+      </p:grpSp>
+      <p:grpSp>
+        <p:nvGrpSpPr>
+          <p:cNvPr id="58" name="Group 57">
+            <a:extLst>
+              <a:ext uri="{FF2B5EF4-FFF2-40B4-BE49-F238E27FC236}">
+                <a16:creationId xmlns:a16="http://schemas.microsoft.com/office/drawing/2014/main" id="{4C2788E3-1232-8A58-1E18-9537AB54C36A}"/>
+              </a:ext>
+            </a:extLst>
+          </p:cNvPr>
+          <p:cNvGrpSpPr/>
+          <p:nvPr/>
+        </p:nvGrpSpPr>
+        <p:grpSpPr>
+          <a:xfrm>
+            <a:off x="2365991" y="1681493"/>
+            <a:ext cx="1204458" cy="1406764"/>
+            <a:chOff x="8660025" y="3594876"/>
+            <a:chExt cx="1204458" cy="1406764"/>
+          </a:xfrm>
+        </p:grpSpPr>
+        <p:cxnSp>
+          <p:nvCxnSpPr>
+            <p:cNvPr id="59" name="Straight Arrow Connector 58">
+              <a:extLst>
+                <a:ext uri="{FF2B5EF4-FFF2-40B4-BE49-F238E27FC236}">
+                  <a16:creationId xmlns:a16="http://schemas.microsoft.com/office/drawing/2014/main" id="{D272DE90-555F-5169-0A20-594F79565F4E}"/>
+                </a:ext>
+              </a:extLst>
+            </p:cNvPr>
+            <p:cNvCxnSpPr>
+              <a:cxnSpLocks/>
+            </p:cNvCxnSpPr>
+            <p:nvPr/>
+          </p:nvCxnSpPr>
+          <p:spPr>
+            <a:xfrm flipV="1">
+              <a:off x="9238623" y="3950209"/>
+              <a:ext cx="0" cy="526001"/>
+            </a:xfrm>
+            <a:prstGeom prst="straightConnector1">
+              <a:avLst/>
+            </a:prstGeom>
+            <a:ln w="38100">
+              <a:solidFill>
+                <a:schemeClr val="tx2">
+                  <a:lumMod val="50000"/>
+                  <a:lumOff val="50000"/>
+                </a:schemeClr>
+              </a:solidFill>
+              <a:tailEnd type="triangle"/>
+            </a:ln>
+          </p:spPr>
+          <p:style>
+            <a:lnRef idx="2">
+              <a:schemeClr val="dk1"/>
+            </a:lnRef>
+            <a:fillRef idx="0">
+              <a:schemeClr val="dk1"/>
+            </a:fillRef>
+            <a:effectRef idx="1">
+              <a:schemeClr val="dk1"/>
+            </a:effectRef>
+            <a:fontRef idx="minor">
+              <a:schemeClr val="tx1"/>
+            </a:fontRef>
+          </p:style>
+        </p:cxnSp>
+        <p:cxnSp>
+          <p:nvCxnSpPr>
+            <p:cNvPr id="60" name="Straight Arrow Connector 59">
+              <a:extLst>
+                <a:ext uri="{FF2B5EF4-FFF2-40B4-BE49-F238E27FC236}">
+                  <a16:creationId xmlns:a16="http://schemas.microsoft.com/office/drawing/2014/main" id="{9C5A2FE4-CC7F-AD3A-3D0C-BC22C004A51D}"/>
+                </a:ext>
+              </a:extLst>
+            </p:cNvPr>
+            <p:cNvCxnSpPr>
+              <a:cxnSpLocks/>
+            </p:cNvCxnSpPr>
+            <p:nvPr/>
+          </p:nvCxnSpPr>
+          <p:spPr>
+            <a:xfrm>
+              <a:off x="9238623" y="4476210"/>
+              <a:ext cx="443885" cy="0"/>
+            </a:xfrm>
+            <a:prstGeom prst="straightConnector1">
+              <a:avLst/>
+            </a:prstGeom>
+            <a:ln w="38100">
+              <a:solidFill>
+                <a:schemeClr val="tx2">
+                  <a:lumMod val="50000"/>
+                  <a:lumOff val="50000"/>
+                </a:schemeClr>
+              </a:solidFill>
+              <a:tailEnd type="triangle"/>
+            </a:ln>
+          </p:spPr>
+          <p:style>
+            <a:lnRef idx="2">
+              <a:schemeClr val="dk1"/>
+            </a:lnRef>
+            <a:fillRef idx="0">
+              <a:schemeClr val="dk1"/>
+            </a:fillRef>
+            <a:effectRef idx="1">
+              <a:schemeClr val="dk1"/>
+            </a:effectRef>
+            <a:fontRef idx="minor">
+              <a:schemeClr val="tx1"/>
+            </a:fontRef>
+          </p:style>
+        </p:cxnSp>
+        <p:cxnSp>
+          <p:nvCxnSpPr>
+            <p:cNvPr id="61" name="Straight Arrow Connector 60">
+              <a:extLst>
+                <a:ext uri="{FF2B5EF4-FFF2-40B4-BE49-F238E27FC236}">
+                  <a16:creationId xmlns:a16="http://schemas.microsoft.com/office/drawing/2014/main" id="{A80A486D-D071-E57E-E9B3-80B7DEEF36BA}"/>
+                </a:ext>
+              </a:extLst>
+            </p:cNvPr>
+            <p:cNvCxnSpPr>
+              <a:cxnSpLocks/>
+            </p:cNvCxnSpPr>
+            <p:nvPr/>
+          </p:nvCxnSpPr>
+          <p:spPr>
+            <a:xfrm flipH="1">
+              <a:off x="8962997" y="4476210"/>
+              <a:ext cx="275626" cy="262587"/>
+            </a:xfrm>
+            <a:prstGeom prst="straightConnector1">
+              <a:avLst/>
+            </a:prstGeom>
+            <a:ln w="38100">
+              <a:solidFill>
+                <a:schemeClr val="tx2">
+                  <a:lumMod val="50000"/>
+                  <a:lumOff val="50000"/>
+                </a:schemeClr>
+              </a:solidFill>
+              <a:tailEnd type="triangle"/>
+            </a:ln>
+          </p:spPr>
+          <p:style>
+            <a:lnRef idx="2">
+              <a:schemeClr val="dk1"/>
+            </a:lnRef>
+            <a:fillRef idx="0">
+              <a:schemeClr val="dk1"/>
+            </a:fillRef>
+            <a:effectRef idx="1">
+              <a:schemeClr val="dk1"/>
+            </a:effectRef>
+            <a:fontRef idx="minor">
+              <a:schemeClr val="tx1"/>
+            </a:fontRef>
+          </p:style>
+        </p:cxnSp>
+        <p:sp>
+          <p:nvSpPr>
+            <p:cNvPr id="62" name="TextBox 61">
+              <a:extLst>
+                <a:ext uri="{FF2B5EF4-FFF2-40B4-BE49-F238E27FC236}">
+                  <a16:creationId xmlns:a16="http://schemas.microsoft.com/office/drawing/2014/main" id="{62ED6053-4E5D-0280-692D-0B7D2414B9F0}"/>
+                </a:ext>
+              </a:extLst>
+            </p:cNvPr>
+            <p:cNvSpPr txBox="1"/>
+            <p:nvPr/>
+          </p:nvSpPr>
+          <p:spPr>
+            <a:xfrm>
+              <a:off x="9069111" y="3594876"/>
+              <a:ext cx="413896" cy="400110"/>
+            </a:xfrm>
+            <a:prstGeom prst="rect">
+              <a:avLst/>
+            </a:prstGeom>
+            <a:noFill/>
+          </p:spPr>
+          <p:txBody>
+            <a:bodyPr wrap="none" rtlCol="0">
+              <a:spAutoFit/>
+            </a:bodyPr>
+            <a:lstStyle/>
+            <a:p>
+              <a:r>
+                <a:rPr lang="en-US" sz="2000" dirty="0"/>
+                <a:t>Y</a:t>
+              </a:r>
+              <a:r>
+                <a:rPr lang="en-US" sz="2000" baseline="-25000" dirty="0"/>
+                <a:t>2</a:t>
+              </a:r>
+            </a:p>
+          </p:txBody>
+        </p:sp>
+        <p:sp>
+          <p:nvSpPr>
+            <p:cNvPr id="63" name="TextBox 62">
+              <a:extLst>
+                <a:ext uri="{FF2B5EF4-FFF2-40B4-BE49-F238E27FC236}">
+                  <a16:creationId xmlns:a16="http://schemas.microsoft.com/office/drawing/2014/main" id="{F8991860-1279-FCF6-4BD2-3083821F1DFD}"/>
+                </a:ext>
+              </a:extLst>
+            </p:cNvPr>
+            <p:cNvSpPr txBox="1"/>
+            <p:nvPr/>
+          </p:nvSpPr>
+          <p:spPr>
+            <a:xfrm>
+              <a:off x="8660025" y="4601530"/>
+              <a:ext cx="409086" cy="400110"/>
+            </a:xfrm>
+            <a:prstGeom prst="rect">
+              <a:avLst/>
+            </a:prstGeom>
+            <a:noFill/>
+          </p:spPr>
+          <p:txBody>
+            <a:bodyPr wrap="none" rtlCol="0">
+              <a:spAutoFit/>
+            </a:bodyPr>
+            <a:lstStyle/>
+            <a:p>
+              <a:r>
+                <a:rPr lang="en-US" sz="2000" dirty="0"/>
+                <a:t>Z</a:t>
+              </a:r>
+              <a:r>
+                <a:rPr lang="en-US" sz="2000" baseline="-25000" dirty="0"/>
+                <a:t>2</a:t>
+              </a:r>
+              <a:endParaRPr lang="en-US" sz="2000" dirty="0"/>
+            </a:p>
+          </p:txBody>
+        </p:sp>
+        <p:sp>
+          <p:nvSpPr>
+            <p:cNvPr id="64" name="TextBox 63">
+              <a:extLst>
+                <a:ext uri="{FF2B5EF4-FFF2-40B4-BE49-F238E27FC236}">
+                  <a16:creationId xmlns:a16="http://schemas.microsoft.com/office/drawing/2014/main" id="{87E171B8-FF4B-853C-0DED-0E2ACB71ECAD}"/>
+                </a:ext>
+              </a:extLst>
+            </p:cNvPr>
+            <p:cNvSpPr txBox="1"/>
+            <p:nvPr/>
+          </p:nvSpPr>
+          <p:spPr>
+            <a:xfrm>
+              <a:off x="9447381" y="4067580"/>
+              <a:ext cx="417102" cy="400110"/>
+            </a:xfrm>
+            <a:prstGeom prst="rect">
+              <a:avLst/>
+            </a:prstGeom>
+            <a:noFill/>
+          </p:spPr>
+          <p:txBody>
+            <a:bodyPr wrap="none" rtlCol="0">
+              <a:spAutoFit/>
+            </a:bodyPr>
+            <a:lstStyle/>
+            <a:p>
+              <a:r>
+                <a:rPr lang="en-US" sz="2000" dirty="0"/>
+                <a:t>X</a:t>
+              </a:r>
+              <a:r>
+                <a:rPr lang="en-US" sz="2000" baseline="-25000" dirty="0"/>
+                <a:t>2</a:t>
+              </a:r>
+            </a:p>
+          </p:txBody>
+        </p:sp>
+      </p:grpSp>
+      <p:grpSp>
+        <p:nvGrpSpPr>
+          <p:cNvPr id="65" name="Group 64">
+            <a:extLst>
+              <a:ext uri="{FF2B5EF4-FFF2-40B4-BE49-F238E27FC236}">
+                <a16:creationId xmlns:a16="http://schemas.microsoft.com/office/drawing/2014/main" id="{E63713F7-3F2B-AB58-1796-E7B988C783C2}"/>
+              </a:ext>
+            </a:extLst>
+          </p:cNvPr>
+          <p:cNvGrpSpPr/>
+          <p:nvPr/>
+        </p:nvGrpSpPr>
+        <p:grpSpPr>
+          <a:xfrm rot="16200000">
+            <a:off x="4515261" y="2323387"/>
+            <a:ext cx="248575" cy="471998"/>
+            <a:chOff x="2246050" y="1305017"/>
+            <a:chExt cx="204187" cy="471998"/>
+          </a:xfrm>
+        </p:grpSpPr>
+        <p:sp>
+          <p:nvSpPr>
+            <p:cNvPr id="66" name="Isosceles Triangle 65">
+              <a:extLst>
+                <a:ext uri="{FF2B5EF4-FFF2-40B4-BE49-F238E27FC236}">
+                  <a16:creationId xmlns:a16="http://schemas.microsoft.com/office/drawing/2014/main" id="{6BBC3EBC-DF97-BE83-752F-69D6DE9D879E}"/>
+                </a:ext>
+              </a:extLst>
+            </p:cNvPr>
+            <p:cNvSpPr/>
+            <p:nvPr/>
+          </p:nvSpPr>
+          <p:spPr>
+            <a:xfrm>
+              <a:off x="2246050" y="1305017"/>
+              <a:ext cx="204187" cy="213065"/>
+            </a:xfrm>
+            <a:prstGeom prst="triangle">
+              <a:avLst/>
+            </a:prstGeom>
+          </p:spPr>
+          <p:style>
+            <a:lnRef idx="2">
+              <a:schemeClr val="dk1">
+                <a:shade val="15000"/>
+              </a:schemeClr>
+            </a:lnRef>
+            <a:fillRef idx="1">
+              <a:schemeClr val="dk1"/>
+            </a:fillRef>
+            <a:effectRef idx="0">
+              <a:schemeClr val="dk1"/>
+            </a:effectRef>
+            <a:fontRef idx="minor">
+              <a:schemeClr val="lt1"/>
+            </a:fontRef>
+          </p:style>
+          <p:txBody>
+            <a:bodyPr rtlCol="0" anchor="ctr"/>
+            <a:lstStyle/>
+            <a:p>
+              <a:pPr algn="ctr"/>
+              <a:endParaRPr lang="en-US"/>
+            </a:p>
+          </p:txBody>
+        </p:sp>
+        <p:sp>
+          <p:nvSpPr>
+            <p:cNvPr id="67" name="Isosceles Triangle 66">
+              <a:extLst>
+                <a:ext uri="{FF2B5EF4-FFF2-40B4-BE49-F238E27FC236}">
+                  <a16:creationId xmlns:a16="http://schemas.microsoft.com/office/drawing/2014/main" id="{D1F8DC32-7EBA-02F0-E2D6-A24DD317F9C8}"/>
+                </a:ext>
+              </a:extLst>
+            </p:cNvPr>
+            <p:cNvSpPr/>
+            <p:nvPr/>
+          </p:nvSpPr>
+          <p:spPr>
+            <a:xfrm rot="10800000">
+              <a:off x="2246050" y="1563950"/>
+              <a:ext cx="204187" cy="213065"/>
+            </a:xfrm>
+            <a:prstGeom prst="triangle">
+              <a:avLst/>
+            </a:prstGeom>
+          </p:spPr>
+          <p:style>
+            <a:lnRef idx="2">
+              <a:schemeClr val="dk1">
+                <a:shade val="15000"/>
+              </a:schemeClr>
+            </a:lnRef>
+            <a:fillRef idx="1">
+              <a:schemeClr val="dk1"/>
+            </a:fillRef>
+            <a:effectRef idx="0">
+              <a:schemeClr val="dk1"/>
+            </a:effectRef>
+            <a:fontRef idx="minor">
+              <a:schemeClr val="lt1"/>
+            </a:fontRef>
+          </p:style>
+          <p:txBody>
+            <a:bodyPr rtlCol="0" anchor="ctr"/>
+            <a:lstStyle/>
+            <a:p>
+              <a:pPr algn="ctr"/>
+              <a:endParaRPr lang="en-US"/>
+            </a:p>
+          </p:txBody>
+        </p:sp>
+      </p:grpSp>
+      <p:sp>
+        <p:nvSpPr>
+          <p:cNvPr id="69" name="TextBox 68">
+            <a:extLst>
+              <a:ext uri="{FF2B5EF4-FFF2-40B4-BE49-F238E27FC236}">
+                <a16:creationId xmlns:a16="http://schemas.microsoft.com/office/drawing/2014/main" id="{B233B7C4-CD1D-8ADA-32C3-4231AFFA9D10}"/>
+              </a:ext>
+            </a:extLst>
+          </p:cNvPr>
+          <p:cNvSpPr txBox="1"/>
+          <p:nvPr/>
+        </p:nvSpPr>
+        <p:spPr>
+          <a:xfrm>
+            <a:off x="582733" y="2084062"/>
+            <a:ext cx="476412" cy="461665"/>
+          </a:xfrm>
+          <a:prstGeom prst="rect">
+            <a:avLst/>
+          </a:prstGeom>
+          <a:noFill/>
+        </p:spPr>
+        <p:txBody>
+          <a:bodyPr wrap="square" rtlCol="0">
+            <a:spAutoFit/>
+          </a:bodyPr>
+          <a:lstStyle/>
+          <a:p>
+            <a:r>
+              <a:rPr lang="el-GR" sz="2400" dirty="0"/>
+              <a:t>θ</a:t>
+            </a:r>
+            <a:r>
+              <a:rPr lang="en-US" sz="2400" baseline="-25000" dirty="0"/>
+              <a:t>2</a:t>
+            </a:r>
+          </a:p>
+        </p:txBody>
+      </p:sp>
+      <p:sp>
+        <p:nvSpPr>
+          <p:cNvPr id="70" name="TextBox 69">
+            <a:extLst>
+              <a:ext uri="{FF2B5EF4-FFF2-40B4-BE49-F238E27FC236}">
+                <a16:creationId xmlns:a16="http://schemas.microsoft.com/office/drawing/2014/main" id="{DC6EBF60-D8F0-751D-14AA-9492A5CD8546}"/>
+              </a:ext>
+            </a:extLst>
+          </p:cNvPr>
+          <p:cNvSpPr txBox="1"/>
+          <p:nvPr/>
+        </p:nvSpPr>
+        <p:spPr>
+          <a:xfrm>
+            <a:off x="2427106" y="2006588"/>
+            <a:ext cx="476412" cy="461665"/>
+          </a:xfrm>
+          <a:prstGeom prst="rect">
+            <a:avLst/>
+          </a:prstGeom>
+          <a:noFill/>
+        </p:spPr>
+        <p:txBody>
+          <a:bodyPr wrap="square" rtlCol="0">
+            <a:spAutoFit/>
+          </a:bodyPr>
+          <a:lstStyle/>
+          <a:p>
+            <a:r>
+              <a:rPr lang="el-GR" sz="2400" dirty="0"/>
+              <a:t>θ</a:t>
+            </a:r>
+            <a:r>
+              <a:rPr lang="en-US" sz="2400" baseline="-25000" dirty="0"/>
+              <a:t>3</a:t>
+            </a:r>
+          </a:p>
+        </p:txBody>
+      </p:sp>
+      <p:cxnSp>
+        <p:nvCxnSpPr>
+          <p:cNvPr id="80" name="Straight Arrow Connector 79">
+            <a:extLst>
+              <a:ext uri="{FF2B5EF4-FFF2-40B4-BE49-F238E27FC236}">
+                <a16:creationId xmlns:a16="http://schemas.microsoft.com/office/drawing/2014/main" id="{24765B7B-682C-3251-F353-FC93C0B90DD8}"/>
+              </a:ext>
+            </a:extLst>
+          </p:cNvPr>
+          <p:cNvCxnSpPr>
+            <a:cxnSpLocks/>
+          </p:cNvCxnSpPr>
+          <p:nvPr/>
+        </p:nvCxnSpPr>
+        <p:spPr>
+          <a:xfrm>
+            <a:off x="155841" y="2543339"/>
+            <a:ext cx="0" cy="2625449"/>
+          </a:xfrm>
+          <a:prstGeom prst="straightConnector1">
+            <a:avLst/>
+          </a:prstGeom>
+          <a:ln>
+            <a:headEnd type="triangle"/>
+            <a:tailEnd type="triangle"/>
+          </a:ln>
+        </p:spPr>
+        <p:style>
+          <a:lnRef idx="2">
+            <a:schemeClr val="accent1"/>
+          </a:lnRef>
+          <a:fillRef idx="0">
+            <a:schemeClr val="accent1"/>
+          </a:fillRef>
+          <a:effectRef idx="1">
+            <a:schemeClr val="accent1"/>
+          </a:effectRef>
+          <a:fontRef idx="minor">
+            <a:schemeClr val="tx1"/>
+          </a:fontRef>
+        </p:style>
+      </p:cxnSp>
+      <p:sp>
+        <p:nvSpPr>
+          <p:cNvPr id="82" name="TextBox 81">
+            <a:extLst>
+              <a:ext uri="{FF2B5EF4-FFF2-40B4-BE49-F238E27FC236}">
+                <a16:creationId xmlns:a16="http://schemas.microsoft.com/office/drawing/2014/main" id="{9A5AF5B4-443E-76C9-01E1-A30A0E9DE05E}"/>
+              </a:ext>
+            </a:extLst>
+          </p:cNvPr>
+          <p:cNvSpPr txBox="1"/>
+          <p:nvPr/>
+        </p:nvSpPr>
+        <p:spPr>
+          <a:xfrm>
+            <a:off x="99298" y="3486731"/>
+            <a:ext cx="487542" cy="369332"/>
+          </a:xfrm>
+          <a:prstGeom prst="rect">
+            <a:avLst/>
+          </a:prstGeom>
+          <a:noFill/>
+        </p:spPr>
+        <p:txBody>
+          <a:bodyPr wrap="square" rtlCol="0">
+            <a:spAutoFit/>
+          </a:bodyPr>
+          <a:lstStyle/>
+          <a:p>
+            <a:r>
+              <a:rPr lang="en-US" dirty="0"/>
+              <a:t>d1</a:t>
+            </a:r>
+          </a:p>
+        </p:txBody>
+      </p:sp>
+      <p:sp>
+        <p:nvSpPr>
+          <p:cNvPr id="83" name="TextBox 82">
+            <a:extLst>
+              <a:ext uri="{FF2B5EF4-FFF2-40B4-BE49-F238E27FC236}">
+                <a16:creationId xmlns:a16="http://schemas.microsoft.com/office/drawing/2014/main" id="{7E081EDC-DFC1-EA95-BA1A-4C7096995054}"/>
+              </a:ext>
+            </a:extLst>
+          </p:cNvPr>
+          <p:cNvSpPr txBox="1"/>
+          <p:nvPr/>
+        </p:nvSpPr>
+        <p:spPr>
+          <a:xfrm>
+            <a:off x="1798660" y="622643"/>
+            <a:ext cx="487542" cy="369332"/>
+          </a:xfrm>
+          <a:prstGeom prst="rect">
+            <a:avLst/>
+          </a:prstGeom>
+          <a:noFill/>
+        </p:spPr>
+        <p:txBody>
+          <a:bodyPr wrap="square" rtlCol="0">
+            <a:spAutoFit/>
+          </a:bodyPr>
+          <a:lstStyle/>
+          <a:p>
+            <a:r>
+              <a:rPr lang="en-US" dirty="0"/>
+              <a:t>a2</a:t>
+            </a:r>
+          </a:p>
+        </p:txBody>
+      </p:sp>
+      <p:sp>
+        <p:nvSpPr>
+          <p:cNvPr id="84" name="TextBox 83">
+            <a:extLst>
+              <a:ext uri="{FF2B5EF4-FFF2-40B4-BE49-F238E27FC236}">
+                <a16:creationId xmlns:a16="http://schemas.microsoft.com/office/drawing/2014/main" id="{F57CD24A-2EE7-B048-9BC0-EBDC05C856C8}"/>
+              </a:ext>
+            </a:extLst>
+          </p:cNvPr>
+          <p:cNvSpPr txBox="1"/>
+          <p:nvPr/>
+        </p:nvSpPr>
+        <p:spPr>
+          <a:xfrm>
+            <a:off x="3469719" y="654924"/>
+            <a:ext cx="487542" cy="369332"/>
+          </a:xfrm>
+          <a:prstGeom prst="rect">
+            <a:avLst/>
+          </a:prstGeom>
+          <a:noFill/>
+        </p:spPr>
+        <p:txBody>
+          <a:bodyPr wrap="square" rtlCol="0">
+            <a:spAutoFit/>
+          </a:bodyPr>
+          <a:lstStyle/>
+          <a:p>
+            <a:r>
+              <a:rPr lang="en-US" dirty="0"/>
+              <a:t>d4</a:t>
+            </a:r>
+          </a:p>
+        </p:txBody>
+      </p:sp>
+      <p:cxnSp>
+        <p:nvCxnSpPr>
+          <p:cNvPr id="90" name="Straight Arrow Connector 89">
+            <a:extLst>
+              <a:ext uri="{FF2B5EF4-FFF2-40B4-BE49-F238E27FC236}">
+                <a16:creationId xmlns:a16="http://schemas.microsoft.com/office/drawing/2014/main" id="{32C2A309-9248-41C9-CA11-72755ACDF3C7}"/>
+              </a:ext>
+            </a:extLst>
+          </p:cNvPr>
+          <p:cNvCxnSpPr>
+            <a:cxnSpLocks/>
+          </p:cNvCxnSpPr>
+          <p:nvPr/>
+        </p:nvCxnSpPr>
+        <p:spPr>
+          <a:xfrm flipH="1">
+            <a:off x="2944589" y="985248"/>
+            <a:ext cx="2810531" cy="0"/>
+          </a:xfrm>
+          <a:prstGeom prst="straightConnector1">
+            <a:avLst/>
+          </a:prstGeom>
+          <a:ln>
+            <a:headEnd type="triangle"/>
+            <a:tailEnd type="triangle"/>
+          </a:ln>
+        </p:spPr>
+        <p:style>
+          <a:lnRef idx="2">
+            <a:schemeClr val="accent1"/>
+          </a:lnRef>
+          <a:fillRef idx="0">
+            <a:schemeClr val="accent1"/>
+          </a:fillRef>
+          <a:effectRef idx="1">
+            <a:schemeClr val="accent1"/>
+          </a:effectRef>
+          <a:fontRef idx="minor">
+            <a:schemeClr val="tx1"/>
+          </a:fontRef>
+        </p:style>
+      </p:cxnSp>
+      <p:cxnSp>
+        <p:nvCxnSpPr>
+          <p:cNvPr id="93" name="Straight Arrow Connector 92">
+            <a:extLst>
+              <a:ext uri="{FF2B5EF4-FFF2-40B4-BE49-F238E27FC236}">
+                <a16:creationId xmlns:a16="http://schemas.microsoft.com/office/drawing/2014/main" id="{1F00E8AD-E8C5-CF94-07D3-D1D357216DC5}"/>
+              </a:ext>
+            </a:extLst>
+          </p:cNvPr>
+          <p:cNvCxnSpPr>
+            <a:cxnSpLocks/>
+          </p:cNvCxnSpPr>
+          <p:nvPr/>
+        </p:nvCxnSpPr>
+        <p:spPr>
+          <a:xfrm flipH="1">
+            <a:off x="1087169" y="985248"/>
+            <a:ext cx="1857420" cy="6727"/>
+          </a:xfrm>
+          <a:prstGeom prst="straightConnector1">
+            <a:avLst/>
+          </a:prstGeom>
+          <a:ln>
+            <a:headEnd type="triangle"/>
+            <a:tailEnd type="triangle"/>
+          </a:ln>
+        </p:spPr>
+        <p:style>
+          <a:lnRef idx="2">
+            <a:schemeClr val="accent1"/>
+          </a:lnRef>
+          <a:fillRef idx="0">
+            <a:schemeClr val="accent1"/>
+          </a:fillRef>
+          <a:effectRef idx="1">
+            <a:schemeClr val="accent1"/>
+          </a:effectRef>
+          <a:fontRef idx="minor">
+            <a:schemeClr val="tx1"/>
+          </a:fontRef>
+        </p:style>
+      </p:cxnSp>
+      <p:sp>
+        <p:nvSpPr>
+          <p:cNvPr id="96" name="TextBox 95">
+            <a:extLst>
+              <a:ext uri="{FF2B5EF4-FFF2-40B4-BE49-F238E27FC236}">
+                <a16:creationId xmlns:a16="http://schemas.microsoft.com/office/drawing/2014/main" id="{2EBE830F-B90B-0312-4F32-22C57B9A205F}"/>
+              </a:ext>
+            </a:extLst>
+          </p:cNvPr>
+          <p:cNvSpPr txBox="1"/>
+          <p:nvPr/>
+        </p:nvSpPr>
+        <p:spPr>
+          <a:xfrm>
+            <a:off x="5209321" y="1982197"/>
+            <a:ext cx="476412" cy="461665"/>
+          </a:xfrm>
+          <a:prstGeom prst="rect">
+            <a:avLst/>
+          </a:prstGeom>
+          <a:noFill/>
+        </p:spPr>
+        <p:txBody>
+          <a:bodyPr wrap="square" rtlCol="0">
+            <a:spAutoFit/>
+          </a:bodyPr>
+          <a:lstStyle/>
+          <a:p>
+            <a:r>
+              <a:rPr lang="el-GR" sz="2400" dirty="0"/>
+              <a:t>θ</a:t>
+            </a:r>
+            <a:r>
+              <a:rPr lang="en-US" sz="2400" baseline="-25000" dirty="0"/>
+              <a:t>5</a:t>
+            </a:r>
+          </a:p>
+        </p:txBody>
+      </p:sp>
+      <p:cxnSp>
+        <p:nvCxnSpPr>
+          <p:cNvPr id="5" name="Straight Connector 4">
+            <a:extLst>
+              <a:ext uri="{FF2B5EF4-FFF2-40B4-BE49-F238E27FC236}">
+                <a16:creationId xmlns:a16="http://schemas.microsoft.com/office/drawing/2014/main" id="{76C3EF6F-83E4-506F-234E-05C8875D084A}"/>
+              </a:ext>
+            </a:extLst>
+          </p:cNvPr>
+          <p:cNvCxnSpPr>
+            <a:cxnSpLocks/>
+          </p:cNvCxnSpPr>
+          <p:nvPr/>
+        </p:nvCxnSpPr>
+        <p:spPr>
+          <a:xfrm flipH="1" flipV="1">
+            <a:off x="4662107" y="2543339"/>
+            <a:ext cx="891358" cy="9321"/>
+          </a:xfrm>
+          <a:prstGeom prst="line">
+            <a:avLst/>
+          </a:prstGeom>
+        </p:spPr>
+        <p:style>
+          <a:lnRef idx="2">
+            <a:schemeClr val="dk1"/>
+          </a:lnRef>
+          <a:fillRef idx="0">
+            <a:schemeClr val="dk1"/>
+          </a:fillRef>
+          <a:effectRef idx="1">
+            <a:schemeClr val="dk1"/>
+          </a:effectRef>
+          <a:fontRef idx="minor">
+            <a:schemeClr val="tx1"/>
+          </a:fontRef>
+        </p:style>
+      </p:cxnSp>
+      <p:sp>
+        <p:nvSpPr>
+          <p:cNvPr id="8" name="Oval 7">
+            <a:extLst>
+              <a:ext uri="{FF2B5EF4-FFF2-40B4-BE49-F238E27FC236}">
+                <a16:creationId xmlns:a16="http://schemas.microsoft.com/office/drawing/2014/main" id="{AB799269-6EC8-0219-6B60-6E1A3A3B17BD}"/>
+              </a:ext>
+            </a:extLst>
+          </p:cNvPr>
+          <p:cNvSpPr/>
+          <p:nvPr/>
+        </p:nvSpPr>
+        <p:spPr>
+          <a:xfrm>
+            <a:off x="5471812" y="2498452"/>
+            <a:ext cx="199742" cy="158888"/>
+          </a:xfrm>
+          <a:prstGeom prst="ellipse">
+            <a:avLst/>
+          </a:prstGeom>
+        </p:spPr>
+        <p:style>
+          <a:lnRef idx="2">
+            <a:schemeClr val="accent1">
+              <a:shade val="15000"/>
+            </a:schemeClr>
+          </a:lnRef>
+          <a:fillRef idx="1">
+            <a:schemeClr val="accent1"/>
+          </a:fillRef>
+          <a:effectRef idx="0">
+            <a:schemeClr val="accent1"/>
+          </a:effectRef>
+          <a:fontRef idx="minor">
+            <a:schemeClr val="lt1"/>
+          </a:fontRef>
+        </p:style>
+        <p:txBody>
+          <a:bodyPr rtlCol="0" anchor="ctr"/>
+          <a:lstStyle/>
+          <a:p>
+            <a:pPr algn="ctr"/>
+            <a:endParaRPr lang="en-US"/>
+          </a:p>
+        </p:txBody>
+      </p:sp>
+      <p:cxnSp>
+        <p:nvCxnSpPr>
+          <p:cNvPr id="10" name="Straight Connector 9">
+            <a:extLst>
+              <a:ext uri="{FF2B5EF4-FFF2-40B4-BE49-F238E27FC236}">
+                <a16:creationId xmlns:a16="http://schemas.microsoft.com/office/drawing/2014/main" id="{6ED8AE9B-3984-13B8-CC0F-A05EDAA7987A}"/>
+              </a:ext>
+            </a:extLst>
+          </p:cNvPr>
+          <p:cNvCxnSpPr>
+            <a:cxnSpLocks/>
+          </p:cNvCxnSpPr>
+          <p:nvPr/>
+        </p:nvCxnSpPr>
+        <p:spPr>
+          <a:xfrm flipV="1">
+            <a:off x="5620059" y="4354031"/>
+            <a:ext cx="0" cy="408129"/>
+          </a:xfrm>
+          <a:prstGeom prst="line">
+            <a:avLst/>
+          </a:prstGeom>
+        </p:spPr>
+        <p:style>
+          <a:lnRef idx="2">
+            <a:schemeClr val="dk1"/>
+          </a:lnRef>
+          <a:fillRef idx="0">
+            <a:schemeClr val="dk1"/>
+          </a:fillRef>
+          <a:effectRef idx="1">
+            <a:schemeClr val="dk1"/>
+          </a:effectRef>
+          <a:fontRef idx="minor">
+            <a:schemeClr val="tx1"/>
+          </a:fontRef>
+        </p:style>
+      </p:cxnSp>
+      <p:cxnSp>
+        <p:nvCxnSpPr>
+          <p:cNvPr id="12" name="Straight Connector 11">
+            <a:extLst>
+              <a:ext uri="{FF2B5EF4-FFF2-40B4-BE49-F238E27FC236}">
+                <a16:creationId xmlns:a16="http://schemas.microsoft.com/office/drawing/2014/main" id="{169CDFF0-5E9D-AFD4-7CDB-1DCF55692FD2}"/>
+              </a:ext>
+            </a:extLst>
+          </p:cNvPr>
+          <p:cNvCxnSpPr>
+            <a:cxnSpLocks/>
+          </p:cNvCxnSpPr>
+          <p:nvPr/>
+        </p:nvCxnSpPr>
+        <p:spPr>
+          <a:xfrm flipV="1">
+            <a:off x="5612719" y="2576530"/>
+            <a:ext cx="7341" cy="1742401"/>
+          </a:xfrm>
+          <a:prstGeom prst="line">
+            <a:avLst/>
+          </a:prstGeom>
+        </p:spPr>
+        <p:style>
+          <a:lnRef idx="2">
+            <a:schemeClr val="dk1"/>
+          </a:lnRef>
+          <a:fillRef idx="0">
+            <a:schemeClr val="dk1"/>
+          </a:fillRef>
+          <a:effectRef idx="1">
+            <a:schemeClr val="dk1"/>
+          </a:effectRef>
+          <a:fontRef idx="minor">
+            <a:schemeClr val="tx1"/>
+          </a:fontRef>
+        </p:style>
+      </p:cxnSp>
+      <p:grpSp>
+        <p:nvGrpSpPr>
+          <p:cNvPr id="15" name="Group 14">
+            <a:extLst>
+              <a:ext uri="{FF2B5EF4-FFF2-40B4-BE49-F238E27FC236}">
+                <a16:creationId xmlns:a16="http://schemas.microsoft.com/office/drawing/2014/main" id="{F85E6308-A77A-AB41-55DC-DC4B81AEA3CC}"/>
+              </a:ext>
+            </a:extLst>
+          </p:cNvPr>
+          <p:cNvGrpSpPr/>
+          <p:nvPr/>
+        </p:nvGrpSpPr>
+        <p:grpSpPr>
+          <a:xfrm>
+            <a:off x="5109438" y="2351795"/>
+            <a:ext cx="1385814" cy="888798"/>
+            <a:chOff x="6682408" y="2265489"/>
+            <a:chExt cx="1385814" cy="888798"/>
+          </a:xfrm>
+        </p:grpSpPr>
+        <p:cxnSp>
+          <p:nvCxnSpPr>
+            <p:cNvPr id="16" name="Straight Arrow Connector 15">
+              <a:extLst>
+                <a:ext uri="{FF2B5EF4-FFF2-40B4-BE49-F238E27FC236}">
+                  <a16:creationId xmlns:a16="http://schemas.microsoft.com/office/drawing/2014/main" id="{B24766B5-2305-ED6A-5AC3-27E4F2D5A3BE}"/>
+                </a:ext>
+              </a:extLst>
+            </p:cNvPr>
+            <p:cNvCxnSpPr>
+              <a:cxnSpLocks/>
+              <a:endCxn id="19" idx="1"/>
+            </p:cNvCxnSpPr>
+            <p:nvPr/>
+          </p:nvCxnSpPr>
+          <p:spPr>
+            <a:xfrm>
+              <a:off x="7262096" y="2464982"/>
+              <a:ext cx="392230" cy="562"/>
+            </a:xfrm>
+            <a:prstGeom prst="straightConnector1">
+              <a:avLst/>
+            </a:prstGeom>
+            <a:ln w="38100">
+              <a:solidFill>
+                <a:schemeClr val="tx2">
+                  <a:lumMod val="50000"/>
+                  <a:lumOff val="50000"/>
+                </a:schemeClr>
+              </a:solidFill>
+              <a:tailEnd type="triangle"/>
+            </a:ln>
+          </p:spPr>
+          <p:style>
+            <a:lnRef idx="2">
+              <a:schemeClr val="dk1"/>
+            </a:lnRef>
+            <a:fillRef idx="0">
+              <a:schemeClr val="dk1"/>
+            </a:fillRef>
+            <a:effectRef idx="1">
+              <a:schemeClr val="dk1"/>
+            </a:effectRef>
+            <a:fontRef idx="minor">
+              <a:schemeClr val="tx1"/>
+            </a:fontRef>
+          </p:style>
+        </p:cxnSp>
+        <p:cxnSp>
+          <p:nvCxnSpPr>
+            <p:cNvPr id="17" name="Straight Arrow Connector 16">
+              <a:extLst>
+                <a:ext uri="{FF2B5EF4-FFF2-40B4-BE49-F238E27FC236}">
+                  <a16:creationId xmlns:a16="http://schemas.microsoft.com/office/drawing/2014/main" id="{7D48CB66-2561-1402-7F70-A26896176ADF}"/>
+                </a:ext>
+              </a:extLst>
+            </p:cNvPr>
+            <p:cNvCxnSpPr>
+              <a:cxnSpLocks/>
+            </p:cNvCxnSpPr>
+            <p:nvPr/>
+          </p:nvCxnSpPr>
+          <p:spPr>
+            <a:xfrm>
+              <a:off x="7263015" y="2454588"/>
+              <a:ext cx="0" cy="547363"/>
+            </a:xfrm>
+            <a:prstGeom prst="straightConnector1">
+              <a:avLst/>
+            </a:prstGeom>
+            <a:ln w="38100">
+              <a:solidFill>
+                <a:schemeClr val="tx2">
+                  <a:lumMod val="50000"/>
+                  <a:lumOff val="50000"/>
+                </a:schemeClr>
+              </a:solidFill>
+              <a:tailEnd type="triangle"/>
+            </a:ln>
+          </p:spPr>
+          <p:style>
+            <a:lnRef idx="2">
+              <a:schemeClr val="dk1"/>
+            </a:lnRef>
+            <a:fillRef idx="0">
+              <a:schemeClr val="dk1"/>
+            </a:fillRef>
+            <a:effectRef idx="1">
+              <a:schemeClr val="dk1"/>
+            </a:effectRef>
+            <a:fontRef idx="minor">
+              <a:schemeClr val="tx1"/>
+            </a:fontRef>
+          </p:style>
+        </p:cxnSp>
+        <p:cxnSp>
+          <p:nvCxnSpPr>
+            <p:cNvPr id="18" name="Straight Arrow Connector 17">
+              <a:extLst>
+                <a:ext uri="{FF2B5EF4-FFF2-40B4-BE49-F238E27FC236}">
+                  <a16:creationId xmlns:a16="http://schemas.microsoft.com/office/drawing/2014/main" id="{D1A65768-4293-93C7-F4AB-1C8D766D0E28}"/>
+                </a:ext>
+              </a:extLst>
+            </p:cNvPr>
+            <p:cNvCxnSpPr>
+              <a:cxnSpLocks/>
+            </p:cNvCxnSpPr>
+            <p:nvPr/>
+          </p:nvCxnSpPr>
+          <p:spPr>
+            <a:xfrm flipH="1">
+              <a:off x="6987389" y="2454588"/>
+              <a:ext cx="275626" cy="262587"/>
+            </a:xfrm>
+            <a:prstGeom prst="straightConnector1">
+              <a:avLst/>
+            </a:prstGeom>
+            <a:ln w="38100">
+              <a:solidFill>
+                <a:schemeClr val="tx2">
+                  <a:lumMod val="50000"/>
+                  <a:lumOff val="50000"/>
+                </a:schemeClr>
+              </a:solidFill>
+              <a:tailEnd type="triangle"/>
+            </a:ln>
+          </p:spPr>
+          <p:style>
+            <a:lnRef idx="2">
+              <a:schemeClr val="dk1"/>
+            </a:lnRef>
+            <a:fillRef idx="0">
+              <a:schemeClr val="dk1"/>
+            </a:fillRef>
+            <a:effectRef idx="1">
+              <a:schemeClr val="dk1"/>
+            </a:effectRef>
+            <a:fontRef idx="minor">
+              <a:schemeClr val="tx1"/>
+            </a:fontRef>
+          </p:style>
+        </p:cxnSp>
+        <p:sp>
+          <p:nvSpPr>
+            <p:cNvPr id="19" name="TextBox 18">
+              <a:extLst>
+                <a:ext uri="{FF2B5EF4-FFF2-40B4-BE49-F238E27FC236}">
+                  <a16:creationId xmlns:a16="http://schemas.microsoft.com/office/drawing/2014/main" id="{58424AD7-00E7-CC15-54A7-6FCE3304D82F}"/>
+                </a:ext>
+              </a:extLst>
+            </p:cNvPr>
+            <p:cNvSpPr txBox="1"/>
+            <p:nvPr/>
+          </p:nvSpPr>
+          <p:spPr>
+            <a:xfrm>
+              <a:off x="7654326" y="2265489"/>
+              <a:ext cx="413896" cy="400110"/>
+            </a:xfrm>
+            <a:prstGeom prst="rect">
+              <a:avLst/>
+            </a:prstGeom>
+            <a:noFill/>
+          </p:spPr>
+          <p:txBody>
+            <a:bodyPr wrap="none" rtlCol="0">
+              <a:spAutoFit/>
+            </a:bodyPr>
+            <a:lstStyle/>
+            <a:p>
+              <a:r>
+                <a:rPr lang="en-US" sz="2000" dirty="0"/>
+                <a:t>Y</a:t>
+              </a:r>
+              <a:r>
+                <a:rPr lang="en-US" sz="2000" baseline="-25000" dirty="0"/>
+                <a:t>4</a:t>
+              </a:r>
+            </a:p>
+          </p:txBody>
+        </p:sp>
+        <p:sp>
+          <p:nvSpPr>
+            <p:cNvPr id="22" name="TextBox 21">
+              <a:extLst>
+                <a:ext uri="{FF2B5EF4-FFF2-40B4-BE49-F238E27FC236}">
+                  <a16:creationId xmlns:a16="http://schemas.microsoft.com/office/drawing/2014/main" id="{BDE1404B-FD20-69B0-07FA-54391ED5DF3C}"/>
+                </a:ext>
+              </a:extLst>
+            </p:cNvPr>
+            <p:cNvSpPr txBox="1"/>
+            <p:nvPr/>
+          </p:nvSpPr>
+          <p:spPr>
+            <a:xfrm>
+              <a:off x="6682408" y="2616910"/>
+              <a:ext cx="409086" cy="400110"/>
+            </a:xfrm>
+            <a:prstGeom prst="rect">
+              <a:avLst/>
+            </a:prstGeom>
+            <a:noFill/>
+          </p:spPr>
+          <p:txBody>
+            <a:bodyPr wrap="none" rtlCol="0">
+              <a:spAutoFit/>
+            </a:bodyPr>
+            <a:lstStyle/>
+            <a:p>
+              <a:r>
+                <a:rPr lang="en-US" sz="2000" dirty="0"/>
+                <a:t>Z</a:t>
+              </a:r>
+              <a:r>
+                <a:rPr lang="en-US" sz="2000" baseline="-25000" dirty="0"/>
+                <a:t>4</a:t>
+              </a:r>
+              <a:endParaRPr lang="en-US" sz="2000" dirty="0"/>
+            </a:p>
+          </p:txBody>
+        </p:sp>
+        <p:sp>
+          <p:nvSpPr>
+            <p:cNvPr id="24" name="TextBox 23">
+              <a:extLst>
+                <a:ext uri="{FF2B5EF4-FFF2-40B4-BE49-F238E27FC236}">
+                  <a16:creationId xmlns:a16="http://schemas.microsoft.com/office/drawing/2014/main" id="{75893AF7-B54C-15B1-0AA9-F736725CDCD4}"/>
+                </a:ext>
+              </a:extLst>
+            </p:cNvPr>
+            <p:cNvSpPr txBox="1"/>
+            <p:nvPr/>
+          </p:nvSpPr>
+          <p:spPr>
+            <a:xfrm>
+              <a:off x="7358074" y="2754177"/>
+              <a:ext cx="417102" cy="400110"/>
+            </a:xfrm>
+            <a:prstGeom prst="rect">
+              <a:avLst/>
+            </a:prstGeom>
+            <a:noFill/>
+          </p:spPr>
+          <p:txBody>
+            <a:bodyPr wrap="none" rtlCol="0">
+              <a:spAutoFit/>
+            </a:bodyPr>
+            <a:lstStyle/>
+            <a:p>
+              <a:r>
+                <a:rPr lang="en-US" sz="2000" dirty="0"/>
+                <a:t>X</a:t>
+              </a:r>
+              <a:r>
+                <a:rPr lang="en-US" sz="2000" baseline="-25000" dirty="0"/>
+                <a:t>4</a:t>
+              </a:r>
+            </a:p>
+          </p:txBody>
+        </p:sp>
+      </p:grpSp>
+      <p:cxnSp>
+        <p:nvCxnSpPr>
+          <p:cNvPr id="25" name="Straight Connector 24">
+            <a:extLst>
+              <a:ext uri="{FF2B5EF4-FFF2-40B4-BE49-F238E27FC236}">
+                <a16:creationId xmlns:a16="http://schemas.microsoft.com/office/drawing/2014/main" id="{F7EE1172-9885-5741-AD74-32D62DC48AE6}"/>
+              </a:ext>
+            </a:extLst>
+          </p:cNvPr>
+          <p:cNvCxnSpPr>
+            <a:cxnSpLocks/>
+            <a:endCxn id="50" idx="0"/>
+          </p:cNvCxnSpPr>
+          <p:nvPr/>
+        </p:nvCxnSpPr>
+        <p:spPr>
+          <a:xfrm flipH="1">
+            <a:off x="2990035" y="1616310"/>
+            <a:ext cx="943450" cy="873622"/>
+          </a:xfrm>
+          <a:prstGeom prst="line">
+            <a:avLst/>
+          </a:prstGeom>
+          <a:ln w="19050" cap="flat" cmpd="sng" algn="ctr">
+            <a:solidFill>
+              <a:schemeClr val="dk1"/>
+            </a:solidFill>
+            <a:prstDash val="dash"/>
+            <a:round/>
+            <a:headEnd type="none" w="med" len="med"/>
+            <a:tailEnd type="none" w="med" len="med"/>
+          </a:ln>
+        </p:spPr>
+        <p:style>
+          <a:lnRef idx="0">
+            <a:scrgbClr r="0" g="0" b="0"/>
+          </a:lnRef>
+          <a:fillRef idx="0">
+            <a:scrgbClr r="0" g="0" b="0"/>
+          </a:fillRef>
+          <a:effectRef idx="0">
+            <a:scrgbClr r="0" g="0" b="0"/>
+          </a:effectRef>
+          <a:fontRef idx="minor">
+            <a:schemeClr val="tx1"/>
+          </a:fontRef>
+        </p:style>
+      </p:cxnSp>
+      <p:sp>
+        <p:nvSpPr>
+          <p:cNvPr id="102" name="Half Frame 101">
+            <a:extLst>
+              <a:ext uri="{FF2B5EF4-FFF2-40B4-BE49-F238E27FC236}">
+                <a16:creationId xmlns:a16="http://schemas.microsoft.com/office/drawing/2014/main" id="{E1D9FFBD-DEBC-26D4-3E67-ED12DC89F4A8}"/>
+              </a:ext>
+            </a:extLst>
+          </p:cNvPr>
+          <p:cNvSpPr/>
+          <p:nvPr/>
+        </p:nvSpPr>
+        <p:spPr>
+          <a:xfrm rot="2629033">
+            <a:off x="5362950" y="4745404"/>
+            <a:ext cx="514216" cy="541534"/>
+          </a:xfrm>
+          <a:prstGeom prst="halfFrame">
+            <a:avLst>
+              <a:gd name="adj1" fmla="val 13180"/>
+              <a:gd name="adj2" fmla="val 11109"/>
+            </a:avLst>
+          </a:prstGeom>
+        </p:spPr>
+        <p:style>
+          <a:lnRef idx="2">
+            <a:schemeClr val="accent1">
+              <a:shade val="15000"/>
+            </a:schemeClr>
+          </a:lnRef>
+          <a:fillRef idx="1">
+            <a:schemeClr val="accent1"/>
+          </a:fillRef>
+          <a:effectRef idx="0">
+            <a:schemeClr val="accent1"/>
+          </a:effectRef>
+          <a:fontRef idx="minor">
+            <a:schemeClr val="lt1"/>
+          </a:fontRef>
+        </p:style>
+        <p:txBody>
+          <a:bodyPr rtlCol="0" anchor="ctr"/>
+          <a:lstStyle/>
+          <a:p>
+            <a:pPr algn="ctr"/>
+            <a:endParaRPr lang="en-US">
+              <a:solidFill>
+                <a:schemeClr val="tx1"/>
+              </a:solidFill>
+            </a:endParaRPr>
+          </a:p>
+        </p:txBody>
+      </p:sp>
+      <p:sp>
+        <p:nvSpPr>
+          <p:cNvPr id="112" name="TextBox 111">
+            <a:extLst>
+              <a:ext uri="{FF2B5EF4-FFF2-40B4-BE49-F238E27FC236}">
+                <a16:creationId xmlns:a16="http://schemas.microsoft.com/office/drawing/2014/main" id="{726F8E64-37AF-60E5-BF9F-B4F4E0E00B6B}"/>
+              </a:ext>
+            </a:extLst>
+          </p:cNvPr>
+          <p:cNvSpPr txBox="1"/>
+          <p:nvPr/>
+        </p:nvSpPr>
+        <p:spPr>
+          <a:xfrm>
+            <a:off x="5026079" y="431470"/>
+            <a:ext cx="2351271" cy="369332"/>
+          </a:xfrm>
+          <a:prstGeom prst="rect">
+            <a:avLst/>
+          </a:prstGeom>
+          <a:noFill/>
+        </p:spPr>
+        <p:txBody>
+          <a:bodyPr wrap="square" rtlCol="0">
+            <a:spAutoFit/>
+          </a:bodyPr>
+          <a:lstStyle/>
+          <a:p>
+            <a:r>
+              <a:rPr lang="en-US" dirty="0"/>
+              <a:t>a4 = a5 = a6 = </a:t>
+            </a:r>
+            <a:r>
+              <a:rPr lang="en-US"/>
+              <a:t>0 </a:t>
+            </a:r>
+            <a:endParaRPr lang="en-US" dirty="0"/>
+          </a:p>
+        </p:txBody>
+      </p:sp>
+      <p:sp>
+        <p:nvSpPr>
+          <p:cNvPr id="37" name="TextBox 36">
+            <a:extLst>
+              <a:ext uri="{FF2B5EF4-FFF2-40B4-BE49-F238E27FC236}">
+                <a16:creationId xmlns:a16="http://schemas.microsoft.com/office/drawing/2014/main" id="{163C5F44-25ED-F38B-D6F8-1529856BB6B6}"/>
+              </a:ext>
+            </a:extLst>
+          </p:cNvPr>
+          <p:cNvSpPr txBox="1"/>
+          <p:nvPr/>
+        </p:nvSpPr>
+        <p:spPr>
+          <a:xfrm>
+            <a:off x="4463246" y="1966773"/>
+            <a:ext cx="476412" cy="461665"/>
+          </a:xfrm>
+          <a:prstGeom prst="rect">
+            <a:avLst/>
+          </a:prstGeom>
+          <a:noFill/>
+        </p:spPr>
+        <p:txBody>
+          <a:bodyPr wrap="square" rtlCol="0">
+            <a:spAutoFit/>
+          </a:bodyPr>
+          <a:lstStyle/>
+          <a:p>
+            <a:r>
+              <a:rPr lang="el-GR" sz="2400" dirty="0"/>
+              <a:t>θ</a:t>
+            </a:r>
+            <a:r>
+              <a:rPr lang="en-US" sz="2400" baseline="-25000" dirty="0"/>
+              <a:t>4</a:t>
+            </a:r>
+          </a:p>
+        </p:txBody>
+      </p:sp>
+      <p:sp>
+        <p:nvSpPr>
+          <p:cNvPr id="38" name="TextBox 37">
+            <a:extLst>
+              <a:ext uri="{FF2B5EF4-FFF2-40B4-BE49-F238E27FC236}">
+                <a16:creationId xmlns:a16="http://schemas.microsoft.com/office/drawing/2014/main" id="{03944F7E-D43E-0A71-5614-1A1ED7322F2E}"/>
+              </a:ext>
+            </a:extLst>
+          </p:cNvPr>
+          <p:cNvSpPr txBox="1"/>
+          <p:nvPr/>
+        </p:nvSpPr>
+        <p:spPr>
+          <a:xfrm>
+            <a:off x="5827452" y="3726971"/>
+            <a:ext cx="476412" cy="707886"/>
+          </a:xfrm>
+          <a:prstGeom prst="rect">
+            <a:avLst/>
+          </a:prstGeom>
+          <a:noFill/>
+        </p:spPr>
+        <p:txBody>
+          <a:bodyPr wrap="square" rtlCol="0">
+            <a:spAutoFit/>
+          </a:bodyPr>
+          <a:lstStyle/>
+          <a:p>
+            <a:r>
+              <a:rPr lang="el-GR" sz="2400" dirty="0"/>
+              <a:t>θ</a:t>
+            </a:r>
+            <a:r>
+              <a:rPr lang="en-US" sz="2400" baseline="-25000" dirty="0"/>
+              <a:t>6	</a:t>
+            </a:r>
+          </a:p>
+        </p:txBody>
+      </p:sp>
+      <p:cxnSp>
+        <p:nvCxnSpPr>
+          <p:cNvPr id="115" name="Straight Arrow Connector 114">
+            <a:extLst>
+              <a:ext uri="{FF2B5EF4-FFF2-40B4-BE49-F238E27FC236}">
+                <a16:creationId xmlns:a16="http://schemas.microsoft.com/office/drawing/2014/main" id="{1698BA7B-14C8-EAA2-3032-FEA16398A098}"/>
+              </a:ext>
+            </a:extLst>
+          </p:cNvPr>
+          <p:cNvCxnSpPr>
+            <a:cxnSpLocks/>
+          </p:cNvCxnSpPr>
+          <p:nvPr/>
+        </p:nvCxnSpPr>
+        <p:spPr>
+          <a:xfrm flipH="1" flipV="1">
+            <a:off x="7954392" y="2388333"/>
+            <a:ext cx="63358" cy="2341812"/>
+          </a:xfrm>
+          <a:prstGeom prst="straightConnector1">
+            <a:avLst/>
+          </a:prstGeom>
+          <a:ln>
+            <a:headEnd type="triangle"/>
+            <a:tailEnd type="triangle"/>
+          </a:ln>
+        </p:spPr>
+        <p:style>
+          <a:lnRef idx="2">
+            <a:schemeClr val="accent1"/>
+          </a:lnRef>
+          <a:fillRef idx="0">
+            <a:schemeClr val="accent1"/>
+          </a:fillRef>
+          <a:effectRef idx="1">
+            <a:schemeClr val="accent1"/>
+          </a:effectRef>
+          <a:fontRef idx="minor">
+            <a:schemeClr val="tx1"/>
+          </a:fontRef>
+        </p:style>
+      </p:cxnSp>
+      <p:sp>
+        <p:nvSpPr>
+          <p:cNvPr id="119" name="TextBox 118">
+            <a:extLst>
+              <a:ext uri="{FF2B5EF4-FFF2-40B4-BE49-F238E27FC236}">
+                <a16:creationId xmlns:a16="http://schemas.microsoft.com/office/drawing/2014/main" id="{3E82514D-611A-2305-980E-784DF8BF3CC2}"/>
+              </a:ext>
+            </a:extLst>
+          </p:cNvPr>
+          <p:cNvSpPr txBox="1"/>
+          <p:nvPr/>
+        </p:nvSpPr>
+        <p:spPr>
+          <a:xfrm>
+            <a:off x="7565855" y="2885459"/>
+            <a:ext cx="487542" cy="369332"/>
+          </a:xfrm>
+          <a:prstGeom prst="rect">
+            <a:avLst/>
+          </a:prstGeom>
+          <a:noFill/>
+        </p:spPr>
+        <p:txBody>
+          <a:bodyPr wrap="square" rtlCol="0">
+            <a:spAutoFit/>
+          </a:bodyPr>
+          <a:lstStyle/>
+          <a:p>
+            <a:r>
+              <a:rPr lang="en-US" dirty="0"/>
+              <a:t>d7</a:t>
+            </a:r>
+          </a:p>
+        </p:txBody>
+      </p:sp>
+      <p:graphicFrame>
+        <p:nvGraphicFramePr>
+          <p:cNvPr id="120" name="Table 119">
+            <a:extLst>
+              <a:ext uri="{FF2B5EF4-FFF2-40B4-BE49-F238E27FC236}">
+                <a16:creationId xmlns:a16="http://schemas.microsoft.com/office/drawing/2014/main" id="{25EF4B6B-5D14-9AFA-4E65-0D700706B816}"/>
+              </a:ext>
+            </a:extLst>
+          </p:cNvPr>
+          <p:cNvGraphicFramePr>
+            <a:graphicFrameLocks noGrp="1"/>
+          </p:cNvGraphicFramePr>
+          <p:nvPr>
+            <p:extLst>
+              <p:ext uri="{D42A27DB-BD31-4B8C-83A1-F6EECF244321}">
+                <p14:modId xmlns:p14="http://schemas.microsoft.com/office/powerpoint/2010/main" val="3110261516"/>
+              </p:ext>
+            </p:extLst>
+          </p:nvPr>
+        </p:nvGraphicFramePr>
+        <p:xfrm>
+          <a:off x="8065965" y="931738"/>
+          <a:ext cx="4202970" cy="2834640"/>
+        </p:xfrm>
+        <a:graphic>
+          <a:graphicData uri="http://schemas.openxmlformats.org/drawingml/2006/table">
+            <a:tbl>
+              <a:tblPr firstRow="1" bandRow="1">
+                <a:tableStyleId>{5C22544A-7EE6-4342-B048-85BDC9FD1C3A}</a:tableStyleId>
+              </a:tblPr>
+              <a:tblGrid>
+                <a:gridCol w="840594">
+                  <a:extLst>
+                    <a:ext uri="{9D8B030D-6E8A-4147-A177-3AD203B41FA5}">
+                      <a16:colId xmlns:a16="http://schemas.microsoft.com/office/drawing/2014/main" val="2205231002"/>
+                    </a:ext>
+                  </a:extLst>
+                </a:gridCol>
+                <a:gridCol w="840594">
+                  <a:extLst>
+                    <a:ext uri="{9D8B030D-6E8A-4147-A177-3AD203B41FA5}">
+                      <a16:colId xmlns:a16="http://schemas.microsoft.com/office/drawing/2014/main" val="2947821736"/>
+                    </a:ext>
+                  </a:extLst>
+                </a:gridCol>
+                <a:gridCol w="840594">
+                  <a:extLst>
+                    <a:ext uri="{9D8B030D-6E8A-4147-A177-3AD203B41FA5}">
+                      <a16:colId xmlns:a16="http://schemas.microsoft.com/office/drawing/2014/main" val="2284687561"/>
+                    </a:ext>
+                  </a:extLst>
+                </a:gridCol>
+                <a:gridCol w="840594">
+                  <a:extLst>
+                    <a:ext uri="{9D8B030D-6E8A-4147-A177-3AD203B41FA5}">
+                      <a16:colId xmlns:a16="http://schemas.microsoft.com/office/drawing/2014/main" val="128693049"/>
+                    </a:ext>
+                  </a:extLst>
+                </a:gridCol>
+                <a:gridCol w="840594">
+                  <a:extLst>
+                    <a:ext uri="{9D8B030D-6E8A-4147-A177-3AD203B41FA5}">
+                      <a16:colId xmlns:a16="http://schemas.microsoft.com/office/drawing/2014/main" val="2597867648"/>
+                    </a:ext>
+                  </a:extLst>
+                </a:gridCol>
+              </a:tblGrid>
+              <a:tr h="310059">
+                <a:tc>
+                  <a:txBody>
+                    <a:bodyPr/>
+                    <a:lstStyle/>
+                    <a:p>
+                      <a:r>
+                        <a:rPr lang="en-US" dirty="0"/>
+                        <a:t>Link ID</a:t>
+                      </a:r>
+                    </a:p>
+                  </a:txBody>
+                  <a:tcPr/>
+                </a:tc>
+                <a:tc>
+                  <a:txBody>
+                    <a:bodyPr/>
+                    <a:lstStyle/>
+                    <a:p>
+                      <a:r>
+                        <a:rPr lang="en-US" dirty="0"/>
+                        <a:t>a</a:t>
+                      </a:r>
+                    </a:p>
+                  </a:txBody>
+                  <a:tcPr/>
+                </a:tc>
+                <a:tc>
+                  <a:txBody>
+                    <a:bodyPr/>
+                    <a:lstStyle/>
+                    <a:p>
+                      <a:r>
+                        <a:rPr lang="en-US" dirty="0"/>
+                        <a:t>d</a:t>
+                      </a:r>
+                    </a:p>
+                  </a:txBody>
+                  <a:tcPr/>
+                </a:tc>
+                <a:tc>
+                  <a:txBody>
+                    <a:bodyPr/>
+                    <a:lstStyle/>
+                    <a:p>
+                      <a:r>
+                        <a:rPr lang="en-US" dirty="0"/>
+                        <a:t>Alpha</a:t>
+                      </a:r>
+                    </a:p>
+                  </a:txBody>
+                  <a:tcPr/>
+                </a:tc>
+                <a:tc>
+                  <a:txBody>
+                    <a:bodyPr/>
+                    <a:lstStyle/>
+                    <a:p>
+                      <a:r>
+                        <a:rPr lang="en-US" dirty="0"/>
+                        <a:t>Theta</a:t>
+                      </a:r>
+                    </a:p>
+                  </a:txBody>
+                  <a:tcPr/>
+                </a:tc>
+                <a:extLst>
+                  <a:ext uri="{0D108BD9-81ED-4DB2-BD59-A6C34878D82A}">
+                    <a16:rowId xmlns:a16="http://schemas.microsoft.com/office/drawing/2014/main" val="2488572694"/>
+                  </a:ext>
+                </a:extLst>
+              </a:tr>
+              <a:tr h="310059">
+                <a:tc>
+                  <a:txBody>
+                    <a:bodyPr/>
+                    <a:lstStyle/>
+                    <a:p>
+                      <a:r>
+                        <a:rPr lang="en-US" dirty="0"/>
+                        <a:t>1</a:t>
+                      </a:r>
+                    </a:p>
+                  </a:txBody>
+                  <a:tcPr/>
+                </a:tc>
+                <a:tc>
+                  <a:txBody>
+                    <a:bodyPr/>
+                    <a:lstStyle/>
+                    <a:p>
+                      <a:r>
+                        <a:rPr lang="en-US" dirty="0"/>
+                        <a:t>0</a:t>
+                      </a:r>
+                    </a:p>
+                  </a:txBody>
+                  <a:tcPr/>
+                </a:tc>
+                <a:tc>
+                  <a:txBody>
+                    <a:bodyPr/>
+                    <a:lstStyle/>
+                    <a:p>
+                      <a:r>
+                        <a:rPr lang="en-US" dirty="0"/>
+                        <a:t>50</a:t>
+                      </a:r>
+                    </a:p>
+                  </a:txBody>
+                  <a:tcPr/>
+                </a:tc>
+                <a:tc>
+                  <a:txBody>
+                    <a:bodyPr/>
+                    <a:lstStyle/>
+                    <a:p>
+                      <a:r>
+                        <a:rPr lang="en-US" dirty="0"/>
+                        <a:t>90</a:t>
+                      </a:r>
+                    </a:p>
+                  </a:txBody>
+                  <a:tcPr/>
+                </a:tc>
+                <a:tc>
+                  <a:txBody>
+                    <a:bodyPr/>
+                    <a:lstStyle/>
+                    <a:p>
+                      <a:endParaRPr lang="en-US"/>
+                    </a:p>
+                  </a:txBody>
+                  <a:tcPr/>
+                </a:tc>
+                <a:extLst>
+                  <a:ext uri="{0D108BD9-81ED-4DB2-BD59-A6C34878D82A}">
+                    <a16:rowId xmlns:a16="http://schemas.microsoft.com/office/drawing/2014/main" val="1903147275"/>
+                  </a:ext>
+                </a:extLst>
+              </a:tr>
+              <a:tr h="310059">
+                <a:tc>
+                  <a:txBody>
+                    <a:bodyPr/>
+                    <a:lstStyle/>
+                    <a:p>
+                      <a:r>
+                        <a:rPr lang="en-US" dirty="0"/>
+                        <a:t>2</a:t>
+                      </a:r>
+                    </a:p>
+                  </a:txBody>
+                  <a:tcPr/>
+                </a:tc>
+                <a:tc>
+                  <a:txBody>
+                    <a:bodyPr/>
+                    <a:lstStyle/>
+                    <a:p>
+                      <a:r>
+                        <a:rPr lang="en-US" dirty="0"/>
+                        <a:t>50</a:t>
+                      </a:r>
+                    </a:p>
+                  </a:txBody>
+                  <a:tcPr/>
+                </a:tc>
+                <a:tc>
+                  <a:txBody>
+                    <a:bodyPr/>
+                    <a:lstStyle/>
+                    <a:p>
+                      <a:r>
+                        <a:rPr lang="en-US" dirty="0"/>
+                        <a:t>0</a:t>
+                      </a:r>
+                    </a:p>
+                  </a:txBody>
+                  <a:tcPr/>
+                </a:tc>
+                <a:tc>
+                  <a:txBody>
+                    <a:bodyPr/>
+                    <a:lstStyle/>
+                    <a:p>
+                      <a:r>
+                        <a:rPr lang="en-US" dirty="0"/>
+                        <a:t>0</a:t>
+                      </a:r>
+                    </a:p>
+                  </a:txBody>
+                  <a:tcPr/>
+                </a:tc>
+                <a:tc>
+                  <a:txBody>
+                    <a:bodyPr/>
+                    <a:lstStyle/>
+                    <a:p>
+                      <a:endParaRPr lang="en-US"/>
+                    </a:p>
+                  </a:txBody>
+                  <a:tcPr/>
+                </a:tc>
+                <a:extLst>
+                  <a:ext uri="{0D108BD9-81ED-4DB2-BD59-A6C34878D82A}">
+                    <a16:rowId xmlns:a16="http://schemas.microsoft.com/office/drawing/2014/main" val="2032630786"/>
+                  </a:ext>
+                </a:extLst>
+              </a:tr>
+              <a:tr h="310059">
+                <a:tc>
+                  <a:txBody>
+                    <a:bodyPr/>
+                    <a:lstStyle/>
+                    <a:p>
+                      <a:r>
+                        <a:rPr lang="en-US" dirty="0"/>
+                        <a:t>3</a:t>
+                      </a:r>
+                    </a:p>
+                  </a:txBody>
+                  <a:tcPr/>
+                </a:tc>
+                <a:tc>
+                  <a:txBody>
+                    <a:bodyPr/>
+                    <a:lstStyle/>
+                    <a:p>
+                      <a:r>
+                        <a:rPr lang="en-US" dirty="0"/>
+                        <a:t>0</a:t>
+                      </a:r>
+                    </a:p>
+                  </a:txBody>
+                  <a:tcPr/>
+                </a:tc>
+                <a:tc>
+                  <a:txBody>
+                    <a:bodyPr/>
+                    <a:lstStyle/>
+                    <a:p>
+                      <a:r>
+                        <a:rPr lang="en-US" dirty="0"/>
+                        <a:t>0</a:t>
+                      </a:r>
+                    </a:p>
+                  </a:txBody>
+                  <a:tcPr/>
+                </a:tc>
+                <a:tc>
+                  <a:txBody>
+                    <a:bodyPr/>
+                    <a:lstStyle/>
+                    <a:p>
+                      <a:r>
+                        <a:rPr lang="en-US" dirty="0"/>
+                        <a:t>90</a:t>
+                      </a:r>
+                    </a:p>
+                  </a:txBody>
+                  <a:tcPr/>
+                </a:tc>
+                <a:tc>
+                  <a:txBody>
+                    <a:bodyPr/>
+                    <a:lstStyle/>
+                    <a:p>
+                      <a:endParaRPr lang="en-US"/>
+                    </a:p>
+                  </a:txBody>
+                  <a:tcPr/>
+                </a:tc>
+                <a:extLst>
+                  <a:ext uri="{0D108BD9-81ED-4DB2-BD59-A6C34878D82A}">
+                    <a16:rowId xmlns:a16="http://schemas.microsoft.com/office/drawing/2014/main" val="745076177"/>
+                  </a:ext>
+                </a:extLst>
+              </a:tr>
+              <a:tr h="310059">
+                <a:tc>
+                  <a:txBody>
+                    <a:bodyPr/>
+                    <a:lstStyle/>
+                    <a:p>
+                      <a:r>
+                        <a:rPr lang="en-US" dirty="0"/>
+                        <a:t>4</a:t>
+                      </a:r>
+                    </a:p>
+                  </a:txBody>
+                  <a:tcPr/>
+                </a:tc>
+                <a:tc>
+                  <a:txBody>
+                    <a:bodyPr/>
+                    <a:lstStyle/>
+                    <a:p>
+                      <a:r>
+                        <a:rPr lang="en-US" dirty="0"/>
+                        <a:t>0</a:t>
+                      </a:r>
+                    </a:p>
+                  </a:txBody>
+                  <a:tcPr/>
+                </a:tc>
+                <a:tc>
+                  <a:txBody>
+                    <a:bodyPr/>
+                    <a:lstStyle/>
+                    <a:p>
+                      <a:r>
+                        <a:rPr lang="en-US" dirty="0"/>
+                        <a:t>50</a:t>
+                      </a:r>
+                    </a:p>
+                  </a:txBody>
+                  <a:tcPr/>
+                </a:tc>
+                <a:tc>
+                  <a:txBody>
+                    <a:bodyPr/>
+                    <a:lstStyle/>
+                    <a:p>
+                      <a:r>
+                        <a:rPr lang="en-US" dirty="0"/>
+                        <a:t>90</a:t>
+                      </a:r>
+                    </a:p>
+                  </a:txBody>
+                  <a:tcPr/>
+                </a:tc>
+                <a:tc>
+                  <a:txBody>
+                    <a:bodyPr/>
+                    <a:lstStyle/>
+                    <a:p>
+                      <a:endParaRPr lang="en-US"/>
+                    </a:p>
+                  </a:txBody>
+                  <a:tcPr/>
+                </a:tc>
+                <a:extLst>
+                  <a:ext uri="{0D108BD9-81ED-4DB2-BD59-A6C34878D82A}">
+                    <a16:rowId xmlns:a16="http://schemas.microsoft.com/office/drawing/2014/main" val="2120115847"/>
+                  </a:ext>
+                </a:extLst>
+              </a:tr>
+              <a:tr h="310059">
+                <a:tc>
+                  <a:txBody>
+                    <a:bodyPr/>
+                    <a:lstStyle/>
+                    <a:p>
+                      <a:r>
+                        <a:rPr lang="en-US" dirty="0"/>
+                        <a:t>5</a:t>
+                      </a:r>
+                    </a:p>
+                  </a:txBody>
+                  <a:tcPr/>
+                </a:tc>
+                <a:tc>
+                  <a:txBody>
+                    <a:bodyPr/>
+                    <a:lstStyle/>
+                    <a:p>
+                      <a:r>
+                        <a:rPr lang="en-US" dirty="0"/>
+                        <a:t>0</a:t>
+                      </a:r>
+                    </a:p>
+                  </a:txBody>
+                  <a:tcPr/>
+                </a:tc>
+                <a:tc>
+                  <a:txBody>
+                    <a:bodyPr/>
+                    <a:lstStyle/>
+                    <a:p>
+                      <a:r>
+                        <a:rPr lang="en-US" dirty="0"/>
+                        <a:t>0</a:t>
+                      </a:r>
+                    </a:p>
+                  </a:txBody>
+                  <a:tcPr/>
+                </a:tc>
+                <a:tc>
+                  <a:txBody>
+                    <a:bodyPr/>
+                    <a:lstStyle/>
+                    <a:p>
+                      <a:r>
+                        <a:rPr lang="en-US" dirty="0"/>
+                        <a:t>90</a:t>
+                      </a:r>
+                    </a:p>
+                  </a:txBody>
+                  <a:tcPr/>
+                </a:tc>
+                <a:tc>
+                  <a:txBody>
+                    <a:bodyPr/>
+                    <a:lstStyle/>
+                    <a:p>
+                      <a:endParaRPr lang="en-US"/>
+                    </a:p>
+                  </a:txBody>
+                  <a:tcPr/>
+                </a:tc>
+                <a:extLst>
+                  <a:ext uri="{0D108BD9-81ED-4DB2-BD59-A6C34878D82A}">
+                    <a16:rowId xmlns:a16="http://schemas.microsoft.com/office/drawing/2014/main" val="2311988270"/>
+                  </a:ext>
+                </a:extLst>
+              </a:tr>
+              <a:tr h="310059">
+                <a:tc>
+                  <a:txBody>
+                    <a:bodyPr/>
+                    <a:lstStyle/>
+                    <a:p>
+                      <a:r>
+                        <a:rPr lang="en-US" dirty="0"/>
+                        <a:t>6</a:t>
+                      </a:r>
+                    </a:p>
+                  </a:txBody>
+                  <a:tcPr/>
+                </a:tc>
+                <a:tc>
+                  <a:txBody>
+                    <a:bodyPr/>
+                    <a:lstStyle/>
+                    <a:p>
+                      <a:r>
+                        <a:rPr lang="en-US" dirty="0"/>
+                        <a:t>0</a:t>
+                      </a:r>
+                    </a:p>
+                  </a:txBody>
+                  <a:tcPr/>
+                </a:tc>
+                <a:tc>
+                  <a:txBody>
+                    <a:bodyPr/>
+                    <a:lstStyle/>
+                    <a:p>
+                      <a:r>
+                        <a:rPr lang="en-US" dirty="0"/>
+                        <a:t>30</a:t>
+                      </a:r>
+                    </a:p>
+                  </a:txBody>
+                  <a:tcPr/>
+                </a:tc>
+                <a:tc>
+                  <a:txBody>
+                    <a:bodyPr/>
+                    <a:lstStyle/>
+                    <a:p>
+                      <a:r>
+                        <a:rPr lang="en-US" dirty="0"/>
+                        <a:t>0</a:t>
+                      </a:r>
+                    </a:p>
+                  </a:txBody>
+                  <a:tcPr/>
+                </a:tc>
+                <a:tc>
+                  <a:txBody>
+                    <a:bodyPr/>
+                    <a:lstStyle/>
+                    <a:p>
+                      <a:endParaRPr lang="en-US" dirty="0"/>
+                    </a:p>
+                  </a:txBody>
+                  <a:tcPr/>
+                </a:tc>
+                <a:extLst>
+                  <a:ext uri="{0D108BD9-81ED-4DB2-BD59-A6C34878D82A}">
+                    <a16:rowId xmlns:a16="http://schemas.microsoft.com/office/drawing/2014/main" val="2116824428"/>
+                  </a:ext>
+                </a:extLst>
+              </a:tr>
+            </a:tbl>
+          </a:graphicData>
+        </a:graphic>
+      </p:graphicFrame>
+      <p:grpSp>
+        <p:nvGrpSpPr>
+          <p:cNvPr id="45" name="Group 44">
+            <a:extLst>
+              <a:ext uri="{FF2B5EF4-FFF2-40B4-BE49-F238E27FC236}">
+                <a16:creationId xmlns:a16="http://schemas.microsoft.com/office/drawing/2014/main" id="{B2EA1B9B-B808-0AA5-2B9E-74FDBE8FA88B}"/>
+              </a:ext>
+            </a:extLst>
+          </p:cNvPr>
+          <p:cNvGrpSpPr/>
+          <p:nvPr/>
+        </p:nvGrpSpPr>
+        <p:grpSpPr>
+          <a:xfrm>
+            <a:off x="3161492" y="921758"/>
+            <a:ext cx="1275332" cy="1264818"/>
+            <a:chOff x="8485245" y="3442476"/>
+            <a:chExt cx="1275332" cy="1264818"/>
+          </a:xfrm>
+        </p:grpSpPr>
+        <p:cxnSp>
+          <p:nvCxnSpPr>
+            <p:cNvPr id="48" name="Straight Arrow Connector 47">
+              <a:extLst>
+                <a:ext uri="{FF2B5EF4-FFF2-40B4-BE49-F238E27FC236}">
+                  <a16:creationId xmlns:a16="http://schemas.microsoft.com/office/drawing/2014/main" id="{B7EDC93E-10B4-D17D-C848-DFA8297B2408}"/>
+                </a:ext>
+              </a:extLst>
+            </p:cNvPr>
+            <p:cNvCxnSpPr>
+              <a:cxnSpLocks/>
+            </p:cNvCxnSpPr>
+            <p:nvPr/>
+          </p:nvCxnSpPr>
+          <p:spPr>
+            <a:xfrm flipV="1">
+              <a:off x="9086223" y="3797809"/>
+              <a:ext cx="0" cy="526001"/>
+            </a:xfrm>
+            <a:prstGeom prst="straightConnector1">
+              <a:avLst/>
+            </a:prstGeom>
+            <a:ln w="38100">
+              <a:solidFill>
+                <a:schemeClr val="tx2">
+                  <a:lumMod val="50000"/>
+                  <a:lumOff val="50000"/>
+                </a:schemeClr>
+              </a:solidFill>
+              <a:tailEnd type="triangle"/>
+            </a:ln>
+          </p:spPr>
+          <p:style>
+            <a:lnRef idx="2">
+              <a:schemeClr val="dk1"/>
+            </a:lnRef>
+            <a:fillRef idx="0">
+              <a:schemeClr val="dk1"/>
+            </a:fillRef>
+            <a:effectRef idx="1">
+              <a:schemeClr val="dk1"/>
+            </a:effectRef>
+            <a:fontRef idx="minor">
+              <a:schemeClr val="tx1"/>
+            </a:fontRef>
+          </p:style>
+        </p:cxnSp>
+        <p:cxnSp>
+          <p:nvCxnSpPr>
+            <p:cNvPr id="68" name="Straight Arrow Connector 67">
+              <a:extLst>
+                <a:ext uri="{FF2B5EF4-FFF2-40B4-BE49-F238E27FC236}">
+                  <a16:creationId xmlns:a16="http://schemas.microsoft.com/office/drawing/2014/main" id="{710B3EA8-7127-B99E-4A34-76A8421ADBFB}"/>
+                </a:ext>
+              </a:extLst>
+            </p:cNvPr>
+            <p:cNvCxnSpPr>
+              <a:cxnSpLocks/>
+            </p:cNvCxnSpPr>
+            <p:nvPr/>
+          </p:nvCxnSpPr>
+          <p:spPr>
+            <a:xfrm flipH="1">
+              <a:off x="8687091" y="4323810"/>
+              <a:ext cx="399132" cy="383484"/>
+            </a:xfrm>
+            <a:prstGeom prst="straightConnector1">
+              <a:avLst/>
+            </a:prstGeom>
+            <a:ln w="38100">
+              <a:solidFill>
+                <a:schemeClr val="tx2">
+                  <a:lumMod val="50000"/>
+                  <a:lumOff val="50000"/>
+                </a:schemeClr>
+              </a:solidFill>
+              <a:tailEnd type="triangle"/>
+            </a:ln>
+          </p:spPr>
+          <p:style>
+            <a:lnRef idx="2">
+              <a:schemeClr val="dk1"/>
+            </a:lnRef>
+            <a:fillRef idx="0">
+              <a:schemeClr val="dk1"/>
+            </a:fillRef>
+            <a:effectRef idx="1">
+              <a:schemeClr val="dk1"/>
+            </a:effectRef>
+            <a:fontRef idx="minor">
+              <a:schemeClr val="tx1"/>
+            </a:fontRef>
+          </p:style>
+        </p:cxnSp>
+        <p:cxnSp>
+          <p:nvCxnSpPr>
+            <p:cNvPr id="71" name="Straight Arrow Connector 70">
+              <a:extLst>
+                <a:ext uri="{FF2B5EF4-FFF2-40B4-BE49-F238E27FC236}">
+                  <a16:creationId xmlns:a16="http://schemas.microsoft.com/office/drawing/2014/main" id="{EBD8CEC6-7DBB-AF65-3102-CE8A1D59270A}"/>
+                </a:ext>
+              </a:extLst>
+            </p:cNvPr>
+            <p:cNvCxnSpPr>
+              <a:cxnSpLocks/>
+            </p:cNvCxnSpPr>
+            <p:nvPr/>
+          </p:nvCxnSpPr>
+          <p:spPr>
+            <a:xfrm>
+              <a:off x="9086223" y="4323810"/>
+              <a:ext cx="375117" cy="0"/>
+            </a:xfrm>
+            <a:prstGeom prst="straightConnector1">
+              <a:avLst/>
+            </a:prstGeom>
+            <a:ln w="38100">
+              <a:solidFill>
+                <a:schemeClr val="tx2">
+                  <a:lumMod val="50000"/>
+                  <a:lumOff val="50000"/>
+                </a:schemeClr>
+              </a:solidFill>
+              <a:tailEnd type="triangle"/>
+            </a:ln>
+          </p:spPr>
+          <p:style>
+            <a:lnRef idx="2">
+              <a:schemeClr val="dk1"/>
+            </a:lnRef>
+            <a:fillRef idx="0">
+              <a:schemeClr val="dk1"/>
+            </a:fillRef>
+            <a:effectRef idx="1">
+              <a:schemeClr val="dk1"/>
+            </a:effectRef>
+            <a:fontRef idx="minor">
+              <a:schemeClr val="tx1"/>
+            </a:fontRef>
+          </p:style>
+        </p:cxnSp>
+        <p:sp>
+          <p:nvSpPr>
+            <p:cNvPr id="72" name="TextBox 71">
+              <a:extLst>
+                <a:ext uri="{FF2B5EF4-FFF2-40B4-BE49-F238E27FC236}">
+                  <a16:creationId xmlns:a16="http://schemas.microsoft.com/office/drawing/2014/main" id="{23F688F4-1B14-55EC-B20C-BE6E522D193B}"/>
+                </a:ext>
+              </a:extLst>
+            </p:cNvPr>
+            <p:cNvSpPr txBox="1"/>
+            <p:nvPr/>
+          </p:nvSpPr>
+          <p:spPr>
+            <a:xfrm>
+              <a:off x="8916711" y="3442476"/>
+              <a:ext cx="417102" cy="400110"/>
+            </a:xfrm>
+            <a:prstGeom prst="rect">
+              <a:avLst/>
+            </a:prstGeom>
+            <a:noFill/>
+          </p:spPr>
+          <p:txBody>
+            <a:bodyPr wrap="none" rtlCol="0">
+              <a:spAutoFit/>
+            </a:bodyPr>
+            <a:lstStyle/>
+            <a:p>
+              <a:r>
+                <a:rPr lang="en-US" sz="2000" dirty="0"/>
+                <a:t>X</a:t>
+              </a:r>
+              <a:r>
+                <a:rPr lang="en-US" sz="2000" baseline="-25000" dirty="0"/>
+                <a:t>3</a:t>
+              </a:r>
+            </a:p>
+          </p:txBody>
+        </p:sp>
+        <p:sp>
+          <p:nvSpPr>
+            <p:cNvPr id="73" name="TextBox 72">
+              <a:extLst>
+                <a:ext uri="{FF2B5EF4-FFF2-40B4-BE49-F238E27FC236}">
+                  <a16:creationId xmlns:a16="http://schemas.microsoft.com/office/drawing/2014/main" id="{6AE87088-96DD-AA06-D95A-E2AF2E1D6E44}"/>
+                </a:ext>
+              </a:extLst>
+            </p:cNvPr>
+            <p:cNvSpPr txBox="1"/>
+            <p:nvPr/>
+          </p:nvSpPr>
+          <p:spPr>
+            <a:xfrm>
+              <a:off x="9351491" y="3909949"/>
+              <a:ext cx="409086" cy="400110"/>
+            </a:xfrm>
+            <a:prstGeom prst="rect">
+              <a:avLst/>
+            </a:prstGeom>
+            <a:noFill/>
+          </p:spPr>
+          <p:txBody>
+            <a:bodyPr wrap="none" rtlCol="0">
+              <a:spAutoFit/>
+            </a:bodyPr>
+            <a:lstStyle/>
+            <a:p>
+              <a:r>
+                <a:rPr lang="en-US" sz="2000" dirty="0"/>
+                <a:t>Z</a:t>
+              </a:r>
+              <a:r>
+                <a:rPr lang="en-US" sz="2000" baseline="-25000" dirty="0"/>
+                <a:t>3</a:t>
+              </a:r>
+            </a:p>
+          </p:txBody>
+        </p:sp>
+        <p:sp>
+          <p:nvSpPr>
+            <p:cNvPr id="74" name="TextBox 73">
+              <a:extLst>
+                <a:ext uri="{FF2B5EF4-FFF2-40B4-BE49-F238E27FC236}">
+                  <a16:creationId xmlns:a16="http://schemas.microsoft.com/office/drawing/2014/main" id="{50358F6A-5637-8C01-E942-6234C5FD2171}"/>
+                </a:ext>
+              </a:extLst>
+            </p:cNvPr>
+            <p:cNvSpPr txBox="1"/>
+            <p:nvPr/>
+          </p:nvSpPr>
+          <p:spPr>
+            <a:xfrm>
+              <a:off x="8485245" y="4098140"/>
+              <a:ext cx="413896" cy="400110"/>
+            </a:xfrm>
+            <a:prstGeom prst="rect">
+              <a:avLst/>
+            </a:prstGeom>
+            <a:noFill/>
+          </p:spPr>
+          <p:txBody>
+            <a:bodyPr wrap="none" rtlCol="0">
+              <a:spAutoFit/>
+            </a:bodyPr>
+            <a:lstStyle/>
+            <a:p>
+              <a:r>
+                <a:rPr lang="en-US" sz="2000" dirty="0"/>
+                <a:t>Y</a:t>
+              </a:r>
+              <a:r>
+                <a:rPr lang="en-US" sz="2000" baseline="-25000" dirty="0"/>
+                <a:t>3</a:t>
+              </a:r>
+            </a:p>
+          </p:txBody>
+        </p:sp>
+      </p:grpSp>
+      <p:pic>
+        <p:nvPicPr>
+          <p:cNvPr id="78" name="Picture 77">
+            <a:extLst>
+              <a:ext uri="{FF2B5EF4-FFF2-40B4-BE49-F238E27FC236}">
+                <a16:creationId xmlns:a16="http://schemas.microsoft.com/office/drawing/2014/main" id="{536ECC96-BB77-CF78-3BA9-18EAE700A072}"/>
+              </a:ext>
+            </a:extLst>
+          </p:cNvPr>
+          <p:cNvPicPr>
+            <a:picLocks noChangeAspect="1"/>
+          </p:cNvPicPr>
+          <p:nvPr/>
+        </p:nvPicPr>
+        <p:blipFill>
+          <a:blip r:embed="rId2"/>
+          <a:stretch>
+            <a:fillRect/>
+          </a:stretch>
+        </p:blipFill>
+        <p:spPr>
+          <a:xfrm>
+            <a:off x="7540443" y="4813472"/>
+            <a:ext cx="5334000" cy="2171700"/>
+          </a:xfrm>
+          <a:prstGeom prst="rect">
+            <a:avLst/>
+          </a:prstGeom>
+        </p:spPr>
+      </p:pic>
+      <p:sp>
+        <p:nvSpPr>
+          <p:cNvPr id="6" name="TextBox 5">
+            <a:extLst>
+              <a:ext uri="{FF2B5EF4-FFF2-40B4-BE49-F238E27FC236}">
+                <a16:creationId xmlns:a16="http://schemas.microsoft.com/office/drawing/2014/main" id="{3494B4AD-D608-7CA2-29C8-A12A35A324BD}"/>
+              </a:ext>
+            </a:extLst>
+          </p:cNvPr>
+          <p:cNvSpPr txBox="1"/>
+          <p:nvPr/>
+        </p:nvSpPr>
+        <p:spPr>
+          <a:xfrm>
+            <a:off x="196296" y="165885"/>
+            <a:ext cx="1211998" cy="369332"/>
+          </a:xfrm>
+          <a:prstGeom prst="rect">
+            <a:avLst/>
+          </a:prstGeom>
+          <a:noFill/>
+        </p:spPr>
+        <p:txBody>
+          <a:bodyPr wrap="none" rtlCol="0">
+            <a:spAutoFit/>
+          </a:bodyPr>
+          <a:lstStyle/>
+          <a:p>
+            <a:r>
+              <a:rPr lang="en-US" dirty="0"/>
+              <a:t>New order</a:t>
+            </a:r>
+          </a:p>
+        </p:txBody>
+      </p:sp>
+      <p:grpSp>
+        <p:nvGrpSpPr>
+          <p:cNvPr id="95" name="Group 94">
+            <a:extLst>
+              <a:ext uri="{FF2B5EF4-FFF2-40B4-BE49-F238E27FC236}">
+                <a16:creationId xmlns:a16="http://schemas.microsoft.com/office/drawing/2014/main" id="{2E074E4C-C0C1-AD17-EA30-C728F461D334}"/>
+              </a:ext>
+            </a:extLst>
+          </p:cNvPr>
+          <p:cNvGrpSpPr/>
+          <p:nvPr/>
+        </p:nvGrpSpPr>
+        <p:grpSpPr>
+          <a:xfrm>
+            <a:off x="6496643" y="768648"/>
+            <a:ext cx="1435746" cy="1600673"/>
+            <a:chOff x="8672327" y="3807905"/>
+            <a:chExt cx="1435746" cy="1600673"/>
+          </a:xfrm>
+        </p:grpSpPr>
+        <p:cxnSp>
+          <p:nvCxnSpPr>
+            <p:cNvPr id="39" name="Straight Arrow Connector 38">
+              <a:extLst>
+                <a:ext uri="{FF2B5EF4-FFF2-40B4-BE49-F238E27FC236}">
+                  <a16:creationId xmlns:a16="http://schemas.microsoft.com/office/drawing/2014/main" id="{46DDC872-B033-4FC9-5D7E-E8B3CB5E8D73}"/>
+                </a:ext>
+              </a:extLst>
+            </p:cNvPr>
+            <p:cNvCxnSpPr>
+              <a:cxnSpLocks/>
+            </p:cNvCxnSpPr>
+            <p:nvPr/>
+          </p:nvCxnSpPr>
+          <p:spPr>
+            <a:xfrm>
+              <a:off x="9086223" y="4323810"/>
+              <a:ext cx="9171" cy="809387"/>
+            </a:xfrm>
+            <a:prstGeom prst="straightConnector1">
+              <a:avLst/>
+            </a:prstGeom>
+            <a:ln w="38100">
+              <a:solidFill>
+                <a:schemeClr val="tx2">
+                  <a:lumMod val="50000"/>
+                  <a:lumOff val="50000"/>
+                </a:schemeClr>
+              </a:solidFill>
+              <a:tailEnd type="triangle"/>
+            </a:ln>
+          </p:spPr>
+          <p:style>
+            <a:lnRef idx="2">
+              <a:schemeClr val="dk1"/>
+            </a:lnRef>
+            <a:fillRef idx="0">
+              <a:schemeClr val="dk1"/>
+            </a:fillRef>
+            <a:effectRef idx="1">
+              <a:schemeClr val="dk1"/>
+            </a:effectRef>
+            <a:fontRef idx="minor">
+              <a:schemeClr val="tx1"/>
+            </a:fontRef>
+          </p:style>
+        </p:cxnSp>
+        <p:cxnSp>
+          <p:nvCxnSpPr>
+            <p:cNvPr id="40" name="Straight Arrow Connector 39">
+              <a:extLst>
+                <a:ext uri="{FF2B5EF4-FFF2-40B4-BE49-F238E27FC236}">
+                  <a16:creationId xmlns:a16="http://schemas.microsoft.com/office/drawing/2014/main" id="{B6580AE8-FC98-F1EF-7429-C28E0946B84B}"/>
+                </a:ext>
+              </a:extLst>
+            </p:cNvPr>
+            <p:cNvCxnSpPr>
+              <a:cxnSpLocks/>
+            </p:cNvCxnSpPr>
+            <p:nvPr/>
+          </p:nvCxnSpPr>
+          <p:spPr>
+            <a:xfrm flipV="1">
+              <a:off x="9086223" y="4317141"/>
+              <a:ext cx="692977" cy="6669"/>
+            </a:xfrm>
+            <a:prstGeom prst="straightConnector1">
+              <a:avLst/>
+            </a:prstGeom>
+            <a:ln w="38100">
+              <a:solidFill>
+                <a:schemeClr val="tx2">
+                  <a:lumMod val="50000"/>
+                  <a:lumOff val="50000"/>
+                </a:schemeClr>
+              </a:solidFill>
+              <a:tailEnd type="triangle"/>
+            </a:ln>
+          </p:spPr>
+          <p:style>
+            <a:lnRef idx="2">
+              <a:schemeClr val="dk1"/>
+            </a:lnRef>
+            <a:fillRef idx="0">
+              <a:schemeClr val="dk1"/>
+            </a:fillRef>
+            <a:effectRef idx="1">
+              <a:schemeClr val="dk1"/>
+            </a:effectRef>
+            <a:fontRef idx="minor">
+              <a:schemeClr val="tx1"/>
+            </a:fontRef>
+          </p:style>
+        </p:cxnSp>
+        <p:cxnSp>
+          <p:nvCxnSpPr>
+            <p:cNvPr id="41" name="Straight Arrow Connector 40">
+              <a:extLst>
+                <a:ext uri="{FF2B5EF4-FFF2-40B4-BE49-F238E27FC236}">
+                  <a16:creationId xmlns:a16="http://schemas.microsoft.com/office/drawing/2014/main" id="{A516E6B8-4041-E25D-3609-CAD86C5BD83C}"/>
+                </a:ext>
+              </a:extLst>
+            </p:cNvPr>
+            <p:cNvCxnSpPr>
+              <a:cxnSpLocks/>
+            </p:cNvCxnSpPr>
+            <p:nvPr/>
+          </p:nvCxnSpPr>
+          <p:spPr>
+            <a:xfrm flipH="1">
+              <a:off x="8810597" y="4323810"/>
+              <a:ext cx="275626" cy="262587"/>
+            </a:xfrm>
+            <a:prstGeom prst="straightConnector1">
+              <a:avLst/>
+            </a:prstGeom>
+            <a:ln w="38100">
+              <a:solidFill>
+                <a:schemeClr val="tx2">
+                  <a:lumMod val="50000"/>
+                  <a:lumOff val="50000"/>
+                </a:schemeClr>
+              </a:solidFill>
+              <a:tailEnd type="triangle"/>
+            </a:ln>
+          </p:spPr>
+          <p:style>
+            <a:lnRef idx="2">
+              <a:schemeClr val="dk1"/>
+            </a:lnRef>
+            <a:fillRef idx="0">
+              <a:schemeClr val="dk1"/>
+            </a:fillRef>
+            <a:effectRef idx="1">
+              <a:schemeClr val="dk1"/>
+            </a:effectRef>
+            <a:fontRef idx="minor">
+              <a:schemeClr val="tx1"/>
+            </a:fontRef>
+          </p:style>
+        </p:cxnSp>
+        <p:sp>
+          <p:nvSpPr>
+            <p:cNvPr id="42" name="TextBox 41">
+              <a:extLst>
+                <a:ext uri="{FF2B5EF4-FFF2-40B4-BE49-F238E27FC236}">
+                  <a16:creationId xmlns:a16="http://schemas.microsoft.com/office/drawing/2014/main" id="{467A0B55-DE40-29B3-4DC8-4C2EC054400D}"/>
+                </a:ext>
+              </a:extLst>
+            </p:cNvPr>
+            <p:cNvSpPr txBox="1"/>
+            <p:nvPr/>
+          </p:nvSpPr>
+          <p:spPr>
+            <a:xfrm>
+              <a:off x="9690971" y="3807905"/>
+              <a:ext cx="417102" cy="400110"/>
+            </a:xfrm>
+            <a:prstGeom prst="rect">
+              <a:avLst/>
+            </a:prstGeom>
+            <a:noFill/>
+          </p:spPr>
+          <p:txBody>
+            <a:bodyPr wrap="none" rtlCol="0">
+              <a:spAutoFit/>
+            </a:bodyPr>
+            <a:lstStyle/>
+            <a:p>
+              <a:r>
+                <a:rPr lang="en-US" sz="2000" dirty="0"/>
+                <a:t>X</a:t>
+              </a:r>
+              <a:r>
+                <a:rPr lang="en-US" sz="2000" baseline="-25000" dirty="0"/>
+                <a:t>5</a:t>
+              </a:r>
+            </a:p>
+          </p:txBody>
+        </p:sp>
+        <p:sp>
+          <p:nvSpPr>
+            <p:cNvPr id="43" name="TextBox 42">
+              <a:extLst>
+                <a:ext uri="{FF2B5EF4-FFF2-40B4-BE49-F238E27FC236}">
+                  <a16:creationId xmlns:a16="http://schemas.microsoft.com/office/drawing/2014/main" id="{0BAD6E37-5747-2892-D475-D3B182795F29}"/>
+                </a:ext>
+              </a:extLst>
+            </p:cNvPr>
+            <p:cNvSpPr txBox="1"/>
+            <p:nvPr/>
+          </p:nvSpPr>
+          <p:spPr>
+            <a:xfrm>
+              <a:off x="9360953" y="5008468"/>
+              <a:ext cx="409086" cy="400110"/>
+            </a:xfrm>
+            <a:prstGeom prst="rect">
+              <a:avLst/>
+            </a:prstGeom>
+            <a:noFill/>
+          </p:spPr>
+          <p:txBody>
+            <a:bodyPr wrap="none" rtlCol="0">
+              <a:spAutoFit/>
+            </a:bodyPr>
+            <a:lstStyle/>
+            <a:p>
+              <a:r>
+                <a:rPr lang="en-US" sz="2000" dirty="0"/>
+                <a:t>Z</a:t>
+              </a:r>
+              <a:r>
+                <a:rPr lang="en-US" sz="2000" baseline="-25000" dirty="0"/>
+                <a:t>5</a:t>
+              </a:r>
+            </a:p>
+          </p:txBody>
+        </p:sp>
+        <p:sp>
+          <p:nvSpPr>
+            <p:cNvPr id="44" name="TextBox 43">
+              <a:extLst>
+                <a:ext uri="{FF2B5EF4-FFF2-40B4-BE49-F238E27FC236}">
+                  <a16:creationId xmlns:a16="http://schemas.microsoft.com/office/drawing/2014/main" id="{ECB2A78F-8EED-1FF2-6D7A-CFFDDFC00DB3}"/>
+                </a:ext>
+              </a:extLst>
+            </p:cNvPr>
+            <p:cNvSpPr txBox="1"/>
+            <p:nvPr/>
+          </p:nvSpPr>
+          <p:spPr>
+            <a:xfrm>
+              <a:off x="8672327" y="3930210"/>
+              <a:ext cx="413896" cy="400110"/>
+            </a:xfrm>
+            <a:prstGeom prst="rect">
+              <a:avLst/>
+            </a:prstGeom>
+            <a:noFill/>
+          </p:spPr>
+          <p:txBody>
+            <a:bodyPr wrap="none" rtlCol="0">
+              <a:spAutoFit/>
+            </a:bodyPr>
+            <a:lstStyle/>
+            <a:p>
+              <a:r>
+                <a:rPr lang="en-US" sz="2000" dirty="0"/>
+                <a:t>Y</a:t>
+              </a:r>
+              <a:r>
+                <a:rPr lang="en-US" sz="2000" baseline="-25000" dirty="0"/>
+                <a:t>5</a:t>
+              </a:r>
+            </a:p>
+          </p:txBody>
+        </p:sp>
+      </p:grpSp>
+      <p:cxnSp>
+        <p:nvCxnSpPr>
+          <p:cNvPr id="7" name="Straight Connector 6">
+            <a:extLst>
+              <a:ext uri="{FF2B5EF4-FFF2-40B4-BE49-F238E27FC236}">
+                <a16:creationId xmlns:a16="http://schemas.microsoft.com/office/drawing/2014/main" id="{71539FC9-B686-1B72-5F4B-8D3057160605}"/>
+              </a:ext>
+            </a:extLst>
+          </p:cNvPr>
+          <p:cNvCxnSpPr>
+            <a:cxnSpLocks/>
+          </p:cNvCxnSpPr>
+          <p:nvPr/>
+        </p:nvCxnSpPr>
+        <p:spPr>
+          <a:xfrm flipH="1">
+            <a:off x="5609146" y="1596876"/>
+            <a:ext cx="943450" cy="873622"/>
+          </a:xfrm>
+          <a:prstGeom prst="line">
+            <a:avLst/>
+          </a:prstGeom>
+          <a:ln w="19050" cap="flat" cmpd="sng" algn="ctr">
+            <a:solidFill>
+              <a:schemeClr val="dk1"/>
+            </a:solidFill>
+            <a:prstDash val="dash"/>
+            <a:round/>
+            <a:headEnd type="none" w="med" len="med"/>
+            <a:tailEnd type="none" w="med" len="med"/>
+          </a:ln>
+        </p:spPr>
+        <p:style>
+          <a:lnRef idx="0">
+            <a:scrgbClr r="0" g="0" b="0"/>
+          </a:lnRef>
+          <a:fillRef idx="0">
+            <a:scrgbClr r="0" g="0" b="0"/>
+          </a:fillRef>
+          <a:effectRef idx="0">
+            <a:scrgbClr r="0" g="0" b="0"/>
+          </a:effectRef>
+          <a:fontRef idx="minor">
+            <a:schemeClr val="tx1"/>
+          </a:fontRef>
+        </p:style>
+      </p:cxnSp>
+      <p:grpSp>
+        <p:nvGrpSpPr>
+          <p:cNvPr id="9" name="Group 8">
+            <a:extLst>
+              <a:ext uri="{FF2B5EF4-FFF2-40B4-BE49-F238E27FC236}">
+                <a16:creationId xmlns:a16="http://schemas.microsoft.com/office/drawing/2014/main" id="{1482150D-F2B1-C743-6D1A-4CC1D3A00CF1}"/>
+              </a:ext>
+            </a:extLst>
+          </p:cNvPr>
+          <p:cNvGrpSpPr/>
+          <p:nvPr/>
+        </p:nvGrpSpPr>
+        <p:grpSpPr>
+          <a:xfrm>
+            <a:off x="5484858" y="3497241"/>
+            <a:ext cx="248575" cy="471998"/>
+            <a:chOff x="2246050" y="1305017"/>
+            <a:chExt cx="204187" cy="471998"/>
+          </a:xfrm>
+        </p:grpSpPr>
+        <p:sp>
+          <p:nvSpPr>
+            <p:cNvPr id="11" name="Isosceles Triangle 10">
+              <a:extLst>
+                <a:ext uri="{FF2B5EF4-FFF2-40B4-BE49-F238E27FC236}">
+                  <a16:creationId xmlns:a16="http://schemas.microsoft.com/office/drawing/2014/main" id="{F1AA208A-7275-5245-E64B-41B855D541B8}"/>
+                </a:ext>
+              </a:extLst>
+            </p:cNvPr>
+            <p:cNvSpPr/>
+            <p:nvPr/>
+          </p:nvSpPr>
+          <p:spPr>
+            <a:xfrm>
+              <a:off x="2246050" y="1305017"/>
+              <a:ext cx="204187" cy="213065"/>
+            </a:xfrm>
+            <a:prstGeom prst="triangle">
+              <a:avLst/>
+            </a:prstGeom>
+          </p:spPr>
+          <p:style>
+            <a:lnRef idx="2">
+              <a:schemeClr val="dk1">
+                <a:shade val="15000"/>
+              </a:schemeClr>
+            </a:lnRef>
+            <a:fillRef idx="1">
+              <a:schemeClr val="dk1"/>
+            </a:fillRef>
+            <a:effectRef idx="0">
+              <a:schemeClr val="dk1"/>
+            </a:effectRef>
+            <a:fontRef idx="minor">
+              <a:schemeClr val="lt1"/>
+            </a:fontRef>
+          </p:style>
+          <p:txBody>
+            <a:bodyPr rtlCol="0" anchor="ctr"/>
+            <a:lstStyle/>
+            <a:p>
+              <a:pPr algn="ctr"/>
+              <a:endParaRPr lang="en-US"/>
+            </a:p>
+          </p:txBody>
+        </p:sp>
+        <p:sp>
+          <p:nvSpPr>
+            <p:cNvPr id="13" name="Isosceles Triangle 12">
+              <a:extLst>
+                <a:ext uri="{FF2B5EF4-FFF2-40B4-BE49-F238E27FC236}">
+                  <a16:creationId xmlns:a16="http://schemas.microsoft.com/office/drawing/2014/main" id="{2BFC611C-D9BF-8E32-0615-6C721A5F2005}"/>
+                </a:ext>
+              </a:extLst>
+            </p:cNvPr>
+            <p:cNvSpPr/>
+            <p:nvPr/>
+          </p:nvSpPr>
+          <p:spPr>
+            <a:xfrm rot="10800000">
+              <a:off x="2246050" y="1563950"/>
+              <a:ext cx="204187" cy="213065"/>
+            </a:xfrm>
+            <a:prstGeom prst="triangle">
+              <a:avLst/>
+            </a:prstGeom>
+          </p:spPr>
+          <p:style>
+            <a:lnRef idx="2">
+              <a:schemeClr val="dk1">
+                <a:shade val="15000"/>
+              </a:schemeClr>
+            </a:lnRef>
+            <a:fillRef idx="1">
+              <a:schemeClr val="dk1"/>
+            </a:fillRef>
+            <a:effectRef idx="0">
+              <a:schemeClr val="dk1"/>
+            </a:effectRef>
+            <a:fontRef idx="minor">
+              <a:schemeClr val="lt1"/>
+            </a:fontRef>
+          </p:style>
+          <p:txBody>
+            <a:bodyPr rtlCol="0" anchor="ctr"/>
+            <a:lstStyle/>
+            <a:p>
+              <a:pPr algn="ctr"/>
+              <a:endParaRPr lang="en-US"/>
+            </a:p>
+          </p:txBody>
+        </p:sp>
+      </p:grpSp>
+      <p:grpSp>
+        <p:nvGrpSpPr>
+          <p:cNvPr id="14" name="Group 13">
+            <a:extLst>
+              <a:ext uri="{FF2B5EF4-FFF2-40B4-BE49-F238E27FC236}">
+                <a16:creationId xmlns:a16="http://schemas.microsoft.com/office/drawing/2014/main" id="{E0C90A47-3537-5F30-4206-0A3F18340034}"/>
+              </a:ext>
+            </a:extLst>
+          </p:cNvPr>
+          <p:cNvGrpSpPr/>
+          <p:nvPr/>
+        </p:nvGrpSpPr>
+        <p:grpSpPr>
+          <a:xfrm>
+            <a:off x="5209321" y="4141280"/>
+            <a:ext cx="1435746" cy="1600673"/>
+            <a:chOff x="8672327" y="3807905"/>
+            <a:chExt cx="1435746" cy="1600673"/>
+          </a:xfrm>
+        </p:grpSpPr>
+        <p:cxnSp>
+          <p:nvCxnSpPr>
+            <p:cNvPr id="23" name="Straight Arrow Connector 22">
+              <a:extLst>
+                <a:ext uri="{FF2B5EF4-FFF2-40B4-BE49-F238E27FC236}">
+                  <a16:creationId xmlns:a16="http://schemas.microsoft.com/office/drawing/2014/main" id="{AF692DD3-59EB-342F-1B23-95C9C88606CD}"/>
+                </a:ext>
+              </a:extLst>
+            </p:cNvPr>
+            <p:cNvCxnSpPr>
+              <a:cxnSpLocks/>
+            </p:cNvCxnSpPr>
+            <p:nvPr/>
+          </p:nvCxnSpPr>
+          <p:spPr>
+            <a:xfrm>
+              <a:off x="9086223" y="4323810"/>
+              <a:ext cx="9171" cy="809387"/>
+            </a:xfrm>
+            <a:prstGeom prst="straightConnector1">
+              <a:avLst/>
+            </a:prstGeom>
+            <a:ln w="38100">
+              <a:solidFill>
+                <a:schemeClr val="tx2">
+                  <a:lumMod val="50000"/>
+                  <a:lumOff val="50000"/>
+                </a:schemeClr>
+              </a:solidFill>
+              <a:tailEnd type="triangle"/>
+            </a:ln>
+          </p:spPr>
+          <p:style>
+            <a:lnRef idx="2">
+              <a:schemeClr val="dk1"/>
+            </a:lnRef>
+            <a:fillRef idx="0">
+              <a:schemeClr val="dk1"/>
+            </a:fillRef>
+            <a:effectRef idx="1">
+              <a:schemeClr val="dk1"/>
+            </a:effectRef>
+            <a:fontRef idx="minor">
+              <a:schemeClr val="tx1"/>
+            </a:fontRef>
+          </p:style>
+        </p:cxnSp>
+        <p:cxnSp>
+          <p:nvCxnSpPr>
+            <p:cNvPr id="26" name="Straight Arrow Connector 25">
+              <a:extLst>
+                <a:ext uri="{FF2B5EF4-FFF2-40B4-BE49-F238E27FC236}">
+                  <a16:creationId xmlns:a16="http://schemas.microsoft.com/office/drawing/2014/main" id="{F474702E-E34E-F1CF-7542-79250438BB7D}"/>
+                </a:ext>
+              </a:extLst>
+            </p:cNvPr>
+            <p:cNvCxnSpPr>
+              <a:cxnSpLocks/>
+            </p:cNvCxnSpPr>
+            <p:nvPr/>
+          </p:nvCxnSpPr>
+          <p:spPr>
+            <a:xfrm flipV="1">
+              <a:off x="9086223" y="4317141"/>
+              <a:ext cx="692977" cy="6669"/>
+            </a:xfrm>
+            <a:prstGeom prst="straightConnector1">
+              <a:avLst/>
+            </a:prstGeom>
+            <a:ln w="38100">
+              <a:solidFill>
+                <a:schemeClr val="tx2">
+                  <a:lumMod val="50000"/>
+                  <a:lumOff val="50000"/>
+                </a:schemeClr>
+              </a:solidFill>
+              <a:tailEnd type="triangle"/>
+            </a:ln>
+          </p:spPr>
+          <p:style>
+            <a:lnRef idx="2">
+              <a:schemeClr val="dk1"/>
+            </a:lnRef>
+            <a:fillRef idx="0">
+              <a:schemeClr val="dk1"/>
+            </a:fillRef>
+            <a:effectRef idx="1">
+              <a:schemeClr val="dk1"/>
+            </a:effectRef>
+            <a:fontRef idx="minor">
+              <a:schemeClr val="tx1"/>
+            </a:fontRef>
+          </p:style>
+        </p:cxnSp>
+        <p:cxnSp>
+          <p:nvCxnSpPr>
+            <p:cNvPr id="27" name="Straight Arrow Connector 26">
+              <a:extLst>
+                <a:ext uri="{FF2B5EF4-FFF2-40B4-BE49-F238E27FC236}">
+                  <a16:creationId xmlns:a16="http://schemas.microsoft.com/office/drawing/2014/main" id="{0D9C8E79-D26F-E01F-9F7D-4E0EFFA2038C}"/>
+                </a:ext>
+              </a:extLst>
+            </p:cNvPr>
+            <p:cNvCxnSpPr>
+              <a:cxnSpLocks/>
+            </p:cNvCxnSpPr>
+            <p:nvPr/>
+          </p:nvCxnSpPr>
+          <p:spPr>
+            <a:xfrm flipH="1">
+              <a:off x="8810597" y="4323810"/>
+              <a:ext cx="275626" cy="262587"/>
+            </a:xfrm>
+            <a:prstGeom prst="straightConnector1">
+              <a:avLst/>
+            </a:prstGeom>
+            <a:ln w="38100">
+              <a:solidFill>
+                <a:schemeClr val="tx2">
+                  <a:lumMod val="50000"/>
+                  <a:lumOff val="50000"/>
+                </a:schemeClr>
+              </a:solidFill>
+              <a:tailEnd type="triangle"/>
+            </a:ln>
+          </p:spPr>
+          <p:style>
+            <a:lnRef idx="2">
+              <a:schemeClr val="dk1"/>
+            </a:lnRef>
+            <a:fillRef idx="0">
+              <a:schemeClr val="dk1"/>
+            </a:fillRef>
+            <a:effectRef idx="1">
+              <a:schemeClr val="dk1"/>
+            </a:effectRef>
+            <a:fontRef idx="minor">
+              <a:schemeClr val="tx1"/>
+            </a:fontRef>
+          </p:style>
+        </p:cxnSp>
+        <p:sp>
+          <p:nvSpPr>
+            <p:cNvPr id="28" name="TextBox 27">
+              <a:extLst>
+                <a:ext uri="{FF2B5EF4-FFF2-40B4-BE49-F238E27FC236}">
+                  <a16:creationId xmlns:a16="http://schemas.microsoft.com/office/drawing/2014/main" id="{925EE3D8-609B-A956-C116-FE404D91273C}"/>
+                </a:ext>
+              </a:extLst>
+            </p:cNvPr>
+            <p:cNvSpPr txBox="1"/>
+            <p:nvPr/>
+          </p:nvSpPr>
+          <p:spPr>
+            <a:xfrm>
+              <a:off x="9690971" y="3807905"/>
+              <a:ext cx="417102" cy="400110"/>
+            </a:xfrm>
+            <a:prstGeom prst="rect">
+              <a:avLst/>
+            </a:prstGeom>
+            <a:noFill/>
+          </p:spPr>
+          <p:txBody>
+            <a:bodyPr wrap="none" rtlCol="0">
+              <a:spAutoFit/>
+            </a:bodyPr>
+            <a:lstStyle/>
+            <a:p>
+              <a:r>
+                <a:rPr lang="en-US" sz="2000" dirty="0"/>
+                <a:t>X</a:t>
+              </a:r>
+              <a:r>
+                <a:rPr lang="en-US" sz="2000" baseline="-25000" dirty="0"/>
+                <a:t>6</a:t>
+              </a:r>
+            </a:p>
+          </p:txBody>
+        </p:sp>
+        <p:sp>
+          <p:nvSpPr>
+            <p:cNvPr id="75" name="TextBox 74">
+              <a:extLst>
+                <a:ext uri="{FF2B5EF4-FFF2-40B4-BE49-F238E27FC236}">
+                  <a16:creationId xmlns:a16="http://schemas.microsoft.com/office/drawing/2014/main" id="{B3383A21-99F7-AF9E-82D4-D12C7FD3C328}"/>
+                </a:ext>
+              </a:extLst>
+            </p:cNvPr>
+            <p:cNvSpPr txBox="1"/>
+            <p:nvPr/>
+          </p:nvSpPr>
+          <p:spPr>
+            <a:xfrm>
+              <a:off x="9360953" y="5008468"/>
+              <a:ext cx="409086" cy="400110"/>
+            </a:xfrm>
+            <a:prstGeom prst="rect">
+              <a:avLst/>
+            </a:prstGeom>
+            <a:noFill/>
+          </p:spPr>
+          <p:txBody>
+            <a:bodyPr wrap="none" rtlCol="0">
+              <a:spAutoFit/>
+            </a:bodyPr>
+            <a:lstStyle/>
+            <a:p>
+              <a:r>
+                <a:rPr lang="en-US" sz="2000" dirty="0"/>
+                <a:t>Z</a:t>
+              </a:r>
+              <a:r>
+                <a:rPr lang="en-US" sz="2000" baseline="-25000" dirty="0"/>
+                <a:t>6</a:t>
+              </a:r>
+            </a:p>
+          </p:txBody>
+        </p:sp>
+        <p:sp>
+          <p:nvSpPr>
+            <p:cNvPr id="76" name="TextBox 75">
+              <a:extLst>
+                <a:ext uri="{FF2B5EF4-FFF2-40B4-BE49-F238E27FC236}">
+                  <a16:creationId xmlns:a16="http://schemas.microsoft.com/office/drawing/2014/main" id="{BC97FA24-80CE-5E12-3145-2624FE1CB1A3}"/>
+                </a:ext>
+              </a:extLst>
+            </p:cNvPr>
+            <p:cNvSpPr txBox="1"/>
+            <p:nvPr/>
+          </p:nvSpPr>
+          <p:spPr>
+            <a:xfrm>
+              <a:off x="8672327" y="3930210"/>
+              <a:ext cx="413896" cy="400110"/>
+            </a:xfrm>
+            <a:prstGeom prst="rect">
+              <a:avLst/>
+            </a:prstGeom>
+            <a:noFill/>
+          </p:spPr>
+          <p:txBody>
+            <a:bodyPr wrap="none" rtlCol="0">
+              <a:spAutoFit/>
+            </a:bodyPr>
+            <a:lstStyle/>
+            <a:p>
+              <a:r>
+                <a:rPr lang="en-US" sz="2000" dirty="0"/>
+                <a:t>Y</a:t>
+              </a:r>
+              <a:r>
+                <a:rPr lang="en-US" sz="2000" baseline="-25000" dirty="0"/>
+                <a:t>6</a:t>
+              </a:r>
+            </a:p>
+          </p:txBody>
+        </p:sp>
+      </p:grpSp>
+    </p:spTree>
+    <p:extLst>
+      <p:ext uri="{BB962C8B-B14F-4D97-AF65-F5344CB8AC3E}">
+        <p14:creationId xmlns:p14="http://schemas.microsoft.com/office/powerpoint/2010/main" val="1200385048"/>
       </p:ext>
     </p:extLst>
   </p:cSld>
@@ -30382,7 +34467,7 @@
           <a:p>
             <a:r>
               <a:rPr lang="en-US" dirty="0"/>
-              <a:t>a3</a:t>
+              <a:t>d4</a:t>
             </a:r>
           </a:p>
         </p:txBody>
@@ -31806,7 +35891,7 @@
         </p:nvGrpSpPr>
         <p:grpSpPr>
           <a:xfrm>
-            <a:off x="3847360" y="909042"/>
+            <a:off x="3161492" y="921758"/>
             <a:ext cx="1275332" cy="1264818"/>
             <a:chOff x="8485245" y="3442476"/>
             <a:chExt cx="1275332" cy="1264818"/>

</xml_diff>

<commit_message>
Moved JJ and BJ tm to robot class and it is working
</commit_message>
<xml_diff>
--- a/Doc/Denavit-Hartenberg.pptx
+++ b/Doc/Denavit-Hartenberg.pptx
@@ -262,7 +262,7 @@
           <a:p>
             <a:fld id="{62A70C6D-A3C4-4C44-A745-7E174427F35D}" type="datetimeFigureOut">
               <a:rPr lang="en-US" smtClean="0"/>
-              <a:t>5/9/2024</a:t>
+              <a:t>5/10/2024</a:t>
             </a:fld>
             <a:endParaRPr lang="en-US"/>
           </a:p>
@@ -460,7 +460,7 @@
           <a:p>
             <a:fld id="{62A70C6D-A3C4-4C44-A745-7E174427F35D}" type="datetimeFigureOut">
               <a:rPr lang="en-US" smtClean="0"/>
-              <a:t>5/9/2024</a:t>
+              <a:t>5/10/2024</a:t>
             </a:fld>
             <a:endParaRPr lang="en-US"/>
           </a:p>
@@ -668,7 +668,7 @@
           <a:p>
             <a:fld id="{62A70C6D-A3C4-4C44-A745-7E174427F35D}" type="datetimeFigureOut">
               <a:rPr lang="en-US" smtClean="0"/>
-              <a:t>5/9/2024</a:t>
+              <a:t>5/10/2024</a:t>
             </a:fld>
             <a:endParaRPr lang="en-US"/>
           </a:p>
@@ -866,7 +866,7 @@
           <a:p>
             <a:fld id="{62A70C6D-A3C4-4C44-A745-7E174427F35D}" type="datetimeFigureOut">
               <a:rPr lang="en-US" smtClean="0"/>
-              <a:t>5/9/2024</a:t>
+              <a:t>5/10/2024</a:t>
             </a:fld>
             <a:endParaRPr lang="en-US"/>
           </a:p>
@@ -1141,7 +1141,7 @@
           <a:p>
             <a:fld id="{62A70C6D-A3C4-4C44-A745-7E174427F35D}" type="datetimeFigureOut">
               <a:rPr lang="en-US" smtClean="0"/>
-              <a:t>5/9/2024</a:t>
+              <a:t>5/10/2024</a:t>
             </a:fld>
             <a:endParaRPr lang="en-US"/>
           </a:p>
@@ -1406,7 +1406,7 @@
           <a:p>
             <a:fld id="{62A70C6D-A3C4-4C44-A745-7E174427F35D}" type="datetimeFigureOut">
               <a:rPr lang="en-US" smtClean="0"/>
-              <a:t>5/9/2024</a:t>
+              <a:t>5/10/2024</a:t>
             </a:fld>
             <a:endParaRPr lang="en-US"/>
           </a:p>
@@ -1818,7 +1818,7 @@
           <a:p>
             <a:fld id="{62A70C6D-A3C4-4C44-A745-7E174427F35D}" type="datetimeFigureOut">
               <a:rPr lang="en-US" smtClean="0"/>
-              <a:t>5/9/2024</a:t>
+              <a:t>5/10/2024</a:t>
             </a:fld>
             <a:endParaRPr lang="en-US"/>
           </a:p>
@@ -1959,7 +1959,7 @@
           <a:p>
             <a:fld id="{62A70C6D-A3C4-4C44-A745-7E174427F35D}" type="datetimeFigureOut">
               <a:rPr lang="en-US" smtClean="0"/>
-              <a:t>5/9/2024</a:t>
+              <a:t>5/10/2024</a:t>
             </a:fld>
             <a:endParaRPr lang="en-US"/>
           </a:p>
@@ -2072,7 +2072,7 @@
           <a:p>
             <a:fld id="{62A70C6D-A3C4-4C44-A745-7E174427F35D}" type="datetimeFigureOut">
               <a:rPr lang="en-US" smtClean="0"/>
-              <a:t>5/9/2024</a:t>
+              <a:t>5/10/2024</a:t>
             </a:fld>
             <a:endParaRPr lang="en-US"/>
           </a:p>
@@ -2383,7 +2383,7 @@
           <a:p>
             <a:fld id="{62A70C6D-A3C4-4C44-A745-7E174427F35D}" type="datetimeFigureOut">
               <a:rPr lang="en-US" smtClean="0"/>
-              <a:t>5/9/2024</a:t>
+              <a:t>5/10/2024</a:t>
             </a:fld>
             <a:endParaRPr lang="en-US"/>
           </a:p>
@@ -2671,7 +2671,7 @@
           <a:p>
             <a:fld id="{62A70C6D-A3C4-4C44-A745-7E174427F35D}" type="datetimeFigureOut">
               <a:rPr lang="en-US" smtClean="0"/>
-              <a:t>5/9/2024</a:t>
+              <a:t>5/10/2024</a:t>
             </a:fld>
             <a:endParaRPr lang="en-US"/>
           </a:p>
@@ -2912,7 +2912,7 @@
           <a:p>
             <a:fld id="{62A70C6D-A3C4-4C44-A745-7E174427F35D}" type="datetimeFigureOut">
               <a:rPr lang="en-US" smtClean="0"/>
-              <a:t>5/9/2024</a:t>
+              <a:t>5/10/2024</a:t>
             </a:fld>
             <a:endParaRPr lang="en-US"/>
           </a:p>

</xml_diff>

<commit_message>
Backup before installing windows
</commit_message>
<xml_diff>
--- a/Doc/Denavit-Hartenberg.pptx
+++ b/Doc/Denavit-Hartenberg.pptx
@@ -7,8 +7,9 @@
   <p:sldIdLst>
     <p:sldId id="270" r:id="rId2"/>
     <p:sldId id="268" r:id="rId3"/>
-    <p:sldId id="269" r:id="rId4"/>
-    <p:sldId id="258" r:id="rId5"/>
+    <p:sldId id="271" r:id="rId4"/>
+    <p:sldId id="269" r:id="rId5"/>
+    <p:sldId id="258" r:id="rId6"/>
   </p:sldIdLst>
   <p:sldSz cx="12192000" cy="6858000"/>
   <p:notesSz cx="6858000" cy="9144000"/>
@@ -262,7 +263,7 @@
           <a:p>
             <a:fld id="{62A70C6D-A3C4-4C44-A745-7E174427F35D}" type="datetimeFigureOut">
               <a:rPr lang="en-US" smtClean="0"/>
-              <a:t>5/10/2024</a:t>
+              <a:t>5/14/2024</a:t>
             </a:fld>
             <a:endParaRPr lang="en-US"/>
           </a:p>
@@ -460,7 +461,7 @@
           <a:p>
             <a:fld id="{62A70C6D-A3C4-4C44-A745-7E174427F35D}" type="datetimeFigureOut">
               <a:rPr lang="en-US" smtClean="0"/>
-              <a:t>5/10/2024</a:t>
+              <a:t>5/14/2024</a:t>
             </a:fld>
             <a:endParaRPr lang="en-US"/>
           </a:p>
@@ -668,7 +669,7 @@
           <a:p>
             <a:fld id="{62A70C6D-A3C4-4C44-A745-7E174427F35D}" type="datetimeFigureOut">
               <a:rPr lang="en-US" smtClean="0"/>
-              <a:t>5/10/2024</a:t>
+              <a:t>5/14/2024</a:t>
             </a:fld>
             <a:endParaRPr lang="en-US"/>
           </a:p>
@@ -866,7 +867,7 @@
           <a:p>
             <a:fld id="{62A70C6D-A3C4-4C44-A745-7E174427F35D}" type="datetimeFigureOut">
               <a:rPr lang="en-US" smtClean="0"/>
-              <a:t>5/10/2024</a:t>
+              <a:t>5/14/2024</a:t>
             </a:fld>
             <a:endParaRPr lang="en-US"/>
           </a:p>
@@ -1141,7 +1142,7 @@
           <a:p>
             <a:fld id="{62A70C6D-A3C4-4C44-A745-7E174427F35D}" type="datetimeFigureOut">
               <a:rPr lang="en-US" smtClean="0"/>
-              <a:t>5/10/2024</a:t>
+              <a:t>5/14/2024</a:t>
             </a:fld>
             <a:endParaRPr lang="en-US"/>
           </a:p>
@@ -1406,7 +1407,7 @@
           <a:p>
             <a:fld id="{62A70C6D-A3C4-4C44-A745-7E174427F35D}" type="datetimeFigureOut">
               <a:rPr lang="en-US" smtClean="0"/>
-              <a:t>5/10/2024</a:t>
+              <a:t>5/14/2024</a:t>
             </a:fld>
             <a:endParaRPr lang="en-US"/>
           </a:p>
@@ -1818,7 +1819,7 @@
           <a:p>
             <a:fld id="{62A70C6D-A3C4-4C44-A745-7E174427F35D}" type="datetimeFigureOut">
               <a:rPr lang="en-US" smtClean="0"/>
-              <a:t>5/10/2024</a:t>
+              <a:t>5/14/2024</a:t>
             </a:fld>
             <a:endParaRPr lang="en-US"/>
           </a:p>
@@ -1959,7 +1960,7 @@
           <a:p>
             <a:fld id="{62A70C6D-A3C4-4C44-A745-7E174427F35D}" type="datetimeFigureOut">
               <a:rPr lang="en-US" smtClean="0"/>
-              <a:t>5/10/2024</a:t>
+              <a:t>5/14/2024</a:t>
             </a:fld>
             <a:endParaRPr lang="en-US"/>
           </a:p>
@@ -2072,7 +2073,7 @@
           <a:p>
             <a:fld id="{62A70C6D-A3C4-4C44-A745-7E174427F35D}" type="datetimeFigureOut">
               <a:rPr lang="en-US" smtClean="0"/>
-              <a:t>5/10/2024</a:t>
+              <a:t>5/14/2024</a:t>
             </a:fld>
             <a:endParaRPr lang="en-US"/>
           </a:p>
@@ -2383,7 +2384,7 @@
           <a:p>
             <a:fld id="{62A70C6D-A3C4-4C44-A745-7E174427F35D}" type="datetimeFigureOut">
               <a:rPr lang="en-US" smtClean="0"/>
-              <a:t>5/10/2024</a:t>
+              <a:t>5/14/2024</a:t>
             </a:fld>
             <a:endParaRPr lang="en-US"/>
           </a:p>
@@ -2671,7 +2672,7 @@
           <a:p>
             <a:fld id="{62A70C6D-A3C4-4C44-A745-7E174427F35D}" type="datetimeFigureOut">
               <a:rPr lang="en-US" smtClean="0"/>
-              <a:t>5/10/2024</a:t>
+              <a:t>5/14/2024</a:t>
             </a:fld>
             <a:endParaRPr lang="en-US"/>
           </a:p>
@@ -2912,7 +2913,7 @@
           <a:p>
             <a:fld id="{62A70C6D-A3C4-4C44-A745-7E174427F35D}" type="datetimeFigureOut">
               <a:rPr lang="en-US" smtClean="0"/>
-              <a:t>5/10/2024</a:t>
+              <a:t>5/14/2024</a:t>
             </a:fld>
             <a:endParaRPr lang="en-US"/>
           </a:p>
@@ -11524,6 +11525,3972 @@
     </p:spTree>
     <p:extLst>
       <p:ext uri="{BB962C8B-B14F-4D97-AF65-F5344CB8AC3E}">
+        <p14:creationId xmlns:p14="http://schemas.microsoft.com/office/powerpoint/2010/main" val="1882708452"/>
+      </p:ext>
+    </p:extLst>
+  </p:cSld>
+  <p:clrMapOvr>
+    <a:masterClrMapping/>
+  </p:clrMapOvr>
+</p:sld>
+</file>
+
+<file path=ppt/slides/slide4.xml><?xml version="1.0" encoding="utf-8"?>
+<p:sld xmlns:a="http://schemas.openxmlformats.org/drawingml/2006/main" xmlns:r="http://schemas.openxmlformats.org/officeDocument/2006/relationships" xmlns:p="http://schemas.openxmlformats.org/presentationml/2006/main">
+  <p:cSld>
+    <p:spTree>
+      <p:nvGrpSpPr>
+        <p:cNvPr id="1" name=""/>
+        <p:cNvGrpSpPr/>
+        <p:nvPr/>
+      </p:nvGrpSpPr>
+      <p:grpSpPr>
+        <a:xfrm>
+          <a:off x="0" y="0"/>
+          <a:ext cx="0" cy="0"/>
+          <a:chOff x="0" y="0"/>
+          <a:chExt cx="0" cy="0"/>
+        </a:xfrm>
+      </p:grpSpPr>
+      <p:grpSp>
+        <p:nvGrpSpPr>
+          <p:cNvPr id="4" name="Group 3">
+            <a:extLst>
+              <a:ext uri="{FF2B5EF4-FFF2-40B4-BE49-F238E27FC236}">
+                <a16:creationId xmlns:a16="http://schemas.microsoft.com/office/drawing/2014/main" id="{388A0AEC-6122-D731-A658-339644E16AF3}"/>
+              </a:ext>
+            </a:extLst>
+          </p:cNvPr>
+          <p:cNvGrpSpPr/>
+          <p:nvPr/>
+        </p:nvGrpSpPr>
+        <p:grpSpPr>
+          <a:xfrm>
+            <a:off x="1034729" y="3659846"/>
+            <a:ext cx="248575" cy="471998"/>
+            <a:chOff x="2246050" y="1305017"/>
+            <a:chExt cx="204187" cy="471998"/>
+          </a:xfrm>
+        </p:grpSpPr>
+        <p:sp>
+          <p:nvSpPr>
+            <p:cNvPr id="2" name="Isosceles Triangle 1">
+              <a:extLst>
+                <a:ext uri="{FF2B5EF4-FFF2-40B4-BE49-F238E27FC236}">
+                  <a16:creationId xmlns:a16="http://schemas.microsoft.com/office/drawing/2014/main" id="{E798782C-357A-4A4C-01FE-D86F1B2FE98F}"/>
+                </a:ext>
+              </a:extLst>
+            </p:cNvPr>
+            <p:cNvSpPr/>
+            <p:nvPr/>
+          </p:nvSpPr>
+          <p:spPr>
+            <a:xfrm>
+              <a:off x="2246050" y="1305017"/>
+              <a:ext cx="204187" cy="213065"/>
+            </a:xfrm>
+            <a:prstGeom prst="triangle">
+              <a:avLst/>
+            </a:prstGeom>
+          </p:spPr>
+          <p:style>
+            <a:lnRef idx="2">
+              <a:schemeClr val="dk1">
+                <a:shade val="15000"/>
+              </a:schemeClr>
+            </a:lnRef>
+            <a:fillRef idx="1">
+              <a:schemeClr val="dk1"/>
+            </a:fillRef>
+            <a:effectRef idx="0">
+              <a:schemeClr val="dk1"/>
+            </a:effectRef>
+            <a:fontRef idx="minor">
+              <a:schemeClr val="lt1"/>
+            </a:fontRef>
+          </p:style>
+          <p:txBody>
+            <a:bodyPr rtlCol="0" anchor="ctr"/>
+            <a:lstStyle/>
+            <a:p>
+              <a:pPr algn="ctr"/>
+              <a:endParaRPr lang="en-US"/>
+            </a:p>
+          </p:txBody>
+        </p:sp>
+        <p:sp>
+          <p:nvSpPr>
+            <p:cNvPr id="3" name="Isosceles Triangle 2">
+              <a:extLst>
+                <a:ext uri="{FF2B5EF4-FFF2-40B4-BE49-F238E27FC236}">
+                  <a16:creationId xmlns:a16="http://schemas.microsoft.com/office/drawing/2014/main" id="{D9BCC807-4E13-AF78-1C7B-AAB81D96CF68}"/>
+                </a:ext>
+              </a:extLst>
+            </p:cNvPr>
+            <p:cNvSpPr/>
+            <p:nvPr/>
+          </p:nvSpPr>
+          <p:spPr>
+            <a:xfrm rot="10800000">
+              <a:off x="2246050" y="1563950"/>
+              <a:ext cx="204187" cy="213065"/>
+            </a:xfrm>
+            <a:prstGeom prst="triangle">
+              <a:avLst/>
+            </a:prstGeom>
+          </p:spPr>
+          <p:style>
+            <a:lnRef idx="2">
+              <a:schemeClr val="dk1">
+                <a:shade val="15000"/>
+              </a:schemeClr>
+            </a:lnRef>
+            <a:fillRef idx="1">
+              <a:schemeClr val="dk1"/>
+            </a:fillRef>
+            <a:effectRef idx="0">
+              <a:schemeClr val="dk1"/>
+            </a:effectRef>
+            <a:fontRef idx="minor">
+              <a:schemeClr val="lt1"/>
+            </a:fontRef>
+          </p:style>
+          <p:txBody>
+            <a:bodyPr rtlCol="0" anchor="ctr"/>
+            <a:lstStyle/>
+            <a:p>
+              <a:pPr algn="ctr"/>
+              <a:endParaRPr lang="en-US"/>
+            </a:p>
+          </p:txBody>
+        </p:sp>
+      </p:grpSp>
+      <p:cxnSp>
+        <p:nvCxnSpPr>
+          <p:cNvPr id="20" name="Straight Connector 19">
+            <a:extLst>
+              <a:ext uri="{FF2B5EF4-FFF2-40B4-BE49-F238E27FC236}">
+                <a16:creationId xmlns:a16="http://schemas.microsoft.com/office/drawing/2014/main" id="{3C91ED00-EB92-F36B-4ADC-1625395AC9FE}"/>
+              </a:ext>
+            </a:extLst>
+          </p:cNvPr>
+          <p:cNvCxnSpPr>
+            <a:cxnSpLocks/>
+          </p:cNvCxnSpPr>
+          <p:nvPr/>
+        </p:nvCxnSpPr>
+        <p:spPr>
+          <a:xfrm>
+            <a:off x="1159017" y="2647055"/>
+            <a:ext cx="0" cy="1012791"/>
+          </a:xfrm>
+          <a:prstGeom prst="line">
+            <a:avLst/>
+          </a:prstGeom>
+        </p:spPr>
+        <p:style>
+          <a:lnRef idx="2">
+            <a:schemeClr val="dk1"/>
+          </a:lnRef>
+          <a:fillRef idx="0">
+            <a:schemeClr val="dk1"/>
+          </a:fillRef>
+          <a:effectRef idx="1">
+            <a:schemeClr val="dk1"/>
+          </a:effectRef>
+          <a:fontRef idx="minor">
+            <a:schemeClr val="tx1"/>
+          </a:fontRef>
+        </p:style>
+      </p:cxnSp>
+      <p:sp>
+        <p:nvSpPr>
+          <p:cNvPr id="21" name="TextBox 20">
+            <a:extLst>
+              <a:ext uri="{FF2B5EF4-FFF2-40B4-BE49-F238E27FC236}">
+                <a16:creationId xmlns:a16="http://schemas.microsoft.com/office/drawing/2014/main" id="{A05998FA-2C49-5FA4-9915-1E1591F09DB7}"/>
+              </a:ext>
+            </a:extLst>
+          </p:cNvPr>
+          <p:cNvSpPr txBox="1"/>
+          <p:nvPr/>
+        </p:nvSpPr>
+        <p:spPr>
+          <a:xfrm>
+            <a:off x="1318561" y="3608432"/>
+            <a:ext cx="476412" cy="461665"/>
+          </a:xfrm>
+          <a:prstGeom prst="rect">
+            <a:avLst/>
+          </a:prstGeom>
+          <a:noFill/>
+        </p:spPr>
+        <p:txBody>
+          <a:bodyPr wrap="square" rtlCol="0">
+            <a:spAutoFit/>
+          </a:bodyPr>
+          <a:lstStyle/>
+          <a:p>
+            <a:r>
+              <a:rPr lang="el-GR" sz="2400" dirty="0"/>
+              <a:t>θ</a:t>
+            </a:r>
+            <a:r>
+              <a:rPr lang="en-US" sz="2400" baseline="-25000" dirty="0"/>
+              <a:t>1</a:t>
+            </a:r>
+          </a:p>
+        </p:txBody>
+      </p:sp>
+      <p:grpSp>
+        <p:nvGrpSpPr>
+          <p:cNvPr id="35" name="Group 34">
+            <a:extLst>
+              <a:ext uri="{FF2B5EF4-FFF2-40B4-BE49-F238E27FC236}">
+                <a16:creationId xmlns:a16="http://schemas.microsoft.com/office/drawing/2014/main" id="{25480107-13C2-9580-A022-3246C140F60E}"/>
+              </a:ext>
+            </a:extLst>
+          </p:cNvPr>
+          <p:cNvGrpSpPr/>
+          <p:nvPr/>
+        </p:nvGrpSpPr>
+        <p:grpSpPr>
+          <a:xfrm>
+            <a:off x="767562" y="4272065"/>
+            <a:ext cx="1206278" cy="1096778"/>
+            <a:chOff x="5245864" y="4129370"/>
+            <a:chExt cx="1206278" cy="1096778"/>
+          </a:xfrm>
+        </p:grpSpPr>
+        <p:cxnSp>
+          <p:nvCxnSpPr>
+            <p:cNvPr id="29" name="Straight Arrow Connector 28">
+              <a:extLst>
+                <a:ext uri="{FF2B5EF4-FFF2-40B4-BE49-F238E27FC236}">
+                  <a16:creationId xmlns:a16="http://schemas.microsoft.com/office/drawing/2014/main" id="{BFFADD88-8C83-697D-63BD-55380A3C0707}"/>
+                </a:ext>
+              </a:extLst>
+            </p:cNvPr>
+            <p:cNvCxnSpPr>
+              <a:cxnSpLocks/>
+            </p:cNvCxnSpPr>
+            <p:nvPr/>
+          </p:nvCxnSpPr>
+          <p:spPr>
+            <a:xfrm flipV="1">
+              <a:off x="5621043" y="4484703"/>
+              <a:ext cx="0" cy="526001"/>
+            </a:xfrm>
+            <a:prstGeom prst="straightConnector1">
+              <a:avLst/>
+            </a:prstGeom>
+            <a:ln w="38100">
+              <a:solidFill>
+                <a:schemeClr val="tx2">
+                  <a:lumMod val="50000"/>
+                  <a:lumOff val="50000"/>
+                </a:schemeClr>
+              </a:solidFill>
+              <a:tailEnd type="triangle"/>
+            </a:ln>
+          </p:spPr>
+          <p:style>
+            <a:lnRef idx="2">
+              <a:schemeClr val="dk1"/>
+            </a:lnRef>
+            <a:fillRef idx="0">
+              <a:schemeClr val="dk1"/>
+            </a:fillRef>
+            <a:effectRef idx="1">
+              <a:schemeClr val="dk1"/>
+            </a:effectRef>
+            <a:fontRef idx="minor">
+              <a:schemeClr val="tx1"/>
+            </a:fontRef>
+          </p:style>
+        </p:cxnSp>
+        <p:cxnSp>
+          <p:nvCxnSpPr>
+            <p:cNvPr id="30" name="Straight Arrow Connector 29">
+              <a:extLst>
+                <a:ext uri="{FF2B5EF4-FFF2-40B4-BE49-F238E27FC236}">
+                  <a16:creationId xmlns:a16="http://schemas.microsoft.com/office/drawing/2014/main" id="{4B3F79CD-047D-D329-21FC-50910FF10F20}"/>
+                </a:ext>
+              </a:extLst>
+            </p:cNvPr>
+            <p:cNvCxnSpPr>
+              <a:cxnSpLocks/>
+            </p:cNvCxnSpPr>
+            <p:nvPr/>
+          </p:nvCxnSpPr>
+          <p:spPr>
+            <a:xfrm>
+              <a:off x="5621043" y="5010704"/>
+              <a:ext cx="443885" cy="0"/>
+            </a:xfrm>
+            <a:prstGeom prst="straightConnector1">
+              <a:avLst/>
+            </a:prstGeom>
+            <a:ln w="38100">
+              <a:solidFill>
+                <a:schemeClr val="tx2">
+                  <a:lumMod val="50000"/>
+                  <a:lumOff val="50000"/>
+                </a:schemeClr>
+              </a:solidFill>
+              <a:tailEnd type="triangle"/>
+            </a:ln>
+          </p:spPr>
+          <p:style>
+            <a:lnRef idx="2">
+              <a:schemeClr val="dk1"/>
+            </a:lnRef>
+            <a:fillRef idx="0">
+              <a:schemeClr val="dk1"/>
+            </a:fillRef>
+            <a:effectRef idx="1">
+              <a:schemeClr val="dk1"/>
+            </a:effectRef>
+            <a:fontRef idx="minor">
+              <a:schemeClr val="tx1"/>
+            </a:fontRef>
+          </p:style>
+        </p:cxnSp>
+        <p:cxnSp>
+          <p:nvCxnSpPr>
+            <p:cNvPr id="31" name="Straight Arrow Connector 30">
+              <a:extLst>
+                <a:ext uri="{FF2B5EF4-FFF2-40B4-BE49-F238E27FC236}">
+                  <a16:creationId xmlns:a16="http://schemas.microsoft.com/office/drawing/2014/main" id="{B75EFA4A-3342-2B58-5494-8B0B29A7BEE4}"/>
+                </a:ext>
+              </a:extLst>
+            </p:cNvPr>
+            <p:cNvCxnSpPr>
+              <a:cxnSpLocks/>
+            </p:cNvCxnSpPr>
+            <p:nvPr/>
+          </p:nvCxnSpPr>
+          <p:spPr>
+            <a:xfrm flipV="1">
+              <a:off x="5621043" y="4587450"/>
+              <a:ext cx="381741" cy="423254"/>
+            </a:xfrm>
+            <a:prstGeom prst="straightConnector1">
+              <a:avLst/>
+            </a:prstGeom>
+            <a:ln w="38100">
+              <a:solidFill>
+                <a:schemeClr val="tx2">
+                  <a:lumMod val="50000"/>
+                  <a:lumOff val="50000"/>
+                </a:schemeClr>
+              </a:solidFill>
+              <a:tailEnd type="triangle"/>
+            </a:ln>
+          </p:spPr>
+          <p:style>
+            <a:lnRef idx="2">
+              <a:schemeClr val="dk1"/>
+            </a:lnRef>
+            <a:fillRef idx="0">
+              <a:schemeClr val="dk1"/>
+            </a:fillRef>
+            <a:effectRef idx="1">
+              <a:schemeClr val="dk1"/>
+            </a:effectRef>
+            <a:fontRef idx="minor">
+              <a:schemeClr val="tx1"/>
+            </a:fontRef>
+          </p:style>
+        </p:cxnSp>
+        <p:sp>
+          <p:nvSpPr>
+            <p:cNvPr id="32" name="TextBox 31">
+              <a:extLst>
+                <a:ext uri="{FF2B5EF4-FFF2-40B4-BE49-F238E27FC236}">
+                  <a16:creationId xmlns:a16="http://schemas.microsoft.com/office/drawing/2014/main" id="{0BA8F0E9-902C-3D9B-95A2-9EF1FE0AB34C}"/>
+                </a:ext>
+              </a:extLst>
+            </p:cNvPr>
+            <p:cNvSpPr txBox="1"/>
+            <p:nvPr/>
+          </p:nvSpPr>
+          <p:spPr>
+            <a:xfrm>
+              <a:off x="5245864" y="4129370"/>
+              <a:ext cx="409086" cy="400110"/>
+            </a:xfrm>
+            <a:prstGeom prst="rect">
+              <a:avLst/>
+            </a:prstGeom>
+            <a:noFill/>
+          </p:spPr>
+          <p:txBody>
+            <a:bodyPr wrap="none" rtlCol="0">
+              <a:spAutoFit/>
+            </a:bodyPr>
+            <a:lstStyle/>
+            <a:p>
+              <a:r>
+                <a:rPr lang="en-US" sz="2000" dirty="0"/>
+                <a:t>Z</a:t>
+              </a:r>
+              <a:r>
+                <a:rPr lang="en-US" sz="2000" baseline="-25000" dirty="0"/>
+                <a:t>0</a:t>
+              </a:r>
+            </a:p>
+          </p:txBody>
+        </p:sp>
+        <p:sp>
+          <p:nvSpPr>
+            <p:cNvPr id="33" name="TextBox 32">
+              <a:extLst>
+                <a:ext uri="{FF2B5EF4-FFF2-40B4-BE49-F238E27FC236}">
+                  <a16:creationId xmlns:a16="http://schemas.microsoft.com/office/drawing/2014/main" id="{E9AF3BB9-A052-B26A-A7CE-8D31C2ABE20D}"/>
+                </a:ext>
+              </a:extLst>
+            </p:cNvPr>
+            <p:cNvSpPr txBox="1"/>
+            <p:nvPr/>
+          </p:nvSpPr>
+          <p:spPr>
+            <a:xfrm>
+              <a:off x="6002784" y="4300037"/>
+              <a:ext cx="413896" cy="400110"/>
+            </a:xfrm>
+            <a:prstGeom prst="rect">
+              <a:avLst/>
+            </a:prstGeom>
+            <a:noFill/>
+          </p:spPr>
+          <p:txBody>
+            <a:bodyPr wrap="none" rtlCol="0">
+              <a:spAutoFit/>
+            </a:bodyPr>
+            <a:lstStyle/>
+            <a:p>
+              <a:r>
+                <a:rPr lang="en-US" sz="2000" dirty="0"/>
+                <a:t>Y</a:t>
+              </a:r>
+              <a:r>
+                <a:rPr lang="en-US" sz="2000" baseline="-25000" dirty="0"/>
+                <a:t>0</a:t>
+              </a:r>
+              <a:endParaRPr lang="en-US" sz="2000" dirty="0"/>
+            </a:p>
+          </p:txBody>
+        </p:sp>
+        <p:sp>
+          <p:nvSpPr>
+            <p:cNvPr id="34" name="TextBox 33">
+              <a:extLst>
+                <a:ext uri="{FF2B5EF4-FFF2-40B4-BE49-F238E27FC236}">
+                  <a16:creationId xmlns:a16="http://schemas.microsoft.com/office/drawing/2014/main" id="{37B07609-8547-2D58-2CE2-2B46141E301D}"/>
+                </a:ext>
+              </a:extLst>
+            </p:cNvPr>
+            <p:cNvSpPr txBox="1"/>
+            <p:nvPr/>
+          </p:nvSpPr>
+          <p:spPr>
+            <a:xfrm>
+              <a:off x="6035040" y="4826038"/>
+              <a:ext cx="417102" cy="400110"/>
+            </a:xfrm>
+            <a:prstGeom prst="rect">
+              <a:avLst/>
+            </a:prstGeom>
+            <a:noFill/>
+          </p:spPr>
+          <p:txBody>
+            <a:bodyPr wrap="none" rtlCol="0">
+              <a:spAutoFit/>
+            </a:bodyPr>
+            <a:lstStyle/>
+            <a:p>
+              <a:r>
+                <a:rPr lang="en-US" sz="2000" dirty="0"/>
+                <a:t>X</a:t>
+              </a:r>
+              <a:r>
+                <a:rPr lang="en-US" sz="2000" baseline="-25000" dirty="0"/>
+                <a:t>0</a:t>
+              </a:r>
+            </a:p>
+          </p:txBody>
+        </p:sp>
+      </p:grpSp>
+      <p:cxnSp>
+        <p:nvCxnSpPr>
+          <p:cNvPr id="36" name="Straight Connector 35">
+            <a:extLst>
+              <a:ext uri="{FF2B5EF4-FFF2-40B4-BE49-F238E27FC236}">
+                <a16:creationId xmlns:a16="http://schemas.microsoft.com/office/drawing/2014/main" id="{AEBE4BD7-F713-2CE1-211D-A3839B353631}"/>
+              </a:ext>
+            </a:extLst>
+          </p:cNvPr>
+          <p:cNvCxnSpPr>
+            <a:cxnSpLocks/>
+          </p:cNvCxnSpPr>
+          <p:nvPr/>
+        </p:nvCxnSpPr>
+        <p:spPr>
+          <a:xfrm>
+            <a:off x="1159016" y="4148861"/>
+            <a:ext cx="0" cy="1012791"/>
+          </a:xfrm>
+          <a:prstGeom prst="line">
+            <a:avLst/>
+          </a:prstGeom>
+        </p:spPr>
+        <p:style>
+          <a:lnRef idx="2">
+            <a:schemeClr val="dk1"/>
+          </a:lnRef>
+          <a:fillRef idx="0">
+            <a:schemeClr val="dk1"/>
+          </a:fillRef>
+          <a:effectRef idx="1">
+            <a:schemeClr val="dk1"/>
+          </a:effectRef>
+          <a:fontRef idx="minor">
+            <a:schemeClr val="tx1"/>
+          </a:fontRef>
+        </p:style>
+      </p:cxnSp>
+      <p:cxnSp>
+        <p:nvCxnSpPr>
+          <p:cNvPr id="47" name="Straight Connector 46">
+            <a:extLst>
+              <a:ext uri="{FF2B5EF4-FFF2-40B4-BE49-F238E27FC236}">
+                <a16:creationId xmlns:a16="http://schemas.microsoft.com/office/drawing/2014/main" id="{3E7BEDEE-DDBC-2A8D-4979-0D561B5BB64B}"/>
+              </a:ext>
+            </a:extLst>
+          </p:cNvPr>
+          <p:cNvCxnSpPr>
+            <a:cxnSpLocks/>
+          </p:cNvCxnSpPr>
+          <p:nvPr/>
+        </p:nvCxnSpPr>
+        <p:spPr>
+          <a:xfrm flipH="1">
+            <a:off x="1169372" y="2559387"/>
+            <a:ext cx="1720792" cy="0"/>
+          </a:xfrm>
+          <a:prstGeom prst="line">
+            <a:avLst/>
+          </a:prstGeom>
+        </p:spPr>
+        <p:style>
+          <a:lnRef idx="2">
+            <a:schemeClr val="dk1"/>
+          </a:lnRef>
+          <a:fillRef idx="0">
+            <a:schemeClr val="dk1"/>
+          </a:fillRef>
+          <a:effectRef idx="1">
+            <a:schemeClr val="dk1"/>
+          </a:effectRef>
+          <a:fontRef idx="minor">
+            <a:schemeClr val="tx1"/>
+          </a:fontRef>
+        </p:style>
+      </p:cxnSp>
+      <p:cxnSp>
+        <p:nvCxnSpPr>
+          <p:cNvPr id="49" name="Straight Connector 48">
+            <a:extLst>
+              <a:ext uri="{FF2B5EF4-FFF2-40B4-BE49-F238E27FC236}">
+                <a16:creationId xmlns:a16="http://schemas.microsoft.com/office/drawing/2014/main" id="{042D2F7B-DE91-3A54-503E-1C200AB0156A}"/>
+              </a:ext>
+            </a:extLst>
+          </p:cNvPr>
+          <p:cNvCxnSpPr>
+            <a:cxnSpLocks/>
+            <a:stCxn id="66" idx="0"/>
+          </p:cNvCxnSpPr>
+          <p:nvPr/>
+        </p:nvCxnSpPr>
+        <p:spPr>
+          <a:xfrm flipH="1">
+            <a:off x="3089906" y="2559386"/>
+            <a:ext cx="1313644" cy="1"/>
+          </a:xfrm>
+          <a:prstGeom prst="line">
+            <a:avLst/>
+          </a:prstGeom>
+        </p:spPr>
+        <p:style>
+          <a:lnRef idx="2">
+            <a:schemeClr val="dk1"/>
+          </a:lnRef>
+          <a:fillRef idx="0">
+            <a:schemeClr val="dk1"/>
+          </a:fillRef>
+          <a:effectRef idx="1">
+            <a:schemeClr val="dk1"/>
+          </a:effectRef>
+          <a:fontRef idx="minor">
+            <a:schemeClr val="tx1"/>
+          </a:fontRef>
+        </p:style>
+      </p:cxnSp>
+      <p:sp>
+        <p:nvSpPr>
+          <p:cNvPr id="46" name="Oval 45">
+            <a:extLst>
+              <a:ext uri="{FF2B5EF4-FFF2-40B4-BE49-F238E27FC236}">
+                <a16:creationId xmlns:a16="http://schemas.microsoft.com/office/drawing/2014/main" id="{F852204D-1992-1641-C66A-C1FB6E34D6E9}"/>
+              </a:ext>
+            </a:extLst>
+          </p:cNvPr>
+          <p:cNvSpPr/>
+          <p:nvPr/>
+        </p:nvSpPr>
+        <p:spPr>
+          <a:xfrm>
+            <a:off x="1059145" y="2479943"/>
+            <a:ext cx="199742" cy="158888"/>
+          </a:xfrm>
+          <a:prstGeom prst="ellipse">
+            <a:avLst/>
+          </a:prstGeom>
+        </p:spPr>
+        <p:style>
+          <a:lnRef idx="2">
+            <a:schemeClr val="accent1">
+              <a:shade val="15000"/>
+            </a:schemeClr>
+          </a:lnRef>
+          <a:fillRef idx="1">
+            <a:schemeClr val="accent1"/>
+          </a:fillRef>
+          <a:effectRef idx="0">
+            <a:schemeClr val="accent1"/>
+          </a:effectRef>
+          <a:fontRef idx="minor">
+            <a:schemeClr val="lt1"/>
+          </a:fontRef>
+        </p:style>
+        <p:txBody>
+          <a:bodyPr rtlCol="0" anchor="ctr"/>
+          <a:lstStyle/>
+          <a:p>
+            <a:pPr algn="ctr"/>
+            <a:endParaRPr lang="en-US"/>
+          </a:p>
+        </p:txBody>
+      </p:sp>
+      <p:sp>
+        <p:nvSpPr>
+          <p:cNvPr id="50" name="Oval 49">
+            <a:extLst>
+              <a:ext uri="{FF2B5EF4-FFF2-40B4-BE49-F238E27FC236}">
+                <a16:creationId xmlns:a16="http://schemas.microsoft.com/office/drawing/2014/main" id="{F49A0742-42C7-7AB4-FB4E-A488BDCD042A}"/>
+              </a:ext>
+            </a:extLst>
+          </p:cNvPr>
+          <p:cNvSpPr/>
+          <p:nvPr/>
+        </p:nvSpPr>
+        <p:spPr>
+          <a:xfrm>
+            <a:off x="2890164" y="2489932"/>
+            <a:ext cx="199742" cy="158888"/>
+          </a:xfrm>
+          <a:prstGeom prst="ellipse">
+            <a:avLst/>
+          </a:prstGeom>
+        </p:spPr>
+        <p:style>
+          <a:lnRef idx="2">
+            <a:schemeClr val="accent1">
+              <a:shade val="15000"/>
+            </a:schemeClr>
+          </a:lnRef>
+          <a:fillRef idx="1">
+            <a:schemeClr val="accent1"/>
+          </a:fillRef>
+          <a:effectRef idx="0">
+            <a:schemeClr val="accent1"/>
+          </a:effectRef>
+          <a:fontRef idx="minor">
+            <a:schemeClr val="lt1"/>
+          </a:fontRef>
+        </p:style>
+        <p:txBody>
+          <a:bodyPr rtlCol="0" anchor="ctr"/>
+          <a:lstStyle/>
+          <a:p>
+            <a:pPr algn="ctr"/>
+            <a:endParaRPr lang="en-US"/>
+          </a:p>
+        </p:txBody>
+      </p:sp>
+      <p:grpSp>
+        <p:nvGrpSpPr>
+          <p:cNvPr id="57" name="Group 56">
+            <a:extLst>
+              <a:ext uri="{FF2B5EF4-FFF2-40B4-BE49-F238E27FC236}">
+                <a16:creationId xmlns:a16="http://schemas.microsoft.com/office/drawing/2014/main" id="{B5AF8952-6A8F-BA9F-9090-978EC904B6E3}"/>
+              </a:ext>
+            </a:extLst>
+          </p:cNvPr>
+          <p:cNvGrpSpPr/>
+          <p:nvPr/>
+        </p:nvGrpSpPr>
+        <p:grpSpPr>
+          <a:xfrm>
+            <a:off x="554038" y="1696562"/>
+            <a:ext cx="1204458" cy="1406764"/>
+            <a:chOff x="8660025" y="3594876"/>
+            <a:chExt cx="1204458" cy="1406764"/>
+          </a:xfrm>
+        </p:grpSpPr>
+        <p:cxnSp>
+          <p:nvCxnSpPr>
+            <p:cNvPr id="51" name="Straight Arrow Connector 50">
+              <a:extLst>
+                <a:ext uri="{FF2B5EF4-FFF2-40B4-BE49-F238E27FC236}">
+                  <a16:creationId xmlns:a16="http://schemas.microsoft.com/office/drawing/2014/main" id="{C49066DA-FBBE-0722-F9F6-6BE497458D4C}"/>
+                </a:ext>
+              </a:extLst>
+            </p:cNvPr>
+            <p:cNvCxnSpPr>
+              <a:cxnSpLocks/>
+            </p:cNvCxnSpPr>
+            <p:nvPr/>
+          </p:nvCxnSpPr>
+          <p:spPr>
+            <a:xfrm flipV="1">
+              <a:off x="9238623" y="3950209"/>
+              <a:ext cx="0" cy="526001"/>
+            </a:xfrm>
+            <a:prstGeom prst="straightConnector1">
+              <a:avLst/>
+            </a:prstGeom>
+            <a:ln w="38100">
+              <a:solidFill>
+                <a:schemeClr val="tx2">
+                  <a:lumMod val="50000"/>
+                  <a:lumOff val="50000"/>
+                </a:schemeClr>
+              </a:solidFill>
+              <a:tailEnd type="triangle"/>
+            </a:ln>
+          </p:spPr>
+          <p:style>
+            <a:lnRef idx="2">
+              <a:schemeClr val="dk1"/>
+            </a:lnRef>
+            <a:fillRef idx="0">
+              <a:schemeClr val="dk1"/>
+            </a:fillRef>
+            <a:effectRef idx="1">
+              <a:schemeClr val="dk1"/>
+            </a:effectRef>
+            <a:fontRef idx="minor">
+              <a:schemeClr val="tx1"/>
+            </a:fontRef>
+          </p:style>
+        </p:cxnSp>
+        <p:cxnSp>
+          <p:nvCxnSpPr>
+            <p:cNvPr id="52" name="Straight Arrow Connector 51">
+              <a:extLst>
+                <a:ext uri="{FF2B5EF4-FFF2-40B4-BE49-F238E27FC236}">
+                  <a16:creationId xmlns:a16="http://schemas.microsoft.com/office/drawing/2014/main" id="{CA4EC0AF-E638-D705-D51B-EAB22D453F00}"/>
+                </a:ext>
+              </a:extLst>
+            </p:cNvPr>
+            <p:cNvCxnSpPr>
+              <a:cxnSpLocks/>
+            </p:cNvCxnSpPr>
+            <p:nvPr/>
+          </p:nvCxnSpPr>
+          <p:spPr>
+            <a:xfrm>
+              <a:off x="9238623" y="4476210"/>
+              <a:ext cx="443885" cy="0"/>
+            </a:xfrm>
+            <a:prstGeom prst="straightConnector1">
+              <a:avLst/>
+            </a:prstGeom>
+            <a:ln w="38100">
+              <a:solidFill>
+                <a:schemeClr val="tx2">
+                  <a:lumMod val="50000"/>
+                  <a:lumOff val="50000"/>
+                </a:schemeClr>
+              </a:solidFill>
+              <a:tailEnd type="triangle"/>
+            </a:ln>
+          </p:spPr>
+          <p:style>
+            <a:lnRef idx="2">
+              <a:schemeClr val="dk1"/>
+            </a:lnRef>
+            <a:fillRef idx="0">
+              <a:schemeClr val="dk1"/>
+            </a:fillRef>
+            <a:effectRef idx="1">
+              <a:schemeClr val="dk1"/>
+            </a:effectRef>
+            <a:fontRef idx="minor">
+              <a:schemeClr val="tx1"/>
+            </a:fontRef>
+          </p:style>
+        </p:cxnSp>
+        <p:cxnSp>
+          <p:nvCxnSpPr>
+            <p:cNvPr id="53" name="Straight Arrow Connector 52">
+              <a:extLst>
+                <a:ext uri="{FF2B5EF4-FFF2-40B4-BE49-F238E27FC236}">
+                  <a16:creationId xmlns:a16="http://schemas.microsoft.com/office/drawing/2014/main" id="{030CEA34-1FBA-4017-113F-1FB3C860D7B1}"/>
+                </a:ext>
+              </a:extLst>
+            </p:cNvPr>
+            <p:cNvCxnSpPr>
+              <a:cxnSpLocks/>
+            </p:cNvCxnSpPr>
+            <p:nvPr/>
+          </p:nvCxnSpPr>
+          <p:spPr>
+            <a:xfrm flipH="1">
+              <a:off x="8962997" y="4476210"/>
+              <a:ext cx="275626" cy="262587"/>
+            </a:xfrm>
+            <a:prstGeom prst="straightConnector1">
+              <a:avLst/>
+            </a:prstGeom>
+            <a:ln w="38100">
+              <a:solidFill>
+                <a:schemeClr val="tx2">
+                  <a:lumMod val="50000"/>
+                  <a:lumOff val="50000"/>
+                </a:schemeClr>
+              </a:solidFill>
+              <a:tailEnd type="triangle"/>
+            </a:ln>
+          </p:spPr>
+          <p:style>
+            <a:lnRef idx="2">
+              <a:schemeClr val="dk1"/>
+            </a:lnRef>
+            <a:fillRef idx="0">
+              <a:schemeClr val="dk1"/>
+            </a:fillRef>
+            <a:effectRef idx="1">
+              <a:schemeClr val="dk1"/>
+            </a:effectRef>
+            <a:fontRef idx="minor">
+              <a:schemeClr val="tx1"/>
+            </a:fontRef>
+          </p:style>
+        </p:cxnSp>
+        <p:sp>
+          <p:nvSpPr>
+            <p:cNvPr id="54" name="TextBox 53">
+              <a:extLst>
+                <a:ext uri="{FF2B5EF4-FFF2-40B4-BE49-F238E27FC236}">
+                  <a16:creationId xmlns:a16="http://schemas.microsoft.com/office/drawing/2014/main" id="{BEABAF22-C6D2-B54A-7B15-6438BB325C80}"/>
+                </a:ext>
+              </a:extLst>
+            </p:cNvPr>
+            <p:cNvSpPr txBox="1"/>
+            <p:nvPr/>
+          </p:nvSpPr>
+          <p:spPr>
+            <a:xfrm>
+              <a:off x="9069111" y="3594876"/>
+              <a:ext cx="413896" cy="400110"/>
+            </a:xfrm>
+            <a:prstGeom prst="rect">
+              <a:avLst/>
+            </a:prstGeom>
+            <a:noFill/>
+          </p:spPr>
+          <p:txBody>
+            <a:bodyPr wrap="none" rtlCol="0">
+              <a:spAutoFit/>
+            </a:bodyPr>
+            <a:lstStyle/>
+            <a:p>
+              <a:r>
+                <a:rPr lang="en-US" sz="2000" dirty="0"/>
+                <a:t>Y</a:t>
+              </a:r>
+              <a:r>
+                <a:rPr lang="en-US" sz="2000" baseline="-25000" dirty="0"/>
+                <a:t>1</a:t>
+              </a:r>
+            </a:p>
+          </p:txBody>
+        </p:sp>
+        <p:sp>
+          <p:nvSpPr>
+            <p:cNvPr id="55" name="TextBox 54">
+              <a:extLst>
+                <a:ext uri="{FF2B5EF4-FFF2-40B4-BE49-F238E27FC236}">
+                  <a16:creationId xmlns:a16="http://schemas.microsoft.com/office/drawing/2014/main" id="{CD2EC7B4-8EAB-483F-2600-C680E3100E23}"/>
+                </a:ext>
+              </a:extLst>
+            </p:cNvPr>
+            <p:cNvSpPr txBox="1"/>
+            <p:nvPr/>
+          </p:nvSpPr>
+          <p:spPr>
+            <a:xfrm>
+              <a:off x="8660025" y="4601530"/>
+              <a:ext cx="409086" cy="400110"/>
+            </a:xfrm>
+            <a:prstGeom prst="rect">
+              <a:avLst/>
+            </a:prstGeom>
+            <a:noFill/>
+          </p:spPr>
+          <p:txBody>
+            <a:bodyPr wrap="none" rtlCol="0">
+              <a:spAutoFit/>
+            </a:bodyPr>
+            <a:lstStyle/>
+            <a:p>
+              <a:r>
+                <a:rPr lang="en-US" sz="2000" dirty="0"/>
+                <a:t>Z</a:t>
+              </a:r>
+              <a:r>
+                <a:rPr lang="en-US" sz="2000" baseline="-25000" dirty="0"/>
+                <a:t>1</a:t>
+              </a:r>
+              <a:endParaRPr lang="en-US" sz="2000" dirty="0"/>
+            </a:p>
+          </p:txBody>
+        </p:sp>
+        <p:sp>
+          <p:nvSpPr>
+            <p:cNvPr id="56" name="TextBox 55">
+              <a:extLst>
+                <a:ext uri="{FF2B5EF4-FFF2-40B4-BE49-F238E27FC236}">
+                  <a16:creationId xmlns:a16="http://schemas.microsoft.com/office/drawing/2014/main" id="{84A6FAC3-46BD-7685-D860-31D2D33034D9}"/>
+                </a:ext>
+              </a:extLst>
+            </p:cNvPr>
+            <p:cNvSpPr txBox="1"/>
+            <p:nvPr/>
+          </p:nvSpPr>
+          <p:spPr>
+            <a:xfrm>
+              <a:off x="9447381" y="4067580"/>
+              <a:ext cx="417102" cy="400110"/>
+            </a:xfrm>
+            <a:prstGeom prst="rect">
+              <a:avLst/>
+            </a:prstGeom>
+            <a:noFill/>
+          </p:spPr>
+          <p:txBody>
+            <a:bodyPr wrap="none" rtlCol="0">
+              <a:spAutoFit/>
+            </a:bodyPr>
+            <a:lstStyle/>
+            <a:p>
+              <a:r>
+                <a:rPr lang="en-US" sz="2000" dirty="0"/>
+                <a:t>X</a:t>
+              </a:r>
+              <a:r>
+                <a:rPr lang="en-US" sz="2000" baseline="-25000" dirty="0"/>
+                <a:t>1</a:t>
+              </a:r>
+            </a:p>
+          </p:txBody>
+        </p:sp>
+      </p:grpSp>
+      <p:grpSp>
+        <p:nvGrpSpPr>
+          <p:cNvPr id="58" name="Group 57">
+            <a:extLst>
+              <a:ext uri="{FF2B5EF4-FFF2-40B4-BE49-F238E27FC236}">
+                <a16:creationId xmlns:a16="http://schemas.microsoft.com/office/drawing/2014/main" id="{4C2788E3-1232-8A58-1E18-9537AB54C36A}"/>
+              </a:ext>
+            </a:extLst>
+          </p:cNvPr>
+          <p:cNvGrpSpPr/>
+          <p:nvPr/>
+        </p:nvGrpSpPr>
+        <p:grpSpPr>
+          <a:xfrm>
+            <a:off x="2365991" y="1681493"/>
+            <a:ext cx="1204458" cy="1406764"/>
+            <a:chOff x="8660025" y="3594876"/>
+            <a:chExt cx="1204458" cy="1406764"/>
+          </a:xfrm>
+        </p:grpSpPr>
+        <p:cxnSp>
+          <p:nvCxnSpPr>
+            <p:cNvPr id="59" name="Straight Arrow Connector 58">
+              <a:extLst>
+                <a:ext uri="{FF2B5EF4-FFF2-40B4-BE49-F238E27FC236}">
+                  <a16:creationId xmlns:a16="http://schemas.microsoft.com/office/drawing/2014/main" id="{D272DE90-555F-5169-0A20-594F79565F4E}"/>
+                </a:ext>
+              </a:extLst>
+            </p:cNvPr>
+            <p:cNvCxnSpPr>
+              <a:cxnSpLocks/>
+            </p:cNvCxnSpPr>
+            <p:nvPr/>
+          </p:nvCxnSpPr>
+          <p:spPr>
+            <a:xfrm flipV="1">
+              <a:off x="9238623" y="3950209"/>
+              <a:ext cx="0" cy="526001"/>
+            </a:xfrm>
+            <a:prstGeom prst="straightConnector1">
+              <a:avLst/>
+            </a:prstGeom>
+            <a:ln w="38100">
+              <a:solidFill>
+                <a:schemeClr val="tx2">
+                  <a:lumMod val="50000"/>
+                  <a:lumOff val="50000"/>
+                </a:schemeClr>
+              </a:solidFill>
+              <a:tailEnd type="triangle"/>
+            </a:ln>
+          </p:spPr>
+          <p:style>
+            <a:lnRef idx="2">
+              <a:schemeClr val="dk1"/>
+            </a:lnRef>
+            <a:fillRef idx="0">
+              <a:schemeClr val="dk1"/>
+            </a:fillRef>
+            <a:effectRef idx="1">
+              <a:schemeClr val="dk1"/>
+            </a:effectRef>
+            <a:fontRef idx="minor">
+              <a:schemeClr val="tx1"/>
+            </a:fontRef>
+          </p:style>
+        </p:cxnSp>
+        <p:cxnSp>
+          <p:nvCxnSpPr>
+            <p:cNvPr id="60" name="Straight Arrow Connector 59">
+              <a:extLst>
+                <a:ext uri="{FF2B5EF4-FFF2-40B4-BE49-F238E27FC236}">
+                  <a16:creationId xmlns:a16="http://schemas.microsoft.com/office/drawing/2014/main" id="{9C5A2FE4-CC7F-AD3A-3D0C-BC22C004A51D}"/>
+                </a:ext>
+              </a:extLst>
+            </p:cNvPr>
+            <p:cNvCxnSpPr>
+              <a:cxnSpLocks/>
+            </p:cNvCxnSpPr>
+            <p:nvPr/>
+          </p:nvCxnSpPr>
+          <p:spPr>
+            <a:xfrm>
+              <a:off x="9238623" y="4476210"/>
+              <a:ext cx="443885" cy="0"/>
+            </a:xfrm>
+            <a:prstGeom prst="straightConnector1">
+              <a:avLst/>
+            </a:prstGeom>
+            <a:ln w="38100">
+              <a:solidFill>
+                <a:schemeClr val="tx2">
+                  <a:lumMod val="50000"/>
+                  <a:lumOff val="50000"/>
+                </a:schemeClr>
+              </a:solidFill>
+              <a:tailEnd type="triangle"/>
+            </a:ln>
+          </p:spPr>
+          <p:style>
+            <a:lnRef idx="2">
+              <a:schemeClr val="dk1"/>
+            </a:lnRef>
+            <a:fillRef idx="0">
+              <a:schemeClr val="dk1"/>
+            </a:fillRef>
+            <a:effectRef idx="1">
+              <a:schemeClr val="dk1"/>
+            </a:effectRef>
+            <a:fontRef idx="minor">
+              <a:schemeClr val="tx1"/>
+            </a:fontRef>
+          </p:style>
+        </p:cxnSp>
+        <p:cxnSp>
+          <p:nvCxnSpPr>
+            <p:cNvPr id="61" name="Straight Arrow Connector 60">
+              <a:extLst>
+                <a:ext uri="{FF2B5EF4-FFF2-40B4-BE49-F238E27FC236}">
+                  <a16:creationId xmlns:a16="http://schemas.microsoft.com/office/drawing/2014/main" id="{A80A486D-D071-E57E-E9B3-80B7DEEF36BA}"/>
+                </a:ext>
+              </a:extLst>
+            </p:cNvPr>
+            <p:cNvCxnSpPr>
+              <a:cxnSpLocks/>
+            </p:cNvCxnSpPr>
+            <p:nvPr/>
+          </p:nvCxnSpPr>
+          <p:spPr>
+            <a:xfrm flipH="1">
+              <a:off x="8962997" y="4476210"/>
+              <a:ext cx="275626" cy="262587"/>
+            </a:xfrm>
+            <a:prstGeom prst="straightConnector1">
+              <a:avLst/>
+            </a:prstGeom>
+            <a:ln w="38100">
+              <a:solidFill>
+                <a:schemeClr val="tx2">
+                  <a:lumMod val="50000"/>
+                  <a:lumOff val="50000"/>
+                </a:schemeClr>
+              </a:solidFill>
+              <a:tailEnd type="triangle"/>
+            </a:ln>
+          </p:spPr>
+          <p:style>
+            <a:lnRef idx="2">
+              <a:schemeClr val="dk1"/>
+            </a:lnRef>
+            <a:fillRef idx="0">
+              <a:schemeClr val="dk1"/>
+            </a:fillRef>
+            <a:effectRef idx="1">
+              <a:schemeClr val="dk1"/>
+            </a:effectRef>
+            <a:fontRef idx="minor">
+              <a:schemeClr val="tx1"/>
+            </a:fontRef>
+          </p:style>
+        </p:cxnSp>
+        <p:sp>
+          <p:nvSpPr>
+            <p:cNvPr id="62" name="TextBox 61">
+              <a:extLst>
+                <a:ext uri="{FF2B5EF4-FFF2-40B4-BE49-F238E27FC236}">
+                  <a16:creationId xmlns:a16="http://schemas.microsoft.com/office/drawing/2014/main" id="{62ED6053-4E5D-0280-692D-0B7D2414B9F0}"/>
+                </a:ext>
+              </a:extLst>
+            </p:cNvPr>
+            <p:cNvSpPr txBox="1"/>
+            <p:nvPr/>
+          </p:nvSpPr>
+          <p:spPr>
+            <a:xfrm>
+              <a:off x="9069111" y="3594876"/>
+              <a:ext cx="413896" cy="400110"/>
+            </a:xfrm>
+            <a:prstGeom prst="rect">
+              <a:avLst/>
+            </a:prstGeom>
+            <a:noFill/>
+          </p:spPr>
+          <p:txBody>
+            <a:bodyPr wrap="none" rtlCol="0">
+              <a:spAutoFit/>
+            </a:bodyPr>
+            <a:lstStyle/>
+            <a:p>
+              <a:r>
+                <a:rPr lang="en-US" sz="2000" dirty="0"/>
+                <a:t>Y</a:t>
+              </a:r>
+              <a:r>
+                <a:rPr lang="en-US" sz="2000" baseline="-25000" dirty="0"/>
+                <a:t>2</a:t>
+              </a:r>
+            </a:p>
+          </p:txBody>
+        </p:sp>
+        <p:sp>
+          <p:nvSpPr>
+            <p:cNvPr id="63" name="TextBox 62">
+              <a:extLst>
+                <a:ext uri="{FF2B5EF4-FFF2-40B4-BE49-F238E27FC236}">
+                  <a16:creationId xmlns:a16="http://schemas.microsoft.com/office/drawing/2014/main" id="{F8991860-1279-FCF6-4BD2-3083821F1DFD}"/>
+                </a:ext>
+              </a:extLst>
+            </p:cNvPr>
+            <p:cNvSpPr txBox="1"/>
+            <p:nvPr/>
+          </p:nvSpPr>
+          <p:spPr>
+            <a:xfrm>
+              <a:off x="8660025" y="4601530"/>
+              <a:ext cx="409086" cy="400110"/>
+            </a:xfrm>
+            <a:prstGeom prst="rect">
+              <a:avLst/>
+            </a:prstGeom>
+            <a:noFill/>
+          </p:spPr>
+          <p:txBody>
+            <a:bodyPr wrap="none" rtlCol="0">
+              <a:spAutoFit/>
+            </a:bodyPr>
+            <a:lstStyle/>
+            <a:p>
+              <a:r>
+                <a:rPr lang="en-US" sz="2000" dirty="0"/>
+                <a:t>Z</a:t>
+              </a:r>
+              <a:r>
+                <a:rPr lang="en-US" sz="2000" baseline="-25000" dirty="0"/>
+                <a:t>2</a:t>
+              </a:r>
+              <a:endParaRPr lang="en-US" sz="2000" dirty="0"/>
+            </a:p>
+          </p:txBody>
+        </p:sp>
+        <p:sp>
+          <p:nvSpPr>
+            <p:cNvPr id="64" name="TextBox 63">
+              <a:extLst>
+                <a:ext uri="{FF2B5EF4-FFF2-40B4-BE49-F238E27FC236}">
+                  <a16:creationId xmlns:a16="http://schemas.microsoft.com/office/drawing/2014/main" id="{87E171B8-FF4B-853C-0DED-0E2ACB71ECAD}"/>
+                </a:ext>
+              </a:extLst>
+            </p:cNvPr>
+            <p:cNvSpPr txBox="1"/>
+            <p:nvPr/>
+          </p:nvSpPr>
+          <p:spPr>
+            <a:xfrm>
+              <a:off x="9447381" y="4067580"/>
+              <a:ext cx="417102" cy="400110"/>
+            </a:xfrm>
+            <a:prstGeom prst="rect">
+              <a:avLst/>
+            </a:prstGeom>
+            <a:noFill/>
+          </p:spPr>
+          <p:txBody>
+            <a:bodyPr wrap="none" rtlCol="0">
+              <a:spAutoFit/>
+            </a:bodyPr>
+            <a:lstStyle/>
+            <a:p>
+              <a:r>
+                <a:rPr lang="en-US" sz="2000" dirty="0"/>
+                <a:t>X</a:t>
+              </a:r>
+              <a:r>
+                <a:rPr lang="en-US" sz="2000" baseline="-25000" dirty="0"/>
+                <a:t>2</a:t>
+              </a:r>
+            </a:p>
+          </p:txBody>
+        </p:sp>
+      </p:grpSp>
+      <p:grpSp>
+        <p:nvGrpSpPr>
+          <p:cNvPr id="65" name="Group 64">
+            <a:extLst>
+              <a:ext uri="{FF2B5EF4-FFF2-40B4-BE49-F238E27FC236}">
+                <a16:creationId xmlns:a16="http://schemas.microsoft.com/office/drawing/2014/main" id="{E63713F7-3F2B-AB58-1796-E7B988C783C2}"/>
+              </a:ext>
+            </a:extLst>
+          </p:cNvPr>
+          <p:cNvGrpSpPr/>
+          <p:nvPr/>
+        </p:nvGrpSpPr>
+        <p:grpSpPr>
+          <a:xfrm rot="16200000">
+            <a:off x="4515261" y="2323387"/>
+            <a:ext cx="248575" cy="471998"/>
+            <a:chOff x="2246050" y="1305017"/>
+            <a:chExt cx="204187" cy="471998"/>
+          </a:xfrm>
+        </p:grpSpPr>
+        <p:sp>
+          <p:nvSpPr>
+            <p:cNvPr id="66" name="Isosceles Triangle 65">
+              <a:extLst>
+                <a:ext uri="{FF2B5EF4-FFF2-40B4-BE49-F238E27FC236}">
+                  <a16:creationId xmlns:a16="http://schemas.microsoft.com/office/drawing/2014/main" id="{6BBC3EBC-DF97-BE83-752F-69D6DE9D879E}"/>
+                </a:ext>
+              </a:extLst>
+            </p:cNvPr>
+            <p:cNvSpPr/>
+            <p:nvPr/>
+          </p:nvSpPr>
+          <p:spPr>
+            <a:xfrm>
+              <a:off x="2246050" y="1305017"/>
+              <a:ext cx="204187" cy="213065"/>
+            </a:xfrm>
+            <a:prstGeom prst="triangle">
+              <a:avLst/>
+            </a:prstGeom>
+          </p:spPr>
+          <p:style>
+            <a:lnRef idx="2">
+              <a:schemeClr val="dk1">
+                <a:shade val="15000"/>
+              </a:schemeClr>
+            </a:lnRef>
+            <a:fillRef idx="1">
+              <a:schemeClr val="dk1"/>
+            </a:fillRef>
+            <a:effectRef idx="0">
+              <a:schemeClr val="dk1"/>
+            </a:effectRef>
+            <a:fontRef idx="minor">
+              <a:schemeClr val="lt1"/>
+            </a:fontRef>
+          </p:style>
+          <p:txBody>
+            <a:bodyPr rtlCol="0" anchor="ctr"/>
+            <a:lstStyle/>
+            <a:p>
+              <a:pPr algn="ctr"/>
+              <a:endParaRPr lang="en-US"/>
+            </a:p>
+          </p:txBody>
+        </p:sp>
+        <p:sp>
+          <p:nvSpPr>
+            <p:cNvPr id="67" name="Isosceles Triangle 66">
+              <a:extLst>
+                <a:ext uri="{FF2B5EF4-FFF2-40B4-BE49-F238E27FC236}">
+                  <a16:creationId xmlns:a16="http://schemas.microsoft.com/office/drawing/2014/main" id="{D1F8DC32-7EBA-02F0-E2D6-A24DD317F9C8}"/>
+                </a:ext>
+              </a:extLst>
+            </p:cNvPr>
+            <p:cNvSpPr/>
+            <p:nvPr/>
+          </p:nvSpPr>
+          <p:spPr>
+            <a:xfrm rot="10800000">
+              <a:off x="2246050" y="1563950"/>
+              <a:ext cx="204187" cy="213065"/>
+            </a:xfrm>
+            <a:prstGeom prst="triangle">
+              <a:avLst/>
+            </a:prstGeom>
+          </p:spPr>
+          <p:style>
+            <a:lnRef idx="2">
+              <a:schemeClr val="dk1">
+                <a:shade val="15000"/>
+              </a:schemeClr>
+            </a:lnRef>
+            <a:fillRef idx="1">
+              <a:schemeClr val="dk1"/>
+            </a:fillRef>
+            <a:effectRef idx="0">
+              <a:schemeClr val="dk1"/>
+            </a:effectRef>
+            <a:fontRef idx="minor">
+              <a:schemeClr val="lt1"/>
+            </a:fontRef>
+          </p:style>
+          <p:txBody>
+            <a:bodyPr rtlCol="0" anchor="ctr"/>
+            <a:lstStyle/>
+            <a:p>
+              <a:pPr algn="ctr"/>
+              <a:endParaRPr lang="en-US"/>
+            </a:p>
+          </p:txBody>
+        </p:sp>
+      </p:grpSp>
+      <p:sp>
+        <p:nvSpPr>
+          <p:cNvPr id="69" name="TextBox 68">
+            <a:extLst>
+              <a:ext uri="{FF2B5EF4-FFF2-40B4-BE49-F238E27FC236}">
+                <a16:creationId xmlns:a16="http://schemas.microsoft.com/office/drawing/2014/main" id="{B233B7C4-CD1D-8ADA-32C3-4231AFFA9D10}"/>
+              </a:ext>
+            </a:extLst>
+          </p:cNvPr>
+          <p:cNvSpPr txBox="1"/>
+          <p:nvPr/>
+        </p:nvSpPr>
+        <p:spPr>
+          <a:xfrm>
+            <a:off x="582733" y="2084062"/>
+            <a:ext cx="476412" cy="461665"/>
+          </a:xfrm>
+          <a:prstGeom prst="rect">
+            <a:avLst/>
+          </a:prstGeom>
+          <a:noFill/>
+        </p:spPr>
+        <p:txBody>
+          <a:bodyPr wrap="square" rtlCol="0">
+            <a:spAutoFit/>
+          </a:bodyPr>
+          <a:lstStyle/>
+          <a:p>
+            <a:r>
+              <a:rPr lang="el-GR" sz="2400" dirty="0"/>
+              <a:t>θ</a:t>
+            </a:r>
+            <a:r>
+              <a:rPr lang="en-US" sz="2400" baseline="-25000" dirty="0"/>
+              <a:t>2</a:t>
+            </a:r>
+          </a:p>
+        </p:txBody>
+      </p:sp>
+      <p:sp>
+        <p:nvSpPr>
+          <p:cNvPr id="70" name="TextBox 69">
+            <a:extLst>
+              <a:ext uri="{FF2B5EF4-FFF2-40B4-BE49-F238E27FC236}">
+                <a16:creationId xmlns:a16="http://schemas.microsoft.com/office/drawing/2014/main" id="{DC6EBF60-D8F0-751D-14AA-9492A5CD8546}"/>
+              </a:ext>
+            </a:extLst>
+          </p:cNvPr>
+          <p:cNvSpPr txBox="1"/>
+          <p:nvPr/>
+        </p:nvSpPr>
+        <p:spPr>
+          <a:xfrm>
+            <a:off x="2427106" y="2006588"/>
+            <a:ext cx="476412" cy="461665"/>
+          </a:xfrm>
+          <a:prstGeom prst="rect">
+            <a:avLst/>
+          </a:prstGeom>
+          <a:noFill/>
+        </p:spPr>
+        <p:txBody>
+          <a:bodyPr wrap="square" rtlCol="0">
+            <a:spAutoFit/>
+          </a:bodyPr>
+          <a:lstStyle/>
+          <a:p>
+            <a:r>
+              <a:rPr lang="el-GR" sz="2400" dirty="0"/>
+              <a:t>θ</a:t>
+            </a:r>
+            <a:r>
+              <a:rPr lang="en-US" sz="2400" baseline="-25000" dirty="0"/>
+              <a:t>3</a:t>
+            </a:r>
+          </a:p>
+        </p:txBody>
+      </p:sp>
+      <p:cxnSp>
+        <p:nvCxnSpPr>
+          <p:cNvPr id="80" name="Straight Arrow Connector 79">
+            <a:extLst>
+              <a:ext uri="{FF2B5EF4-FFF2-40B4-BE49-F238E27FC236}">
+                <a16:creationId xmlns:a16="http://schemas.microsoft.com/office/drawing/2014/main" id="{24765B7B-682C-3251-F353-FC93C0B90DD8}"/>
+              </a:ext>
+            </a:extLst>
+          </p:cNvPr>
+          <p:cNvCxnSpPr>
+            <a:cxnSpLocks/>
+          </p:cNvCxnSpPr>
+          <p:nvPr/>
+        </p:nvCxnSpPr>
+        <p:spPr>
+          <a:xfrm>
+            <a:off x="155841" y="2543339"/>
+            <a:ext cx="0" cy="2625449"/>
+          </a:xfrm>
+          <a:prstGeom prst="straightConnector1">
+            <a:avLst/>
+          </a:prstGeom>
+          <a:ln>
+            <a:headEnd type="triangle"/>
+            <a:tailEnd type="triangle"/>
+          </a:ln>
+        </p:spPr>
+        <p:style>
+          <a:lnRef idx="2">
+            <a:schemeClr val="accent1"/>
+          </a:lnRef>
+          <a:fillRef idx="0">
+            <a:schemeClr val="accent1"/>
+          </a:fillRef>
+          <a:effectRef idx="1">
+            <a:schemeClr val="accent1"/>
+          </a:effectRef>
+          <a:fontRef idx="minor">
+            <a:schemeClr val="tx1"/>
+          </a:fontRef>
+        </p:style>
+      </p:cxnSp>
+      <p:sp>
+        <p:nvSpPr>
+          <p:cNvPr id="82" name="TextBox 81">
+            <a:extLst>
+              <a:ext uri="{FF2B5EF4-FFF2-40B4-BE49-F238E27FC236}">
+                <a16:creationId xmlns:a16="http://schemas.microsoft.com/office/drawing/2014/main" id="{9A5AF5B4-443E-76C9-01E1-A30A0E9DE05E}"/>
+              </a:ext>
+            </a:extLst>
+          </p:cNvPr>
+          <p:cNvSpPr txBox="1"/>
+          <p:nvPr/>
+        </p:nvSpPr>
+        <p:spPr>
+          <a:xfrm>
+            <a:off x="99298" y="3486731"/>
+            <a:ext cx="487542" cy="369332"/>
+          </a:xfrm>
+          <a:prstGeom prst="rect">
+            <a:avLst/>
+          </a:prstGeom>
+          <a:noFill/>
+        </p:spPr>
+        <p:txBody>
+          <a:bodyPr wrap="square" rtlCol="0">
+            <a:spAutoFit/>
+          </a:bodyPr>
+          <a:lstStyle/>
+          <a:p>
+            <a:r>
+              <a:rPr lang="en-US" dirty="0"/>
+              <a:t>d1</a:t>
+            </a:r>
+          </a:p>
+        </p:txBody>
+      </p:sp>
+      <p:grpSp>
+        <p:nvGrpSpPr>
+          <p:cNvPr id="81" name="Group 80">
+            <a:extLst>
+              <a:ext uri="{FF2B5EF4-FFF2-40B4-BE49-F238E27FC236}">
+                <a16:creationId xmlns:a16="http://schemas.microsoft.com/office/drawing/2014/main" id="{3107135E-D92C-5491-9F7D-5611755A6C82}"/>
+              </a:ext>
+            </a:extLst>
+          </p:cNvPr>
+          <p:cNvGrpSpPr/>
+          <p:nvPr/>
+        </p:nvGrpSpPr>
+        <p:grpSpPr>
+          <a:xfrm>
+            <a:off x="1080582" y="423436"/>
+            <a:ext cx="4667951" cy="401613"/>
+            <a:chOff x="1087169" y="622643"/>
+            <a:chExt cx="4667951" cy="401613"/>
+          </a:xfrm>
+        </p:grpSpPr>
+        <p:sp>
+          <p:nvSpPr>
+            <p:cNvPr id="83" name="TextBox 82">
+              <a:extLst>
+                <a:ext uri="{FF2B5EF4-FFF2-40B4-BE49-F238E27FC236}">
+                  <a16:creationId xmlns:a16="http://schemas.microsoft.com/office/drawing/2014/main" id="{7E081EDC-DFC1-EA95-BA1A-4C7096995054}"/>
+                </a:ext>
+              </a:extLst>
+            </p:cNvPr>
+            <p:cNvSpPr txBox="1"/>
+            <p:nvPr/>
+          </p:nvSpPr>
+          <p:spPr>
+            <a:xfrm>
+              <a:off x="1798660" y="622643"/>
+              <a:ext cx="487542" cy="369332"/>
+            </a:xfrm>
+            <a:prstGeom prst="rect">
+              <a:avLst/>
+            </a:prstGeom>
+            <a:noFill/>
+          </p:spPr>
+          <p:txBody>
+            <a:bodyPr wrap="square" rtlCol="0">
+              <a:spAutoFit/>
+            </a:bodyPr>
+            <a:lstStyle/>
+            <a:p>
+              <a:r>
+                <a:rPr lang="en-US" dirty="0"/>
+                <a:t>a2</a:t>
+              </a:r>
+            </a:p>
+          </p:txBody>
+        </p:sp>
+        <p:sp>
+          <p:nvSpPr>
+            <p:cNvPr id="84" name="TextBox 83">
+              <a:extLst>
+                <a:ext uri="{FF2B5EF4-FFF2-40B4-BE49-F238E27FC236}">
+                  <a16:creationId xmlns:a16="http://schemas.microsoft.com/office/drawing/2014/main" id="{F57CD24A-2EE7-B048-9BC0-EBDC05C856C8}"/>
+                </a:ext>
+              </a:extLst>
+            </p:cNvPr>
+            <p:cNvSpPr txBox="1"/>
+            <p:nvPr/>
+          </p:nvSpPr>
+          <p:spPr>
+            <a:xfrm>
+              <a:off x="3469719" y="654924"/>
+              <a:ext cx="487542" cy="369332"/>
+            </a:xfrm>
+            <a:prstGeom prst="rect">
+              <a:avLst/>
+            </a:prstGeom>
+            <a:noFill/>
+          </p:spPr>
+          <p:txBody>
+            <a:bodyPr wrap="square" rtlCol="0">
+              <a:spAutoFit/>
+            </a:bodyPr>
+            <a:lstStyle/>
+            <a:p>
+              <a:r>
+                <a:rPr lang="en-US" dirty="0"/>
+                <a:t>d4</a:t>
+              </a:r>
+            </a:p>
+          </p:txBody>
+        </p:sp>
+        <p:cxnSp>
+          <p:nvCxnSpPr>
+            <p:cNvPr id="90" name="Straight Arrow Connector 89">
+              <a:extLst>
+                <a:ext uri="{FF2B5EF4-FFF2-40B4-BE49-F238E27FC236}">
+                  <a16:creationId xmlns:a16="http://schemas.microsoft.com/office/drawing/2014/main" id="{32C2A309-9248-41C9-CA11-72755ACDF3C7}"/>
+                </a:ext>
+              </a:extLst>
+            </p:cNvPr>
+            <p:cNvCxnSpPr>
+              <a:cxnSpLocks/>
+            </p:cNvCxnSpPr>
+            <p:nvPr/>
+          </p:nvCxnSpPr>
+          <p:spPr>
+            <a:xfrm flipH="1">
+              <a:off x="2944589" y="985248"/>
+              <a:ext cx="2810531" cy="0"/>
+            </a:xfrm>
+            <a:prstGeom prst="straightConnector1">
+              <a:avLst/>
+            </a:prstGeom>
+            <a:ln>
+              <a:headEnd type="triangle"/>
+              <a:tailEnd type="triangle"/>
+            </a:ln>
+          </p:spPr>
+          <p:style>
+            <a:lnRef idx="2">
+              <a:schemeClr val="accent1"/>
+            </a:lnRef>
+            <a:fillRef idx="0">
+              <a:schemeClr val="accent1"/>
+            </a:fillRef>
+            <a:effectRef idx="1">
+              <a:schemeClr val="accent1"/>
+            </a:effectRef>
+            <a:fontRef idx="minor">
+              <a:schemeClr val="tx1"/>
+            </a:fontRef>
+          </p:style>
+        </p:cxnSp>
+        <p:cxnSp>
+          <p:nvCxnSpPr>
+            <p:cNvPr id="93" name="Straight Arrow Connector 92">
+              <a:extLst>
+                <a:ext uri="{FF2B5EF4-FFF2-40B4-BE49-F238E27FC236}">
+                  <a16:creationId xmlns:a16="http://schemas.microsoft.com/office/drawing/2014/main" id="{1F00E8AD-E8C5-CF94-07D3-D1D357216DC5}"/>
+                </a:ext>
+              </a:extLst>
+            </p:cNvPr>
+            <p:cNvCxnSpPr>
+              <a:cxnSpLocks/>
+            </p:cNvCxnSpPr>
+            <p:nvPr/>
+          </p:nvCxnSpPr>
+          <p:spPr>
+            <a:xfrm flipH="1">
+              <a:off x="1087169" y="985248"/>
+              <a:ext cx="1857420" cy="6727"/>
+            </a:xfrm>
+            <a:prstGeom prst="straightConnector1">
+              <a:avLst/>
+            </a:prstGeom>
+            <a:ln>
+              <a:headEnd type="triangle"/>
+              <a:tailEnd type="triangle"/>
+            </a:ln>
+          </p:spPr>
+          <p:style>
+            <a:lnRef idx="2">
+              <a:schemeClr val="accent1"/>
+            </a:lnRef>
+            <a:fillRef idx="0">
+              <a:schemeClr val="accent1"/>
+            </a:fillRef>
+            <a:effectRef idx="1">
+              <a:schemeClr val="accent1"/>
+            </a:effectRef>
+            <a:fontRef idx="minor">
+              <a:schemeClr val="tx1"/>
+            </a:fontRef>
+          </p:style>
+        </p:cxnSp>
+      </p:grpSp>
+      <p:sp>
+        <p:nvSpPr>
+          <p:cNvPr id="96" name="TextBox 95">
+            <a:extLst>
+              <a:ext uri="{FF2B5EF4-FFF2-40B4-BE49-F238E27FC236}">
+                <a16:creationId xmlns:a16="http://schemas.microsoft.com/office/drawing/2014/main" id="{2EBE830F-B90B-0312-4F32-22C57B9A205F}"/>
+              </a:ext>
+            </a:extLst>
+          </p:cNvPr>
+          <p:cNvSpPr txBox="1"/>
+          <p:nvPr/>
+        </p:nvSpPr>
+        <p:spPr>
+          <a:xfrm>
+            <a:off x="5063786" y="2064725"/>
+            <a:ext cx="476412" cy="461665"/>
+          </a:xfrm>
+          <a:prstGeom prst="rect">
+            <a:avLst/>
+          </a:prstGeom>
+          <a:noFill/>
+        </p:spPr>
+        <p:txBody>
+          <a:bodyPr wrap="square" rtlCol="0">
+            <a:spAutoFit/>
+          </a:bodyPr>
+          <a:lstStyle/>
+          <a:p>
+            <a:r>
+              <a:rPr lang="el-GR" sz="2400" dirty="0"/>
+              <a:t>θ</a:t>
+            </a:r>
+            <a:r>
+              <a:rPr lang="en-US" sz="2400" baseline="-25000" dirty="0"/>
+              <a:t>5</a:t>
+            </a:r>
+          </a:p>
+        </p:txBody>
+      </p:sp>
+      <p:cxnSp>
+        <p:nvCxnSpPr>
+          <p:cNvPr id="5" name="Straight Connector 4">
+            <a:extLst>
+              <a:ext uri="{FF2B5EF4-FFF2-40B4-BE49-F238E27FC236}">
+                <a16:creationId xmlns:a16="http://schemas.microsoft.com/office/drawing/2014/main" id="{76C3EF6F-83E4-506F-234E-05C8875D084A}"/>
+              </a:ext>
+            </a:extLst>
+          </p:cNvPr>
+          <p:cNvCxnSpPr>
+            <a:cxnSpLocks/>
+          </p:cNvCxnSpPr>
+          <p:nvPr/>
+        </p:nvCxnSpPr>
+        <p:spPr>
+          <a:xfrm flipH="1" flipV="1">
+            <a:off x="4662107" y="2543339"/>
+            <a:ext cx="891358" cy="9321"/>
+          </a:xfrm>
+          <a:prstGeom prst="line">
+            <a:avLst/>
+          </a:prstGeom>
+        </p:spPr>
+        <p:style>
+          <a:lnRef idx="2">
+            <a:schemeClr val="dk1"/>
+          </a:lnRef>
+          <a:fillRef idx="0">
+            <a:schemeClr val="dk1"/>
+          </a:fillRef>
+          <a:effectRef idx="1">
+            <a:schemeClr val="dk1"/>
+          </a:effectRef>
+          <a:fontRef idx="minor">
+            <a:schemeClr val="tx1"/>
+          </a:fontRef>
+        </p:style>
+      </p:cxnSp>
+      <p:sp>
+        <p:nvSpPr>
+          <p:cNvPr id="8" name="Oval 7">
+            <a:extLst>
+              <a:ext uri="{FF2B5EF4-FFF2-40B4-BE49-F238E27FC236}">
+                <a16:creationId xmlns:a16="http://schemas.microsoft.com/office/drawing/2014/main" id="{AB799269-6EC8-0219-6B60-6E1A3A3B17BD}"/>
+              </a:ext>
+            </a:extLst>
+          </p:cNvPr>
+          <p:cNvSpPr/>
+          <p:nvPr/>
+        </p:nvSpPr>
+        <p:spPr>
+          <a:xfrm>
+            <a:off x="5471812" y="2498452"/>
+            <a:ext cx="199742" cy="158888"/>
+          </a:xfrm>
+          <a:prstGeom prst="ellipse">
+            <a:avLst/>
+          </a:prstGeom>
+        </p:spPr>
+        <p:style>
+          <a:lnRef idx="2">
+            <a:schemeClr val="accent1">
+              <a:shade val="15000"/>
+            </a:schemeClr>
+          </a:lnRef>
+          <a:fillRef idx="1">
+            <a:schemeClr val="accent1"/>
+          </a:fillRef>
+          <a:effectRef idx="0">
+            <a:schemeClr val="accent1"/>
+          </a:effectRef>
+          <a:fontRef idx="minor">
+            <a:schemeClr val="lt1"/>
+          </a:fontRef>
+        </p:style>
+        <p:txBody>
+          <a:bodyPr rtlCol="0" anchor="ctr"/>
+          <a:lstStyle/>
+          <a:p>
+            <a:pPr algn="ctr"/>
+            <a:endParaRPr lang="en-US"/>
+          </a:p>
+        </p:txBody>
+      </p:sp>
+      <p:grpSp>
+        <p:nvGrpSpPr>
+          <p:cNvPr id="15" name="Group 14">
+            <a:extLst>
+              <a:ext uri="{FF2B5EF4-FFF2-40B4-BE49-F238E27FC236}">
+                <a16:creationId xmlns:a16="http://schemas.microsoft.com/office/drawing/2014/main" id="{F85E6308-A77A-AB41-55DC-DC4B81AEA3CC}"/>
+              </a:ext>
+            </a:extLst>
+          </p:cNvPr>
+          <p:cNvGrpSpPr/>
+          <p:nvPr/>
+        </p:nvGrpSpPr>
+        <p:grpSpPr>
+          <a:xfrm>
+            <a:off x="5036906" y="2342941"/>
+            <a:ext cx="1385814" cy="888798"/>
+            <a:chOff x="6682408" y="2265489"/>
+            <a:chExt cx="1385814" cy="888798"/>
+          </a:xfrm>
+        </p:grpSpPr>
+        <p:cxnSp>
+          <p:nvCxnSpPr>
+            <p:cNvPr id="16" name="Straight Arrow Connector 15">
+              <a:extLst>
+                <a:ext uri="{FF2B5EF4-FFF2-40B4-BE49-F238E27FC236}">
+                  <a16:creationId xmlns:a16="http://schemas.microsoft.com/office/drawing/2014/main" id="{B24766B5-2305-ED6A-5AC3-27E4F2D5A3BE}"/>
+                </a:ext>
+              </a:extLst>
+            </p:cNvPr>
+            <p:cNvCxnSpPr>
+              <a:cxnSpLocks/>
+              <a:endCxn id="19" idx="1"/>
+            </p:cNvCxnSpPr>
+            <p:nvPr/>
+          </p:nvCxnSpPr>
+          <p:spPr>
+            <a:xfrm>
+              <a:off x="7262096" y="2464982"/>
+              <a:ext cx="392230" cy="562"/>
+            </a:xfrm>
+            <a:prstGeom prst="straightConnector1">
+              <a:avLst/>
+            </a:prstGeom>
+            <a:ln w="38100">
+              <a:solidFill>
+                <a:schemeClr val="tx2">
+                  <a:lumMod val="50000"/>
+                  <a:lumOff val="50000"/>
+                </a:schemeClr>
+              </a:solidFill>
+              <a:tailEnd type="triangle"/>
+            </a:ln>
+          </p:spPr>
+          <p:style>
+            <a:lnRef idx="2">
+              <a:schemeClr val="dk1"/>
+            </a:lnRef>
+            <a:fillRef idx="0">
+              <a:schemeClr val="dk1"/>
+            </a:fillRef>
+            <a:effectRef idx="1">
+              <a:schemeClr val="dk1"/>
+            </a:effectRef>
+            <a:fontRef idx="minor">
+              <a:schemeClr val="tx1"/>
+            </a:fontRef>
+          </p:style>
+        </p:cxnSp>
+        <p:cxnSp>
+          <p:nvCxnSpPr>
+            <p:cNvPr id="17" name="Straight Arrow Connector 16">
+              <a:extLst>
+                <a:ext uri="{FF2B5EF4-FFF2-40B4-BE49-F238E27FC236}">
+                  <a16:creationId xmlns:a16="http://schemas.microsoft.com/office/drawing/2014/main" id="{7D48CB66-2561-1402-7F70-A26896176ADF}"/>
+                </a:ext>
+              </a:extLst>
+            </p:cNvPr>
+            <p:cNvCxnSpPr>
+              <a:cxnSpLocks/>
+            </p:cNvCxnSpPr>
+            <p:nvPr/>
+          </p:nvCxnSpPr>
+          <p:spPr>
+            <a:xfrm>
+              <a:off x="7263015" y="2454588"/>
+              <a:ext cx="0" cy="547363"/>
+            </a:xfrm>
+            <a:prstGeom prst="straightConnector1">
+              <a:avLst/>
+            </a:prstGeom>
+            <a:ln w="38100">
+              <a:solidFill>
+                <a:schemeClr val="tx2">
+                  <a:lumMod val="50000"/>
+                  <a:lumOff val="50000"/>
+                </a:schemeClr>
+              </a:solidFill>
+              <a:tailEnd type="triangle"/>
+            </a:ln>
+          </p:spPr>
+          <p:style>
+            <a:lnRef idx="2">
+              <a:schemeClr val="dk1"/>
+            </a:lnRef>
+            <a:fillRef idx="0">
+              <a:schemeClr val="dk1"/>
+            </a:fillRef>
+            <a:effectRef idx="1">
+              <a:schemeClr val="dk1"/>
+            </a:effectRef>
+            <a:fontRef idx="minor">
+              <a:schemeClr val="tx1"/>
+            </a:fontRef>
+          </p:style>
+        </p:cxnSp>
+        <p:cxnSp>
+          <p:nvCxnSpPr>
+            <p:cNvPr id="18" name="Straight Arrow Connector 17">
+              <a:extLst>
+                <a:ext uri="{FF2B5EF4-FFF2-40B4-BE49-F238E27FC236}">
+                  <a16:creationId xmlns:a16="http://schemas.microsoft.com/office/drawing/2014/main" id="{D1A65768-4293-93C7-F4AB-1C8D766D0E28}"/>
+                </a:ext>
+              </a:extLst>
+            </p:cNvPr>
+            <p:cNvCxnSpPr>
+              <a:cxnSpLocks/>
+            </p:cNvCxnSpPr>
+            <p:nvPr/>
+          </p:nvCxnSpPr>
+          <p:spPr>
+            <a:xfrm flipH="1">
+              <a:off x="6987389" y="2454588"/>
+              <a:ext cx="275626" cy="262587"/>
+            </a:xfrm>
+            <a:prstGeom prst="straightConnector1">
+              <a:avLst/>
+            </a:prstGeom>
+            <a:ln w="38100">
+              <a:solidFill>
+                <a:schemeClr val="tx2">
+                  <a:lumMod val="50000"/>
+                  <a:lumOff val="50000"/>
+                </a:schemeClr>
+              </a:solidFill>
+              <a:tailEnd type="triangle"/>
+            </a:ln>
+          </p:spPr>
+          <p:style>
+            <a:lnRef idx="2">
+              <a:schemeClr val="dk1"/>
+            </a:lnRef>
+            <a:fillRef idx="0">
+              <a:schemeClr val="dk1"/>
+            </a:fillRef>
+            <a:effectRef idx="1">
+              <a:schemeClr val="dk1"/>
+            </a:effectRef>
+            <a:fontRef idx="minor">
+              <a:schemeClr val="tx1"/>
+            </a:fontRef>
+          </p:style>
+        </p:cxnSp>
+        <p:sp>
+          <p:nvSpPr>
+            <p:cNvPr id="19" name="TextBox 18">
+              <a:extLst>
+                <a:ext uri="{FF2B5EF4-FFF2-40B4-BE49-F238E27FC236}">
+                  <a16:creationId xmlns:a16="http://schemas.microsoft.com/office/drawing/2014/main" id="{58424AD7-00E7-CC15-54A7-6FCE3304D82F}"/>
+                </a:ext>
+              </a:extLst>
+            </p:cNvPr>
+            <p:cNvSpPr txBox="1"/>
+            <p:nvPr/>
+          </p:nvSpPr>
+          <p:spPr>
+            <a:xfrm>
+              <a:off x="7654326" y="2265489"/>
+              <a:ext cx="413896" cy="400110"/>
+            </a:xfrm>
+            <a:prstGeom prst="rect">
+              <a:avLst/>
+            </a:prstGeom>
+            <a:noFill/>
+          </p:spPr>
+          <p:txBody>
+            <a:bodyPr wrap="none" rtlCol="0">
+              <a:spAutoFit/>
+            </a:bodyPr>
+            <a:lstStyle/>
+            <a:p>
+              <a:r>
+                <a:rPr lang="en-US" sz="2000" dirty="0"/>
+                <a:t>Y</a:t>
+              </a:r>
+              <a:r>
+                <a:rPr lang="en-US" sz="2000" baseline="-25000" dirty="0"/>
+                <a:t>4</a:t>
+              </a:r>
+            </a:p>
+          </p:txBody>
+        </p:sp>
+        <p:sp>
+          <p:nvSpPr>
+            <p:cNvPr id="22" name="TextBox 21">
+              <a:extLst>
+                <a:ext uri="{FF2B5EF4-FFF2-40B4-BE49-F238E27FC236}">
+                  <a16:creationId xmlns:a16="http://schemas.microsoft.com/office/drawing/2014/main" id="{BDE1404B-FD20-69B0-07FA-54391ED5DF3C}"/>
+                </a:ext>
+              </a:extLst>
+            </p:cNvPr>
+            <p:cNvSpPr txBox="1"/>
+            <p:nvPr/>
+          </p:nvSpPr>
+          <p:spPr>
+            <a:xfrm>
+              <a:off x="6682408" y="2616910"/>
+              <a:ext cx="409086" cy="400110"/>
+            </a:xfrm>
+            <a:prstGeom prst="rect">
+              <a:avLst/>
+            </a:prstGeom>
+            <a:noFill/>
+          </p:spPr>
+          <p:txBody>
+            <a:bodyPr wrap="none" rtlCol="0">
+              <a:spAutoFit/>
+            </a:bodyPr>
+            <a:lstStyle/>
+            <a:p>
+              <a:r>
+                <a:rPr lang="en-US" sz="2000" dirty="0"/>
+                <a:t>Z</a:t>
+              </a:r>
+              <a:r>
+                <a:rPr lang="en-US" sz="2000" baseline="-25000" dirty="0"/>
+                <a:t>4</a:t>
+              </a:r>
+              <a:endParaRPr lang="en-US" sz="2000" dirty="0"/>
+            </a:p>
+          </p:txBody>
+        </p:sp>
+        <p:sp>
+          <p:nvSpPr>
+            <p:cNvPr id="24" name="TextBox 23">
+              <a:extLst>
+                <a:ext uri="{FF2B5EF4-FFF2-40B4-BE49-F238E27FC236}">
+                  <a16:creationId xmlns:a16="http://schemas.microsoft.com/office/drawing/2014/main" id="{75893AF7-B54C-15B1-0AA9-F736725CDCD4}"/>
+                </a:ext>
+              </a:extLst>
+            </p:cNvPr>
+            <p:cNvSpPr txBox="1"/>
+            <p:nvPr/>
+          </p:nvSpPr>
+          <p:spPr>
+            <a:xfrm>
+              <a:off x="7358074" y="2754177"/>
+              <a:ext cx="417102" cy="400110"/>
+            </a:xfrm>
+            <a:prstGeom prst="rect">
+              <a:avLst/>
+            </a:prstGeom>
+            <a:noFill/>
+          </p:spPr>
+          <p:txBody>
+            <a:bodyPr wrap="none" rtlCol="0">
+              <a:spAutoFit/>
+            </a:bodyPr>
+            <a:lstStyle/>
+            <a:p>
+              <a:r>
+                <a:rPr lang="en-US" sz="2000" dirty="0"/>
+                <a:t>X</a:t>
+              </a:r>
+              <a:r>
+                <a:rPr lang="en-US" sz="2000" baseline="-25000" dirty="0"/>
+                <a:t>4</a:t>
+              </a:r>
+            </a:p>
+          </p:txBody>
+        </p:sp>
+      </p:grpSp>
+      <p:cxnSp>
+        <p:nvCxnSpPr>
+          <p:cNvPr id="25" name="Straight Connector 24">
+            <a:extLst>
+              <a:ext uri="{FF2B5EF4-FFF2-40B4-BE49-F238E27FC236}">
+                <a16:creationId xmlns:a16="http://schemas.microsoft.com/office/drawing/2014/main" id="{F7EE1172-9885-5741-AD74-32D62DC48AE6}"/>
+              </a:ext>
+            </a:extLst>
+          </p:cNvPr>
+          <p:cNvCxnSpPr>
+            <a:cxnSpLocks/>
+            <a:endCxn id="50" idx="0"/>
+          </p:cNvCxnSpPr>
+          <p:nvPr/>
+        </p:nvCxnSpPr>
+        <p:spPr>
+          <a:xfrm flipH="1">
+            <a:off x="2990035" y="1616310"/>
+            <a:ext cx="943450" cy="873622"/>
+          </a:xfrm>
+          <a:prstGeom prst="line">
+            <a:avLst/>
+          </a:prstGeom>
+          <a:ln w="19050" cap="flat" cmpd="sng" algn="ctr">
+            <a:solidFill>
+              <a:schemeClr val="dk1"/>
+            </a:solidFill>
+            <a:prstDash val="dash"/>
+            <a:round/>
+            <a:headEnd type="none" w="med" len="med"/>
+            <a:tailEnd type="none" w="med" len="med"/>
+          </a:ln>
+        </p:spPr>
+        <p:style>
+          <a:lnRef idx="0">
+            <a:scrgbClr r="0" g="0" b="0"/>
+          </a:lnRef>
+          <a:fillRef idx="0">
+            <a:scrgbClr r="0" g="0" b="0"/>
+          </a:fillRef>
+          <a:effectRef idx="0">
+            <a:scrgbClr r="0" g="0" b="0"/>
+          </a:effectRef>
+          <a:fontRef idx="minor">
+            <a:schemeClr val="tx1"/>
+          </a:fontRef>
+        </p:style>
+      </p:cxnSp>
+      <p:sp>
+        <p:nvSpPr>
+          <p:cNvPr id="37" name="TextBox 36">
+            <a:extLst>
+              <a:ext uri="{FF2B5EF4-FFF2-40B4-BE49-F238E27FC236}">
+                <a16:creationId xmlns:a16="http://schemas.microsoft.com/office/drawing/2014/main" id="{163C5F44-25ED-F38B-D6F8-1529856BB6B6}"/>
+              </a:ext>
+            </a:extLst>
+          </p:cNvPr>
+          <p:cNvSpPr txBox="1"/>
+          <p:nvPr/>
+        </p:nvSpPr>
+        <p:spPr>
+          <a:xfrm>
+            <a:off x="4463246" y="1966773"/>
+            <a:ext cx="476412" cy="461665"/>
+          </a:xfrm>
+          <a:prstGeom prst="rect">
+            <a:avLst/>
+          </a:prstGeom>
+          <a:noFill/>
+        </p:spPr>
+        <p:txBody>
+          <a:bodyPr wrap="square" rtlCol="0">
+            <a:spAutoFit/>
+          </a:bodyPr>
+          <a:lstStyle/>
+          <a:p>
+            <a:r>
+              <a:rPr lang="el-GR" sz="2400" dirty="0"/>
+              <a:t>θ</a:t>
+            </a:r>
+            <a:r>
+              <a:rPr lang="en-US" sz="2400" baseline="-25000" dirty="0"/>
+              <a:t>4</a:t>
+            </a:r>
+          </a:p>
+        </p:txBody>
+      </p:sp>
+      <p:sp>
+        <p:nvSpPr>
+          <p:cNvPr id="38" name="TextBox 37">
+            <a:extLst>
+              <a:ext uri="{FF2B5EF4-FFF2-40B4-BE49-F238E27FC236}">
+                <a16:creationId xmlns:a16="http://schemas.microsoft.com/office/drawing/2014/main" id="{03944F7E-D43E-0A71-5614-1A1ED7322F2E}"/>
+              </a:ext>
+            </a:extLst>
+          </p:cNvPr>
+          <p:cNvSpPr txBox="1"/>
+          <p:nvPr/>
+        </p:nvSpPr>
+        <p:spPr>
+          <a:xfrm>
+            <a:off x="5356758" y="1472003"/>
+            <a:ext cx="476412" cy="461665"/>
+          </a:xfrm>
+          <a:prstGeom prst="rect">
+            <a:avLst/>
+          </a:prstGeom>
+          <a:noFill/>
+        </p:spPr>
+        <p:txBody>
+          <a:bodyPr wrap="square" rtlCol="0">
+            <a:spAutoFit/>
+          </a:bodyPr>
+          <a:lstStyle/>
+          <a:p>
+            <a:r>
+              <a:rPr lang="el-GR" sz="2400" dirty="0"/>
+              <a:t>θ</a:t>
+            </a:r>
+            <a:r>
+              <a:rPr lang="en-US" sz="2400" baseline="-25000" dirty="0"/>
+              <a:t>6</a:t>
+            </a:r>
+          </a:p>
+        </p:txBody>
+      </p:sp>
+      <p:cxnSp>
+        <p:nvCxnSpPr>
+          <p:cNvPr id="115" name="Straight Arrow Connector 114">
+            <a:extLst>
+              <a:ext uri="{FF2B5EF4-FFF2-40B4-BE49-F238E27FC236}">
+                <a16:creationId xmlns:a16="http://schemas.microsoft.com/office/drawing/2014/main" id="{1698BA7B-14C8-EAA2-3032-FEA16398A098}"/>
+              </a:ext>
+            </a:extLst>
+          </p:cNvPr>
+          <p:cNvCxnSpPr>
+            <a:cxnSpLocks/>
+          </p:cNvCxnSpPr>
+          <p:nvPr/>
+        </p:nvCxnSpPr>
+        <p:spPr>
+          <a:xfrm flipH="1" flipV="1">
+            <a:off x="7104492" y="2539400"/>
+            <a:ext cx="40035" cy="2132775"/>
+          </a:xfrm>
+          <a:prstGeom prst="straightConnector1">
+            <a:avLst/>
+          </a:prstGeom>
+          <a:ln>
+            <a:headEnd type="triangle"/>
+            <a:tailEnd type="triangle"/>
+          </a:ln>
+        </p:spPr>
+        <p:style>
+          <a:lnRef idx="2">
+            <a:schemeClr val="accent1"/>
+          </a:lnRef>
+          <a:fillRef idx="0">
+            <a:schemeClr val="accent1"/>
+          </a:fillRef>
+          <a:effectRef idx="1">
+            <a:schemeClr val="accent1"/>
+          </a:effectRef>
+          <a:fontRef idx="minor">
+            <a:schemeClr val="tx1"/>
+          </a:fontRef>
+        </p:style>
+      </p:cxnSp>
+      <p:sp>
+        <p:nvSpPr>
+          <p:cNvPr id="119" name="TextBox 118">
+            <a:extLst>
+              <a:ext uri="{FF2B5EF4-FFF2-40B4-BE49-F238E27FC236}">
+                <a16:creationId xmlns:a16="http://schemas.microsoft.com/office/drawing/2014/main" id="{3E82514D-611A-2305-980E-784DF8BF3CC2}"/>
+              </a:ext>
+            </a:extLst>
+          </p:cNvPr>
+          <p:cNvSpPr txBox="1"/>
+          <p:nvPr/>
+        </p:nvSpPr>
+        <p:spPr>
+          <a:xfrm>
+            <a:off x="6606438" y="3290514"/>
+            <a:ext cx="487542" cy="369332"/>
+          </a:xfrm>
+          <a:prstGeom prst="rect">
+            <a:avLst/>
+          </a:prstGeom>
+          <a:noFill/>
+        </p:spPr>
+        <p:txBody>
+          <a:bodyPr wrap="square" rtlCol="0">
+            <a:spAutoFit/>
+          </a:bodyPr>
+          <a:lstStyle/>
+          <a:p>
+            <a:r>
+              <a:rPr lang="en-US" dirty="0"/>
+              <a:t>d6</a:t>
+            </a:r>
+          </a:p>
+        </p:txBody>
+      </p:sp>
+      <p:graphicFrame>
+        <p:nvGraphicFramePr>
+          <p:cNvPr id="120" name="Table 119">
+            <a:extLst>
+              <a:ext uri="{FF2B5EF4-FFF2-40B4-BE49-F238E27FC236}">
+                <a16:creationId xmlns:a16="http://schemas.microsoft.com/office/drawing/2014/main" id="{25EF4B6B-5D14-9AFA-4E65-0D700706B816}"/>
+              </a:ext>
+            </a:extLst>
+          </p:cNvPr>
+          <p:cNvGraphicFramePr>
+            <a:graphicFrameLocks noGrp="1"/>
+          </p:cNvGraphicFramePr>
+          <p:nvPr/>
+        </p:nvGraphicFramePr>
+        <p:xfrm>
+          <a:off x="8065965" y="931738"/>
+          <a:ext cx="4202970" cy="2834640"/>
+        </p:xfrm>
+        <a:graphic>
+          <a:graphicData uri="http://schemas.openxmlformats.org/drawingml/2006/table">
+            <a:tbl>
+              <a:tblPr firstRow="1" bandRow="1">
+                <a:tableStyleId>{5C22544A-7EE6-4342-B048-85BDC9FD1C3A}</a:tableStyleId>
+              </a:tblPr>
+              <a:tblGrid>
+                <a:gridCol w="840594">
+                  <a:extLst>
+                    <a:ext uri="{9D8B030D-6E8A-4147-A177-3AD203B41FA5}">
+                      <a16:colId xmlns:a16="http://schemas.microsoft.com/office/drawing/2014/main" val="2205231002"/>
+                    </a:ext>
+                  </a:extLst>
+                </a:gridCol>
+                <a:gridCol w="840594">
+                  <a:extLst>
+                    <a:ext uri="{9D8B030D-6E8A-4147-A177-3AD203B41FA5}">
+                      <a16:colId xmlns:a16="http://schemas.microsoft.com/office/drawing/2014/main" val="2947821736"/>
+                    </a:ext>
+                  </a:extLst>
+                </a:gridCol>
+                <a:gridCol w="840594">
+                  <a:extLst>
+                    <a:ext uri="{9D8B030D-6E8A-4147-A177-3AD203B41FA5}">
+                      <a16:colId xmlns:a16="http://schemas.microsoft.com/office/drawing/2014/main" val="2284687561"/>
+                    </a:ext>
+                  </a:extLst>
+                </a:gridCol>
+                <a:gridCol w="840594">
+                  <a:extLst>
+                    <a:ext uri="{9D8B030D-6E8A-4147-A177-3AD203B41FA5}">
+                      <a16:colId xmlns:a16="http://schemas.microsoft.com/office/drawing/2014/main" val="128693049"/>
+                    </a:ext>
+                  </a:extLst>
+                </a:gridCol>
+                <a:gridCol w="840594">
+                  <a:extLst>
+                    <a:ext uri="{9D8B030D-6E8A-4147-A177-3AD203B41FA5}">
+                      <a16:colId xmlns:a16="http://schemas.microsoft.com/office/drawing/2014/main" val="2597867648"/>
+                    </a:ext>
+                  </a:extLst>
+                </a:gridCol>
+              </a:tblGrid>
+              <a:tr h="310059">
+                <a:tc>
+                  <a:txBody>
+                    <a:bodyPr/>
+                    <a:lstStyle/>
+                    <a:p>
+                      <a:r>
+                        <a:rPr lang="en-US" dirty="0"/>
+                        <a:t>Link ID</a:t>
+                      </a:r>
+                    </a:p>
+                  </a:txBody>
+                  <a:tcPr/>
+                </a:tc>
+                <a:tc>
+                  <a:txBody>
+                    <a:bodyPr/>
+                    <a:lstStyle/>
+                    <a:p>
+                      <a:r>
+                        <a:rPr lang="en-US" dirty="0"/>
+                        <a:t>a</a:t>
+                      </a:r>
+                    </a:p>
+                  </a:txBody>
+                  <a:tcPr/>
+                </a:tc>
+                <a:tc>
+                  <a:txBody>
+                    <a:bodyPr/>
+                    <a:lstStyle/>
+                    <a:p>
+                      <a:r>
+                        <a:rPr lang="en-US" dirty="0"/>
+                        <a:t>d</a:t>
+                      </a:r>
+                    </a:p>
+                  </a:txBody>
+                  <a:tcPr/>
+                </a:tc>
+                <a:tc>
+                  <a:txBody>
+                    <a:bodyPr/>
+                    <a:lstStyle/>
+                    <a:p>
+                      <a:r>
+                        <a:rPr lang="en-US" dirty="0"/>
+                        <a:t>Alpha</a:t>
+                      </a:r>
+                    </a:p>
+                  </a:txBody>
+                  <a:tcPr/>
+                </a:tc>
+                <a:tc>
+                  <a:txBody>
+                    <a:bodyPr/>
+                    <a:lstStyle/>
+                    <a:p>
+                      <a:r>
+                        <a:rPr lang="en-US" dirty="0"/>
+                        <a:t>Theta</a:t>
+                      </a:r>
+                    </a:p>
+                  </a:txBody>
+                  <a:tcPr/>
+                </a:tc>
+                <a:extLst>
+                  <a:ext uri="{0D108BD9-81ED-4DB2-BD59-A6C34878D82A}">
+                    <a16:rowId xmlns:a16="http://schemas.microsoft.com/office/drawing/2014/main" val="2488572694"/>
+                  </a:ext>
+                </a:extLst>
+              </a:tr>
+              <a:tr h="310059">
+                <a:tc>
+                  <a:txBody>
+                    <a:bodyPr/>
+                    <a:lstStyle/>
+                    <a:p>
+                      <a:r>
+                        <a:rPr lang="en-US" dirty="0"/>
+                        <a:t>1</a:t>
+                      </a:r>
+                    </a:p>
+                  </a:txBody>
+                  <a:tcPr/>
+                </a:tc>
+                <a:tc>
+                  <a:txBody>
+                    <a:bodyPr/>
+                    <a:lstStyle/>
+                    <a:p>
+                      <a:r>
+                        <a:rPr lang="en-US" dirty="0"/>
+                        <a:t>0</a:t>
+                      </a:r>
+                    </a:p>
+                  </a:txBody>
+                  <a:tcPr/>
+                </a:tc>
+                <a:tc>
+                  <a:txBody>
+                    <a:bodyPr/>
+                    <a:lstStyle/>
+                    <a:p>
+                      <a:r>
+                        <a:rPr lang="en-US" dirty="0"/>
+                        <a:t>50</a:t>
+                      </a:r>
+                    </a:p>
+                  </a:txBody>
+                  <a:tcPr/>
+                </a:tc>
+                <a:tc>
+                  <a:txBody>
+                    <a:bodyPr/>
+                    <a:lstStyle/>
+                    <a:p>
+                      <a:r>
+                        <a:rPr lang="en-US" dirty="0"/>
+                        <a:t>90</a:t>
+                      </a:r>
+                    </a:p>
+                  </a:txBody>
+                  <a:tcPr/>
+                </a:tc>
+                <a:tc>
+                  <a:txBody>
+                    <a:bodyPr/>
+                    <a:lstStyle/>
+                    <a:p>
+                      <a:endParaRPr lang="en-US"/>
+                    </a:p>
+                  </a:txBody>
+                  <a:tcPr/>
+                </a:tc>
+                <a:extLst>
+                  <a:ext uri="{0D108BD9-81ED-4DB2-BD59-A6C34878D82A}">
+                    <a16:rowId xmlns:a16="http://schemas.microsoft.com/office/drawing/2014/main" val="1903147275"/>
+                  </a:ext>
+                </a:extLst>
+              </a:tr>
+              <a:tr h="310059">
+                <a:tc>
+                  <a:txBody>
+                    <a:bodyPr/>
+                    <a:lstStyle/>
+                    <a:p>
+                      <a:r>
+                        <a:rPr lang="en-US" dirty="0"/>
+                        <a:t>2</a:t>
+                      </a:r>
+                    </a:p>
+                  </a:txBody>
+                  <a:tcPr/>
+                </a:tc>
+                <a:tc>
+                  <a:txBody>
+                    <a:bodyPr/>
+                    <a:lstStyle/>
+                    <a:p>
+                      <a:r>
+                        <a:rPr lang="en-US" dirty="0"/>
+                        <a:t>50</a:t>
+                      </a:r>
+                    </a:p>
+                  </a:txBody>
+                  <a:tcPr/>
+                </a:tc>
+                <a:tc>
+                  <a:txBody>
+                    <a:bodyPr/>
+                    <a:lstStyle/>
+                    <a:p>
+                      <a:r>
+                        <a:rPr lang="en-US" dirty="0"/>
+                        <a:t>0</a:t>
+                      </a:r>
+                    </a:p>
+                  </a:txBody>
+                  <a:tcPr/>
+                </a:tc>
+                <a:tc>
+                  <a:txBody>
+                    <a:bodyPr/>
+                    <a:lstStyle/>
+                    <a:p>
+                      <a:r>
+                        <a:rPr lang="en-US" dirty="0"/>
+                        <a:t>0</a:t>
+                      </a:r>
+                    </a:p>
+                  </a:txBody>
+                  <a:tcPr/>
+                </a:tc>
+                <a:tc>
+                  <a:txBody>
+                    <a:bodyPr/>
+                    <a:lstStyle/>
+                    <a:p>
+                      <a:endParaRPr lang="en-US"/>
+                    </a:p>
+                  </a:txBody>
+                  <a:tcPr/>
+                </a:tc>
+                <a:extLst>
+                  <a:ext uri="{0D108BD9-81ED-4DB2-BD59-A6C34878D82A}">
+                    <a16:rowId xmlns:a16="http://schemas.microsoft.com/office/drawing/2014/main" val="2032630786"/>
+                  </a:ext>
+                </a:extLst>
+              </a:tr>
+              <a:tr h="310059">
+                <a:tc>
+                  <a:txBody>
+                    <a:bodyPr/>
+                    <a:lstStyle/>
+                    <a:p>
+                      <a:r>
+                        <a:rPr lang="en-US" dirty="0"/>
+                        <a:t>3</a:t>
+                      </a:r>
+                    </a:p>
+                  </a:txBody>
+                  <a:tcPr/>
+                </a:tc>
+                <a:tc>
+                  <a:txBody>
+                    <a:bodyPr/>
+                    <a:lstStyle/>
+                    <a:p>
+                      <a:r>
+                        <a:rPr lang="en-US" dirty="0"/>
+                        <a:t>0</a:t>
+                      </a:r>
+                    </a:p>
+                  </a:txBody>
+                  <a:tcPr/>
+                </a:tc>
+                <a:tc>
+                  <a:txBody>
+                    <a:bodyPr/>
+                    <a:lstStyle/>
+                    <a:p>
+                      <a:r>
+                        <a:rPr lang="en-US" dirty="0"/>
+                        <a:t>0</a:t>
+                      </a:r>
+                    </a:p>
+                  </a:txBody>
+                  <a:tcPr/>
+                </a:tc>
+                <a:tc>
+                  <a:txBody>
+                    <a:bodyPr/>
+                    <a:lstStyle/>
+                    <a:p>
+                      <a:r>
+                        <a:rPr lang="en-US" dirty="0"/>
+                        <a:t>90</a:t>
+                      </a:r>
+                    </a:p>
+                  </a:txBody>
+                  <a:tcPr/>
+                </a:tc>
+                <a:tc>
+                  <a:txBody>
+                    <a:bodyPr/>
+                    <a:lstStyle/>
+                    <a:p>
+                      <a:endParaRPr lang="en-US"/>
+                    </a:p>
+                  </a:txBody>
+                  <a:tcPr/>
+                </a:tc>
+                <a:extLst>
+                  <a:ext uri="{0D108BD9-81ED-4DB2-BD59-A6C34878D82A}">
+                    <a16:rowId xmlns:a16="http://schemas.microsoft.com/office/drawing/2014/main" val="745076177"/>
+                  </a:ext>
+                </a:extLst>
+              </a:tr>
+              <a:tr h="310059">
+                <a:tc>
+                  <a:txBody>
+                    <a:bodyPr/>
+                    <a:lstStyle/>
+                    <a:p>
+                      <a:r>
+                        <a:rPr lang="en-US" dirty="0"/>
+                        <a:t>4</a:t>
+                      </a:r>
+                    </a:p>
+                  </a:txBody>
+                  <a:tcPr/>
+                </a:tc>
+                <a:tc>
+                  <a:txBody>
+                    <a:bodyPr/>
+                    <a:lstStyle/>
+                    <a:p>
+                      <a:r>
+                        <a:rPr lang="en-US" dirty="0"/>
+                        <a:t>0</a:t>
+                      </a:r>
+                    </a:p>
+                  </a:txBody>
+                  <a:tcPr/>
+                </a:tc>
+                <a:tc>
+                  <a:txBody>
+                    <a:bodyPr/>
+                    <a:lstStyle/>
+                    <a:p>
+                      <a:r>
+                        <a:rPr lang="en-US" dirty="0"/>
+                        <a:t>50</a:t>
+                      </a:r>
+                    </a:p>
+                  </a:txBody>
+                  <a:tcPr/>
+                </a:tc>
+                <a:tc>
+                  <a:txBody>
+                    <a:bodyPr/>
+                    <a:lstStyle/>
+                    <a:p>
+                      <a:r>
+                        <a:rPr lang="en-US" dirty="0"/>
+                        <a:t>90</a:t>
+                      </a:r>
+                    </a:p>
+                  </a:txBody>
+                  <a:tcPr/>
+                </a:tc>
+                <a:tc>
+                  <a:txBody>
+                    <a:bodyPr/>
+                    <a:lstStyle/>
+                    <a:p>
+                      <a:endParaRPr lang="en-US"/>
+                    </a:p>
+                  </a:txBody>
+                  <a:tcPr/>
+                </a:tc>
+                <a:extLst>
+                  <a:ext uri="{0D108BD9-81ED-4DB2-BD59-A6C34878D82A}">
+                    <a16:rowId xmlns:a16="http://schemas.microsoft.com/office/drawing/2014/main" val="2120115847"/>
+                  </a:ext>
+                </a:extLst>
+              </a:tr>
+              <a:tr h="310059">
+                <a:tc>
+                  <a:txBody>
+                    <a:bodyPr/>
+                    <a:lstStyle/>
+                    <a:p>
+                      <a:r>
+                        <a:rPr lang="en-US" dirty="0"/>
+                        <a:t>5</a:t>
+                      </a:r>
+                    </a:p>
+                  </a:txBody>
+                  <a:tcPr/>
+                </a:tc>
+                <a:tc>
+                  <a:txBody>
+                    <a:bodyPr/>
+                    <a:lstStyle/>
+                    <a:p>
+                      <a:r>
+                        <a:rPr lang="en-US" dirty="0"/>
+                        <a:t>0</a:t>
+                      </a:r>
+                    </a:p>
+                  </a:txBody>
+                  <a:tcPr/>
+                </a:tc>
+                <a:tc>
+                  <a:txBody>
+                    <a:bodyPr/>
+                    <a:lstStyle/>
+                    <a:p>
+                      <a:r>
+                        <a:rPr lang="en-US" dirty="0"/>
+                        <a:t>0</a:t>
+                      </a:r>
+                    </a:p>
+                  </a:txBody>
+                  <a:tcPr/>
+                </a:tc>
+                <a:tc>
+                  <a:txBody>
+                    <a:bodyPr/>
+                    <a:lstStyle/>
+                    <a:p>
+                      <a:r>
+                        <a:rPr lang="en-US" dirty="0"/>
+                        <a:t>90</a:t>
+                      </a:r>
+                    </a:p>
+                  </a:txBody>
+                  <a:tcPr/>
+                </a:tc>
+                <a:tc>
+                  <a:txBody>
+                    <a:bodyPr/>
+                    <a:lstStyle/>
+                    <a:p>
+                      <a:endParaRPr lang="en-US"/>
+                    </a:p>
+                  </a:txBody>
+                  <a:tcPr/>
+                </a:tc>
+                <a:extLst>
+                  <a:ext uri="{0D108BD9-81ED-4DB2-BD59-A6C34878D82A}">
+                    <a16:rowId xmlns:a16="http://schemas.microsoft.com/office/drawing/2014/main" val="2311988270"/>
+                  </a:ext>
+                </a:extLst>
+              </a:tr>
+              <a:tr h="310059">
+                <a:tc>
+                  <a:txBody>
+                    <a:bodyPr/>
+                    <a:lstStyle/>
+                    <a:p>
+                      <a:r>
+                        <a:rPr lang="en-US" dirty="0"/>
+                        <a:t>6</a:t>
+                      </a:r>
+                    </a:p>
+                  </a:txBody>
+                  <a:tcPr/>
+                </a:tc>
+                <a:tc>
+                  <a:txBody>
+                    <a:bodyPr/>
+                    <a:lstStyle/>
+                    <a:p>
+                      <a:r>
+                        <a:rPr lang="en-US" dirty="0"/>
+                        <a:t>0</a:t>
+                      </a:r>
+                    </a:p>
+                  </a:txBody>
+                  <a:tcPr/>
+                </a:tc>
+                <a:tc>
+                  <a:txBody>
+                    <a:bodyPr/>
+                    <a:lstStyle/>
+                    <a:p>
+                      <a:r>
+                        <a:rPr lang="en-US" dirty="0"/>
+                        <a:t>30</a:t>
+                      </a:r>
+                    </a:p>
+                  </a:txBody>
+                  <a:tcPr/>
+                </a:tc>
+                <a:tc>
+                  <a:txBody>
+                    <a:bodyPr/>
+                    <a:lstStyle/>
+                    <a:p>
+                      <a:r>
+                        <a:rPr lang="en-US" dirty="0"/>
+                        <a:t>0</a:t>
+                      </a:r>
+                    </a:p>
+                  </a:txBody>
+                  <a:tcPr/>
+                </a:tc>
+                <a:tc>
+                  <a:txBody>
+                    <a:bodyPr/>
+                    <a:lstStyle/>
+                    <a:p>
+                      <a:endParaRPr lang="en-US" dirty="0"/>
+                    </a:p>
+                  </a:txBody>
+                  <a:tcPr/>
+                </a:tc>
+                <a:extLst>
+                  <a:ext uri="{0D108BD9-81ED-4DB2-BD59-A6C34878D82A}">
+                    <a16:rowId xmlns:a16="http://schemas.microsoft.com/office/drawing/2014/main" val="2116824428"/>
+                  </a:ext>
+                </a:extLst>
+              </a:tr>
+            </a:tbl>
+          </a:graphicData>
+        </a:graphic>
+      </p:graphicFrame>
+      <p:grpSp>
+        <p:nvGrpSpPr>
+          <p:cNvPr id="45" name="Group 44">
+            <a:extLst>
+              <a:ext uri="{FF2B5EF4-FFF2-40B4-BE49-F238E27FC236}">
+                <a16:creationId xmlns:a16="http://schemas.microsoft.com/office/drawing/2014/main" id="{B2EA1B9B-B808-0AA5-2B9E-74FDBE8FA88B}"/>
+              </a:ext>
+            </a:extLst>
+          </p:cNvPr>
+          <p:cNvGrpSpPr/>
+          <p:nvPr/>
+        </p:nvGrpSpPr>
+        <p:grpSpPr>
+          <a:xfrm>
+            <a:off x="3161492" y="921758"/>
+            <a:ext cx="1275332" cy="1264818"/>
+            <a:chOff x="8485245" y="3442476"/>
+            <a:chExt cx="1275332" cy="1264818"/>
+          </a:xfrm>
+        </p:grpSpPr>
+        <p:cxnSp>
+          <p:nvCxnSpPr>
+            <p:cNvPr id="48" name="Straight Arrow Connector 47">
+              <a:extLst>
+                <a:ext uri="{FF2B5EF4-FFF2-40B4-BE49-F238E27FC236}">
+                  <a16:creationId xmlns:a16="http://schemas.microsoft.com/office/drawing/2014/main" id="{B7EDC93E-10B4-D17D-C848-DFA8297B2408}"/>
+                </a:ext>
+              </a:extLst>
+            </p:cNvPr>
+            <p:cNvCxnSpPr>
+              <a:cxnSpLocks/>
+            </p:cNvCxnSpPr>
+            <p:nvPr/>
+          </p:nvCxnSpPr>
+          <p:spPr>
+            <a:xfrm flipV="1">
+              <a:off x="9086223" y="3797809"/>
+              <a:ext cx="0" cy="526001"/>
+            </a:xfrm>
+            <a:prstGeom prst="straightConnector1">
+              <a:avLst/>
+            </a:prstGeom>
+            <a:ln w="38100">
+              <a:solidFill>
+                <a:schemeClr val="tx2">
+                  <a:lumMod val="50000"/>
+                  <a:lumOff val="50000"/>
+                </a:schemeClr>
+              </a:solidFill>
+              <a:tailEnd type="triangle"/>
+            </a:ln>
+          </p:spPr>
+          <p:style>
+            <a:lnRef idx="2">
+              <a:schemeClr val="dk1"/>
+            </a:lnRef>
+            <a:fillRef idx="0">
+              <a:schemeClr val="dk1"/>
+            </a:fillRef>
+            <a:effectRef idx="1">
+              <a:schemeClr val="dk1"/>
+            </a:effectRef>
+            <a:fontRef idx="minor">
+              <a:schemeClr val="tx1"/>
+            </a:fontRef>
+          </p:style>
+        </p:cxnSp>
+        <p:cxnSp>
+          <p:nvCxnSpPr>
+            <p:cNvPr id="68" name="Straight Arrow Connector 67">
+              <a:extLst>
+                <a:ext uri="{FF2B5EF4-FFF2-40B4-BE49-F238E27FC236}">
+                  <a16:creationId xmlns:a16="http://schemas.microsoft.com/office/drawing/2014/main" id="{710B3EA8-7127-B99E-4A34-76A8421ADBFB}"/>
+                </a:ext>
+              </a:extLst>
+            </p:cNvPr>
+            <p:cNvCxnSpPr>
+              <a:cxnSpLocks/>
+            </p:cNvCxnSpPr>
+            <p:nvPr/>
+          </p:nvCxnSpPr>
+          <p:spPr>
+            <a:xfrm flipH="1">
+              <a:off x="8687091" y="4323810"/>
+              <a:ext cx="399132" cy="383484"/>
+            </a:xfrm>
+            <a:prstGeom prst="straightConnector1">
+              <a:avLst/>
+            </a:prstGeom>
+            <a:ln w="38100">
+              <a:solidFill>
+                <a:schemeClr val="tx2">
+                  <a:lumMod val="50000"/>
+                  <a:lumOff val="50000"/>
+                </a:schemeClr>
+              </a:solidFill>
+              <a:tailEnd type="triangle"/>
+            </a:ln>
+          </p:spPr>
+          <p:style>
+            <a:lnRef idx="2">
+              <a:schemeClr val="dk1"/>
+            </a:lnRef>
+            <a:fillRef idx="0">
+              <a:schemeClr val="dk1"/>
+            </a:fillRef>
+            <a:effectRef idx="1">
+              <a:schemeClr val="dk1"/>
+            </a:effectRef>
+            <a:fontRef idx="minor">
+              <a:schemeClr val="tx1"/>
+            </a:fontRef>
+          </p:style>
+        </p:cxnSp>
+        <p:cxnSp>
+          <p:nvCxnSpPr>
+            <p:cNvPr id="71" name="Straight Arrow Connector 70">
+              <a:extLst>
+                <a:ext uri="{FF2B5EF4-FFF2-40B4-BE49-F238E27FC236}">
+                  <a16:creationId xmlns:a16="http://schemas.microsoft.com/office/drawing/2014/main" id="{EBD8CEC6-7DBB-AF65-3102-CE8A1D59270A}"/>
+                </a:ext>
+              </a:extLst>
+            </p:cNvPr>
+            <p:cNvCxnSpPr>
+              <a:cxnSpLocks/>
+            </p:cNvCxnSpPr>
+            <p:nvPr/>
+          </p:nvCxnSpPr>
+          <p:spPr>
+            <a:xfrm>
+              <a:off x="9086223" y="4323810"/>
+              <a:ext cx="375117" cy="0"/>
+            </a:xfrm>
+            <a:prstGeom prst="straightConnector1">
+              <a:avLst/>
+            </a:prstGeom>
+            <a:ln w="38100">
+              <a:solidFill>
+                <a:schemeClr val="tx2">
+                  <a:lumMod val="50000"/>
+                  <a:lumOff val="50000"/>
+                </a:schemeClr>
+              </a:solidFill>
+              <a:tailEnd type="triangle"/>
+            </a:ln>
+          </p:spPr>
+          <p:style>
+            <a:lnRef idx="2">
+              <a:schemeClr val="dk1"/>
+            </a:lnRef>
+            <a:fillRef idx="0">
+              <a:schemeClr val="dk1"/>
+            </a:fillRef>
+            <a:effectRef idx="1">
+              <a:schemeClr val="dk1"/>
+            </a:effectRef>
+            <a:fontRef idx="minor">
+              <a:schemeClr val="tx1"/>
+            </a:fontRef>
+          </p:style>
+        </p:cxnSp>
+        <p:sp>
+          <p:nvSpPr>
+            <p:cNvPr id="72" name="TextBox 71">
+              <a:extLst>
+                <a:ext uri="{FF2B5EF4-FFF2-40B4-BE49-F238E27FC236}">
+                  <a16:creationId xmlns:a16="http://schemas.microsoft.com/office/drawing/2014/main" id="{23F688F4-1B14-55EC-B20C-BE6E522D193B}"/>
+                </a:ext>
+              </a:extLst>
+            </p:cNvPr>
+            <p:cNvSpPr txBox="1"/>
+            <p:nvPr/>
+          </p:nvSpPr>
+          <p:spPr>
+            <a:xfrm>
+              <a:off x="8916711" y="3442476"/>
+              <a:ext cx="417102" cy="400110"/>
+            </a:xfrm>
+            <a:prstGeom prst="rect">
+              <a:avLst/>
+            </a:prstGeom>
+            <a:noFill/>
+          </p:spPr>
+          <p:txBody>
+            <a:bodyPr wrap="none" rtlCol="0">
+              <a:spAutoFit/>
+            </a:bodyPr>
+            <a:lstStyle/>
+            <a:p>
+              <a:r>
+                <a:rPr lang="en-US" sz="2000" dirty="0"/>
+                <a:t>X</a:t>
+              </a:r>
+              <a:r>
+                <a:rPr lang="en-US" sz="2000" baseline="-25000" dirty="0"/>
+                <a:t>3</a:t>
+              </a:r>
+            </a:p>
+          </p:txBody>
+        </p:sp>
+        <p:sp>
+          <p:nvSpPr>
+            <p:cNvPr id="73" name="TextBox 72">
+              <a:extLst>
+                <a:ext uri="{FF2B5EF4-FFF2-40B4-BE49-F238E27FC236}">
+                  <a16:creationId xmlns:a16="http://schemas.microsoft.com/office/drawing/2014/main" id="{6AE87088-96DD-AA06-D95A-E2AF2E1D6E44}"/>
+                </a:ext>
+              </a:extLst>
+            </p:cNvPr>
+            <p:cNvSpPr txBox="1"/>
+            <p:nvPr/>
+          </p:nvSpPr>
+          <p:spPr>
+            <a:xfrm>
+              <a:off x="9351491" y="3909949"/>
+              <a:ext cx="409086" cy="400110"/>
+            </a:xfrm>
+            <a:prstGeom prst="rect">
+              <a:avLst/>
+            </a:prstGeom>
+            <a:noFill/>
+          </p:spPr>
+          <p:txBody>
+            <a:bodyPr wrap="none" rtlCol="0">
+              <a:spAutoFit/>
+            </a:bodyPr>
+            <a:lstStyle/>
+            <a:p>
+              <a:r>
+                <a:rPr lang="en-US" sz="2000" dirty="0"/>
+                <a:t>Z</a:t>
+              </a:r>
+              <a:r>
+                <a:rPr lang="en-US" sz="2000" baseline="-25000" dirty="0"/>
+                <a:t>3</a:t>
+              </a:r>
+            </a:p>
+          </p:txBody>
+        </p:sp>
+        <p:sp>
+          <p:nvSpPr>
+            <p:cNvPr id="74" name="TextBox 73">
+              <a:extLst>
+                <a:ext uri="{FF2B5EF4-FFF2-40B4-BE49-F238E27FC236}">
+                  <a16:creationId xmlns:a16="http://schemas.microsoft.com/office/drawing/2014/main" id="{50358F6A-5637-8C01-E942-6234C5FD2171}"/>
+                </a:ext>
+              </a:extLst>
+            </p:cNvPr>
+            <p:cNvSpPr txBox="1"/>
+            <p:nvPr/>
+          </p:nvSpPr>
+          <p:spPr>
+            <a:xfrm>
+              <a:off x="8485245" y="4098140"/>
+              <a:ext cx="413896" cy="400110"/>
+            </a:xfrm>
+            <a:prstGeom prst="rect">
+              <a:avLst/>
+            </a:prstGeom>
+            <a:noFill/>
+          </p:spPr>
+          <p:txBody>
+            <a:bodyPr wrap="none" rtlCol="0">
+              <a:spAutoFit/>
+            </a:bodyPr>
+            <a:lstStyle/>
+            <a:p>
+              <a:r>
+                <a:rPr lang="en-US" sz="2000" dirty="0"/>
+                <a:t>Y</a:t>
+              </a:r>
+              <a:r>
+                <a:rPr lang="en-US" sz="2000" baseline="-25000" dirty="0"/>
+                <a:t>3</a:t>
+              </a:r>
+            </a:p>
+          </p:txBody>
+        </p:sp>
+      </p:grpSp>
+      <p:pic>
+        <p:nvPicPr>
+          <p:cNvPr id="78" name="Picture 77">
+            <a:extLst>
+              <a:ext uri="{FF2B5EF4-FFF2-40B4-BE49-F238E27FC236}">
+                <a16:creationId xmlns:a16="http://schemas.microsoft.com/office/drawing/2014/main" id="{536ECC96-BB77-CF78-3BA9-18EAE700A072}"/>
+              </a:ext>
+            </a:extLst>
+          </p:cNvPr>
+          <p:cNvPicPr>
+            <a:picLocks noChangeAspect="1"/>
+          </p:cNvPicPr>
+          <p:nvPr/>
+        </p:nvPicPr>
+        <p:blipFill>
+          <a:blip r:embed="rId2"/>
+          <a:stretch>
+            <a:fillRect/>
+          </a:stretch>
+        </p:blipFill>
+        <p:spPr>
+          <a:xfrm>
+            <a:off x="9004038" y="4762160"/>
+            <a:ext cx="5334000" cy="2171700"/>
+          </a:xfrm>
+          <a:prstGeom prst="rect">
+            <a:avLst/>
+          </a:prstGeom>
+        </p:spPr>
+      </p:pic>
+      <p:cxnSp>
+        <p:nvCxnSpPr>
+          <p:cNvPr id="7" name="Straight Connector 6">
+            <a:extLst>
+              <a:ext uri="{FF2B5EF4-FFF2-40B4-BE49-F238E27FC236}">
+                <a16:creationId xmlns:a16="http://schemas.microsoft.com/office/drawing/2014/main" id="{71539FC9-B686-1B72-5F4B-8D3057160605}"/>
+              </a:ext>
+            </a:extLst>
+          </p:cNvPr>
+          <p:cNvCxnSpPr>
+            <a:cxnSpLocks/>
+          </p:cNvCxnSpPr>
+          <p:nvPr/>
+        </p:nvCxnSpPr>
+        <p:spPr>
+          <a:xfrm flipH="1">
+            <a:off x="5609146" y="983696"/>
+            <a:ext cx="1614402" cy="1486802"/>
+          </a:xfrm>
+          <a:prstGeom prst="line">
+            <a:avLst/>
+          </a:prstGeom>
+          <a:ln w="19050" cap="flat" cmpd="sng" algn="ctr">
+            <a:solidFill>
+              <a:schemeClr val="dk1"/>
+            </a:solidFill>
+            <a:prstDash val="dash"/>
+            <a:round/>
+            <a:headEnd type="none" w="med" len="med"/>
+            <a:tailEnd type="none" w="med" len="med"/>
+          </a:ln>
+        </p:spPr>
+        <p:style>
+          <a:lnRef idx="0">
+            <a:scrgbClr r="0" g="0" b="0"/>
+          </a:lnRef>
+          <a:fillRef idx="0">
+            <a:scrgbClr r="0" g="0" b="0"/>
+          </a:fillRef>
+          <a:effectRef idx="0">
+            <a:scrgbClr r="0" g="0" b="0"/>
+          </a:effectRef>
+          <a:fontRef idx="minor">
+            <a:schemeClr val="tx1"/>
+          </a:fontRef>
+        </p:style>
+      </p:cxnSp>
+      <p:grpSp>
+        <p:nvGrpSpPr>
+          <p:cNvPr id="9" name="Group 8">
+            <a:extLst>
+              <a:ext uri="{FF2B5EF4-FFF2-40B4-BE49-F238E27FC236}">
+                <a16:creationId xmlns:a16="http://schemas.microsoft.com/office/drawing/2014/main" id="{1482150D-F2B1-C743-6D1A-4CC1D3A00CF1}"/>
+              </a:ext>
+            </a:extLst>
+          </p:cNvPr>
+          <p:cNvGrpSpPr/>
+          <p:nvPr/>
+        </p:nvGrpSpPr>
+        <p:grpSpPr>
+          <a:xfrm>
+            <a:off x="5476489" y="1998830"/>
+            <a:ext cx="248575" cy="471998"/>
+            <a:chOff x="2246050" y="1305017"/>
+            <a:chExt cx="204187" cy="471998"/>
+          </a:xfrm>
+        </p:grpSpPr>
+        <p:sp>
+          <p:nvSpPr>
+            <p:cNvPr id="11" name="Isosceles Triangle 10">
+              <a:extLst>
+                <a:ext uri="{FF2B5EF4-FFF2-40B4-BE49-F238E27FC236}">
+                  <a16:creationId xmlns:a16="http://schemas.microsoft.com/office/drawing/2014/main" id="{F1AA208A-7275-5245-E64B-41B855D541B8}"/>
+                </a:ext>
+              </a:extLst>
+            </p:cNvPr>
+            <p:cNvSpPr/>
+            <p:nvPr/>
+          </p:nvSpPr>
+          <p:spPr>
+            <a:xfrm>
+              <a:off x="2246050" y="1305017"/>
+              <a:ext cx="204187" cy="213065"/>
+            </a:xfrm>
+            <a:prstGeom prst="triangle">
+              <a:avLst/>
+            </a:prstGeom>
+          </p:spPr>
+          <p:style>
+            <a:lnRef idx="2">
+              <a:schemeClr val="dk1">
+                <a:shade val="15000"/>
+              </a:schemeClr>
+            </a:lnRef>
+            <a:fillRef idx="1">
+              <a:schemeClr val="dk1"/>
+            </a:fillRef>
+            <a:effectRef idx="0">
+              <a:schemeClr val="dk1"/>
+            </a:effectRef>
+            <a:fontRef idx="minor">
+              <a:schemeClr val="lt1"/>
+            </a:fontRef>
+          </p:style>
+          <p:txBody>
+            <a:bodyPr rtlCol="0" anchor="ctr"/>
+            <a:lstStyle/>
+            <a:p>
+              <a:pPr algn="ctr"/>
+              <a:endParaRPr lang="en-US"/>
+            </a:p>
+          </p:txBody>
+        </p:sp>
+        <p:sp>
+          <p:nvSpPr>
+            <p:cNvPr id="13" name="Isosceles Triangle 12">
+              <a:extLst>
+                <a:ext uri="{FF2B5EF4-FFF2-40B4-BE49-F238E27FC236}">
+                  <a16:creationId xmlns:a16="http://schemas.microsoft.com/office/drawing/2014/main" id="{2BFC611C-D9BF-8E32-0615-6C721A5F2005}"/>
+                </a:ext>
+              </a:extLst>
+            </p:cNvPr>
+            <p:cNvSpPr/>
+            <p:nvPr/>
+          </p:nvSpPr>
+          <p:spPr>
+            <a:xfrm rot="10800000">
+              <a:off x="2246050" y="1563950"/>
+              <a:ext cx="204187" cy="213065"/>
+            </a:xfrm>
+            <a:prstGeom prst="triangle">
+              <a:avLst/>
+            </a:prstGeom>
+          </p:spPr>
+          <p:style>
+            <a:lnRef idx="2">
+              <a:schemeClr val="dk1">
+                <a:shade val="15000"/>
+              </a:schemeClr>
+            </a:lnRef>
+            <a:fillRef idx="1">
+              <a:schemeClr val="dk1"/>
+            </a:fillRef>
+            <a:effectRef idx="0">
+              <a:schemeClr val="dk1"/>
+            </a:effectRef>
+            <a:fontRef idx="minor">
+              <a:schemeClr val="lt1"/>
+            </a:fontRef>
+          </p:style>
+          <p:txBody>
+            <a:bodyPr rtlCol="0" anchor="ctr"/>
+            <a:lstStyle/>
+            <a:p>
+              <a:pPr algn="ctr"/>
+              <a:endParaRPr lang="en-US"/>
+            </a:p>
+          </p:txBody>
+        </p:sp>
+      </p:grpSp>
+      <p:grpSp>
+        <p:nvGrpSpPr>
+          <p:cNvPr id="14" name="Group 13">
+            <a:extLst>
+              <a:ext uri="{FF2B5EF4-FFF2-40B4-BE49-F238E27FC236}">
+                <a16:creationId xmlns:a16="http://schemas.microsoft.com/office/drawing/2014/main" id="{E0C90A47-3537-5F30-4206-0A3F18340034}"/>
+              </a:ext>
+            </a:extLst>
+          </p:cNvPr>
+          <p:cNvGrpSpPr/>
+          <p:nvPr/>
+        </p:nvGrpSpPr>
+        <p:grpSpPr>
+          <a:xfrm>
+            <a:off x="6833676" y="481277"/>
+            <a:ext cx="1106873" cy="1397890"/>
+            <a:chOff x="8672327" y="3887567"/>
+            <a:chExt cx="1106873" cy="1397890"/>
+          </a:xfrm>
+        </p:grpSpPr>
+        <p:cxnSp>
+          <p:nvCxnSpPr>
+            <p:cNvPr id="23" name="Straight Arrow Connector 22">
+              <a:extLst>
+                <a:ext uri="{FF2B5EF4-FFF2-40B4-BE49-F238E27FC236}">
+                  <a16:creationId xmlns:a16="http://schemas.microsoft.com/office/drawing/2014/main" id="{AF692DD3-59EB-342F-1B23-95C9C88606CD}"/>
+                </a:ext>
+              </a:extLst>
+            </p:cNvPr>
+            <p:cNvCxnSpPr>
+              <a:cxnSpLocks/>
+            </p:cNvCxnSpPr>
+            <p:nvPr/>
+          </p:nvCxnSpPr>
+          <p:spPr>
+            <a:xfrm>
+              <a:off x="9086223" y="4323810"/>
+              <a:ext cx="13713" cy="670006"/>
+            </a:xfrm>
+            <a:prstGeom prst="straightConnector1">
+              <a:avLst/>
+            </a:prstGeom>
+            <a:ln w="38100">
+              <a:solidFill>
+                <a:schemeClr val="tx2">
+                  <a:lumMod val="50000"/>
+                  <a:lumOff val="50000"/>
+                </a:schemeClr>
+              </a:solidFill>
+              <a:tailEnd type="triangle"/>
+            </a:ln>
+          </p:spPr>
+          <p:style>
+            <a:lnRef idx="2">
+              <a:schemeClr val="dk1"/>
+            </a:lnRef>
+            <a:fillRef idx="0">
+              <a:schemeClr val="dk1"/>
+            </a:fillRef>
+            <a:effectRef idx="1">
+              <a:schemeClr val="dk1"/>
+            </a:effectRef>
+            <a:fontRef idx="minor">
+              <a:schemeClr val="tx1"/>
+            </a:fontRef>
+          </p:style>
+        </p:cxnSp>
+        <p:cxnSp>
+          <p:nvCxnSpPr>
+            <p:cNvPr id="26" name="Straight Arrow Connector 25">
+              <a:extLst>
+                <a:ext uri="{FF2B5EF4-FFF2-40B4-BE49-F238E27FC236}">
+                  <a16:creationId xmlns:a16="http://schemas.microsoft.com/office/drawing/2014/main" id="{F474702E-E34E-F1CF-7542-79250438BB7D}"/>
+                </a:ext>
+              </a:extLst>
+            </p:cNvPr>
+            <p:cNvCxnSpPr>
+              <a:cxnSpLocks/>
+            </p:cNvCxnSpPr>
+            <p:nvPr/>
+          </p:nvCxnSpPr>
+          <p:spPr>
+            <a:xfrm flipV="1">
+              <a:off x="9086223" y="4317141"/>
+              <a:ext cx="692977" cy="6669"/>
+            </a:xfrm>
+            <a:prstGeom prst="straightConnector1">
+              <a:avLst/>
+            </a:prstGeom>
+            <a:ln w="38100">
+              <a:solidFill>
+                <a:schemeClr val="tx2">
+                  <a:lumMod val="50000"/>
+                  <a:lumOff val="50000"/>
+                </a:schemeClr>
+              </a:solidFill>
+              <a:tailEnd type="triangle"/>
+            </a:ln>
+          </p:spPr>
+          <p:style>
+            <a:lnRef idx="2">
+              <a:schemeClr val="dk1"/>
+            </a:lnRef>
+            <a:fillRef idx="0">
+              <a:schemeClr val="dk1"/>
+            </a:fillRef>
+            <a:effectRef idx="1">
+              <a:schemeClr val="dk1"/>
+            </a:effectRef>
+            <a:fontRef idx="minor">
+              <a:schemeClr val="tx1"/>
+            </a:fontRef>
+          </p:style>
+        </p:cxnSp>
+        <p:cxnSp>
+          <p:nvCxnSpPr>
+            <p:cNvPr id="27" name="Straight Arrow Connector 26">
+              <a:extLst>
+                <a:ext uri="{FF2B5EF4-FFF2-40B4-BE49-F238E27FC236}">
+                  <a16:creationId xmlns:a16="http://schemas.microsoft.com/office/drawing/2014/main" id="{0D9C8E79-D26F-E01F-9F7D-4E0EFFA2038C}"/>
+                </a:ext>
+              </a:extLst>
+            </p:cNvPr>
+            <p:cNvCxnSpPr>
+              <a:cxnSpLocks/>
+            </p:cNvCxnSpPr>
+            <p:nvPr/>
+          </p:nvCxnSpPr>
+          <p:spPr>
+            <a:xfrm flipH="1">
+              <a:off x="8810597" y="4323810"/>
+              <a:ext cx="275626" cy="262587"/>
+            </a:xfrm>
+            <a:prstGeom prst="straightConnector1">
+              <a:avLst/>
+            </a:prstGeom>
+            <a:ln w="38100">
+              <a:solidFill>
+                <a:schemeClr val="tx2">
+                  <a:lumMod val="50000"/>
+                  <a:lumOff val="50000"/>
+                </a:schemeClr>
+              </a:solidFill>
+              <a:tailEnd type="triangle"/>
+            </a:ln>
+          </p:spPr>
+          <p:style>
+            <a:lnRef idx="2">
+              <a:schemeClr val="dk1"/>
+            </a:lnRef>
+            <a:fillRef idx="0">
+              <a:schemeClr val="dk1"/>
+            </a:fillRef>
+            <a:effectRef idx="1">
+              <a:schemeClr val="dk1"/>
+            </a:effectRef>
+            <a:fontRef idx="minor">
+              <a:schemeClr val="tx1"/>
+            </a:fontRef>
+          </p:style>
+        </p:cxnSp>
+        <p:sp>
+          <p:nvSpPr>
+            <p:cNvPr id="28" name="TextBox 27">
+              <a:extLst>
+                <a:ext uri="{FF2B5EF4-FFF2-40B4-BE49-F238E27FC236}">
+                  <a16:creationId xmlns:a16="http://schemas.microsoft.com/office/drawing/2014/main" id="{925EE3D8-609B-A956-C116-FE404D91273C}"/>
+                </a:ext>
+              </a:extLst>
+            </p:cNvPr>
+            <p:cNvSpPr txBox="1"/>
+            <p:nvPr/>
+          </p:nvSpPr>
+          <p:spPr>
+            <a:xfrm>
+              <a:off x="9312354" y="3887567"/>
+              <a:ext cx="417102" cy="400110"/>
+            </a:xfrm>
+            <a:prstGeom prst="rect">
+              <a:avLst/>
+            </a:prstGeom>
+            <a:noFill/>
+          </p:spPr>
+          <p:txBody>
+            <a:bodyPr wrap="none" rtlCol="0">
+              <a:spAutoFit/>
+            </a:bodyPr>
+            <a:lstStyle/>
+            <a:p>
+              <a:r>
+                <a:rPr lang="en-US" sz="2000" dirty="0"/>
+                <a:t>X</a:t>
+              </a:r>
+              <a:r>
+                <a:rPr lang="en-US" sz="2000" baseline="-25000" dirty="0"/>
+                <a:t>6</a:t>
+              </a:r>
+            </a:p>
+          </p:txBody>
+        </p:sp>
+        <p:sp>
+          <p:nvSpPr>
+            <p:cNvPr id="75" name="TextBox 74">
+              <a:extLst>
+                <a:ext uri="{FF2B5EF4-FFF2-40B4-BE49-F238E27FC236}">
+                  <a16:creationId xmlns:a16="http://schemas.microsoft.com/office/drawing/2014/main" id="{B3383A21-99F7-AF9E-82D4-D12C7FD3C328}"/>
+                </a:ext>
+              </a:extLst>
+            </p:cNvPr>
+            <p:cNvSpPr txBox="1"/>
+            <p:nvPr/>
+          </p:nvSpPr>
+          <p:spPr>
+            <a:xfrm>
+              <a:off x="9034689" y="4885347"/>
+              <a:ext cx="409086" cy="400110"/>
+            </a:xfrm>
+            <a:prstGeom prst="rect">
+              <a:avLst/>
+            </a:prstGeom>
+            <a:noFill/>
+          </p:spPr>
+          <p:txBody>
+            <a:bodyPr wrap="none" rtlCol="0">
+              <a:spAutoFit/>
+            </a:bodyPr>
+            <a:lstStyle/>
+            <a:p>
+              <a:r>
+                <a:rPr lang="en-US" sz="2000" dirty="0"/>
+                <a:t>Z</a:t>
+              </a:r>
+              <a:r>
+                <a:rPr lang="en-US" sz="2000" baseline="-25000" dirty="0"/>
+                <a:t>6</a:t>
+              </a:r>
+            </a:p>
+          </p:txBody>
+        </p:sp>
+        <p:sp>
+          <p:nvSpPr>
+            <p:cNvPr id="76" name="TextBox 75">
+              <a:extLst>
+                <a:ext uri="{FF2B5EF4-FFF2-40B4-BE49-F238E27FC236}">
+                  <a16:creationId xmlns:a16="http://schemas.microsoft.com/office/drawing/2014/main" id="{BC97FA24-80CE-5E12-3145-2624FE1CB1A3}"/>
+                </a:ext>
+              </a:extLst>
+            </p:cNvPr>
+            <p:cNvSpPr txBox="1"/>
+            <p:nvPr/>
+          </p:nvSpPr>
+          <p:spPr>
+            <a:xfrm>
+              <a:off x="8672327" y="3930210"/>
+              <a:ext cx="413896" cy="400110"/>
+            </a:xfrm>
+            <a:prstGeom prst="rect">
+              <a:avLst/>
+            </a:prstGeom>
+            <a:noFill/>
+          </p:spPr>
+          <p:txBody>
+            <a:bodyPr wrap="none" rtlCol="0">
+              <a:spAutoFit/>
+            </a:bodyPr>
+            <a:lstStyle/>
+            <a:p>
+              <a:r>
+                <a:rPr lang="en-US" sz="2000" dirty="0"/>
+                <a:t>Y</a:t>
+              </a:r>
+              <a:r>
+                <a:rPr lang="en-US" sz="2000" baseline="-25000" dirty="0"/>
+                <a:t>6</a:t>
+              </a:r>
+            </a:p>
+          </p:txBody>
+        </p:sp>
+      </p:grpSp>
+      <p:sp>
+        <p:nvSpPr>
+          <p:cNvPr id="77" name="TextBox 76">
+            <a:extLst>
+              <a:ext uri="{FF2B5EF4-FFF2-40B4-BE49-F238E27FC236}">
+                <a16:creationId xmlns:a16="http://schemas.microsoft.com/office/drawing/2014/main" id="{A395744E-BD56-3BBB-9022-3E92B6198D7C}"/>
+              </a:ext>
+            </a:extLst>
+          </p:cNvPr>
+          <p:cNvSpPr txBox="1"/>
+          <p:nvPr/>
+        </p:nvSpPr>
+        <p:spPr>
+          <a:xfrm>
+            <a:off x="-16159" y="9166"/>
+            <a:ext cx="4604722" cy="369332"/>
+          </a:xfrm>
+          <a:prstGeom prst="rect">
+            <a:avLst/>
+          </a:prstGeom>
+          <a:noFill/>
+        </p:spPr>
+        <p:txBody>
+          <a:bodyPr wrap="none" rtlCol="0">
+            <a:spAutoFit/>
+          </a:bodyPr>
+          <a:lstStyle/>
+          <a:p>
+            <a:r>
+              <a:rPr lang="en-US" altLang="zh-CN" dirty="0"/>
+              <a:t>MCK Robot DH coordination and parameters</a:t>
+            </a:r>
+            <a:endParaRPr lang="en-US" dirty="0"/>
+          </a:p>
+        </p:txBody>
+      </p:sp>
+      <p:grpSp>
+        <p:nvGrpSpPr>
+          <p:cNvPr id="95" name="Group 94">
+            <a:extLst>
+              <a:ext uri="{FF2B5EF4-FFF2-40B4-BE49-F238E27FC236}">
+                <a16:creationId xmlns:a16="http://schemas.microsoft.com/office/drawing/2014/main" id="{2E074E4C-C0C1-AD17-EA30-C728F461D334}"/>
+              </a:ext>
+            </a:extLst>
+          </p:cNvPr>
+          <p:cNvGrpSpPr/>
+          <p:nvPr/>
+        </p:nvGrpSpPr>
+        <p:grpSpPr>
+          <a:xfrm>
+            <a:off x="6019506" y="1281383"/>
+            <a:ext cx="1091455" cy="1061558"/>
+            <a:chOff x="8672327" y="3904041"/>
+            <a:chExt cx="1091455" cy="1061558"/>
+          </a:xfrm>
+        </p:grpSpPr>
+        <p:cxnSp>
+          <p:nvCxnSpPr>
+            <p:cNvPr id="39" name="Straight Arrow Connector 38">
+              <a:extLst>
+                <a:ext uri="{FF2B5EF4-FFF2-40B4-BE49-F238E27FC236}">
+                  <a16:creationId xmlns:a16="http://schemas.microsoft.com/office/drawing/2014/main" id="{46DDC872-B033-4FC9-5D7E-E8B3CB5E8D73}"/>
+                </a:ext>
+              </a:extLst>
+            </p:cNvPr>
+            <p:cNvCxnSpPr>
+              <a:cxnSpLocks/>
+            </p:cNvCxnSpPr>
+            <p:nvPr/>
+          </p:nvCxnSpPr>
+          <p:spPr>
+            <a:xfrm>
+              <a:off x="9086223" y="4323810"/>
+              <a:ext cx="19625" cy="641789"/>
+            </a:xfrm>
+            <a:prstGeom prst="straightConnector1">
+              <a:avLst/>
+            </a:prstGeom>
+            <a:ln w="38100">
+              <a:solidFill>
+                <a:schemeClr val="tx2">
+                  <a:lumMod val="50000"/>
+                  <a:lumOff val="50000"/>
+                </a:schemeClr>
+              </a:solidFill>
+              <a:tailEnd type="triangle"/>
+            </a:ln>
+          </p:spPr>
+          <p:style>
+            <a:lnRef idx="2">
+              <a:schemeClr val="dk1"/>
+            </a:lnRef>
+            <a:fillRef idx="0">
+              <a:schemeClr val="dk1"/>
+            </a:fillRef>
+            <a:effectRef idx="1">
+              <a:schemeClr val="dk1"/>
+            </a:effectRef>
+            <a:fontRef idx="minor">
+              <a:schemeClr val="tx1"/>
+            </a:fontRef>
+          </p:style>
+        </p:cxnSp>
+        <p:cxnSp>
+          <p:nvCxnSpPr>
+            <p:cNvPr id="40" name="Straight Arrow Connector 39">
+              <a:extLst>
+                <a:ext uri="{FF2B5EF4-FFF2-40B4-BE49-F238E27FC236}">
+                  <a16:creationId xmlns:a16="http://schemas.microsoft.com/office/drawing/2014/main" id="{B6580AE8-FC98-F1EF-7429-C28E0946B84B}"/>
+                </a:ext>
+              </a:extLst>
+            </p:cNvPr>
+            <p:cNvCxnSpPr>
+              <a:cxnSpLocks/>
+            </p:cNvCxnSpPr>
+            <p:nvPr/>
+          </p:nvCxnSpPr>
+          <p:spPr>
+            <a:xfrm>
+              <a:off x="9086223" y="4323810"/>
+              <a:ext cx="548630" cy="0"/>
+            </a:xfrm>
+            <a:prstGeom prst="straightConnector1">
+              <a:avLst/>
+            </a:prstGeom>
+            <a:ln w="38100">
+              <a:solidFill>
+                <a:schemeClr val="tx2">
+                  <a:lumMod val="50000"/>
+                  <a:lumOff val="50000"/>
+                </a:schemeClr>
+              </a:solidFill>
+              <a:tailEnd type="triangle"/>
+            </a:ln>
+          </p:spPr>
+          <p:style>
+            <a:lnRef idx="2">
+              <a:schemeClr val="dk1"/>
+            </a:lnRef>
+            <a:fillRef idx="0">
+              <a:schemeClr val="dk1"/>
+            </a:fillRef>
+            <a:effectRef idx="1">
+              <a:schemeClr val="dk1"/>
+            </a:effectRef>
+            <a:fontRef idx="minor">
+              <a:schemeClr val="tx1"/>
+            </a:fontRef>
+          </p:style>
+        </p:cxnSp>
+        <p:cxnSp>
+          <p:nvCxnSpPr>
+            <p:cNvPr id="41" name="Straight Arrow Connector 40">
+              <a:extLst>
+                <a:ext uri="{FF2B5EF4-FFF2-40B4-BE49-F238E27FC236}">
+                  <a16:creationId xmlns:a16="http://schemas.microsoft.com/office/drawing/2014/main" id="{A516E6B8-4041-E25D-3609-CAD86C5BD83C}"/>
+                </a:ext>
+              </a:extLst>
+            </p:cNvPr>
+            <p:cNvCxnSpPr>
+              <a:cxnSpLocks/>
+            </p:cNvCxnSpPr>
+            <p:nvPr/>
+          </p:nvCxnSpPr>
+          <p:spPr>
+            <a:xfrm flipH="1">
+              <a:off x="8810597" y="4323810"/>
+              <a:ext cx="275626" cy="262587"/>
+            </a:xfrm>
+            <a:prstGeom prst="straightConnector1">
+              <a:avLst/>
+            </a:prstGeom>
+            <a:ln w="38100">
+              <a:solidFill>
+                <a:schemeClr val="tx2">
+                  <a:lumMod val="50000"/>
+                  <a:lumOff val="50000"/>
+                </a:schemeClr>
+              </a:solidFill>
+              <a:tailEnd type="triangle"/>
+            </a:ln>
+          </p:spPr>
+          <p:style>
+            <a:lnRef idx="2">
+              <a:schemeClr val="dk1"/>
+            </a:lnRef>
+            <a:fillRef idx="0">
+              <a:schemeClr val="dk1"/>
+            </a:fillRef>
+            <a:effectRef idx="1">
+              <a:schemeClr val="dk1"/>
+            </a:effectRef>
+            <a:fontRef idx="minor">
+              <a:schemeClr val="tx1"/>
+            </a:fontRef>
+          </p:style>
+        </p:cxnSp>
+        <p:sp>
+          <p:nvSpPr>
+            <p:cNvPr id="42" name="TextBox 41">
+              <a:extLst>
+                <a:ext uri="{FF2B5EF4-FFF2-40B4-BE49-F238E27FC236}">
+                  <a16:creationId xmlns:a16="http://schemas.microsoft.com/office/drawing/2014/main" id="{467A0B55-DE40-29B3-4DC8-4C2EC054400D}"/>
+                </a:ext>
+              </a:extLst>
+            </p:cNvPr>
+            <p:cNvSpPr txBox="1"/>
+            <p:nvPr/>
+          </p:nvSpPr>
+          <p:spPr>
+            <a:xfrm>
+              <a:off x="9346680" y="3904041"/>
+              <a:ext cx="417102" cy="400110"/>
+            </a:xfrm>
+            <a:prstGeom prst="rect">
+              <a:avLst/>
+            </a:prstGeom>
+            <a:noFill/>
+          </p:spPr>
+          <p:txBody>
+            <a:bodyPr wrap="none" rtlCol="0">
+              <a:spAutoFit/>
+            </a:bodyPr>
+            <a:lstStyle/>
+            <a:p>
+              <a:r>
+                <a:rPr lang="en-US" sz="2000" dirty="0"/>
+                <a:t>X</a:t>
+              </a:r>
+              <a:r>
+                <a:rPr lang="en-US" sz="2000" baseline="-25000" dirty="0"/>
+                <a:t>5</a:t>
+              </a:r>
+            </a:p>
+          </p:txBody>
+        </p:sp>
+        <p:sp>
+          <p:nvSpPr>
+            <p:cNvPr id="43" name="TextBox 42">
+              <a:extLst>
+                <a:ext uri="{FF2B5EF4-FFF2-40B4-BE49-F238E27FC236}">
+                  <a16:creationId xmlns:a16="http://schemas.microsoft.com/office/drawing/2014/main" id="{0BAD6E37-5747-2892-D475-D3B182795F29}"/>
+                </a:ext>
+              </a:extLst>
+            </p:cNvPr>
+            <p:cNvSpPr txBox="1"/>
+            <p:nvPr/>
+          </p:nvSpPr>
+          <p:spPr>
+            <a:xfrm>
+              <a:off x="9072152" y="4528595"/>
+              <a:ext cx="409086" cy="400110"/>
+            </a:xfrm>
+            <a:prstGeom prst="rect">
+              <a:avLst/>
+            </a:prstGeom>
+            <a:noFill/>
+          </p:spPr>
+          <p:txBody>
+            <a:bodyPr wrap="none" rtlCol="0">
+              <a:spAutoFit/>
+            </a:bodyPr>
+            <a:lstStyle/>
+            <a:p>
+              <a:r>
+                <a:rPr lang="en-US" sz="2000" dirty="0"/>
+                <a:t>Z</a:t>
+              </a:r>
+              <a:r>
+                <a:rPr lang="en-US" sz="2000" baseline="-25000" dirty="0"/>
+                <a:t>5</a:t>
+              </a:r>
+            </a:p>
+          </p:txBody>
+        </p:sp>
+        <p:sp>
+          <p:nvSpPr>
+            <p:cNvPr id="44" name="TextBox 43">
+              <a:extLst>
+                <a:ext uri="{FF2B5EF4-FFF2-40B4-BE49-F238E27FC236}">
+                  <a16:creationId xmlns:a16="http://schemas.microsoft.com/office/drawing/2014/main" id="{ECB2A78F-8EED-1FF2-6D7A-CFFDDFC00DB3}"/>
+                </a:ext>
+              </a:extLst>
+            </p:cNvPr>
+            <p:cNvSpPr txBox="1"/>
+            <p:nvPr/>
+          </p:nvSpPr>
+          <p:spPr>
+            <a:xfrm>
+              <a:off x="8672327" y="3930210"/>
+              <a:ext cx="413896" cy="400110"/>
+            </a:xfrm>
+            <a:prstGeom prst="rect">
+              <a:avLst/>
+            </a:prstGeom>
+            <a:noFill/>
+          </p:spPr>
+          <p:txBody>
+            <a:bodyPr wrap="none" rtlCol="0">
+              <a:spAutoFit/>
+            </a:bodyPr>
+            <a:lstStyle/>
+            <a:p>
+              <a:r>
+                <a:rPr lang="en-US" sz="2000" dirty="0"/>
+                <a:t>Y</a:t>
+              </a:r>
+              <a:r>
+                <a:rPr lang="en-US" sz="2000" baseline="-25000" dirty="0"/>
+                <a:t>5</a:t>
+              </a:r>
+            </a:p>
+          </p:txBody>
+        </p:sp>
+      </p:grpSp>
+      <p:sp>
+        <p:nvSpPr>
+          <p:cNvPr id="86" name="TextBox 85">
+            <a:extLst>
+              <a:ext uri="{FF2B5EF4-FFF2-40B4-BE49-F238E27FC236}">
+                <a16:creationId xmlns:a16="http://schemas.microsoft.com/office/drawing/2014/main" id="{FD6D826B-49EF-030C-AA48-2DC94D7AA0E6}"/>
+              </a:ext>
+            </a:extLst>
+          </p:cNvPr>
+          <p:cNvSpPr txBox="1"/>
+          <p:nvPr/>
+        </p:nvSpPr>
+        <p:spPr>
+          <a:xfrm>
+            <a:off x="4833176" y="5131885"/>
+            <a:ext cx="834177" cy="369332"/>
+          </a:xfrm>
+          <a:prstGeom prst="rect">
+            <a:avLst/>
+          </a:prstGeom>
+          <a:noFill/>
+        </p:spPr>
+        <p:txBody>
+          <a:bodyPr wrap="square" rtlCol="0">
+            <a:spAutoFit/>
+          </a:bodyPr>
+          <a:lstStyle/>
+          <a:p>
+            <a:r>
+              <a:rPr lang="en-US" dirty="0"/>
+              <a:t>TCP</a:t>
+            </a:r>
+          </a:p>
+        </p:txBody>
+      </p:sp>
+    </p:spTree>
+    <p:extLst>
+      <p:ext uri="{BB962C8B-B14F-4D97-AF65-F5344CB8AC3E}">
         <p14:creationId xmlns:p14="http://schemas.microsoft.com/office/powerpoint/2010/main" val="2132555248"/>
       </p:ext>
     </p:extLst>
@@ -11534,7 +15501,7 @@
 </p:sld>
 </file>
 
-<file path=ppt/slides/slide4.xml><?xml version="1.0" encoding="utf-8"?>
+<file path=ppt/slides/slide5.xml><?xml version="1.0" encoding="utf-8"?>
 <p:sld xmlns:a="http://schemas.openxmlformats.org/drawingml/2006/main" xmlns:r="http://schemas.openxmlformats.org/officeDocument/2006/relationships" xmlns:p="http://schemas.openxmlformats.org/presentationml/2006/main">
   <p:cSld>
     <p:spTree>

</xml_diff>

<commit_message>
Just implemented j1-6 IK. Need to debug it.
</commit_message>
<xml_diff>
--- a/Doc/Denavit-Hartenberg.pptx
+++ b/Doc/Denavit-Hartenberg.pptx
@@ -263,7 +263,7 @@
           <a:p>
             <a:fld id="{62A70C6D-A3C4-4C44-A745-7E174427F35D}" type="datetimeFigureOut">
               <a:rPr lang="en-US" smtClean="0"/>
-              <a:t>5/14/2024</a:t>
+              <a:t>5/21/2024</a:t>
             </a:fld>
             <a:endParaRPr lang="en-US"/>
           </a:p>
@@ -461,7 +461,7 @@
           <a:p>
             <a:fld id="{62A70C6D-A3C4-4C44-A745-7E174427F35D}" type="datetimeFigureOut">
               <a:rPr lang="en-US" smtClean="0"/>
-              <a:t>5/14/2024</a:t>
+              <a:t>5/21/2024</a:t>
             </a:fld>
             <a:endParaRPr lang="en-US"/>
           </a:p>
@@ -669,7 +669,7 @@
           <a:p>
             <a:fld id="{62A70C6D-A3C4-4C44-A745-7E174427F35D}" type="datetimeFigureOut">
               <a:rPr lang="en-US" smtClean="0"/>
-              <a:t>5/14/2024</a:t>
+              <a:t>5/21/2024</a:t>
             </a:fld>
             <a:endParaRPr lang="en-US"/>
           </a:p>
@@ -867,7 +867,7 @@
           <a:p>
             <a:fld id="{62A70C6D-A3C4-4C44-A745-7E174427F35D}" type="datetimeFigureOut">
               <a:rPr lang="en-US" smtClean="0"/>
-              <a:t>5/14/2024</a:t>
+              <a:t>5/21/2024</a:t>
             </a:fld>
             <a:endParaRPr lang="en-US"/>
           </a:p>
@@ -1142,7 +1142,7 @@
           <a:p>
             <a:fld id="{62A70C6D-A3C4-4C44-A745-7E174427F35D}" type="datetimeFigureOut">
               <a:rPr lang="en-US" smtClean="0"/>
-              <a:t>5/14/2024</a:t>
+              <a:t>5/21/2024</a:t>
             </a:fld>
             <a:endParaRPr lang="en-US"/>
           </a:p>
@@ -1407,7 +1407,7 @@
           <a:p>
             <a:fld id="{62A70C6D-A3C4-4C44-A745-7E174427F35D}" type="datetimeFigureOut">
               <a:rPr lang="en-US" smtClean="0"/>
-              <a:t>5/14/2024</a:t>
+              <a:t>5/21/2024</a:t>
             </a:fld>
             <a:endParaRPr lang="en-US"/>
           </a:p>
@@ -1819,7 +1819,7 @@
           <a:p>
             <a:fld id="{62A70C6D-A3C4-4C44-A745-7E174427F35D}" type="datetimeFigureOut">
               <a:rPr lang="en-US" smtClean="0"/>
-              <a:t>5/14/2024</a:t>
+              <a:t>5/21/2024</a:t>
             </a:fld>
             <a:endParaRPr lang="en-US"/>
           </a:p>
@@ -1960,7 +1960,7 @@
           <a:p>
             <a:fld id="{62A70C6D-A3C4-4C44-A745-7E174427F35D}" type="datetimeFigureOut">
               <a:rPr lang="en-US" smtClean="0"/>
-              <a:t>5/14/2024</a:t>
+              <a:t>5/21/2024</a:t>
             </a:fld>
             <a:endParaRPr lang="en-US"/>
           </a:p>
@@ -2073,7 +2073,7 @@
           <a:p>
             <a:fld id="{62A70C6D-A3C4-4C44-A745-7E174427F35D}" type="datetimeFigureOut">
               <a:rPr lang="en-US" smtClean="0"/>
-              <a:t>5/14/2024</a:t>
+              <a:t>5/21/2024</a:t>
             </a:fld>
             <a:endParaRPr lang="en-US"/>
           </a:p>
@@ -2384,7 +2384,7 @@
           <a:p>
             <a:fld id="{62A70C6D-A3C4-4C44-A745-7E174427F35D}" type="datetimeFigureOut">
               <a:rPr lang="en-US" smtClean="0"/>
-              <a:t>5/14/2024</a:t>
+              <a:t>5/21/2024</a:t>
             </a:fld>
             <a:endParaRPr lang="en-US"/>
           </a:p>
@@ -2672,7 +2672,7 @@
           <a:p>
             <a:fld id="{62A70C6D-A3C4-4C44-A745-7E174427F35D}" type="datetimeFigureOut">
               <a:rPr lang="en-US" smtClean="0"/>
-              <a:t>5/14/2024</a:t>
+              <a:t>5/21/2024</a:t>
             </a:fld>
             <a:endParaRPr lang="en-US"/>
           </a:p>
@@ -2913,7 +2913,7 @@
           <a:p>
             <a:fld id="{62A70C6D-A3C4-4C44-A745-7E174427F35D}" type="datetimeFigureOut">
               <a:rPr lang="en-US" smtClean="0"/>
-              <a:t>5/14/2024</a:t>
+              <a:t>5/21/2024</a:t>
             </a:fld>
             <a:endParaRPr lang="en-US"/>
           </a:p>
@@ -15488,6 +15488,66 @@
           </a:p>
         </p:txBody>
       </p:sp>
+      <p:pic>
+        <p:nvPicPr>
+          <p:cNvPr id="10" name="Picture 9">
+            <a:extLst>
+              <a:ext uri="{FF2B5EF4-FFF2-40B4-BE49-F238E27FC236}">
+                <a16:creationId xmlns:a16="http://schemas.microsoft.com/office/drawing/2014/main" id="{543AD577-EB03-BAA3-B3A8-ED2DED5D0C5C}"/>
+              </a:ext>
+            </a:extLst>
+          </p:cNvPr>
+          <p:cNvPicPr>
+            <a:picLocks noChangeAspect="1"/>
+          </p:cNvPicPr>
+          <p:nvPr/>
+        </p:nvPicPr>
+        <p:blipFill>
+          <a:blip r:embed="rId3"/>
+          <a:stretch>
+            <a:fillRect/>
+          </a:stretch>
+        </p:blipFill>
+        <p:spPr>
+          <a:xfrm>
+            <a:off x="1232814" y="5971985"/>
+            <a:ext cx="3314700" cy="714375"/>
+          </a:xfrm>
+          <a:prstGeom prst="rect">
+            <a:avLst/>
+          </a:prstGeom>
+        </p:spPr>
+      </p:pic>
+      <p:pic>
+        <p:nvPicPr>
+          <p:cNvPr id="79" name="Picture 78">
+            <a:extLst>
+              <a:ext uri="{FF2B5EF4-FFF2-40B4-BE49-F238E27FC236}">
+                <a16:creationId xmlns:a16="http://schemas.microsoft.com/office/drawing/2014/main" id="{1948D4BC-7C9C-5712-B94D-5FDA8255B29B}"/>
+              </a:ext>
+            </a:extLst>
+          </p:cNvPr>
+          <p:cNvPicPr>
+            <a:picLocks noChangeAspect="1"/>
+          </p:cNvPicPr>
+          <p:nvPr/>
+        </p:nvPicPr>
+        <p:blipFill>
+          <a:blip r:embed="rId4"/>
+          <a:stretch>
+            <a:fillRect/>
+          </a:stretch>
+        </p:blipFill>
+        <p:spPr>
+          <a:xfrm>
+            <a:off x="4719189" y="5997104"/>
+            <a:ext cx="3448050" cy="600075"/>
+          </a:xfrm>
+          <a:prstGeom prst="rect">
+            <a:avLst/>
+          </a:prstGeom>
+        </p:spPr>
+      </p:pic>
     </p:spTree>
     <p:extLst>
       <p:ext uri="{BB962C8B-B14F-4D97-AF65-F5344CB8AC3E}">

</xml_diff>

<commit_message>
WIP. Debuging Link2end IK
</commit_message>
<xml_diff>
--- a/Doc/Denavit-Hartenberg.pptx
+++ b/Doc/Denavit-Hartenberg.pptx
@@ -10,6 +10,7 @@
     <p:sldId id="271" r:id="rId4"/>
     <p:sldId id="269" r:id="rId5"/>
     <p:sldId id="258" r:id="rId6"/>
+    <p:sldId id="272" r:id="rId7"/>
   </p:sldIdLst>
   <p:sldSz cx="12192000" cy="6858000"/>
   <p:notesSz cx="6858000" cy="9144000"/>
@@ -263,7 +264,7 @@
           <a:p>
             <a:fld id="{62A70C6D-A3C4-4C44-A745-7E174427F35D}" type="datetimeFigureOut">
               <a:rPr lang="en-US" smtClean="0"/>
-              <a:t>5/21/2024</a:t>
+              <a:t>5/28/2024</a:t>
             </a:fld>
             <a:endParaRPr lang="en-US"/>
           </a:p>
@@ -461,7 +462,7 @@
           <a:p>
             <a:fld id="{62A70C6D-A3C4-4C44-A745-7E174427F35D}" type="datetimeFigureOut">
               <a:rPr lang="en-US" smtClean="0"/>
-              <a:t>5/21/2024</a:t>
+              <a:t>5/28/2024</a:t>
             </a:fld>
             <a:endParaRPr lang="en-US"/>
           </a:p>
@@ -669,7 +670,7 @@
           <a:p>
             <a:fld id="{62A70C6D-A3C4-4C44-A745-7E174427F35D}" type="datetimeFigureOut">
               <a:rPr lang="en-US" smtClean="0"/>
-              <a:t>5/21/2024</a:t>
+              <a:t>5/28/2024</a:t>
             </a:fld>
             <a:endParaRPr lang="en-US"/>
           </a:p>
@@ -867,7 +868,7 @@
           <a:p>
             <a:fld id="{62A70C6D-A3C4-4C44-A745-7E174427F35D}" type="datetimeFigureOut">
               <a:rPr lang="en-US" smtClean="0"/>
-              <a:t>5/21/2024</a:t>
+              <a:t>5/28/2024</a:t>
             </a:fld>
             <a:endParaRPr lang="en-US"/>
           </a:p>
@@ -1142,7 +1143,7 @@
           <a:p>
             <a:fld id="{62A70C6D-A3C4-4C44-A745-7E174427F35D}" type="datetimeFigureOut">
               <a:rPr lang="en-US" smtClean="0"/>
-              <a:t>5/21/2024</a:t>
+              <a:t>5/28/2024</a:t>
             </a:fld>
             <a:endParaRPr lang="en-US"/>
           </a:p>
@@ -1407,7 +1408,7 @@
           <a:p>
             <a:fld id="{62A70C6D-A3C4-4C44-A745-7E174427F35D}" type="datetimeFigureOut">
               <a:rPr lang="en-US" smtClean="0"/>
-              <a:t>5/21/2024</a:t>
+              <a:t>5/28/2024</a:t>
             </a:fld>
             <a:endParaRPr lang="en-US"/>
           </a:p>
@@ -1819,7 +1820,7 @@
           <a:p>
             <a:fld id="{62A70C6D-A3C4-4C44-A745-7E174427F35D}" type="datetimeFigureOut">
               <a:rPr lang="en-US" smtClean="0"/>
-              <a:t>5/21/2024</a:t>
+              <a:t>5/28/2024</a:t>
             </a:fld>
             <a:endParaRPr lang="en-US"/>
           </a:p>
@@ -1960,7 +1961,7 @@
           <a:p>
             <a:fld id="{62A70C6D-A3C4-4C44-A745-7E174427F35D}" type="datetimeFigureOut">
               <a:rPr lang="en-US" smtClean="0"/>
-              <a:t>5/21/2024</a:t>
+              <a:t>5/28/2024</a:t>
             </a:fld>
             <a:endParaRPr lang="en-US"/>
           </a:p>
@@ -2073,7 +2074,7 @@
           <a:p>
             <a:fld id="{62A70C6D-A3C4-4C44-A745-7E174427F35D}" type="datetimeFigureOut">
               <a:rPr lang="en-US" smtClean="0"/>
-              <a:t>5/21/2024</a:t>
+              <a:t>5/28/2024</a:t>
             </a:fld>
             <a:endParaRPr lang="en-US"/>
           </a:p>
@@ -2384,7 +2385,7 @@
           <a:p>
             <a:fld id="{62A70C6D-A3C4-4C44-A745-7E174427F35D}" type="datetimeFigureOut">
               <a:rPr lang="en-US" smtClean="0"/>
-              <a:t>5/21/2024</a:t>
+              <a:t>5/28/2024</a:t>
             </a:fld>
             <a:endParaRPr lang="en-US"/>
           </a:p>
@@ -2672,7 +2673,7 @@
           <a:p>
             <a:fld id="{62A70C6D-A3C4-4C44-A745-7E174427F35D}" type="datetimeFigureOut">
               <a:rPr lang="en-US" smtClean="0"/>
-              <a:t>5/21/2024</a:t>
+              <a:t>5/28/2024</a:t>
             </a:fld>
             <a:endParaRPr lang="en-US"/>
           </a:p>
@@ -2913,7 +2914,7 @@
           <a:p>
             <a:fld id="{62A70C6D-A3C4-4C44-A745-7E174427F35D}" type="datetimeFigureOut">
               <a:rPr lang="en-US" smtClean="0"/>
-              <a:t>5/21/2024</a:t>
+              <a:t>5/28/2024</a:t>
             </a:fld>
             <a:endParaRPr lang="en-US"/>
           </a:p>
@@ -14691,7 +14692,7 @@
         </p:blipFill>
         <p:spPr>
           <a:xfrm>
-            <a:off x="9004038" y="4762160"/>
+            <a:off x="8382259" y="3906630"/>
             <a:ext cx="5334000" cy="2171700"/>
           </a:xfrm>
           <a:prstGeom prst="rect">
@@ -15927,6 +15928,197 @@
     <p:extLst>
       <p:ext uri="{BB962C8B-B14F-4D97-AF65-F5344CB8AC3E}">
         <p14:creationId xmlns:p14="http://schemas.microsoft.com/office/powerpoint/2010/main" val="3592314825"/>
+      </p:ext>
+    </p:extLst>
+  </p:cSld>
+  <p:clrMapOvr>
+    <a:masterClrMapping/>
+  </p:clrMapOvr>
+</p:sld>
+</file>
+
+<file path=ppt/slides/slide6.xml><?xml version="1.0" encoding="utf-8"?>
+<p:sld xmlns:a="http://schemas.openxmlformats.org/drawingml/2006/main" xmlns:r="http://schemas.openxmlformats.org/officeDocument/2006/relationships" xmlns:p="http://schemas.openxmlformats.org/presentationml/2006/main">
+  <p:cSld>
+    <p:spTree>
+      <p:nvGrpSpPr>
+        <p:cNvPr id="1" name=""/>
+        <p:cNvGrpSpPr/>
+        <p:nvPr/>
+      </p:nvGrpSpPr>
+      <p:grpSpPr>
+        <a:xfrm>
+          <a:off x="0" y="0"/>
+          <a:ext cx="0" cy="0"/>
+          <a:chOff x="0" y="0"/>
+          <a:chExt cx="0" cy="0"/>
+        </a:xfrm>
+      </p:grpSpPr>
+      <p:pic>
+        <p:nvPicPr>
+          <p:cNvPr id="3" name="Picture 2">
+            <a:extLst>
+              <a:ext uri="{FF2B5EF4-FFF2-40B4-BE49-F238E27FC236}">
+                <a16:creationId xmlns:a16="http://schemas.microsoft.com/office/drawing/2014/main" id="{78FD2522-A6EE-CD80-BBA7-B9A9F4AE63E3}"/>
+              </a:ext>
+            </a:extLst>
+          </p:cNvPr>
+          <p:cNvPicPr>
+            <a:picLocks noChangeAspect="1"/>
+          </p:cNvPicPr>
+          <p:nvPr/>
+        </p:nvPicPr>
+        <p:blipFill>
+          <a:blip r:embed="rId2"/>
+          <a:stretch>
+            <a:fillRect/>
+          </a:stretch>
+        </p:blipFill>
+        <p:spPr>
+          <a:xfrm>
+            <a:off x="1839982" y="728867"/>
+            <a:ext cx="3476421" cy="2700133"/>
+          </a:xfrm>
+          <a:prstGeom prst="rect">
+            <a:avLst/>
+          </a:prstGeom>
+        </p:spPr>
+      </p:pic>
+      <p:sp>
+        <p:nvSpPr>
+          <p:cNvPr id="4" name="TextBox 3">
+            <a:extLst>
+              <a:ext uri="{FF2B5EF4-FFF2-40B4-BE49-F238E27FC236}">
+                <a16:creationId xmlns:a16="http://schemas.microsoft.com/office/drawing/2014/main" id="{F5AA8482-C84A-CB56-46A7-B4EBE6503A70}"/>
+              </a:ext>
+            </a:extLst>
+          </p:cNvPr>
+          <p:cNvSpPr txBox="1"/>
+          <p:nvPr/>
+        </p:nvSpPr>
+        <p:spPr>
+          <a:xfrm>
+            <a:off x="4755159" y="728867"/>
+            <a:ext cx="1122487" cy="369332"/>
+          </a:xfrm>
+          <a:prstGeom prst="rect">
+            <a:avLst/>
+          </a:prstGeom>
+          <a:noFill/>
+        </p:spPr>
+        <p:txBody>
+          <a:bodyPr wrap="none" rtlCol="0">
+            <a:spAutoFit/>
+          </a:bodyPr>
+          <a:lstStyle/>
+          <a:p>
+            <a:r>
+              <a:rPr lang="en-US" dirty="0"/>
+              <a:t>J4-6 are 0</a:t>
+            </a:r>
+          </a:p>
+        </p:txBody>
+      </p:sp>
+      <p:pic>
+        <p:nvPicPr>
+          <p:cNvPr id="6" name="Picture 5">
+            <a:extLst>
+              <a:ext uri="{FF2B5EF4-FFF2-40B4-BE49-F238E27FC236}">
+                <a16:creationId xmlns:a16="http://schemas.microsoft.com/office/drawing/2014/main" id="{5919B62F-9E5B-DB5A-F154-B9B2587810D2}"/>
+              </a:ext>
+            </a:extLst>
+          </p:cNvPr>
+          <p:cNvPicPr>
+            <a:picLocks noChangeAspect="1"/>
+          </p:cNvPicPr>
+          <p:nvPr/>
+        </p:nvPicPr>
+        <p:blipFill>
+          <a:blip r:embed="rId3"/>
+          <a:stretch>
+            <a:fillRect/>
+          </a:stretch>
+        </p:blipFill>
+        <p:spPr>
+          <a:xfrm>
+            <a:off x="1078395" y="3220275"/>
+            <a:ext cx="4495800" cy="3381375"/>
+          </a:xfrm>
+          <a:prstGeom prst="rect">
+            <a:avLst/>
+          </a:prstGeom>
+        </p:spPr>
+      </p:pic>
+      <p:pic>
+        <p:nvPicPr>
+          <p:cNvPr id="10" name="Picture 9">
+            <a:extLst>
+              <a:ext uri="{FF2B5EF4-FFF2-40B4-BE49-F238E27FC236}">
+                <a16:creationId xmlns:a16="http://schemas.microsoft.com/office/drawing/2014/main" id="{8E1C7565-CB21-3EF6-DFF4-874BF3F7B9A8}"/>
+              </a:ext>
+            </a:extLst>
+          </p:cNvPr>
+          <p:cNvPicPr>
+            <a:picLocks noChangeAspect="1"/>
+          </p:cNvPicPr>
+          <p:nvPr/>
+        </p:nvPicPr>
+        <p:blipFill>
+          <a:blip r:embed="rId4"/>
+          <a:stretch>
+            <a:fillRect/>
+          </a:stretch>
+        </p:blipFill>
+        <p:spPr>
+          <a:xfrm>
+            <a:off x="5693672" y="1718434"/>
+            <a:ext cx="6715125" cy="2466975"/>
+          </a:xfrm>
+          <a:prstGeom prst="rect">
+            <a:avLst/>
+          </a:prstGeom>
+        </p:spPr>
+      </p:pic>
+      <p:sp>
+        <p:nvSpPr>
+          <p:cNvPr id="11" name="TextBox 10">
+            <a:extLst>
+              <a:ext uri="{FF2B5EF4-FFF2-40B4-BE49-F238E27FC236}">
+                <a16:creationId xmlns:a16="http://schemas.microsoft.com/office/drawing/2014/main" id="{3973653E-07B3-FCBB-DD93-C3EE42161BD2}"/>
+              </a:ext>
+            </a:extLst>
+          </p:cNvPr>
+          <p:cNvSpPr txBox="1"/>
+          <p:nvPr/>
+        </p:nvSpPr>
+        <p:spPr>
+          <a:xfrm>
+            <a:off x="5464053" y="5029197"/>
+            <a:ext cx="1107996" cy="369332"/>
+          </a:xfrm>
+          <a:prstGeom prst="rect">
+            <a:avLst/>
+          </a:prstGeom>
+          <a:noFill/>
+        </p:spPr>
+        <p:txBody>
+          <a:bodyPr wrap="none" rtlCol="0">
+            <a:spAutoFit/>
+          </a:bodyPr>
+          <a:lstStyle/>
+          <a:p>
+            <a:r>
+              <a:rPr lang="en-US"/>
+              <a:t>J4 45	</a:t>
+            </a:r>
+            <a:endParaRPr lang="en-US" dirty="0"/>
+          </a:p>
+        </p:txBody>
+      </p:sp>
+    </p:spTree>
+    <p:extLst>
+      <p:ext uri="{BB962C8B-B14F-4D97-AF65-F5344CB8AC3E}">
+        <p14:creationId xmlns:p14="http://schemas.microsoft.com/office/powerpoint/2010/main" val="1716865962"/>
       </p:ext>
     </p:extLst>
   </p:cSld>

</xml_diff>

<commit_message>
J4-6 ik is sort of working. Z is upside down when RZYX is 000
</commit_message>
<xml_diff>
--- a/Doc/Denavit-Hartenberg.pptx
+++ b/Doc/Denavit-Hartenberg.pptx
@@ -264,7 +264,7 @@
           <a:p>
             <a:fld id="{62A70C6D-A3C4-4C44-A745-7E174427F35D}" type="datetimeFigureOut">
               <a:rPr lang="en-US" smtClean="0"/>
-              <a:t>5/28/2024</a:t>
+              <a:t>5/29/2024</a:t>
             </a:fld>
             <a:endParaRPr lang="en-US"/>
           </a:p>
@@ -462,7 +462,7 @@
           <a:p>
             <a:fld id="{62A70C6D-A3C4-4C44-A745-7E174427F35D}" type="datetimeFigureOut">
               <a:rPr lang="en-US" smtClean="0"/>
-              <a:t>5/28/2024</a:t>
+              <a:t>5/29/2024</a:t>
             </a:fld>
             <a:endParaRPr lang="en-US"/>
           </a:p>
@@ -670,7 +670,7 @@
           <a:p>
             <a:fld id="{62A70C6D-A3C4-4C44-A745-7E174427F35D}" type="datetimeFigureOut">
               <a:rPr lang="en-US" smtClean="0"/>
-              <a:t>5/28/2024</a:t>
+              <a:t>5/29/2024</a:t>
             </a:fld>
             <a:endParaRPr lang="en-US"/>
           </a:p>
@@ -868,7 +868,7 @@
           <a:p>
             <a:fld id="{62A70C6D-A3C4-4C44-A745-7E174427F35D}" type="datetimeFigureOut">
               <a:rPr lang="en-US" smtClean="0"/>
-              <a:t>5/28/2024</a:t>
+              <a:t>5/29/2024</a:t>
             </a:fld>
             <a:endParaRPr lang="en-US"/>
           </a:p>
@@ -1143,7 +1143,7 @@
           <a:p>
             <a:fld id="{62A70C6D-A3C4-4C44-A745-7E174427F35D}" type="datetimeFigureOut">
               <a:rPr lang="en-US" smtClean="0"/>
-              <a:t>5/28/2024</a:t>
+              <a:t>5/29/2024</a:t>
             </a:fld>
             <a:endParaRPr lang="en-US"/>
           </a:p>
@@ -1408,7 +1408,7 @@
           <a:p>
             <a:fld id="{62A70C6D-A3C4-4C44-A745-7E174427F35D}" type="datetimeFigureOut">
               <a:rPr lang="en-US" smtClean="0"/>
-              <a:t>5/28/2024</a:t>
+              <a:t>5/29/2024</a:t>
             </a:fld>
             <a:endParaRPr lang="en-US"/>
           </a:p>
@@ -1820,7 +1820,7 @@
           <a:p>
             <a:fld id="{62A70C6D-A3C4-4C44-A745-7E174427F35D}" type="datetimeFigureOut">
               <a:rPr lang="en-US" smtClean="0"/>
-              <a:t>5/28/2024</a:t>
+              <a:t>5/29/2024</a:t>
             </a:fld>
             <a:endParaRPr lang="en-US"/>
           </a:p>
@@ -1961,7 +1961,7 @@
           <a:p>
             <a:fld id="{62A70C6D-A3C4-4C44-A745-7E174427F35D}" type="datetimeFigureOut">
               <a:rPr lang="en-US" smtClean="0"/>
-              <a:t>5/28/2024</a:t>
+              <a:t>5/29/2024</a:t>
             </a:fld>
             <a:endParaRPr lang="en-US"/>
           </a:p>
@@ -2074,7 +2074,7 @@
           <a:p>
             <a:fld id="{62A70C6D-A3C4-4C44-A745-7E174427F35D}" type="datetimeFigureOut">
               <a:rPr lang="en-US" smtClean="0"/>
-              <a:t>5/28/2024</a:t>
+              <a:t>5/29/2024</a:t>
             </a:fld>
             <a:endParaRPr lang="en-US"/>
           </a:p>
@@ -2385,7 +2385,7 @@
           <a:p>
             <a:fld id="{62A70C6D-A3C4-4C44-A745-7E174427F35D}" type="datetimeFigureOut">
               <a:rPr lang="en-US" smtClean="0"/>
-              <a:t>5/28/2024</a:t>
+              <a:t>5/29/2024</a:t>
             </a:fld>
             <a:endParaRPr lang="en-US"/>
           </a:p>
@@ -2673,7 +2673,7 @@
           <a:p>
             <a:fld id="{62A70C6D-A3C4-4C44-A745-7E174427F35D}" type="datetimeFigureOut">
               <a:rPr lang="en-US" smtClean="0"/>
-              <a:t>5/28/2024</a:t>
+              <a:t>5/29/2024</a:t>
             </a:fld>
             <a:endParaRPr lang="en-US"/>
           </a:p>
@@ -2914,7 +2914,7 @@
           <a:p>
             <a:fld id="{62A70C6D-A3C4-4C44-A745-7E174427F35D}" type="datetimeFigureOut">
               <a:rPr lang="en-US" smtClean="0"/>
-              <a:t>5/28/2024</a:t>
+              <a:t>5/29/2024</a:t>
             </a:fld>
             <a:endParaRPr lang="en-US"/>
           </a:p>

</xml_diff>

<commit_message>
WIP. Clean up some code. Keep working on it.
</commit_message>
<xml_diff>
--- a/Doc/Denavit-Hartenberg.pptx
+++ b/Doc/Denavit-Hartenberg.pptx
@@ -4,6 +4,9 @@
   <p:sldMasterIdLst>
     <p:sldMasterId id="2147483648" r:id="rId1"/>
   </p:sldMasterIdLst>
+  <p:notesMasterIdLst>
+    <p:notesMasterId r:id="rId8"/>
+  </p:notesMasterIdLst>
   <p:sldIdLst>
     <p:sldId id="270" r:id="rId2"/>
     <p:sldId id="268" r:id="rId3"/>
@@ -117,6 +120,439 @@
 </p:presentation>
 </file>
 
+<file path=ppt/notesMasters/notesMaster1.xml><?xml version="1.0" encoding="utf-8"?>
+<p:notesMaster xmlns:a="http://schemas.openxmlformats.org/drawingml/2006/main" xmlns:r="http://schemas.openxmlformats.org/officeDocument/2006/relationships" xmlns:p="http://schemas.openxmlformats.org/presentationml/2006/main">
+  <p:cSld>
+    <p:bg>
+      <p:bgRef idx="1001">
+        <a:schemeClr val="bg1"/>
+      </p:bgRef>
+    </p:bg>
+    <p:spTree>
+      <p:nvGrpSpPr>
+        <p:cNvPr id="1" name=""/>
+        <p:cNvGrpSpPr/>
+        <p:nvPr/>
+      </p:nvGrpSpPr>
+      <p:grpSpPr>
+        <a:xfrm>
+          <a:off x="0" y="0"/>
+          <a:ext cx="0" cy="0"/>
+          <a:chOff x="0" y="0"/>
+          <a:chExt cx="0" cy="0"/>
+        </a:xfrm>
+      </p:grpSpPr>
+      <p:sp>
+        <p:nvSpPr>
+          <p:cNvPr id="2" name="Header Placeholder 1"/>
+          <p:cNvSpPr>
+            <a:spLocks noGrp="1"/>
+          </p:cNvSpPr>
+          <p:nvPr>
+            <p:ph type="hdr" sz="quarter"/>
+          </p:nvPr>
+        </p:nvSpPr>
+        <p:spPr>
+          <a:xfrm>
+            <a:off x="0" y="0"/>
+            <a:ext cx="2971800" cy="458788"/>
+          </a:xfrm>
+          <a:prstGeom prst="rect">
+            <a:avLst/>
+          </a:prstGeom>
+        </p:spPr>
+        <p:txBody>
+          <a:bodyPr vert="horz" lIns="91440" tIns="45720" rIns="91440" bIns="45720" rtlCol="0"/>
+          <a:lstStyle>
+            <a:lvl1pPr algn="l">
+              <a:defRPr sz="1200"/>
+            </a:lvl1pPr>
+          </a:lstStyle>
+          <a:p>
+            <a:endParaRPr lang="en-US"/>
+          </a:p>
+        </p:txBody>
+      </p:sp>
+      <p:sp>
+        <p:nvSpPr>
+          <p:cNvPr id="3" name="Date Placeholder 2"/>
+          <p:cNvSpPr>
+            <a:spLocks noGrp="1"/>
+          </p:cNvSpPr>
+          <p:nvPr>
+            <p:ph type="dt" idx="1"/>
+          </p:nvPr>
+        </p:nvSpPr>
+        <p:spPr>
+          <a:xfrm>
+            <a:off x="3884613" y="0"/>
+            <a:ext cx="2971800" cy="458788"/>
+          </a:xfrm>
+          <a:prstGeom prst="rect">
+            <a:avLst/>
+          </a:prstGeom>
+        </p:spPr>
+        <p:txBody>
+          <a:bodyPr vert="horz" lIns="91440" tIns="45720" rIns="91440" bIns="45720" rtlCol="0"/>
+          <a:lstStyle>
+            <a:lvl1pPr algn="r">
+              <a:defRPr sz="1200"/>
+            </a:lvl1pPr>
+          </a:lstStyle>
+          <a:p>
+            <a:fld id="{ED421E8D-A66F-4222-8E1C-6086B5A59EF2}" type="datetimeFigureOut">
+              <a:rPr lang="en-US" smtClean="0"/>
+              <a:t>10/18/2024</a:t>
+            </a:fld>
+            <a:endParaRPr lang="en-US"/>
+          </a:p>
+        </p:txBody>
+      </p:sp>
+      <p:sp>
+        <p:nvSpPr>
+          <p:cNvPr id="4" name="Slide Image Placeholder 3"/>
+          <p:cNvSpPr>
+            <a:spLocks noGrp="1" noRot="1" noChangeAspect="1"/>
+          </p:cNvSpPr>
+          <p:nvPr>
+            <p:ph type="sldImg" idx="2"/>
+          </p:nvPr>
+        </p:nvSpPr>
+        <p:spPr>
+          <a:xfrm>
+            <a:off x="685800" y="1143000"/>
+            <a:ext cx="5486400" cy="3086100"/>
+          </a:xfrm>
+          <a:prstGeom prst="rect">
+            <a:avLst/>
+          </a:prstGeom>
+          <a:noFill/>
+          <a:ln w="12700">
+            <a:solidFill>
+              <a:prstClr val="black"/>
+            </a:solidFill>
+          </a:ln>
+        </p:spPr>
+        <p:txBody>
+          <a:bodyPr vert="horz" lIns="91440" tIns="45720" rIns="91440" bIns="45720" rtlCol="0" anchor="ctr"/>
+          <a:lstStyle/>
+          <a:p>
+            <a:endParaRPr lang="en-US"/>
+          </a:p>
+        </p:txBody>
+      </p:sp>
+      <p:sp>
+        <p:nvSpPr>
+          <p:cNvPr id="5" name="Notes Placeholder 4"/>
+          <p:cNvSpPr>
+            <a:spLocks noGrp="1"/>
+          </p:cNvSpPr>
+          <p:nvPr>
+            <p:ph type="body" sz="quarter" idx="3"/>
+          </p:nvPr>
+        </p:nvSpPr>
+        <p:spPr>
+          <a:xfrm>
+            <a:off x="685800" y="4400550"/>
+            <a:ext cx="5486400" cy="3600450"/>
+          </a:xfrm>
+          <a:prstGeom prst="rect">
+            <a:avLst/>
+          </a:prstGeom>
+        </p:spPr>
+        <p:txBody>
+          <a:bodyPr vert="horz" lIns="91440" tIns="45720" rIns="91440" bIns="45720" rtlCol="0"/>
+          <a:lstStyle/>
+          <a:p>
+            <a:pPr lvl="0"/>
+            <a:r>
+              <a:rPr lang="en-US"/>
+              <a:t>Click to edit Master text styles</a:t>
+            </a:r>
+          </a:p>
+          <a:p>
+            <a:pPr lvl="1"/>
+            <a:r>
+              <a:rPr lang="en-US"/>
+              <a:t>Second level</a:t>
+            </a:r>
+          </a:p>
+          <a:p>
+            <a:pPr lvl="2"/>
+            <a:r>
+              <a:rPr lang="en-US"/>
+              <a:t>Third level</a:t>
+            </a:r>
+          </a:p>
+          <a:p>
+            <a:pPr lvl="3"/>
+            <a:r>
+              <a:rPr lang="en-US"/>
+              <a:t>Fourth level</a:t>
+            </a:r>
+          </a:p>
+          <a:p>
+            <a:pPr lvl="4"/>
+            <a:r>
+              <a:rPr lang="en-US"/>
+              <a:t>Fifth level</a:t>
+            </a:r>
+          </a:p>
+        </p:txBody>
+      </p:sp>
+      <p:sp>
+        <p:nvSpPr>
+          <p:cNvPr id="6" name="Footer Placeholder 5"/>
+          <p:cNvSpPr>
+            <a:spLocks noGrp="1"/>
+          </p:cNvSpPr>
+          <p:nvPr>
+            <p:ph type="ftr" sz="quarter" idx="4"/>
+          </p:nvPr>
+        </p:nvSpPr>
+        <p:spPr>
+          <a:xfrm>
+            <a:off x="0" y="8685213"/>
+            <a:ext cx="2971800" cy="458787"/>
+          </a:xfrm>
+          <a:prstGeom prst="rect">
+            <a:avLst/>
+          </a:prstGeom>
+        </p:spPr>
+        <p:txBody>
+          <a:bodyPr vert="horz" lIns="91440" tIns="45720" rIns="91440" bIns="45720" rtlCol="0" anchor="b"/>
+          <a:lstStyle>
+            <a:lvl1pPr algn="l">
+              <a:defRPr sz="1200"/>
+            </a:lvl1pPr>
+          </a:lstStyle>
+          <a:p>
+            <a:endParaRPr lang="en-US"/>
+          </a:p>
+        </p:txBody>
+      </p:sp>
+      <p:sp>
+        <p:nvSpPr>
+          <p:cNvPr id="7" name="Slide Number Placeholder 6"/>
+          <p:cNvSpPr>
+            <a:spLocks noGrp="1"/>
+          </p:cNvSpPr>
+          <p:nvPr>
+            <p:ph type="sldNum" sz="quarter" idx="5"/>
+          </p:nvPr>
+        </p:nvSpPr>
+        <p:spPr>
+          <a:xfrm>
+            <a:off x="3884613" y="8685213"/>
+            <a:ext cx="2971800" cy="458787"/>
+          </a:xfrm>
+          <a:prstGeom prst="rect">
+            <a:avLst/>
+          </a:prstGeom>
+        </p:spPr>
+        <p:txBody>
+          <a:bodyPr vert="horz" lIns="91440" tIns="45720" rIns="91440" bIns="45720" rtlCol="0" anchor="b"/>
+          <a:lstStyle>
+            <a:lvl1pPr algn="r">
+              <a:defRPr sz="1200"/>
+            </a:lvl1pPr>
+          </a:lstStyle>
+          <a:p>
+            <a:fld id="{7ED5DB56-3ABD-4BC2-99F0-83A7E75A530B}" type="slidenum">
+              <a:rPr lang="en-US" smtClean="0"/>
+              <a:t>‹#›</a:t>
+            </a:fld>
+            <a:endParaRPr lang="en-US"/>
+          </a:p>
+        </p:txBody>
+      </p:sp>
+    </p:spTree>
+    <p:extLst>
+      <p:ext uri="{BB962C8B-B14F-4D97-AF65-F5344CB8AC3E}">
+        <p14:creationId xmlns:p14="http://schemas.microsoft.com/office/powerpoint/2010/main" val="3737328325"/>
+      </p:ext>
+    </p:extLst>
+  </p:cSld>
+  <p:clrMap bg1="lt1" tx1="dk1" bg2="lt2" tx2="dk2" accent1="accent1" accent2="accent2" accent3="accent3" accent4="accent4" accent5="accent5" accent6="accent6" hlink="hlink" folHlink="folHlink"/>
+  <p:notesStyle>
+    <a:lvl1pPr marL="0" algn="l" defTabSz="914400" rtl="0" eaLnBrk="1" latinLnBrk="0" hangingPunct="1">
+      <a:defRPr sz="1200" kern="1200">
+        <a:solidFill>
+          <a:schemeClr val="tx1"/>
+        </a:solidFill>
+        <a:latin typeface="+mn-lt"/>
+        <a:ea typeface="+mn-ea"/>
+        <a:cs typeface="+mn-cs"/>
+      </a:defRPr>
+    </a:lvl1pPr>
+    <a:lvl2pPr marL="457200" algn="l" defTabSz="914400" rtl="0" eaLnBrk="1" latinLnBrk="0" hangingPunct="1">
+      <a:defRPr sz="1200" kern="1200">
+        <a:solidFill>
+          <a:schemeClr val="tx1"/>
+        </a:solidFill>
+        <a:latin typeface="+mn-lt"/>
+        <a:ea typeface="+mn-ea"/>
+        <a:cs typeface="+mn-cs"/>
+      </a:defRPr>
+    </a:lvl2pPr>
+    <a:lvl3pPr marL="914400" algn="l" defTabSz="914400" rtl="0" eaLnBrk="1" latinLnBrk="0" hangingPunct="1">
+      <a:defRPr sz="1200" kern="1200">
+        <a:solidFill>
+          <a:schemeClr val="tx1"/>
+        </a:solidFill>
+        <a:latin typeface="+mn-lt"/>
+        <a:ea typeface="+mn-ea"/>
+        <a:cs typeface="+mn-cs"/>
+      </a:defRPr>
+    </a:lvl3pPr>
+    <a:lvl4pPr marL="1371600" algn="l" defTabSz="914400" rtl="0" eaLnBrk="1" latinLnBrk="0" hangingPunct="1">
+      <a:defRPr sz="1200" kern="1200">
+        <a:solidFill>
+          <a:schemeClr val="tx1"/>
+        </a:solidFill>
+        <a:latin typeface="+mn-lt"/>
+        <a:ea typeface="+mn-ea"/>
+        <a:cs typeface="+mn-cs"/>
+      </a:defRPr>
+    </a:lvl4pPr>
+    <a:lvl5pPr marL="1828800" algn="l" defTabSz="914400" rtl="0" eaLnBrk="1" latinLnBrk="0" hangingPunct="1">
+      <a:defRPr sz="1200" kern="1200">
+        <a:solidFill>
+          <a:schemeClr val="tx1"/>
+        </a:solidFill>
+        <a:latin typeface="+mn-lt"/>
+        <a:ea typeface="+mn-ea"/>
+        <a:cs typeface="+mn-cs"/>
+      </a:defRPr>
+    </a:lvl5pPr>
+    <a:lvl6pPr marL="2286000" algn="l" defTabSz="914400" rtl="0" eaLnBrk="1" latinLnBrk="0" hangingPunct="1">
+      <a:defRPr sz="1200" kern="1200">
+        <a:solidFill>
+          <a:schemeClr val="tx1"/>
+        </a:solidFill>
+        <a:latin typeface="+mn-lt"/>
+        <a:ea typeface="+mn-ea"/>
+        <a:cs typeface="+mn-cs"/>
+      </a:defRPr>
+    </a:lvl6pPr>
+    <a:lvl7pPr marL="2743200" algn="l" defTabSz="914400" rtl="0" eaLnBrk="1" latinLnBrk="0" hangingPunct="1">
+      <a:defRPr sz="1200" kern="1200">
+        <a:solidFill>
+          <a:schemeClr val="tx1"/>
+        </a:solidFill>
+        <a:latin typeface="+mn-lt"/>
+        <a:ea typeface="+mn-ea"/>
+        <a:cs typeface="+mn-cs"/>
+      </a:defRPr>
+    </a:lvl7pPr>
+    <a:lvl8pPr marL="3200400" algn="l" defTabSz="914400" rtl="0" eaLnBrk="1" latinLnBrk="0" hangingPunct="1">
+      <a:defRPr sz="1200" kern="1200">
+        <a:solidFill>
+          <a:schemeClr val="tx1"/>
+        </a:solidFill>
+        <a:latin typeface="+mn-lt"/>
+        <a:ea typeface="+mn-ea"/>
+        <a:cs typeface="+mn-cs"/>
+      </a:defRPr>
+    </a:lvl8pPr>
+    <a:lvl9pPr marL="3657600" algn="l" defTabSz="914400" rtl="0" eaLnBrk="1" latinLnBrk="0" hangingPunct="1">
+      <a:defRPr sz="1200" kern="1200">
+        <a:solidFill>
+          <a:schemeClr val="tx1"/>
+        </a:solidFill>
+        <a:latin typeface="+mn-lt"/>
+        <a:ea typeface="+mn-ea"/>
+        <a:cs typeface="+mn-cs"/>
+      </a:defRPr>
+    </a:lvl9pPr>
+  </p:notesStyle>
+</p:notesMaster>
+</file>
+
+<file path=ppt/notesSlides/notesSlide1.xml><?xml version="1.0" encoding="utf-8"?>
+<p:notes xmlns:a="http://schemas.openxmlformats.org/drawingml/2006/main" xmlns:r="http://schemas.openxmlformats.org/officeDocument/2006/relationships" xmlns:p="http://schemas.openxmlformats.org/presentationml/2006/main">
+  <p:cSld>
+    <p:spTree>
+      <p:nvGrpSpPr>
+        <p:cNvPr id="1" name=""/>
+        <p:cNvGrpSpPr/>
+        <p:nvPr/>
+      </p:nvGrpSpPr>
+      <p:grpSpPr>
+        <a:xfrm>
+          <a:off x="0" y="0"/>
+          <a:ext cx="0" cy="0"/>
+          <a:chOff x="0" y="0"/>
+          <a:chExt cx="0" cy="0"/>
+        </a:xfrm>
+      </p:grpSpPr>
+      <p:sp>
+        <p:nvSpPr>
+          <p:cNvPr id="2" name="Slide Image Placeholder 1"/>
+          <p:cNvSpPr>
+            <a:spLocks noGrp="1" noRot="1" noChangeAspect="1"/>
+          </p:cNvSpPr>
+          <p:nvPr>
+            <p:ph type="sldImg"/>
+          </p:nvPr>
+        </p:nvSpPr>
+        <p:spPr/>
+      </p:sp>
+      <p:sp>
+        <p:nvSpPr>
+          <p:cNvPr id="3" name="Notes Placeholder 2"/>
+          <p:cNvSpPr>
+            <a:spLocks noGrp="1"/>
+          </p:cNvSpPr>
+          <p:nvPr>
+            <p:ph type="body" idx="1"/>
+          </p:nvPr>
+        </p:nvSpPr>
+        <p:spPr/>
+        <p:txBody>
+          <a:bodyPr/>
+          <a:lstStyle/>
+          <a:p>
+            <a:endParaRPr lang="en-US" dirty="0"/>
+          </a:p>
+        </p:txBody>
+      </p:sp>
+      <p:sp>
+        <p:nvSpPr>
+          <p:cNvPr id="4" name="Slide Number Placeholder 3"/>
+          <p:cNvSpPr>
+            <a:spLocks noGrp="1"/>
+          </p:cNvSpPr>
+          <p:nvPr>
+            <p:ph type="sldNum" sz="quarter" idx="5"/>
+          </p:nvPr>
+        </p:nvSpPr>
+        <p:spPr/>
+        <p:txBody>
+          <a:bodyPr/>
+          <a:lstStyle/>
+          <a:p>
+            <a:fld id="{7ED5DB56-3ABD-4BC2-99F0-83A7E75A530B}" type="slidenum">
+              <a:rPr lang="en-US" smtClean="0"/>
+              <a:t>4</a:t>
+            </a:fld>
+            <a:endParaRPr lang="en-US"/>
+          </a:p>
+        </p:txBody>
+      </p:sp>
+    </p:spTree>
+    <p:extLst>
+      <p:ext uri="{BB962C8B-B14F-4D97-AF65-F5344CB8AC3E}">
+        <p14:creationId xmlns:p14="http://schemas.microsoft.com/office/powerpoint/2010/main" val="77660164"/>
+      </p:ext>
+    </p:extLst>
+  </p:cSld>
+  <p:clrMapOvr>
+    <a:masterClrMapping/>
+  </p:clrMapOvr>
+</p:notes>
+</file>
+
 <file path=ppt/slideLayouts/slideLayout1.xml><?xml version="1.0" encoding="utf-8"?>
 <p:sldLayout xmlns:a="http://schemas.openxmlformats.org/drawingml/2006/main" xmlns:r="http://schemas.openxmlformats.org/officeDocument/2006/relationships" xmlns:p="http://schemas.openxmlformats.org/presentationml/2006/main" type="title" preserve="1">
   <p:cSld name="Title Slide">
@@ -264,7 +700,7 @@
           <a:p>
             <a:fld id="{62A70C6D-A3C4-4C44-A745-7E174427F35D}" type="datetimeFigureOut">
               <a:rPr lang="en-US" smtClean="0"/>
-              <a:t>5/29/2024</a:t>
+              <a:t>10/18/2024</a:t>
             </a:fld>
             <a:endParaRPr lang="en-US"/>
           </a:p>
@@ -462,7 +898,7 @@
           <a:p>
             <a:fld id="{62A70C6D-A3C4-4C44-A745-7E174427F35D}" type="datetimeFigureOut">
               <a:rPr lang="en-US" smtClean="0"/>
-              <a:t>5/29/2024</a:t>
+              <a:t>10/18/2024</a:t>
             </a:fld>
             <a:endParaRPr lang="en-US"/>
           </a:p>
@@ -670,7 +1106,7 @@
           <a:p>
             <a:fld id="{62A70C6D-A3C4-4C44-A745-7E174427F35D}" type="datetimeFigureOut">
               <a:rPr lang="en-US" smtClean="0"/>
-              <a:t>5/29/2024</a:t>
+              <a:t>10/18/2024</a:t>
             </a:fld>
             <a:endParaRPr lang="en-US"/>
           </a:p>
@@ -868,7 +1304,7 @@
           <a:p>
             <a:fld id="{62A70C6D-A3C4-4C44-A745-7E174427F35D}" type="datetimeFigureOut">
               <a:rPr lang="en-US" smtClean="0"/>
-              <a:t>5/29/2024</a:t>
+              <a:t>10/18/2024</a:t>
             </a:fld>
             <a:endParaRPr lang="en-US"/>
           </a:p>
@@ -1143,7 +1579,7 @@
           <a:p>
             <a:fld id="{62A70C6D-A3C4-4C44-A745-7E174427F35D}" type="datetimeFigureOut">
               <a:rPr lang="en-US" smtClean="0"/>
-              <a:t>5/29/2024</a:t>
+              <a:t>10/18/2024</a:t>
             </a:fld>
             <a:endParaRPr lang="en-US"/>
           </a:p>
@@ -1408,7 +1844,7 @@
           <a:p>
             <a:fld id="{62A70C6D-A3C4-4C44-A745-7E174427F35D}" type="datetimeFigureOut">
               <a:rPr lang="en-US" smtClean="0"/>
-              <a:t>5/29/2024</a:t>
+              <a:t>10/18/2024</a:t>
             </a:fld>
             <a:endParaRPr lang="en-US"/>
           </a:p>
@@ -1820,7 +2256,7 @@
           <a:p>
             <a:fld id="{62A70C6D-A3C4-4C44-A745-7E174427F35D}" type="datetimeFigureOut">
               <a:rPr lang="en-US" smtClean="0"/>
-              <a:t>5/29/2024</a:t>
+              <a:t>10/18/2024</a:t>
             </a:fld>
             <a:endParaRPr lang="en-US"/>
           </a:p>
@@ -1961,7 +2397,7 @@
           <a:p>
             <a:fld id="{62A70C6D-A3C4-4C44-A745-7E174427F35D}" type="datetimeFigureOut">
               <a:rPr lang="en-US" smtClean="0"/>
-              <a:t>5/29/2024</a:t>
+              <a:t>10/18/2024</a:t>
             </a:fld>
             <a:endParaRPr lang="en-US"/>
           </a:p>
@@ -2074,7 +2510,7 @@
           <a:p>
             <a:fld id="{62A70C6D-A3C4-4C44-A745-7E174427F35D}" type="datetimeFigureOut">
               <a:rPr lang="en-US" smtClean="0"/>
-              <a:t>5/29/2024</a:t>
+              <a:t>10/18/2024</a:t>
             </a:fld>
             <a:endParaRPr lang="en-US"/>
           </a:p>
@@ -2385,7 +2821,7 @@
           <a:p>
             <a:fld id="{62A70C6D-A3C4-4C44-A745-7E174427F35D}" type="datetimeFigureOut">
               <a:rPr lang="en-US" smtClean="0"/>
-              <a:t>5/29/2024</a:t>
+              <a:t>10/18/2024</a:t>
             </a:fld>
             <a:endParaRPr lang="en-US"/>
           </a:p>
@@ -2673,7 +3109,7 @@
           <a:p>
             <a:fld id="{62A70C6D-A3C4-4C44-A745-7E174427F35D}" type="datetimeFigureOut">
               <a:rPr lang="en-US" smtClean="0"/>
-              <a:t>5/29/2024</a:t>
+              <a:t>10/18/2024</a:t>
             </a:fld>
             <a:endParaRPr lang="en-US"/>
           </a:p>
@@ -2914,7 +3350,7 @@
           <a:p>
             <a:fld id="{62A70C6D-A3C4-4C44-A745-7E174427F35D}" type="datetimeFigureOut">
               <a:rPr lang="en-US" smtClean="0"/>
-              <a:t>5/29/2024</a:t>
+              <a:t>10/18/2024</a:t>
             </a:fld>
             <a:endParaRPr lang="en-US"/>
           </a:p>
@@ -5822,7 +6258,7 @@
           <p:nvPr>
             <p:extLst>
               <p:ext uri="{D42A27DB-BD31-4B8C-83A1-F6EECF244321}">
-                <p14:modId xmlns:p14="http://schemas.microsoft.com/office/powerpoint/2010/main" val="3110261516"/>
+                <p14:modId xmlns:p14="http://schemas.microsoft.com/office/powerpoint/2010/main" val="222790506"/>
               </p:ext>
             </p:extLst>
           </p:nvPr>
@@ -6004,7 +6440,10 @@
                     <a:bodyPr/>
                     <a:lstStyle/>
                     <a:p>
-                      <a:endParaRPr lang="en-US"/>
+                      <a:r>
+                        <a:rPr lang="en-US" dirty="0"/>
+                        <a:t>0</a:t>
+                      </a:r>
                     </a:p>
                   </a:txBody>
                   <a:tcPr/>
@@ -6073,7 +6512,10 @@
                     <a:bodyPr/>
                     <a:lstStyle/>
                     <a:p>
-                      <a:endParaRPr lang="en-US"/>
+                      <a:r>
+                        <a:rPr lang="en-US" dirty="0"/>
+                        <a:t>0</a:t>
+                      </a:r>
                     </a:p>
                   </a:txBody>
                   <a:tcPr/>
@@ -6142,7 +6584,10 @@
                     <a:bodyPr/>
                     <a:lstStyle/>
                     <a:p>
-                      <a:endParaRPr lang="en-US"/>
+                      <a:r>
+                        <a:rPr lang="en-US" dirty="0"/>
+                        <a:t>90</a:t>
+                      </a:r>
                     </a:p>
                   </a:txBody>
                   <a:tcPr/>
@@ -6211,7 +6656,10 @@
                     <a:bodyPr/>
                     <a:lstStyle/>
                     <a:p>
-                      <a:endParaRPr lang="en-US"/>
+                      <a:r>
+                        <a:rPr lang="en-US" dirty="0"/>
+                        <a:t>-180</a:t>
+                      </a:r>
                     </a:p>
                   </a:txBody>
                   <a:tcPr/>
@@ -6280,7 +6728,10 @@
                     <a:bodyPr/>
                     <a:lstStyle/>
                     <a:p>
-                      <a:endParaRPr lang="en-US"/>
+                      <a:r>
+                        <a:rPr lang="en-US" dirty="0"/>
+                        <a:t>90</a:t>
+                      </a:r>
                     </a:p>
                   </a:txBody>
                   <a:tcPr/>
@@ -6349,7 +6800,10 @@
                     <a:bodyPr/>
                     <a:lstStyle/>
                     <a:p>
-                      <a:endParaRPr lang="en-US" dirty="0"/>
+                      <a:r>
+                        <a:rPr lang="en-US" dirty="0"/>
+                        <a:t>0</a:t>
+                      </a:r>
                     </a:p>
                   </a:txBody>
                   <a:tcPr/>
@@ -6665,7 +7119,7 @@
         </p:blipFill>
         <p:spPr>
           <a:xfrm>
-            <a:off x="9004038" y="4762160"/>
+            <a:off x="8444645" y="4241341"/>
             <a:ext cx="5334000" cy="2171700"/>
           </a:xfrm>
           <a:prstGeom prst="rect">
@@ -9848,7 +10302,13 @@
           <p:cNvGraphicFramePr>
             <a:graphicFrameLocks noGrp="1"/>
           </p:cNvGraphicFramePr>
-          <p:nvPr/>
+          <p:nvPr>
+            <p:extLst>
+              <p:ext uri="{D42A27DB-BD31-4B8C-83A1-F6EECF244321}">
+                <p14:modId xmlns:p14="http://schemas.microsoft.com/office/powerpoint/2010/main" val="1328114417"/>
+              </p:ext>
+            </p:extLst>
+          </p:nvPr>
         </p:nvGraphicFramePr>
         <p:xfrm>
           <a:off x="8065965" y="931738"/>
@@ -10027,7 +10487,10 @@
                     <a:bodyPr/>
                     <a:lstStyle/>
                     <a:p>
-                      <a:endParaRPr lang="en-US"/>
+                      <a:r>
+                        <a:rPr lang="en-US" dirty="0"/>
+                        <a:t>0</a:t>
+                      </a:r>
                     </a:p>
                   </a:txBody>
                   <a:tcPr/>
@@ -10096,7 +10559,10 @@
                     <a:bodyPr/>
                     <a:lstStyle/>
                     <a:p>
-                      <a:endParaRPr lang="en-US"/>
+                      <a:r>
+                        <a:rPr lang="en-US" dirty="0"/>
+                        <a:t>0</a:t>
+                      </a:r>
                     </a:p>
                   </a:txBody>
                   <a:tcPr/>
@@ -10165,7 +10631,10 @@
                     <a:bodyPr/>
                     <a:lstStyle/>
                     <a:p>
-                      <a:endParaRPr lang="en-US"/>
+                      <a:r>
+                        <a:rPr lang="en-US" dirty="0"/>
+                        <a:t>90</a:t>
+                      </a:r>
                     </a:p>
                   </a:txBody>
                   <a:tcPr/>
@@ -10234,7 +10703,10 @@
                     <a:bodyPr/>
                     <a:lstStyle/>
                     <a:p>
-                      <a:endParaRPr lang="en-US"/>
+                      <a:r>
+                        <a:rPr lang="en-US" dirty="0"/>
+                        <a:t>-180</a:t>
+                      </a:r>
                     </a:p>
                   </a:txBody>
                   <a:tcPr/>
@@ -10303,7 +10775,10 @@
                     <a:bodyPr/>
                     <a:lstStyle/>
                     <a:p>
-                      <a:endParaRPr lang="en-US"/>
+                      <a:r>
+                        <a:rPr lang="en-US" dirty="0"/>
+                        <a:t>90</a:t>
+                      </a:r>
                     </a:p>
                   </a:txBody>
                   <a:tcPr/>
@@ -10372,7 +10847,10 @@
                     <a:bodyPr/>
                     <a:lstStyle/>
                     <a:p>
-                      <a:endParaRPr lang="en-US" dirty="0"/>
+                      <a:r>
+                        <a:rPr lang="en-US" dirty="0"/>
+                        <a:t>0</a:t>
+                      </a:r>
                     </a:p>
                   </a:txBody>
                   <a:tcPr/>
@@ -13852,7 +14330,13 @@
           <p:cNvGraphicFramePr>
             <a:graphicFrameLocks noGrp="1"/>
           </p:cNvGraphicFramePr>
-          <p:nvPr/>
+          <p:nvPr>
+            <p:extLst>
+              <p:ext uri="{D42A27DB-BD31-4B8C-83A1-F6EECF244321}">
+                <p14:modId xmlns:p14="http://schemas.microsoft.com/office/powerpoint/2010/main" val="423827568"/>
+              </p:ext>
+            </p:extLst>
+          </p:nvPr>
         </p:nvGraphicFramePr>
         <p:xfrm>
           <a:off x="8065965" y="931738"/>
@@ -14031,7 +14515,10 @@
                     <a:bodyPr/>
                     <a:lstStyle/>
                     <a:p>
-                      <a:endParaRPr lang="en-US"/>
+                      <a:r>
+                        <a:rPr lang="en-US" dirty="0"/>
+                        <a:t>0</a:t>
+                      </a:r>
                     </a:p>
                   </a:txBody>
                   <a:tcPr/>
@@ -14100,7 +14587,10 @@
                     <a:bodyPr/>
                     <a:lstStyle/>
                     <a:p>
-                      <a:endParaRPr lang="en-US"/>
+                      <a:r>
+                        <a:rPr lang="en-US" dirty="0"/>
+                        <a:t>0</a:t>
+                      </a:r>
                     </a:p>
                   </a:txBody>
                   <a:tcPr/>
@@ -14169,7 +14659,10 @@
                     <a:bodyPr/>
                     <a:lstStyle/>
                     <a:p>
-                      <a:endParaRPr lang="en-US"/>
+                      <a:r>
+                        <a:rPr lang="en-US" dirty="0"/>
+                        <a:t>90</a:t>
+                      </a:r>
                     </a:p>
                   </a:txBody>
                   <a:tcPr/>
@@ -14238,7 +14731,10 @@
                     <a:bodyPr/>
                     <a:lstStyle/>
                     <a:p>
-                      <a:endParaRPr lang="en-US"/>
+                      <a:r>
+                        <a:rPr lang="en-US" dirty="0"/>
+                        <a:t>-180</a:t>
+                      </a:r>
                     </a:p>
                   </a:txBody>
                   <a:tcPr/>
@@ -14307,7 +14803,10 @@
                     <a:bodyPr/>
                     <a:lstStyle/>
                     <a:p>
-                      <a:endParaRPr lang="en-US"/>
+                      <a:r>
+                        <a:rPr lang="en-US" dirty="0"/>
+                        <a:t>90</a:t>
+                      </a:r>
                     </a:p>
                   </a:txBody>
                   <a:tcPr/>
@@ -14376,7 +14875,10 @@
                     <a:bodyPr/>
                     <a:lstStyle/>
                     <a:p>
-                      <a:endParaRPr lang="en-US" dirty="0"/>
+                      <a:r>
+                        <a:rPr lang="en-US" dirty="0"/>
+                        <a:t>0</a:t>
+                      </a:r>
                     </a:p>
                   </a:txBody>
                   <a:tcPr/>
@@ -14670,36 +15172,6 @@
           </p:txBody>
         </p:sp>
       </p:grpSp>
-      <p:pic>
-        <p:nvPicPr>
-          <p:cNvPr id="78" name="Picture 77">
-            <a:extLst>
-              <a:ext uri="{FF2B5EF4-FFF2-40B4-BE49-F238E27FC236}">
-                <a16:creationId xmlns:a16="http://schemas.microsoft.com/office/drawing/2014/main" id="{536ECC96-BB77-CF78-3BA9-18EAE700A072}"/>
-              </a:ext>
-            </a:extLst>
-          </p:cNvPr>
-          <p:cNvPicPr>
-            <a:picLocks noChangeAspect="1"/>
-          </p:cNvPicPr>
-          <p:nvPr/>
-        </p:nvPicPr>
-        <p:blipFill>
-          <a:blip r:embed="rId2"/>
-          <a:stretch>
-            <a:fillRect/>
-          </a:stretch>
-        </p:blipFill>
-        <p:spPr>
-          <a:xfrm>
-            <a:off x="8382259" y="3906630"/>
-            <a:ext cx="5334000" cy="2171700"/>
-          </a:xfrm>
-          <a:prstGeom prst="rect">
-            <a:avLst/>
-          </a:prstGeom>
-        </p:spPr>
-      </p:pic>
       <p:cxnSp>
         <p:nvCxnSpPr>
           <p:cNvPr id="7" name="Straight Connector 6">
@@ -15543,6 +16015,36 @@
           <a:xfrm>
             <a:off x="4719189" y="5997104"/>
             <a:ext cx="3448050" cy="600075"/>
+          </a:xfrm>
+          <a:prstGeom prst="rect">
+            <a:avLst/>
+          </a:prstGeom>
+        </p:spPr>
+      </p:pic>
+      <p:pic>
+        <p:nvPicPr>
+          <p:cNvPr id="12" name="Picture 11">
+            <a:extLst>
+              <a:ext uri="{FF2B5EF4-FFF2-40B4-BE49-F238E27FC236}">
+                <a16:creationId xmlns:a16="http://schemas.microsoft.com/office/drawing/2014/main" id="{DD3996DC-A98D-34D5-CA15-616832AAE465}"/>
+              </a:ext>
+            </a:extLst>
+          </p:cNvPr>
+          <p:cNvPicPr>
+            <a:picLocks noChangeAspect="1"/>
+          </p:cNvPicPr>
+          <p:nvPr/>
+        </p:nvPicPr>
+        <p:blipFill>
+          <a:blip r:embed="rId5"/>
+          <a:stretch>
+            <a:fillRect/>
+          </a:stretch>
+        </p:blipFill>
+        <p:spPr>
+          <a:xfrm>
+            <a:off x="8577341" y="3918779"/>
+            <a:ext cx="4115842" cy="3359871"/>
           </a:xfrm>
           <a:prstGeom prst="rect">
             <a:avLst/>
@@ -16441,4 +16943,319 @@
     </a:ext>
   </a:extLst>
 </a:theme>
+</file>
+
+<file path=ppt/theme/theme2.xml><?xml version="1.0" encoding="utf-8"?>
+<a:theme xmlns:a="http://schemas.openxmlformats.org/drawingml/2006/main" name="Office Theme">
+  <a:themeElements>
+    <a:clrScheme name="Office">
+      <a:dk1>
+        <a:sysClr val="windowText" lastClr="000000"/>
+      </a:dk1>
+      <a:lt1>
+        <a:sysClr val="window" lastClr="FFFFFF"/>
+      </a:lt1>
+      <a:dk2>
+        <a:srgbClr val="0E2841"/>
+      </a:dk2>
+      <a:lt2>
+        <a:srgbClr val="E8E8E8"/>
+      </a:lt2>
+      <a:accent1>
+        <a:srgbClr val="156082"/>
+      </a:accent1>
+      <a:accent2>
+        <a:srgbClr val="E97132"/>
+      </a:accent2>
+      <a:accent3>
+        <a:srgbClr val="196B24"/>
+      </a:accent3>
+      <a:accent4>
+        <a:srgbClr val="0F9ED5"/>
+      </a:accent4>
+      <a:accent5>
+        <a:srgbClr val="A02B93"/>
+      </a:accent5>
+      <a:accent6>
+        <a:srgbClr val="4EA72E"/>
+      </a:accent6>
+      <a:hlink>
+        <a:srgbClr val="467886"/>
+      </a:hlink>
+      <a:folHlink>
+        <a:srgbClr val="96607D"/>
+      </a:folHlink>
+    </a:clrScheme>
+    <a:fontScheme name="Office">
+      <a:majorFont>
+        <a:latin typeface="Aptos Display" panose="02110004020202020204"/>
+        <a:ea typeface=""/>
+        <a:cs typeface=""/>
+        <a:font script="Jpan" typeface="游ゴシック Light"/>
+        <a:font script="Hang" typeface="맑은 고딕"/>
+        <a:font script="Hans" typeface="等线 Light"/>
+        <a:font script="Hant" typeface="新細明體"/>
+        <a:font script="Arab" typeface="Times New Roman"/>
+        <a:font script="Hebr" typeface="Times New Roman"/>
+        <a:font script="Thai" typeface="Angsana New"/>
+        <a:font script="Ethi" typeface="Nyala"/>
+        <a:font script="Beng" typeface="Vrinda"/>
+        <a:font script="Gujr" typeface="Shruti"/>
+        <a:font script="Khmr" typeface="MoolBoran"/>
+        <a:font script="Knda" typeface="Tunga"/>
+        <a:font script="Guru" typeface="Raavi"/>
+        <a:font script="Cans" typeface="Euphemia"/>
+        <a:font script="Cher" typeface="Plantagenet Cherokee"/>
+        <a:font script="Yiii" typeface="Microsoft Yi Baiti"/>
+        <a:font script="Tibt" typeface="Microsoft Himalaya"/>
+        <a:font script="Thaa" typeface="MV Boli"/>
+        <a:font script="Deva" typeface="Mangal"/>
+        <a:font script="Telu" typeface="Gautami"/>
+        <a:font script="Taml" typeface="Latha"/>
+        <a:font script="Syrc" typeface="Estrangelo Edessa"/>
+        <a:font script="Orya" typeface="Kalinga"/>
+        <a:font script="Mlym" typeface="Kartika"/>
+        <a:font script="Laoo" typeface="DokChampa"/>
+        <a:font script="Sinh" typeface="Iskoola Pota"/>
+        <a:font script="Mong" typeface="Mongolian Baiti"/>
+        <a:font script="Viet" typeface="Times New Roman"/>
+        <a:font script="Uigh" typeface="Microsoft Uighur"/>
+        <a:font script="Geor" typeface="Sylfaen"/>
+        <a:font script="Armn" typeface="Arial"/>
+        <a:font script="Bugi" typeface="Leelawadee UI"/>
+        <a:font script="Bopo" typeface="Microsoft JhengHei"/>
+        <a:font script="Java" typeface="Javanese Text"/>
+        <a:font script="Lisu" typeface="Segoe UI"/>
+        <a:font script="Mymr" typeface="Myanmar Text"/>
+        <a:font script="Nkoo" typeface="Ebrima"/>
+        <a:font script="Olck" typeface="Nirmala UI"/>
+        <a:font script="Osma" typeface="Ebrima"/>
+        <a:font script="Phag" typeface="Phagspa"/>
+        <a:font script="Syrn" typeface="Estrangelo Edessa"/>
+        <a:font script="Syrj" typeface="Estrangelo Edessa"/>
+        <a:font script="Syre" typeface="Estrangelo Edessa"/>
+        <a:font script="Sora" typeface="Nirmala UI"/>
+        <a:font script="Tale" typeface="Microsoft Tai Le"/>
+        <a:font script="Talu" typeface="Microsoft New Tai Lue"/>
+        <a:font script="Tfng" typeface="Ebrima"/>
+      </a:majorFont>
+      <a:minorFont>
+        <a:latin typeface="Aptos" panose="02110004020202020204"/>
+        <a:ea typeface=""/>
+        <a:cs typeface=""/>
+        <a:font script="Jpan" typeface="游ゴシック"/>
+        <a:font script="Hang" typeface="맑은 고딕"/>
+        <a:font script="Hans" typeface="等线"/>
+        <a:font script="Hant" typeface="新細明體"/>
+        <a:font script="Arab" typeface="Arial"/>
+        <a:font script="Hebr" typeface="Arial"/>
+        <a:font script="Thai" typeface="Cordia New"/>
+        <a:font script="Ethi" typeface="Nyala"/>
+        <a:font script="Beng" typeface="Vrinda"/>
+        <a:font script="Gujr" typeface="Shruti"/>
+        <a:font script="Khmr" typeface="DaunPenh"/>
+        <a:font script="Knda" typeface="Tunga"/>
+        <a:font script="Guru" typeface="Raavi"/>
+        <a:font script="Cans" typeface="Euphemia"/>
+        <a:font script="Cher" typeface="Plantagenet Cherokee"/>
+        <a:font script="Yiii" typeface="Microsoft Yi Baiti"/>
+        <a:font script="Tibt" typeface="Microsoft Himalaya"/>
+        <a:font script="Thaa" typeface="MV Boli"/>
+        <a:font script="Deva" typeface="Mangal"/>
+        <a:font script="Telu" typeface="Gautami"/>
+        <a:font script="Taml" typeface="Latha"/>
+        <a:font script="Syrc" typeface="Estrangelo Edessa"/>
+        <a:font script="Orya" typeface="Kalinga"/>
+        <a:font script="Mlym" typeface="Kartika"/>
+        <a:font script="Laoo" typeface="DokChampa"/>
+        <a:font script="Sinh" typeface="Iskoola Pota"/>
+        <a:font script="Mong" typeface="Mongolian Baiti"/>
+        <a:font script="Viet" typeface="Arial"/>
+        <a:font script="Uigh" typeface="Microsoft Uighur"/>
+        <a:font script="Geor" typeface="Sylfaen"/>
+        <a:font script="Armn" typeface="Arial"/>
+        <a:font script="Bugi" typeface="Leelawadee UI"/>
+        <a:font script="Bopo" typeface="Microsoft JhengHei"/>
+        <a:font script="Java" typeface="Javanese Text"/>
+        <a:font script="Lisu" typeface="Segoe UI"/>
+        <a:font script="Mymr" typeface="Myanmar Text"/>
+        <a:font script="Nkoo" typeface="Ebrima"/>
+        <a:font script="Olck" typeface="Nirmala UI"/>
+        <a:font script="Osma" typeface="Ebrima"/>
+        <a:font script="Phag" typeface="Phagspa"/>
+        <a:font script="Syrn" typeface="Estrangelo Edessa"/>
+        <a:font script="Syrj" typeface="Estrangelo Edessa"/>
+        <a:font script="Syre" typeface="Estrangelo Edessa"/>
+        <a:font script="Sora" typeface="Nirmala UI"/>
+        <a:font script="Tale" typeface="Microsoft Tai Le"/>
+        <a:font script="Talu" typeface="Microsoft New Tai Lue"/>
+        <a:font script="Tfng" typeface="Ebrima"/>
+      </a:minorFont>
+    </a:fontScheme>
+    <a:fmtScheme name="Office">
+      <a:fillStyleLst>
+        <a:solidFill>
+          <a:schemeClr val="phClr"/>
+        </a:solidFill>
+        <a:gradFill rotWithShape="1">
+          <a:gsLst>
+            <a:gs pos="0">
+              <a:schemeClr val="phClr">
+                <a:lumMod val="110000"/>
+                <a:satMod val="105000"/>
+                <a:tint val="67000"/>
+              </a:schemeClr>
+            </a:gs>
+            <a:gs pos="50000">
+              <a:schemeClr val="phClr">
+                <a:lumMod val="105000"/>
+                <a:satMod val="103000"/>
+                <a:tint val="73000"/>
+              </a:schemeClr>
+            </a:gs>
+            <a:gs pos="100000">
+              <a:schemeClr val="phClr">
+                <a:lumMod val="105000"/>
+                <a:satMod val="109000"/>
+                <a:tint val="81000"/>
+              </a:schemeClr>
+            </a:gs>
+          </a:gsLst>
+          <a:lin ang="5400000" scaled="0"/>
+        </a:gradFill>
+        <a:gradFill rotWithShape="1">
+          <a:gsLst>
+            <a:gs pos="0">
+              <a:schemeClr val="phClr">
+                <a:satMod val="103000"/>
+                <a:lumMod val="102000"/>
+                <a:tint val="94000"/>
+              </a:schemeClr>
+            </a:gs>
+            <a:gs pos="50000">
+              <a:schemeClr val="phClr">
+                <a:satMod val="110000"/>
+                <a:lumMod val="100000"/>
+                <a:shade val="100000"/>
+              </a:schemeClr>
+            </a:gs>
+            <a:gs pos="100000">
+              <a:schemeClr val="phClr">
+                <a:lumMod val="99000"/>
+                <a:satMod val="120000"/>
+                <a:shade val="78000"/>
+              </a:schemeClr>
+            </a:gs>
+          </a:gsLst>
+          <a:lin ang="5400000" scaled="0"/>
+        </a:gradFill>
+      </a:fillStyleLst>
+      <a:lnStyleLst>
+        <a:ln w="12700" cap="flat" cmpd="sng" algn="ctr">
+          <a:solidFill>
+            <a:schemeClr val="phClr"/>
+          </a:solidFill>
+          <a:prstDash val="solid"/>
+          <a:miter lim="800000"/>
+        </a:ln>
+        <a:ln w="19050" cap="flat" cmpd="sng" algn="ctr">
+          <a:solidFill>
+            <a:schemeClr val="phClr"/>
+          </a:solidFill>
+          <a:prstDash val="solid"/>
+          <a:miter lim="800000"/>
+        </a:ln>
+        <a:ln w="25400" cap="flat" cmpd="sng" algn="ctr">
+          <a:solidFill>
+            <a:schemeClr val="phClr"/>
+          </a:solidFill>
+          <a:prstDash val="solid"/>
+          <a:miter lim="800000"/>
+        </a:ln>
+      </a:lnStyleLst>
+      <a:effectStyleLst>
+        <a:effectStyle>
+          <a:effectLst/>
+        </a:effectStyle>
+        <a:effectStyle>
+          <a:effectLst/>
+        </a:effectStyle>
+        <a:effectStyle>
+          <a:effectLst>
+            <a:outerShdw blurRad="57150" dist="19050" dir="5400000" algn="ctr" rotWithShape="0">
+              <a:srgbClr val="000000">
+                <a:alpha val="63000"/>
+              </a:srgbClr>
+            </a:outerShdw>
+          </a:effectLst>
+        </a:effectStyle>
+      </a:effectStyleLst>
+      <a:bgFillStyleLst>
+        <a:solidFill>
+          <a:schemeClr val="phClr"/>
+        </a:solidFill>
+        <a:solidFill>
+          <a:schemeClr val="phClr">
+            <a:tint val="95000"/>
+            <a:satMod val="170000"/>
+          </a:schemeClr>
+        </a:solidFill>
+        <a:gradFill rotWithShape="1">
+          <a:gsLst>
+            <a:gs pos="0">
+              <a:schemeClr val="phClr">
+                <a:tint val="93000"/>
+                <a:satMod val="150000"/>
+                <a:shade val="98000"/>
+                <a:lumMod val="102000"/>
+              </a:schemeClr>
+            </a:gs>
+            <a:gs pos="50000">
+              <a:schemeClr val="phClr">
+                <a:tint val="98000"/>
+                <a:satMod val="130000"/>
+                <a:shade val="90000"/>
+                <a:lumMod val="103000"/>
+              </a:schemeClr>
+            </a:gs>
+            <a:gs pos="100000">
+              <a:schemeClr val="phClr">
+                <a:shade val="63000"/>
+                <a:satMod val="120000"/>
+              </a:schemeClr>
+            </a:gs>
+          </a:gsLst>
+          <a:lin ang="5400000" scaled="0"/>
+        </a:gradFill>
+      </a:bgFillStyleLst>
+    </a:fmtScheme>
+  </a:themeElements>
+  <a:objectDefaults>
+    <a:lnDef>
+      <a:spPr/>
+      <a:bodyPr/>
+      <a:lstStyle/>
+      <a:style>
+        <a:lnRef idx="2">
+          <a:schemeClr val="accent1"/>
+        </a:lnRef>
+        <a:fillRef idx="0">
+          <a:schemeClr val="accent1"/>
+        </a:fillRef>
+        <a:effectRef idx="1">
+          <a:schemeClr val="accent1"/>
+        </a:effectRef>
+        <a:fontRef idx="minor">
+          <a:schemeClr val="tx1"/>
+        </a:fontRef>
+      </a:style>
+    </a:lnDef>
+  </a:objectDefaults>
+  <a:extraClrSchemeLst/>
+  <a:extLst>
+    <a:ext uri="{05A4C25C-085E-4340-85A3-A5531E510DB2}">
+      <thm15:themeFamily xmlns:thm15="http://schemas.microsoft.com/office/thememl/2012/main" name="Office Theme" id="{2E142A2C-CD16-42D6-873A-C26D2A0506FA}" vid="{1BDDFF52-6CD6-40A5-AB3C-68EB2F1E4D0A}"/>
+    </a:ext>
+  </a:extLst>
+</a:theme>
 </file>
</xml_diff>

<commit_message>
Added TCP. Y rotation not working
</commit_message>
<xml_diff>
--- a/Doc/Denavit-Hartenberg.pptx
+++ b/Doc/Denavit-Hartenberg.pptx
@@ -16250,8 +16250,8 @@
         </p:nvSpPr>
         <p:spPr>
           <a:xfrm>
-            <a:off x="2963900" y="2835595"/>
-            <a:ext cx="589585" cy="369332"/>
+            <a:off x="3008436" y="2866351"/>
+            <a:ext cx="617477" cy="369332"/>
           </a:xfrm>
           <a:prstGeom prst="rect">
             <a:avLst/>
@@ -16265,10 +16265,9 @@
           <a:lstStyle/>
           <a:p>
             <a:r>
-              <a:rPr lang="en-US" dirty="0" err="1"/>
-              <a:t>Tbw</a:t>
+              <a:rPr lang="en-US" dirty="0"/>
+              <a:t>Tb2f</a:t>
             </a:r>
-            <a:endParaRPr lang="en-US" dirty="0"/>
           </a:p>
         </p:txBody>
       </p:sp>
@@ -16327,7 +16326,7 @@
         </p:nvSpPr>
         <p:spPr>
           <a:xfrm>
-            <a:off x="3870356" y="3651739"/>
+            <a:off x="4060942" y="3192457"/>
             <a:ext cx="750975" cy="369332"/>
           </a:xfrm>
           <a:prstGeom prst="rect">
@@ -16363,8 +16362,8 @@
         </p:nvSpPr>
         <p:spPr>
           <a:xfrm>
-            <a:off x="5522613" y="1345370"/>
-            <a:ext cx="780855" cy="369332"/>
+            <a:off x="5286020" y="1776340"/>
+            <a:ext cx="1338251" cy="369332"/>
           </a:xfrm>
           <a:prstGeom prst="rect">
             <a:avLst/>
@@ -16379,7 +16378,7 @@
           <a:p>
             <a:r>
               <a:rPr lang="en-US" dirty="0" err="1"/>
-              <a:t>Twtcp</a:t>
+              <a:t>TFlangeTCP</a:t>
             </a:r>
             <a:endParaRPr lang="en-US" dirty="0"/>
           </a:p>
@@ -16426,6 +16425,78 @@
           </a:fontRef>
         </p:style>
       </p:cxnSp>
+      <p:sp>
+        <p:nvSpPr>
+          <p:cNvPr id="4" name="TextBox 3">
+            <a:extLst>
+              <a:ext uri="{FF2B5EF4-FFF2-40B4-BE49-F238E27FC236}">
+                <a16:creationId xmlns:a16="http://schemas.microsoft.com/office/drawing/2014/main" id="{9C4C13D6-C268-F42A-D1C4-5C07FA8BBAB4}"/>
+              </a:ext>
+            </a:extLst>
+          </p:cNvPr>
+          <p:cNvSpPr txBox="1"/>
+          <p:nvPr/>
+        </p:nvSpPr>
+        <p:spPr>
+          <a:xfrm>
+            <a:off x="5286020" y="2193927"/>
+            <a:ext cx="643253" cy="369332"/>
+          </a:xfrm>
+          <a:prstGeom prst="rect">
+            <a:avLst/>
+          </a:prstGeom>
+          <a:noFill/>
+        </p:spPr>
+        <p:txBody>
+          <a:bodyPr wrap="none" rtlCol="0">
+            <a:spAutoFit/>
+          </a:bodyPr>
+          <a:lstStyle/>
+          <a:p>
+            <a:r>
+              <a:rPr lang="en-US" dirty="0" err="1"/>
+              <a:t>Ptcp</a:t>
+            </a:r>
+            <a:endParaRPr lang="en-US" dirty="0"/>
+          </a:p>
+        </p:txBody>
+      </p:sp>
+      <p:sp>
+        <p:nvSpPr>
+          <p:cNvPr id="5" name="TextBox 4">
+            <a:extLst>
+              <a:ext uri="{FF2B5EF4-FFF2-40B4-BE49-F238E27FC236}">
+                <a16:creationId xmlns:a16="http://schemas.microsoft.com/office/drawing/2014/main" id="{3200BAC5-98A7-D25F-5F6E-C3F5EC54FD27}"/>
+              </a:ext>
+            </a:extLst>
+          </p:cNvPr>
+          <p:cNvSpPr txBox="1"/>
+          <p:nvPr/>
+        </p:nvSpPr>
+        <p:spPr>
+          <a:xfrm>
+            <a:off x="4357624" y="999051"/>
+            <a:ext cx="928396" cy="369332"/>
+          </a:xfrm>
+          <a:prstGeom prst="rect">
+            <a:avLst/>
+          </a:prstGeom>
+          <a:noFill/>
+        </p:spPr>
+        <p:txBody>
+          <a:bodyPr wrap="none" rtlCol="0">
+            <a:spAutoFit/>
+          </a:bodyPr>
+          <a:lstStyle/>
+          <a:p>
+            <a:r>
+              <a:rPr lang="en-US" dirty="0" err="1"/>
+              <a:t>Pflange</a:t>
+            </a:r>
+            <a:endParaRPr lang="en-US" dirty="0"/>
+          </a:p>
+        </p:txBody>
+      </p:sp>
     </p:spTree>
     <p:extLst>
       <p:ext uri="{BB962C8B-B14F-4D97-AF65-F5344CB8AC3E}">

</xml_diff>